<commit_message>
stamp works, except for rounded corners
</commit_message>
<xml_diff>
--- a/rectangleRotation.pptx
+++ b/rectangleRotation.pptx
@@ -6,6 +6,7 @@
   </p:sldMasterIdLst>
   <p:sldIdLst>
     <p:sldId id="260" r:id="rId2"/>
+    <p:sldId id="261" r:id="rId3"/>
   </p:sldIdLst>
   <p:sldSz cx="12192000" cy="6858000"/>
   <p:notesSz cx="6858000" cy="9144000"/>
@@ -3361,7 +3362,7 @@
         </p:nvSpPr>
         <p:spPr>
           <a:xfrm>
-            <a:off x="873303" y="945222"/>
+            <a:off x="400699" y="1027415"/>
             <a:ext cx="10705672" cy="4294598"/>
           </a:xfrm>
           <a:prstGeom prst="rect">
@@ -3419,7 +3420,7 @@
         </p:nvSpPr>
         <p:spPr>
           <a:xfrm rot="575565">
-            <a:off x="2566607" y="1549773"/>
+            <a:off x="2094003" y="1631966"/>
             <a:ext cx="7351158" cy="3092110"/>
           </a:xfrm>
           <a:prstGeom prst="rect">
@@ -3475,7 +3476,7 @@
         </p:nvSpPr>
         <p:spPr>
           <a:xfrm>
-            <a:off x="3764280" y="838200"/>
+            <a:off x="3291676" y="920393"/>
             <a:ext cx="342900" cy="369332"/>
           </a:xfrm>
           <a:prstGeom prst="rect">
@@ -3511,7 +3512,7 @@
         </p:nvSpPr>
         <p:spPr>
           <a:xfrm>
-            <a:off x="3538252" y="1074723"/>
+            <a:off x="3065648" y="1156916"/>
             <a:ext cx="342900" cy="369332"/>
           </a:xfrm>
           <a:prstGeom prst="rect">
@@ -3535,10 +3536,10 @@
       </p:sp>
       <p:sp>
         <p:nvSpPr>
-          <p:cNvPr id="22" name="TextBox 21">
-            <a:extLst>
-              <a:ext uri="{FF2B5EF4-FFF2-40B4-BE49-F238E27FC236}">
-                <a16:creationId xmlns:a16="http://schemas.microsoft.com/office/drawing/2014/main" id="{ACEB17EF-0B5F-C147-BE35-24863ADF1D6C}"/>
+          <p:cNvPr id="30" name="TextBox 29">
+            <a:extLst>
+              <a:ext uri="{FF2B5EF4-FFF2-40B4-BE49-F238E27FC236}">
+                <a16:creationId xmlns:a16="http://schemas.microsoft.com/office/drawing/2014/main" id="{098F1191-0EF2-3943-946C-6B5A0AEF03FB}"/>
               </a:ext>
             </a:extLst>
           </p:cNvPr>
@@ -3547,50 +3548,7 @@
         </p:nvSpPr>
         <p:spPr>
           <a:xfrm>
-            <a:off x="1260769" y="309732"/>
-            <a:ext cx="1603709" cy="369332"/>
-          </a:xfrm>
-          <a:prstGeom prst="rect">
-            <a:avLst/>
-          </a:prstGeom>
-          <a:noFill/>
-        </p:spPr>
-        <p:txBody>
-          <a:bodyPr wrap="none" rtlCol="0">
-            <a:spAutoFit/>
-          </a:bodyPr>
-          <a:lstStyle/>
-          <a:p>
-            <a:r>
-              <a:rPr lang="en-US" dirty="0"/>
-              <a:t>B1/A1 = tan(</a:t>
-            </a:r>
-            <a:r>
-              <a:rPr lang="el-GR" dirty="0"/>
-              <a:t>β</a:t>
-            </a:r>
-            <a:r>
-              <a:rPr lang="en-US" dirty="0"/>
-              <a:t>)</a:t>
-            </a:r>
-          </a:p>
-        </p:txBody>
-      </p:sp>
-      <p:sp>
-        <p:nvSpPr>
-          <p:cNvPr id="30" name="TextBox 29">
-            <a:extLst>
-              <a:ext uri="{FF2B5EF4-FFF2-40B4-BE49-F238E27FC236}">
-                <a16:creationId xmlns:a16="http://schemas.microsoft.com/office/drawing/2014/main" id="{098F1191-0EF2-3943-946C-6B5A0AEF03FB}"/>
-              </a:ext>
-            </a:extLst>
-          </p:cNvPr>
-          <p:cNvSpPr txBox="1"/>
-          <p:nvPr/>
-        </p:nvSpPr>
-        <p:spPr>
-          <a:xfrm>
-            <a:off x="5732986" y="4613940"/>
+            <a:off x="5260382" y="4696133"/>
             <a:ext cx="435300" cy="369332"/>
           </a:xfrm>
           <a:prstGeom prst="rect">
@@ -3626,7 +3584,7 @@
         </p:nvSpPr>
         <p:spPr>
           <a:xfrm>
-            <a:off x="9868709" y="3531066"/>
+            <a:off x="9396105" y="3613259"/>
             <a:ext cx="487642" cy="369332"/>
           </a:xfrm>
           <a:prstGeom prst="rect">
@@ -3648,8 +3606,8 @@
           </a:p>
         </p:txBody>
       </p:sp>
-      <mc:AlternateContent xmlns:mc="http://schemas.openxmlformats.org/markup-compatibility/2006" xmlns:a14="http://schemas.microsoft.com/office/drawing/2010/main">
-        <mc:Choice Requires="a14">
+      <mc:AlternateContent xmlns:mc="http://schemas.openxmlformats.org/markup-compatibility/2006">
+        <mc:Choice xmlns:a14="http://schemas.microsoft.com/office/drawing/2010/main" Requires="a14">
           <p:sp>
             <p:nvSpPr>
               <p:cNvPr id="32" name="TextBox 31">
@@ -3664,7 +3622,7 @@
             </p:nvSpPr>
             <p:spPr>
               <a:xfrm>
-                <a:off x="3213727" y="152317"/>
+                <a:off x="2741123" y="234510"/>
                 <a:ext cx="4320093" cy="612732"/>
               </a:xfrm>
               <a:prstGeom prst="rect">
@@ -3922,7 +3880,7 @@
             </p:txBody>
           </p:sp>
         </mc:Choice>
-        <mc:Fallback xmlns="">
+        <mc:Fallback>
           <p:sp>
             <p:nvSpPr>
               <p:cNvPr id="32" name="TextBox 31">
@@ -3939,7 +3897,7 @@
             </p:nvSpPr>
             <p:spPr>
               <a:xfrm>
-                <a:off x="3213727" y="152317"/>
+                <a:off x="2741123" y="234510"/>
                 <a:ext cx="4320093" cy="612732"/>
               </a:xfrm>
               <a:prstGeom prst="rect">
@@ -3967,8 +3925,8 @@
           </p:sp>
         </mc:Fallback>
       </mc:AlternateContent>
-      <mc:AlternateContent xmlns:mc="http://schemas.openxmlformats.org/markup-compatibility/2006" xmlns:a14="http://schemas.microsoft.com/office/drawing/2010/main">
-        <mc:Choice Requires="a14">
+      <mc:AlternateContent xmlns:mc="http://schemas.openxmlformats.org/markup-compatibility/2006">
+        <mc:Choice xmlns:a14="http://schemas.microsoft.com/office/drawing/2010/main" Requires="a14">
           <p:sp>
             <p:nvSpPr>
               <p:cNvPr id="35" name="TextBox 34">
@@ -3983,8 +3941,8 @@
             </p:nvSpPr>
             <p:spPr>
               <a:xfrm>
-                <a:off x="6773364" y="5706650"/>
-                <a:ext cx="4805611" cy="714683"/>
+                <a:off x="2951567" y="5852192"/>
+                <a:ext cx="5636030" cy="887935"/>
               </a:xfrm>
               <a:prstGeom prst="rect">
                 <a:avLst/>
@@ -3997,13 +3955,33 @@
               </a:bodyPr>
               <a:lstStyle/>
               <a:p>
-                <a:pPr/>
                 <a14:m>
                   <m:oMathPara xmlns:m="http://schemas.openxmlformats.org/officeDocument/2006/math">
                     <m:oMathParaPr>
                       <m:jc m:val="centerGroup"/>
                     </m:oMathParaPr>
                     <m:oMath xmlns:m="http://schemas.openxmlformats.org/officeDocument/2006/math">
+                      <m:r>
+                        <m:rPr>
+                          <m:nor/>
+                        </m:rPr>
+                        <a:rPr lang="en-US" dirty="0"/>
+                        <m:t>Scaling</m:t>
+                      </m:r>
+                      <m:r>
+                        <m:rPr>
+                          <m:nor/>
+                        </m:rPr>
+                        <a:rPr lang="en-US" dirty="0"/>
+                        <m:t> </m:t>
+                      </m:r>
+                      <m:r>
+                        <m:rPr>
+                          <m:nor/>
+                        </m:rPr>
+                        <a:rPr lang="en-US" dirty="0"/>
+                        <m:t>factor</m:t>
+                      </m:r>
                       <m:r>
                         <a:rPr lang="en-GB" b="0" i="1" smtClean="0">
                           <a:latin typeface="Cambria Math" panose="02040503050406030204" pitchFamily="18" charset="0"/>
@@ -4029,43 +4007,6 @@
                             <a:rPr lang="en-US" b="0" i="1" smtClean="0">
                               <a:latin typeface="Cambria Math" panose="02040503050406030204" pitchFamily="18" charset="0"/>
                             </a:rPr>
-                            <m:t>2</m:t>
-                          </m:r>
-                        </m:num>
-                        <m:den>
-                          <m:r>
-                            <a:rPr lang="en-US" b="0" i="1" smtClean="0">
-                              <a:latin typeface="Cambria Math" panose="02040503050406030204" pitchFamily="18" charset="0"/>
-                            </a:rPr>
-                            <m:t>𝐵</m:t>
-                          </m:r>
-                          <m:r>
-                            <a:rPr lang="en-US" b="0" i="1" smtClean="0">
-                              <a:latin typeface="Cambria Math" panose="02040503050406030204" pitchFamily="18" charset="0"/>
-                            </a:rPr>
-                            <m:t>1</m:t>
-                          </m:r>
-                        </m:den>
-                      </m:f>
-                      <m:r>
-                        <a:rPr lang="en-US" b="0" i="1" smtClean="0">
-                          <a:latin typeface="Cambria Math" panose="02040503050406030204" pitchFamily="18" charset="0"/>
-                        </a:rPr>
-                        <m:t>=</m:t>
-                      </m:r>
-                      <m:f>
-                        <m:fPr>
-                          <m:ctrlPr>
-                            <a:rPr lang="en-GB" b="0" i="1" smtClean="0">
-                              <a:latin typeface="Cambria Math" panose="02040503050406030204" pitchFamily="18" charset="0"/>
-                            </a:rPr>
-                          </m:ctrlPr>
-                        </m:fPr>
-                        <m:num>
-                          <m:r>
-                            <a:rPr lang="en-US" b="0" i="1" smtClean="0">
-                              <a:latin typeface="Cambria Math" panose="02040503050406030204" pitchFamily="18" charset="0"/>
-                            </a:rPr>
                             <m:t>1</m:t>
                           </m:r>
                         </m:num>
@@ -4080,10 +4021,40 @@
                             <a:rPr lang="en-US" b="0" i="1" smtClean="0">
                               <a:latin typeface="Cambria Math" panose="02040503050406030204" pitchFamily="18" charset="0"/>
                             </a:rPr>
-                            <m:t>1</m:t>
+                            <m:t>2</m:t>
                           </m:r>
                         </m:den>
                       </m:f>
+                      <m:r>
+                        <a:rPr lang="en-US" i="1">
+                          <a:latin typeface="Cambria Math" panose="02040503050406030204" pitchFamily="18" charset="0"/>
+                        </a:rPr>
+                        <m:t> </m:t>
+                      </m:r>
+                      <m:r>
+                        <a:rPr lang="en-US" i="1">
+                          <a:latin typeface="Cambria Math" panose="02040503050406030204" pitchFamily="18" charset="0"/>
+                        </a:rPr>
+                        <m:t>𝑤𝑖𝑡h</m:t>
+                      </m:r>
+                      <m:r>
+                        <a:rPr lang="en-US" b="0" i="1" smtClean="0">
+                          <a:latin typeface="Cambria Math" panose="02040503050406030204" pitchFamily="18" charset="0"/>
+                        </a:rPr>
+                        <m:t>   </m:t>
+                      </m:r>
+                      <m:r>
+                        <a:rPr lang="en-US" i="1">
+                          <a:latin typeface="Cambria Math" panose="02040503050406030204" pitchFamily="18" charset="0"/>
+                        </a:rPr>
+                        <m:t>𝐵</m:t>
+                      </m:r>
+                      <m:r>
+                        <a:rPr lang="en-US" i="1">
+                          <a:latin typeface="Cambria Math" panose="02040503050406030204" pitchFamily="18" charset="0"/>
+                        </a:rPr>
+                        <m:t>2=</m:t>
+                      </m:r>
                       <m:r>
                         <a:rPr lang="en-US" i="1">
                           <a:latin typeface="Cambria Math" panose="02040503050406030204" pitchFamily="18" charset="0"/>
@@ -4108,562 +4079,6 @@
                           </m:r>
                           <m:r>
                             <a:rPr lang="en-US" i="1">
-                              <a:latin typeface="Cambria Math" panose="02040503050406030204" pitchFamily="18" charset="0"/>
-                              <a:ea typeface="Cambria Math" panose="02040503050406030204" pitchFamily="18" charset="0"/>
-                            </a:rPr>
-                            <m:t>+</m:t>
-                          </m:r>
-                          <m:sSup>
-                            <m:sSupPr>
-                              <m:ctrlPr>
-                                <a:rPr lang="en-US" i="1">
-                                  <a:latin typeface="Cambria Math" panose="02040503050406030204" pitchFamily="18" charset="0"/>
-                                  <a:ea typeface="Cambria Math" panose="02040503050406030204" pitchFamily="18" charset="0"/>
-                                </a:rPr>
-                              </m:ctrlPr>
-                            </m:sSupPr>
-                            <m:e>
-                              <m:r>
-                                <a:rPr lang="en-US" i="1">
-                                  <a:latin typeface="Cambria Math" panose="02040503050406030204" pitchFamily="18" charset="0"/>
-                                  <a:ea typeface="Cambria Math" panose="02040503050406030204" pitchFamily="18" charset="0"/>
-                                </a:rPr>
-                                <m:t>𝑡𝑎𝑛</m:t>
-                              </m:r>
-                            </m:e>
-                            <m:sup>
-                              <m:r>
-                                <a:rPr lang="en-US" i="1">
-                                  <a:latin typeface="Cambria Math" panose="02040503050406030204" pitchFamily="18" charset="0"/>
-                                  <a:ea typeface="Cambria Math" panose="02040503050406030204" pitchFamily="18" charset="0"/>
-                                </a:rPr>
-                                <m:t>−1</m:t>
-                              </m:r>
-                            </m:sup>
-                          </m:sSup>
-                          <m:d>
-                            <m:dPr>
-                              <m:ctrlPr>
-                                <a:rPr lang="en-US" i="1">
-                                  <a:latin typeface="Cambria Math" panose="02040503050406030204" pitchFamily="18" charset="0"/>
-                                  <a:ea typeface="Cambria Math" panose="02040503050406030204" pitchFamily="18" charset="0"/>
-                                </a:rPr>
-                              </m:ctrlPr>
-                            </m:dPr>
-                            <m:e>
-                              <m:f>
-                                <m:fPr>
-                                  <m:ctrlPr>
-                                    <a:rPr lang="en-US" i="1">
-                                      <a:latin typeface="Cambria Math" panose="02040503050406030204" pitchFamily="18" charset="0"/>
-                                      <a:ea typeface="Cambria Math" panose="02040503050406030204" pitchFamily="18" charset="0"/>
-                                    </a:rPr>
-                                  </m:ctrlPr>
-                                </m:fPr>
-                                <m:num>
-                                  <m:r>
-                                    <a:rPr lang="en-US" i="1">
-                                      <a:latin typeface="Cambria Math" panose="02040503050406030204" pitchFamily="18" charset="0"/>
-                                      <a:ea typeface="Cambria Math" panose="02040503050406030204" pitchFamily="18" charset="0"/>
-                                    </a:rPr>
-                                    <m:t>𝐵</m:t>
-                                  </m:r>
-                                  <m:r>
-                                    <a:rPr lang="en-US" i="1">
-                                      <a:latin typeface="Cambria Math" panose="02040503050406030204" pitchFamily="18" charset="0"/>
-                                      <a:ea typeface="Cambria Math" panose="02040503050406030204" pitchFamily="18" charset="0"/>
-                                    </a:rPr>
-                                    <m:t>1</m:t>
-                                  </m:r>
-                                </m:num>
-                                <m:den>
-                                  <m:r>
-                                    <a:rPr lang="en-US" i="1">
-                                      <a:latin typeface="Cambria Math" panose="02040503050406030204" pitchFamily="18" charset="0"/>
-                                      <a:ea typeface="Cambria Math" panose="02040503050406030204" pitchFamily="18" charset="0"/>
-                                    </a:rPr>
-                                    <m:t>𝐴</m:t>
-                                  </m:r>
-                                  <m:r>
-                                    <a:rPr lang="en-US" i="1">
-                                      <a:latin typeface="Cambria Math" panose="02040503050406030204" pitchFamily="18" charset="0"/>
-                                      <a:ea typeface="Cambria Math" panose="02040503050406030204" pitchFamily="18" charset="0"/>
-                                    </a:rPr>
-                                    <m:t>1</m:t>
-                                  </m:r>
-                                </m:den>
-                              </m:f>
-                            </m:e>
-                          </m:d>
-                        </m:e>
-                      </m:d>
-                      <m:rad>
-                        <m:radPr>
-                          <m:degHide m:val="on"/>
-                          <m:ctrlPr>
-                            <a:rPr lang="en-US" i="1">
-                              <a:latin typeface="Cambria Math" panose="02040503050406030204" pitchFamily="18" charset="0"/>
-                              <a:ea typeface="Cambria Math" panose="02040503050406030204" pitchFamily="18" charset="0"/>
-                            </a:rPr>
-                          </m:ctrlPr>
-                        </m:radPr>
-                        <m:deg/>
-                        <m:e>
-                          <m:sSup>
-                            <m:sSupPr>
-                              <m:ctrlPr>
-                                <a:rPr lang="en-US" i="1">
-                                  <a:latin typeface="Cambria Math" panose="02040503050406030204" pitchFamily="18" charset="0"/>
-                                  <a:ea typeface="Cambria Math" panose="02040503050406030204" pitchFamily="18" charset="0"/>
-                                </a:rPr>
-                              </m:ctrlPr>
-                            </m:sSupPr>
-                            <m:e>
-                              <m:sSup>
-                                <m:sSupPr>
-                                  <m:ctrlPr>
-                                    <a:rPr lang="en-US" i="1">
-                                      <a:latin typeface="Cambria Math" panose="02040503050406030204" pitchFamily="18" charset="0"/>
-                                      <a:ea typeface="Cambria Math" panose="02040503050406030204" pitchFamily="18" charset="0"/>
-                                    </a:rPr>
-                                  </m:ctrlPr>
-                                </m:sSupPr>
-                                <m:e>
-                                  <m:r>
-                                    <a:rPr lang="en-US" i="1">
-                                      <a:latin typeface="Cambria Math" panose="02040503050406030204" pitchFamily="18" charset="0"/>
-                                      <a:ea typeface="Cambria Math" panose="02040503050406030204" pitchFamily="18" charset="0"/>
-                                    </a:rPr>
-                                    <m:t>𝐴</m:t>
-                                  </m:r>
-                                  <m:r>
-                                    <a:rPr lang="en-US" i="1">
-                                      <a:latin typeface="Cambria Math" panose="02040503050406030204" pitchFamily="18" charset="0"/>
-                                      <a:ea typeface="Cambria Math" panose="02040503050406030204" pitchFamily="18" charset="0"/>
-                                    </a:rPr>
-                                    <m:t>1</m:t>
-                                  </m:r>
-                                </m:e>
-                                <m:sup>
-                                  <m:r>
-                                    <a:rPr lang="en-US" i="1">
-                                      <a:latin typeface="Cambria Math" panose="02040503050406030204" pitchFamily="18" charset="0"/>
-                                      <a:ea typeface="Cambria Math" panose="02040503050406030204" pitchFamily="18" charset="0"/>
-                                    </a:rPr>
-                                    <m:t>2</m:t>
-                                  </m:r>
-                                </m:sup>
-                              </m:sSup>
-                              <m:r>
-                                <a:rPr lang="en-US" i="1">
-                                  <a:latin typeface="Cambria Math" panose="02040503050406030204" pitchFamily="18" charset="0"/>
-                                  <a:ea typeface="Cambria Math" panose="02040503050406030204" pitchFamily="18" charset="0"/>
-                                </a:rPr>
-                                <m:t>+</m:t>
-                              </m:r>
-                              <m:r>
-                                <a:rPr lang="en-US" i="1">
-                                  <a:latin typeface="Cambria Math" panose="02040503050406030204" pitchFamily="18" charset="0"/>
-                                  <a:ea typeface="Cambria Math" panose="02040503050406030204" pitchFamily="18" charset="0"/>
-                                </a:rPr>
-                                <m:t>𝐵</m:t>
-                              </m:r>
-                              <m:r>
-                                <a:rPr lang="en-US" i="1">
-                                  <a:latin typeface="Cambria Math" panose="02040503050406030204" pitchFamily="18" charset="0"/>
-                                  <a:ea typeface="Cambria Math" panose="02040503050406030204" pitchFamily="18" charset="0"/>
-                                </a:rPr>
-                                <m:t>1</m:t>
-                              </m:r>
-                            </m:e>
-                            <m:sup>
-                              <m:r>
-                                <a:rPr lang="en-US" i="1">
-                                  <a:latin typeface="Cambria Math" panose="02040503050406030204" pitchFamily="18" charset="0"/>
-                                  <a:ea typeface="Cambria Math" panose="02040503050406030204" pitchFamily="18" charset="0"/>
-                                </a:rPr>
-                                <m:t>2</m:t>
-                              </m:r>
-                            </m:sup>
-                          </m:sSup>
-                        </m:e>
-                      </m:rad>
-                    </m:oMath>
-                  </m:oMathPara>
-                </a14:m>
-                <a:endParaRPr lang="en-US" dirty="0"/>
-              </a:p>
-            </p:txBody>
-          </p:sp>
-        </mc:Choice>
-        <mc:Fallback xmlns="">
-          <p:sp>
-            <p:nvSpPr>
-              <p:cNvPr id="35" name="TextBox 34">
-                <a:extLst>
-                  <a:ext uri="{FF2B5EF4-FFF2-40B4-BE49-F238E27FC236}">
-                    <a16:creationId xmlns:a16="http://schemas.microsoft.com/office/drawing/2014/main" id="{335CA84D-80BE-054F-9DF4-A402871A8F70}"/>
-                  </a:ext>
-                </a:extLst>
-              </p:cNvPr>
-              <p:cNvSpPr txBox="1">
-                <a:spLocks noRot="1" noChangeAspect="1" noMove="1" noResize="1" noEditPoints="1" noAdjustHandles="1" noChangeArrowheads="1" noChangeShapeType="1" noTextEdit="1"/>
-              </p:cNvSpPr>
-              <p:nvPr/>
-            </p:nvSpPr>
-            <p:spPr>
-              <a:xfrm>
-                <a:off x="6773364" y="5706650"/>
-                <a:ext cx="4805611" cy="714683"/>
-              </a:xfrm>
-              <a:prstGeom prst="rect">
-                <a:avLst/>
-              </a:prstGeom>
-              <a:blipFill>
-                <a:blip r:embed="rId3"/>
-                <a:stretch>
-                  <a:fillRect/>
-                </a:stretch>
-              </a:blipFill>
-            </p:spPr>
-            <p:txBody>
-              <a:bodyPr/>
-              <a:lstStyle/>
-              <a:p>
-                <a:r>
-                  <a:rPr lang="en-VN">
-                    <a:noFill/>
-                  </a:rPr>
-                  <a:t> </a:t>
-                </a:r>
-              </a:p>
-            </p:txBody>
-          </p:sp>
-        </mc:Fallback>
-      </mc:AlternateContent>
-      <p:sp>
-        <p:nvSpPr>
-          <p:cNvPr id="36" name="Rectangle 35">
-            <a:extLst>
-              <a:ext uri="{FF2B5EF4-FFF2-40B4-BE49-F238E27FC236}">
-                <a16:creationId xmlns:a16="http://schemas.microsoft.com/office/drawing/2014/main" id="{0B461721-D99E-F547-B863-7AAD5D3926D9}"/>
-              </a:ext>
-            </a:extLst>
-          </p:cNvPr>
-          <p:cNvSpPr/>
-          <p:nvPr/>
-        </p:nvSpPr>
-        <p:spPr>
-          <a:xfrm>
-            <a:off x="5475999" y="5877388"/>
-            <a:ext cx="1490473" cy="369332"/>
-          </a:xfrm>
-          <a:prstGeom prst="rect">
-            <a:avLst/>
-          </a:prstGeom>
-        </p:spPr>
-        <p:txBody>
-          <a:bodyPr wrap="none">
-            <a:spAutoFit/>
-          </a:bodyPr>
-          <a:lstStyle/>
-          <a:p>
-            <a:r>
-              <a:rPr lang="en-US" dirty="0"/>
-              <a:t>Scaling factor</a:t>
-            </a:r>
-            <a:endParaRPr lang="de-DE" dirty="0"/>
-          </a:p>
-        </p:txBody>
-      </p:sp>
-      <p:cxnSp>
-        <p:nvCxnSpPr>
-          <p:cNvPr id="38" name="Straight Connector 37">
-            <a:extLst>
-              <a:ext uri="{FF2B5EF4-FFF2-40B4-BE49-F238E27FC236}">
-                <a16:creationId xmlns:a16="http://schemas.microsoft.com/office/drawing/2014/main" id="{35C14695-3F9D-7E45-B75B-1728B794F7F4}"/>
-              </a:ext>
-            </a:extLst>
-          </p:cNvPr>
-          <p:cNvCxnSpPr/>
-          <p:nvPr/>
-        </p:nvCxnSpPr>
-        <p:spPr>
-          <a:xfrm flipV="1">
-            <a:off x="9605913" y="958878"/>
-            <a:ext cx="0" cy="4273900"/>
-          </a:xfrm>
-          <a:prstGeom prst="line">
-            <a:avLst/>
-          </a:prstGeom>
-          <a:ln w="28575">
-            <a:solidFill>
-              <a:schemeClr val="tx1"/>
-            </a:solidFill>
-            <a:prstDash val="dash"/>
-          </a:ln>
-        </p:spPr>
-        <p:style>
-          <a:lnRef idx="1">
-            <a:schemeClr val="accent1"/>
-          </a:lnRef>
-          <a:fillRef idx="0">
-            <a:schemeClr val="accent1"/>
-          </a:fillRef>
-          <a:effectRef idx="0">
-            <a:schemeClr val="accent1"/>
-          </a:effectRef>
-          <a:fontRef idx="minor">
-            <a:schemeClr val="tx1"/>
-          </a:fontRef>
-        </p:style>
-      </p:cxnSp>
-      <p:cxnSp>
-        <p:nvCxnSpPr>
-          <p:cNvPr id="25" name="Straight Connector 24">
-            <a:extLst>
-              <a:ext uri="{FF2B5EF4-FFF2-40B4-BE49-F238E27FC236}">
-                <a16:creationId xmlns:a16="http://schemas.microsoft.com/office/drawing/2014/main" id="{15FB0CE4-7621-064C-BCD0-CE3F9F5994AA}"/>
-              </a:ext>
-            </a:extLst>
-          </p:cNvPr>
-          <p:cNvCxnSpPr>
-            <a:cxnSpLocks/>
-          </p:cNvCxnSpPr>
-          <p:nvPr/>
-        </p:nvCxnSpPr>
-        <p:spPr>
-          <a:xfrm rot="575565">
-            <a:off x="2544349" y="1527515"/>
-            <a:ext cx="7351158" cy="3092110"/>
-          </a:xfrm>
-          <a:prstGeom prst="line">
-            <a:avLst/>
-          </a:prstGeom>
-          <a:ln>
-            <a:solidFill>
-              <a:srgbClr val="FF0000"/>
-            </a:solidFill>
-          </a:ln>
-        </p:spPr>
-        <p:style>
-          <a:lnRef idx="1">
-            <a:schemeClr val="accent1"/>
-          </a:lnRef>
-          <a:fillRef idx="0">
-            <a:schemeClr val="accent1"/>
-          </a:fillRef>
-          <a:effectRef idx="0">
-            <a:schemeClr val="accent1"/>
-          </a:effectRef>
-          <a:fontRef idx="minor">
-            <a:schemeClr val="tx1"/>
-          </a:fontRef>
-        </p:style>
-      </p:cxnSp>
-      <p:sp>
-        <p:nvSpPr>
-          <p:cNvPr id="27" name="Rounded Rectangular Callout 26">
-            <a:extLst>
-              <a:ext uri="{FF2B5EF4-FFF2-40B4-BE49-F238E27FC236}">
-                <a16:creationId xmlns:a16="http://schemas.microsoft.com/office/drawing/2014/main" id="{2B0E5EFA-324B-084B-88F9-1DAEB1A1D872}"/>
-              </a:ext>
-            </a:extLst>
-          </p:cNvPr>
-          <p:cNvSpPr/>
-          <p:nvPr/>
-        </p:nvSpPr>
-        <p:spPr>
-          <a:xfrm>
-            <a:off x="7443992" y="2696592"/>
-            <a:ext cx="556181" cy="376978"/>
-          </a:xfrm>
-          <a:prstGeom prst="wedgeRoundRectCallout">
-            <a:avLst>
-              <a:gd name="adj1" fmla="val -182454"/>
-              <a:gd name="adj2" fmla="val 116431"/>
-              <a:gd name="adj3" fmla="val 16667"/>
-            </a:avLst>
-          </a:prstGeom>
-          <a:noFill/>
-        </p:spPr>
-        <p:style>
-          <a:lnRef idx="2">
-            <a:schemeClr val="accent1">
-              <a:shade val="50000"/>
-            </a:schemeClr>
-          </a:lnRef>
-          <a:fillRef idx="1">
-            <a:schemeClr val="accent1"/>
-          </a:fillRef>
-          <a:effectRef idx="0">
-            <a:schemeClr val="accent1"/>
-          </a:effectRef>
-          <a:fontRef idx="minor">
-            <a:schemeClr val="lt1"/>
-          </a:fontRef>
-        </p:style>
-        <p:txBody>
-          <a:bodyPr rtlCol="0" anchor="ctr"/>
-          <a:lstStyle/>
-          <a:p>
-            <a:pPr algn="ctr"/>
-            <a:r>
-              <a:rPr lang="de-DE" dirty="0">
-                <a:solidFill>
-                  <a:sysClr val="windowText" lastClr="000000"/>
-                </a:solidFill>
-              </a:rPr>
-              <a:t>d</a:t>
-            </a:r>
-          </a:p>
-        </p:txBody>
-      </p:sp>
-      <p:sp>
-        <p:nvSpPr>
-          <p:cNvPr id="37" name="TextBox 36">
-            <a:extLst>
-              <a:ext uri="{FF2B5EF4-FFF2-40B4-BE49-F238E27FC236}">
-                <a16:creationId xmlns:a16="http://schemas.microsoft.com/office/drawing/2014/main" id="{5861C22F-90CC-CC4E-A2DA-ACE566B8C61A}"/>
-              </a:ext>
-            </a:extLst>
-          </p:cNvPr>
-          <p:cNvSpPr txBox="1"/>
-          <p:nvPr/>
-        </p:nvSpPr>
-        <p:spPr>
-          <a:xfrm>
-            <a:off x="11123427" y="3054712"/>
-            <a:ext cx="487642" cy="369332"/>
-          </a:xfrm>
-          <a:prstGeom prst="rect">
-            <a:avLst/>
-          </a:prstGeom>
-          <a:noFill/>
-        </p:spPr>
-        <p:txBody>
-          <a:bodyPr wrap="square" rtlCol="0">
-            <a:spAutoFit/>
-          </a:bodyPr>
-          <a:lstStyle/>
-          <a:p>
-            <a:r>
-              <a:rPr lang="en-GB" dirty="0"/>
-              <a:t>B2</a:t>
-            </a:r>
-            <a:endParaRPr lang="de-DE" dirty="0"/>
-          </a:p>
-        </p:txBody>
-      </p:sp>
-      <p:sp>
-        <p:nvSpPr>
-          <p:cNvPr id="39" name="TextBox 38">
-            <a:extLst>
-              <a:ext uri="{FF2B5EF4-FFF2-40B4-BE49-F238E27FC236}">
-                <a16:creationId xmlns:a16="http://schemas.microsoft.com/office/drawing/2014/main" id="{6F24D8C6-30F0-6D4B-A303-7BF04C963E42}"/>
-              </a:ext>
-            </a:extLst>
-          </p:cNvPr>
-          <p:cNvSpPr txBox="1"/>
-          <p:nvPr/>
-        </p:nvSpPr>
-        <p:spPr>
-          <a:xfrm>
-            <a:off x="5172977" y="5241579"/>
-            <a:ext cx="487642" cy="369332"/>
-          </a:xfrm>
-          <a:prstGeom prst="rect">
-            <a:avLst/>
-          </a:prstGeom>
-          <a:noFill/>
-        </p:spPr>
-        <p:txBody>
-          <a:bodyPr wrap="square" rtlCol="0">
-            <a:spAutoFit/>
-          </a:bodyPr>
-          <a:lstStyle/>
-          <a:p>
-            <a:r>
-              <a:rPr lang="en-GB" dirty="0"/>
-              <a:t>A2</a:t>
-            </a:r>
-            <a:endParaRPr lang="de-DE" dirty="0"/>
-          </a:p>
-        </p:txBody>
-      </p:sp>
-      <mc:AlternateContent xmlns:mc="http://schemas.openxmlformats.org/markup-compatibility/2006" xmlns:a14="http://schemas.microsoft.com/office/drawing/2010/main">
-        <mc:Choice Requires="a14">
-          <p:sp>
-            <p:nvSpPr>
-              <p:cNvPr id="40" name="TextBox 39">
-                <a:extLst>
-                  <a:ext uri="{FF2B5EF4-FFF2-40B4-BE49-F238E27FC236}">
-                    <a16:creationId xmlns:a16="http://schemas.microsoft.com/office/drawing/2014/main" id="{53169839-3D46-394C-8D2E-87722A38D427}"/>
-                  </a:ext>
-                </a:extLst>
-              </p:cNvPr>
-              <p:cNvSpPr txBox="1"/>
-              <p:nvPr/>
-            </p:nvSpPr>
-            <p:spPr>
-              <a:xfrm>
-                <a:off x="1116189" y="5706650"/>
-                <a:ext cx="3089692" cy="435440"/>
-              </a:xfrm>
-              <a:prstGeom prst="rect">
-                <a:avLst/>
-              </a:prstGeom>
-              <a:noFill/>
-            </p:spPr>
-            <p:txBody>
-              <a:bodyPr wrap="none" rtlCol="0">
-                <a:spAutoFit/>
-              </a:bodyPr>
-              <a:lstStyle/>
-              <a:p>
-                <a:pPr/>
-                <a14:m>
-                  <m:oMathPara xmlns:m="http://schemas.openxmlformats.org/officeDocument/2006/math">
-                    <m:oMathParaPr>
-                      <m:jc m:val="centerGroup"/>
-                    </m:oMathParaPr>
-                    <m:oMath xmlns:m="http://schemas.openxmlformats.org/officeDocument/2006/math">
-                      <m:r>
-                        <a:rPr lang="en-US" b="0" i="1" smtClean="0">
-                          <a:latin typeface="Cambria Math" panose="02040503050406030204" pitchFamily="18" charset="0"/>
-                        </a:rPr>
-                        <m:t>𝐵</m:t>
-                      </m:r>
-                      <m:r>
-                        <a:rPr lang="en-US" b="0" i="1" smtClean="0">
-                          <a:latin typeface="Cambria Math" panose="02040503050406030204" pitchFamily="18" charset="0"/>
-                        </a:rPr>
-                        <m:t>2=</m:t>
-                      </m:r>
-                      <m:r>
-                        <a:rPr lang="en-US" b="0" i="1" smtClean="0">
-                          <a:latin typeface="Cambria Math" panose="02040503050406030204" pitchFamily="18" charset="0"/>
-                        </a:rPr>
-                        <m:t>𝑠𝑖𝑛</m:t>
-                      </m:r>
-                      <m:d>
-                        <m:dPr>
-                          <m:ctrlPr>
-                            <a:rPr lang="en-US" b="0" i="1" smtClean="0">
-                              <a:latin typeface="Cambria Math" panose="02040503050406030204" pitchFamily="18" charset="0"/>
-                            </a:rPr>
-                          </m:ctrlPr>
-                        </m:dPr>
-                        <m:e>
-                          <m:r>
-                            <a:rPr lang="en-GB" i="1">
-                              <a:latin typeface="Cambria Math" panose="02040503050406030204" pitchFamily="18" charset="0"/>
-                              <a:ea typeface="Cambria Math" panose="02040503050406030204" pitchFamily="18" charset="0"/>
-                            </a:rPr>
-                            <m:t>𝛼</m:t>
-                          </m:r>
-                          <m:r>
-                            <a:rPr lang="en-US" b="0" i="1" smtClean="0">
                               <a:latin typeface="Cambria Math" panose="02040503050406030204" pitchFamily="18" charset="0"/>
                               <a:ea typeface="Cambria Math" panose="02040503050406030204" pitchFamily="18" charset="0"/>
                             </a:rPr>
@@ -4774,16 +4189,20 @@
                 </a14:m>
                 <a:endParaRPr lang="en-US" dirty="0"/>
               </a:p>
+              <a:p>
+                <a:pPr/>
+                <a:endParaRPr lang="en-US" dirty="0"/>
+              </a:p>
             </p:txBody>
           </p:sp>
         </mc:Choice>
-        <mc:Fallback xmlns="">
+        <mc:Fallback>
           <p:sp>
             <p:nvSpPr>
-              <p:cNvPr id="40" name="TextBox 39">
+              <p:cNvPr id="35" name="TextBox 34">
                 <a:extLst>
                   <a:ext uri="{FF2B5EF4-FFF2-40B4-BE49-F238E27FC236}">
-                    <a16:creationId xmlns:a16="http://schemas.microsoft.com/office/drawing/2014/main" id="{53169839-3D46-394C-8D2E-87722A38D427}"/>
+                    <a16:creationId xmlns:a16="http://schemas.microsoft.com/office/drawing/2014/main" id="{335CA84D-80BE-054F-9DF4-A402871A8F70}"/>
                   </a:ext>
                 </a:extLst>
               </p:cNvPr>
@@ -4794,16 +4213,16 @@
             </p:nvSpPr>
             <p:spPr>
               <a:xfrm>
-                <a:off x="1116189" y="5706650"/>
-                <a:ext cx="3089692" cy="435440"/>
+                <a:off x="2951567" y="5852192"/>
+                <a:ext cx="5636030" cy="887935"/>
               </a:xfrm>
               <a:prstGeom prst="rect">
                 <a:avLst/>
               </a:prstGeom>
               <a:blipFill>
-                <a:blip r:embed="rId4"/>
+                <a:blip r:embed="rId3"/>
                 <a:stretch>
-                  <a:fillRect b="-5714"/>
+                  <a:fillRect/>
                 </a:stretch>
               </a:blipFill>
             </p:spPr>
@@ -4822,10 +4241,1876 @@
           </p:sp>
         </mc:Fallback>
       </mc:AlternateContent>
+      <p:cxnSp>
+        <p:nvCxnSpPr>
+          <p:cNvPr id="38" name="Straight Connector 37">
+            <a:extLst>
+              <a:ext uri="{FF2B5EF4-FFF2-40B4-BE49-F238E27FC236}">
+                <a16:creationId xmlns:a16="http://schemas.microsoft.com/office/drawing/2014/main" id="{35C14695-3F9D-7E45-B75B-1728B794F7F4}"/>
+              </a:ext>
+            </a:extLst>
+          </p:cNvPr>
+          <p:cNvCxnSpPr/>
+          <p:nvPr/>
+        </p:nvCxnSpPr>
+        <p:spPr>
+          <a:xfrm flipV="1">
+            <a:off x="9133309" y="1041071"/>
+            <a:ext cx="0" cy="4273900"/>
+          </a:xfrm>
+          <a:prstGeom prst="line">
+            <a:avLst/>
+          </a:prstGeom>
+          <a:ln w="28575">
+            <a:solidFill>
+              <a:schemeClr val="tx1"/>
+            </a:solidFill>
+            <a:prstDash val="dash"/>
+          </a:ln>
+        </p:spPr>
+        <p:style>
+          <a:lnRef idx="1">
+            <a:schemeClr val="accent1"/>
+          </a:lnRef>
+          <a:fillRef idx="0">
+            <a:schemeClr val="accent1"/>
+          </a:fillRef>
+          <a:effectRef idx="0">
+            <a:schemeClr val="accent1"/>
+          </a:effectRef>
+          <a:fontRef idx="minor">
+            <a:schemeClr val="tx1"/>
+          </a:fontRef>
+        </p:style>
+      </p:cxnSp>
+      <p:cxnSp>
+        <p:nvCxnSpPr>
+          <p:cNvPr id="25" name="Straight Connector 24">
+            <a:extLst>
+              <a:ext uri="{FF2B5EF4-FFF2-40B4-BE49-F238E27FC236}">
+                <a16:creationId xmlns:a16="http://schemas.microsoft.com/office/drawing/2014/main" id="{15FB0CE4-7621-064C-BCD0-CE3F9F5994AA}"/>
+              </a:ext>
+            </a:extLst>
+          </p:cNvPr>
+          <p:cNvCxnSpPr>
+            <a:cxnSpLocks/>
+          </p:cNvCxnSpPr>
+          <p:nvPr/>
+        </p:nvCxnSpPr>
+        <p:spPr>
+          <a:xfrm rot="575565">
+            <a:off x="2071745" y="1609708"/>
+            <a:ext cx="7351158" cy="3092110"/>
+          </a:xfrm>
+          <a:prstGeom prst="line">
+            <a:avLst/>
+          </a:prstGeom>
+          <a:ln>
+            <a:solidFill>
+              <a:srgbClr val="FF0000"/>
+            </a:solidFill>
+          </a:ln>
+        </p:spPr>
+        <p:style>
+          <a:lnRef idx="1">
+            <a:schemeClr val="accent1"/>
+          </a:lnRef>
+          <a:fillRef idx="0">
+            <a:schemeClr val="accent1"/>
+          </a:fillRef>
+          <a:effectRef idx="0">
+            <a:schemeClr val="accent1"/>
+          </a:effectRef>
+          <a:fontRef idx="minor">
+            <a:schemeClr val="tx1"/>
+          </a:fontRef>
+        </p:style>
+      </p:cxnSp>
+      <p:sp>
+        <p:nvSpPr>
+          <p:cNvPr id="27" name="Rounded Rectangular Callout 26">
+            <a:extLst>
+              <a:ext uri="{FF2B5EF4-FFF2-40B4-BE49-F238E27FC236}">
+                <a16:creationId xmlns:a16="http://schemas.microsoft.com/office/drawing/2014/main" id="{2B0E5EFA-324B-084B-88F9-1DAEB1A1D872}"/>
+              </a:ext>
+            </a:extLst>
+          </p:cNvPr>
+          <p:cNvSpPr/>
+          <p:nvPr/>
+        </p:nvSpPr>
+        <p:spPr>
+          <a:xfrm>
+            <a:off x="6971388" y="2778785"/>
+            <a:ext cx="556181" cy="376978"/>
+          </a:xfrm>
+          <a:prstGeom prst="wedgeRoundRectCallout">
+            <a:avLst>
+              <a:gd name="adj1" fmla="val -182454"/>
+              <a:gd name="adj2" fmla="val 116431"/>
+              <a:gd name="adj3" fmla="val 16667"/>
+            </a:avLst>
+          </a:prstGeom>
+          <a:noFill/>
+        </p:spPr>
+        <p:style>
+          <a:lnRef idx="2">
+            <a:schemeClr val="accent1">
+              <a:shade val="50000"/>
+            </a:schemeClr>
+          </a:lnRef>
+          <a:fillRef idx="1">
+            <a:schemeClr val="accent1"/>
+          </a:fillRef>
+          <a:effectRef idx="0">
+            <a:schemeClr val="accent1"/>
+          </a:effectRef>
+          <a:fontRef idx="minor">
+            <a:schemeClr val="lt1"/>
+          </a:fontRef>
+        </p:style>
+        <p:txBody>
+          <a:bodyPr rtlCol="0" anchor="ctr"/>
+          <a:lstStyle/>
+          <a:p>
+            <a:pPr algn="ctr"/>
+            <a:r>
+              <a:rPr lang="de-DE" dirty="0">
+                <a:solidFill>
+                  <a:sysClr val="windowText" lastClr="000000"/>
+                </a:solidFill>
+              </a:rPr>
+              <a:t>d</a:t>
+            </a:r>
+          </a:p>
+        </p:txBody>
+      </p:sp>
+      <p:sp>
+        <p:nvSpPr>
+          <p:cNvPr id="37" name="TextBox 36">
+            <a:extLst>
+              <a:ext uri="{FF2B5EF4-FFF2-40B4-BE49-F238E27FC236}">
+                <a16:creationId xmlns:a16="http://schemas.microsoft.com/office/drawing/2014/main" id="{5861C22F-90CC-CC4E-A2DA-ACE566B8C61A}"/>
+              </a:ext>
+            </a:extLst>
+          </p:cNvPr>
+          <p:cNvSpPr txBox="1"/>
+          <p:nvPr/>
+        </p:nvSpPr>
+        <p:spPr>
+          <a:xfrm>
+            <a:off x="10650823" y="3136905"/>
+            <a:ext cx="487642" cy="369332"/>
+          </a:xfrm>
+          <a:prstGeom prst="rect">
+            <a:avLst/>
+          </a:prstGeom>
+          <a:noFill/>
+        </p:spPr>
+        <p:txBody>
+          <a:bodyPr wrap="square" rtlCol="0">
+            <a:spAutoFit/>
+          </a:bodyPr>
+          <a:lstStyle/>
+          <a:p>
+            <a:r>
+              <a:rPr lang="en-GB" dirty="0"/>
+              <a:t>B2</a:t>
+            </a:r>
+            <a:endParaRPr lang="de-DE" dirty="0"/>
+          </a:p>
+        </p:txBody>
+      </p:sp>
+      <p:sp>
+        <p:nvSpPr>
+          <p:cNvPr id="39" name="TextBox 38">
+            <a:extLst>
+              <a:ext uri="{FF2B5EF4-FFF2-40B4-BE49-F238E27FC236}">
+                <a16:creationId xmlns:a16="http://schemas.microsoft.com/office/drawing/2014/main" id="{6F24D8C6-30F0-6D4B-A303-7BF04C963E42}"/>
+              </a:ext>
+            </a:extLst>
+          </p:cNvPr>
+          <p:cNvSpPr txBox="1"/>
+          <p:nvPr/>
+        </p:nvSpPr>
+        <p:spPr>
+          <a:xfrm>
+            <a:off x="4700373" y="5323772"/>
+            <a:ext cx="487642" cy="369332"/>
+          </a:xfrm>
+          <a:prstGeom prst="rect">
+            <a:avLst/>
+          </a:prstGeom>
+          <a:noFill/>
+        </p:spPr>
+        <p:txBody>
+          <a:bodyPr wrap="square" rtlCol="0">
+            <a:spAutoFit/>
+          </a:bodyPr>
+          <a:lstStyle/>
+          <a:p>
+            <a:r>
+              <a:rPr lang="en-GB" dirty="0"/>
+              <a:t>A2</a:t>
+            </a:r>
+            <a:endParaRPr lang="de-DE" dirty="0"/>
+          </a:p>
+        </p:txBody>
+      </p:sp>
+      <mc:AlternateContent xmlns:mc="http://schemas.openxmlformats.org/markup-compatibility/2006">
+        <mc:Choice xmlns:a14="http://schemas.microsoft.com/office/drawing/2010/main" Requires="a14">
+          <p:sp>
+            <p:nvSpPr>
+              <p:cNvPr id="18" name="TextBox 17">
+                <a:extLst>
+                  <a:ext uri="{FF2B5EF4-FFF2-40B4-BE49-F238E27FC236}">
+                    <a16:creationId xmlns:a16="http://schemas.microsoft.com/office/drawing/2014/main" id="{689176F6-71B6-9A48-B045-CAA132129BF2}"/>
+                  </a:ext>
+                </a:extLst>
+              </p:cNvPr>
+              <p:cNvSpPr txBox="1"/>
+              <p:nvPr/>
+            </p:nvSpPr>
+            <p:spPr>
+              <a:xfrm>
+                <a:off x="789059" y="307985"/>
+                <a:ext cx="1319207" cy="484172"/>
+              </a:xfrm>
+              <a:prstGeom prst="rect">
+                <a:avLst/>
+              </a:prstGeom>
+              <a:noFill/>
+            </p:spPr>
+            <p:txBody>
+              <a:bodyPr wrap="none" rtlCol="0">
+                <a:spAutoFit/>
+              </a:bodyPr>
+              <a:lstStyle/>
+              <a:p>
+                <a:pPr/>
+                <a:r>
+                  <a:rPr lang="en-US" b="0" dirty="0"/>
+                  <a:t>tan</a:t>
+                </a:r>
+                <a14:m>
+                  <m:oMath xmlns:m="http://schemas.openxmlformats.org/officeDocument/2006/math">
+                    <m:d>
+                      <m:dPr>
+                        <m:ctrlPr>
+                          <a:rPr lang="en-US" b="0" i="1" smtClean="0">
+                            <a:latin typeface="Cambria Math" panose="02040503050406030204" pitchFamily="18" charset="0"/>
+                          </a:rPr>
+                        </m:ctrlPr>
+                      </m:dPr>
+                      <m:e>
+                        <m:r>
+                          <m:rPr>
+                            <m:nor/>
+                          </m:rPr>
+                          <a:rPr lang="el-GR" dirty="0"/>
+                          <m:t>β</m:t>
+                        </m:r>
+                      </m:e>
+                    </m:d>
+                    <m:r>
+                      <a:rPr lang="en-US" b="0" i="1" dirty="0" smtClean="0">
+                        <a:latin typeface="Cambria Math" panose="02040503050406030204" pitchFamily="18" charset="0"/>
+                      </a:rPr>
+                      <m:t>=</m:t>
+                    </m:r>
+                    <m:f>
+                      <m:fPr>
+                        <m:ctrlPr>
+                          <a:rPr lang="en-US" b="0" i="1" dirty="0" smtClean="0">
+                            <a:latin typeface="Cambria Math" panose="02040503050406030204" pitchFamily="18" charset="0"/>
+                          </a:rPr>
+                        </m:ctrlPr>
+                      </m:fPr>
+                      <m:num>
+                        <m:r>
+                          <a:rPr lang="en-US" b="0" i="1" dirty="0" smtClean="0">
+                            <a:latin typeface="Cambria Math" panose="02040503050406030204" pitchFamily="18" charset="0"/>
+                          </a:rPr>
+                          <m:t>𝐵</m:t>
+                        </m:r>
+                        <m:r>
+                          <a:rPr lang="en-US" b="0" i="1" dirty="0" smtClean="0">
+                            <a:latin typeface="Cambria Math" panose="02040503050406030204" pitchFamily="18" charset="0"/>
+                          </a:rPr>
+                          <m:t>1</m:t>
+                        </m:r>
+                      </m:num>
+                      <m:den>
+                        <m:r>
+                          <a:rPr lang="en-US" b="0" i="1" dirty="0" smtClean="0">
+                            <a:latin typeface="Cambria Math" panose="02040503050406030204" pitchFamily="18" charset="0"/>
+                          </a:rPr>
+                          <m:t>𝐴</m:t>
+                        </m:r>
+                        <m:r>
+                          <a:rPr lang="en-US" b="0" i="1" dirty="0" smtClean="0">
+                            <a:latin typeface="Cambria Math" panose="02040503050406030204" pitchFamily="18" charset="0"/>
+                          </a:rPr>
+                          <m:t>1</m:t>
+                        </m:r>
+                      </m:den>
+                    </m:f>
+                  </m:oMath>
+                </a14:m>
+                <a:endParaRPr lang="en-US" dirty="0"/>
+              </a:p>
+            </p:txBody>
+          </p:sp>
+        </mc:Choice>
+        <mc:Fallback>
+          <p:sp>
+            <p:nvSpPr>
+              <p:cNvPr id="18" name="TextBox 17">
+                <a:extLst>
+                  <a:ext uri="{FF2B5EF4-FFF2-40B4-BE49-F238E27FC236}">
+                    <a16:creationId xmlns:a16="http://schemas.microsoft.com/office/drawing/2014/main" id="{689176F6-71B6-9A48-B045-CAA132129BF2}"/>
+                  </a:ext>
+                </a:extLst>
+              </p:cNvPr>
+              <p:cNvSpPr txBox="1">
+                <a:spLocks noRot="1" noChangeAspect="1" noMove="1" noResize="1" noEditPoints="1" noAdjustHandles="1" noChangeArrowheads="1" noChangeShapeType="1" noTextEdit="1"/>
+              </p:cNvSpPr>
+              <p:nvPr/>
+            </p:nvSpPr>
+            <p:spPr>
+              <a:xfrm>
+                <a:off x="789059" y="307985"/>
+                <a:ext cx="1319207" cy="484172"/>
+              </a:xfrm>
+              <a:prstGeom prst="rect">
+                <a:avLst/>
+              </a:prstGeom>
+              <a:blipFill>
+                <a:blip r:embed="rId4"/>
+                <a:stretch>
+                  <a:fillRect l="-2830" b="-10256"/>
+                </a:stretch>
+              </a:blipFill>
+            </p:spPr>
+            <p:txBody>
+              <a:bodyPr/>
+              <a:lstStyle/>
+              <a:p>
+                <a:r>
+                  <a:rPr lang="en-VN">
+                    <a:noFill/>
+                  </a:rPr>
+                  <a:t> </a:t>
+                </a:r>
+              </a:p>
+            </p:txBody>
+          </p:sp>
+        </mc:Fallback>
+      </mc:AlternateContent>
+      <p:sp>
+        <p:nvSpPr>
+          <p:cNvPr id="3" name="TextBox 2">
+            <a:extLst>
+              <a:ext uri="{FF2B5EF4-FFF2-40B4-BE49-F238E27FC236}">
+                <a16:creationId xmlns:a16="http://schemas.microsoft.com/office/drawing/2014/main" id="{198829DF-51F6-2549-A1E5-2651A0F72CA8}"/>
+              </a:ext>
+            </a:extLst>
+          </p:cNvPr>
+          <p:cNvSpPr txBox="1"/>
+          <p:nvPr/>
+        </p:nvSpPr>
+        <p:spPr>
+          <a:xfrm>
+            <a:off x="7713794" y="273273"/>
+            <a:ext cx="3392577" cy="369332"/>
+          </a:xfrm>
+          <a:prstGeom prst="rect">
+            <a:avLst/>
+          </a:prstGeom>
+          <a:noFill/>
+        </p:spPr>
+        <p:txBody>
+          <a:bodyPr wrap="square" rtlCol="0">
+            <a:spAutoFit/>
+          </a:bodyPr>
+          <a:lstStyle/>
+          <a:p>
+            <a:r>
+              <a:rPr lang="en-VN" i="1" dirty="0"/>
+              <a:t>Would stick out at top and bottom</a:t>
+            </a:r>
+          </a:p>
+        </p:txBody>
+      </p:sp>
     </p:spTree>
     <p:extLst>
       <p:ext uri="{BB962C8B-B14F-4D97-AF65-F5344CB8AC3E}">
         <p14:creationId xmlns:p14="http://schemas.microsoft.com/office/powerpoint/2010/main" val="354758786"/>
+      </p:ext>
+    </p:extLst>
+  </p:cSld>
+  <p:clrMapOvr>
+    <a:masterClrMapping/>
+  </p:clrMapOvr>
+</p:sld>
+</file>
+
+<file path=ppt/slides/slide2.xml><?xml version="1.0" encoding="utf-8"?>
+<p:sld xmlns:a="http://schemas.openxmlformats.org/drawingml/2006/main" xmlns:r="http://schemas.openxmlformats.org/officeDocument/2006/relationships" xmlns:p="http://schemas.openxmlformats.org/presentationml/2006/main">
+  <p:cSld>
+    <p:spTree>
+      <p:nvGrpSpPr>
+        <p:cNvPr id="1" name=""/>
+        <p:cNvGrpSpPr/>
+        <p:nvPr/>
+      </p:nvGrpSpPr>
+      <p:grpSpPr>
+        <a:xfrm>
+          <a:off x="0" y="0"/>
+          <a:ext cx="0" cy="0"/>
+          <a:chOff x="0" y="0"/>
+          <a:chExt cx="0" cy="0"/>
+        </a:xfrm>
+      </p:grpSpPr>
+      <p:sp>
+        <p:nvSpPr>
+          <p:cNvPr id="4" name="Rectangle 3">
+            <a:extLst>
+              <a:ext uri="{FF2B5EF4-FFF2-40B4-BE49-F238E27FC236}">
+                <a16:creationId xmlns:a16="http://schemas.microsoft.com/office/drawing/2014/main" id="{C02BF6B6-025E-8D45-9150-0309B5F42CCB}"/>
+              </a:ext>
+            </a:extLst>
+          </p:cNvPr>
+          <p:cNvSpPr/>
+          <p:nvPr/>
+        </p:nvSpPr>
+        <p:spPr>
+          <a:xfrm>
+            <a:off x="1387009" y="626724"/>
+            <a:ext cx="3727178" cy="5603047"/>
+          </a:xfrm>
+          <a:prstGeom prst="rect">
+            <a:avLst/>
+          </a:prstGeom>
+          <a:solidFill>
+            <a:srgbClr val="4472C4">
+              <a:alpha val="37255"/>
+            </a:srgbClr>
+          </a:solidFill>
+          <a:ln>
+            <a:solidFill>
+              <a:schemeClr val="tx1"/>
+            </a:solidFill>
+          </a:ln>
+        </p:spPr>
+        <p:style>
+          <a:lnRef idx="2">
+            <a:schemeClr val="accent1">
+              <a:shade val="50000"/>
+            </a:schemeClr>
+          </a:lnRef>
+          <a:fillRef idx="1">
+            <a:schemeClr val="accent1"/>
+          </a:fillRef>
+          <a:effectRef idx="0">
+            <a:schemeClr val="accent1"/>
+          </a:effectRef>
+          <a:fontRef idx="minor">
+            <a:schemeClr val="lt1"/>
+          </a:fontRef>
+        </p:style>
+        <p:txBody>
+          <a:bodyPr rtlCol="0" anchor="ctr"/>
+          <a:lstStyle/>
+          <a:p>
+            <a:pPr algn="ctr"/>
+            <a:endParaRPr lang="de-DE" dirty="0"/>
+          </a:p>
+        </p:txBody>
+      </p:sp>
+      <p:sp>
+        <p:nvSpPr>
+          <p:cNvPr id="10" name="Rectangle 9">
+            <a:extLst>
+              <a:ext uri="{FF2B5EF4-FFF2-40B4-BE49-F238E27FC236}">
+                <a16:creationId xmlns:a16="http://schemas.microsoft.com/office/drawing/2014/main" id="{49D2695A-2AFF-914A-AE0F-F66E950C7CD2}"/>
+              </a:ext>
+            </a:extLst>
+          </p:cNvPr>
+          <p:cNvSpPr>
+            <a:spLocks noChangeAspect="1"/>
+          </p:cNvSpPr>
+          <p:nvPr/>
+        </p:nvSpPr>
+        <p:spPr>
+          <a:xfrm rot="575565">
+            <a:off x="1523172" y="2130358"/>
+            <a:ext cx="3467103" cy="1778074"/>
+          </a:xfrm>
+          <a:prstGeom prst="rect">
+            <a:avLst/>
+          </a:prstGeom>
+          <a:solidFill>
+            <a:srgbClr val="FFC000">
+              <a:alpha val="37255"/>
+            </a:srgbClr>
+          </a:solidFill>
+          <a:ln>
+            <a:solidFill>
+              <a:srgbClr val="FF0000"/>
+            </a:solidFill>
+          </a:ln>
+        </p:spPr>
+        <p:style>
+          <a:lnRef idx="2">
+            <a:schemeClr val="accent1">
+              <a:shade val="50000"/>
+            </a:schemeClr>
+          </a:lnRef>
+          <a:fillRef idx="1">
+            <a:schemeClr val="accent1"/>
+          </a:fillRef>
+          <a:effectRef idx="0">
+            <a:schemeClr val="accent1"/>
+          </a:effectRef>
+          <a:fontRef idx="minor">
+            <a:schemeClr val="lt1"/>
+          </a:fontRef>
+        </p:style>
+        <p:txBody>
+          <a:bodyPr rtlCol="0" anchor="ctr"/>
+          <a:lstStyle/>
+          <a:p>
+            <a:pPr algn="ctr"/>
+            <a:endParaRPr lang="de-DE" dirty="0"/>
+          </a:p>
+        </p:txBody>
+      </p:sp>
+      <p:sp>
+        <p:nvSpPr>
+          <p:cNvPr id="30" name="TextBox 29">
+            <a:extLst>
+              <a:ext uri="{FF2B5EF4-FFF2-40B4-BE49-F238E27FC236}">
+                <a16:creationId xmlns:a16="http://schemas.microsoft.com/office/drawing/2014/main" id="{098F1191-0EF2-3943-946C-6B5A0AEF03FB}"/>
+              </a:ext>
+            </a:extLst>
+          </p:cNvPr>
+          <p:cNvSpPr txBox="1"/>
+          <p:nvPr/>
+        </p:nvSpPr>
+        <p:spPr>
+          <a:xfrm>
+            <a:off x="2687630" y="3818080"/>
+            <a:ext cx="435300" cy="369332"/>
+          </a:xfrm>
+          <a:prstGeom prst="rect">
+            <a:avLst/>
+          </a:prstGeom>
+          <a:noFill/>
+        </p:spPr>
+        <p:txBody>
+          <a:bodyPr wrap="square" rtlCol="0">
+            <a:spAutoFit/>
+          </a:bodyPr>
+          <a:lstStyle/>
+          <a:p>
+            <a:r>
+              <a:rPr lang="en-GB" dirty="0"/>
+              <a:t>A1</a:t>
+            </a:r>
+            <a:endParaRPr lang="de-DE" dirty="0"/>
+          </a:p>
+        </p:txBody>
+      </p:sp>
+      <p:sp>
+        <p:nvSpPr>
+          <p:cNvPr id="31" name="TextBox 30">
+            <a:extLst>
+              <a:ext uri="{FF2B5EF4-FFF2-40B4-BE49-F238E27FC236}">
+                <a16:creationId xmlns:a16="http://schemas.microsoft.com/office/drawing/2014/main" id="{859B51C3-173D-2941-9465-93397D93D7CD}"/>
+              </a:ext>
+            </a:extLst>
+          </p:cNvPr>
+          <p:cNvSpPr txBox="1"/>
+          <p:nvPr/>
+        </p:nvSpPr>
+        <p:spPr>
+          <a:xfrm>
+            <a:off x="4616048" y="3116491"/>
+            <a:ext cx="487642" cy="369332"/>
+          </a:xfrm>
+          <a:prstGeom prst="rect">
+            <a:avLst/>
+          </a:prstGeom>
+          <a:noFill/>
+        </p:spPr>
+        <p:txBody>
+          <a:bodyPr wrap="square" rtlCol="0">
+            <a:spAutoFit/>
+          </a:bodyPr>
+          <a:lstStyle/>
+          <a:p>
+            <a:r>
+              <a:rPr lang="en-GB" dirty="0"/>
+              <a:t>B1</a:t>
+            </a:r>
+            <a:endParaRPr lang="de-DE" dirty="0"/>
+          </a:p>
+        </p:txBody>
+      </p:sp>
+      <mc:AlternateContent xmlns:mc="http://schemas.openxmlformats.org/markup-compatibility/2006">
+        <mc:Choice xmlns:a14="http://schemas.microsoft.com/office/drawing/2010/main" Requires="a14">
+          <p:sp>
+            <p:nvSpPr>
+              <p:cNvPr id="32" name="TextBox 31">
+                <a:extLst>
+                  <a:ext uri="{FF2B5EF4-FFF2-40B4-BE49-F238E27FC236}">
+                    <a16:creationId xmlns:a16="http://schemas.microsoft.com/office/drawing/2014/main" id="{C0827B7B-6600-B847-B256-E1E080E6764C}"/>
+                  </a:ext>
+                </a:extLst>
+              </p:cNvPr>
+              <p:cNvSpPr txBox="1"/>
+              <p:nvPr/>
+            </p:nvSpPr>
+            <p:spPr>
+              <a:xfrm>
+                <a:off x="6365517" y="2620259"/>
+                <a:ext cx="1651221" cy="610936"/>
+              </a:xfrm>
+              <a:prstGeom prst="rect">
+                <a:avLst/>
+              </a:prstGeom>
+              <a:noFill/>
+            </p:spPr>
+            <p:txBody>
+              <a:bodyPr wrap="none" rtlCol="0">
+                <a:spAutoFit/>
+              </a:bodyPr>
+              <a:lstStyle/>
+              <a:p>
+                <a:pPr/>
+                <a14:m>
+                  <m:oMathPara xmlns:m="http://schemas.openxmlformats.org/officeDocument/2006/math">
+                    <m:oMathParaPr>
+                      <m:jc m:val="centerGroup"/>
+                    </m:oMathParaPr>
+                    <m:oMath xmlns:m="http://schemas.openxmlformats.org/officeDocument/2006/math">
+                      <m:func>
+                        <m:funcPr>
+                          <m:ctrlPr>
+                            <a:rPr lang="en-GB" b="0" i="1" smtClean="0">
+                              <a:latin typeface="Cambria Math" panose="02040503050406030204" pitchFamily="18" charset="0"/>
+                            </a:rPr>
+                          </m:ctrlPr>
+                        </m:funcPr>
+                        <m:fName>
+                          <m:r>
+                            <m:rPr>
+                              <m:sty m:val="p"/>
+                            </m:rPr>
+                            <a:rPr lang="en-US" b="0" smtClean="0">
+                              <a:latin typeface="Cambria Math" panose="02040503050406030204" pitchFamily="18" charset="0"/>
+                            </a:rPr>
+                            <m:t>cos</m:t>
+                          </m:r>
+                        </m:fName>
+                        <m:e>
+                          <m:d>
+                            <m:dPr>
+                              <m:ctrlPr>
+                                <a:rPr lang="en-GB" b="0" i="1" smtClean="0">
+                                  <a:latin typeface="Cambria Math" panose="02040503050406030204" pitchFamily="18" charset="0"/>
+                                </a:rPr>
+                              </m:ctrlPr>
+                            </m:dPr>
+                            <m:e>
+                              <m:r>
+                                <a:rPr lang="en-GB" b="0" i="1" smtClean="0">
+                                  <a:latin typeface="Cambria Math" panose="02040503050406030204" pitchFamily="18" charset="0"/>
+                                  <a:ea typeface="Cambria Math" panose="02040503050406030204" pitchFamily="18" charset="0"/>
+                                </a:rPr>
+                                <m:t>𝛼</m:t>
+                              </m:r>
+                            </m:e>
+                          </m:d>
+                        </m:e>
+                      </m:func>
+                      <m:r>
+                        <a:rPr lang="en-GB" b="0" i="1" smtClean="0">
+                          <a:latin typeface="Cambria Math" panose="02040503050406030204" pitchFamily="18" charset="0"/>
+                          <a:ea typeface="Cambria Math" panose="02040503050406030204" pitchFamily="18" charset="0"/>
+                        </a:rPr>
+                        <m:t>= </m:t>
+                      </m:r>
+                      <m:f>
+                        <m:fPr>
+                          <m:ctrlPr>
+                            <a:rPr lang="en-GB" b="0" i="1" smtClean="0">
+                              <a:latin typeface="Cambria Math" panose="02040503050406030204" pitchFamily="18" charset="0"/>
+                              <a:ea typeface="Cambria Math" panose="02040503050406030204" pitchFamily="18" charset="0"/>
+                            </a:rPr>
+                          </m:ctrlPr>
+                        </m:fPr>
+                        <m:num>
+                          <m:r>
+                            <a:rPr lang="en-US" b="0" i="1" smtClean="0">
+                              <a:latin typeface="Cambria Math" panose="02040503050406030204" pitchFamily="18" charset="0"/>
+                              <a:ea typeface="Cambria Math" panose="02040503050406030204" pitchFamily="18" charset="0"/>
+                            </a:rPr>
+                            <m:t>𝐴</m:t>
+                          </m:r>
+                          <m:r>
+                            <a:rPr lang="en-US" b="0" i="1" smtClean="0">
+                              <a:latin typeface="Cambria Math" panose="02040503050406030204" pitchFamily="18" charset="0"/>
+                              <a:ea typeface="Cambria Math" panose="02040503050406030204" pitchFamily="18" charset="0"/>
+                            </a:rPr>
+                            <m:t>22</m:t>
+                          </m:r>
+                        </m:num>
+                        <m:den>
+                          <m:r>
+                            <a:rPr lang="en-US" b="0" i="1" smtClean="0">
+                              <a:latin typeface="Cambria Math" panose="02040503050406030204" pitchFamily="18" charset="0"/>
+                              <a:ea typeface="Cambria Math" panose="02040503050406030204" pitchFamily="18" charset="0"/>
+                            </a:rPr>
+                            <m:t>𝐴</m:t>
+                          </m:r>
+                          <m:r>
+                            <a:rPr lang="en-US" b="0" i="1" smtClean="0">
+                              <a:latin typeface="Cambria Math" panose="02040503050406030204" pitchFamily="18" charset="0"/>
+                              <a:ea typeface="Cambria Math" panose="02040503050406030204" pitchFamily="18" charset="0"/>
+                            </a:rPr>
+                            <m:t>1</m:t>
+                          </m:r>
+                        </m:den>
+                      </m:f>
+                    </m:oMath>
+                  </m:oMathPara>
+                </a14:m>
+                <a:endParaRPr lang="en-US" dirty="0"/>
+              </a:p>
+            </p:txBody>
+          </p:sp>
+        </mc:Choice>
+        <mc:Fallback>
+          <p:sp>
+            <p:nvSpPr>
+              <p:cNvPr id="32" name="TextBox 31">
+                <a:extLst>
+                  <a:ext uri="{FF2B5EF4-FFF2-40B4-BE49-F238E27FC236}">
+                    <a16:creationId xmlns:a16="http://schemas.microsoft.com/office/drawing/2014/main" id="{C0827B7B-6600-B847-B256-E1E080E6764C}"/>
+                  </a:ext>
+                </a:extLst>
+              </p:cNvPr>
+              <p:cNvSpPr txBox="1">
+                <a:spLocks noRot="1" noChangeAspect="1" noMove="1" noResize="1" noEditPoints="1" noAdjustHandles="1" noChangeArrowheads="1" noChangeShapeType="1" noTextEdit="1"/>
+              </p:cNvSpPr>
+              <p:nvPr/>
+            </p:nvSpPr>
+            <p:spPr>
+              <a:xfrm>
+                <a:off x="6365517" y="2620259"/>
+                <a:ext cx="1651221" cy="610936"/>
+              </a:xfrm>
+              <a:prstGeom prst="rect">
+                <a:avLst/>
+              </a:prstGeom>
+              <a:blipFill>
+                <a:blip r:embed="rId2"/>
+                <a:stretch>
+                  <a:fillRect b="-4082"/>
+                </a:stretch>
+              </a:blipFill>
+            </p:spPr>
+            <p:txBody>
+              <a:bodyPr/>
+              <a:lstStyle/>
+              <a:p>
+                <a:r>
+                  <a:rPr lang="en-VN">
+                    <a:noFill/>
+                  </a:rPr>
+                  <a:t> </a:t>
+                </a:r>
+              </a:p>
+            </p:txBody>
+          </p:sp>
+        </mc:Fallback>
+      </mc:AlternateContent>
+      <mc:AlternateContent xmlns:mc="http://schemas.openxmlformats.org/markup-compatibility/2006">
+        <mc:Choice xmlns:a14="http://schemas.microsoft.com/office/drawing/2010/main" Requires="a14">
+          <p:sp>
+            <p:nvSpPr>
+              <p:cNvPr id="35" name="TextBox 34">
+                <a:extLst>
+                  <a:ext uri="{FF2B5EF4-FFF2-40B4-BE49-F238E27FC236}">
+                    <a16:creationId xmlns:a16="http://schemas.microsoft.com/office/drawing/2014/main" id="{335CA84D-80BE-054F-9DF4-A402871A8F70}"/>
+                  </a:ext>
+                </a:extLst>
+              </p:cNvPr>
+              <p:cNvSpPr txBox="1"/>
+              <p:nvPr/>
+            </p:nvSpPr>
+            <p:spPr>
+              <a:xfrm>
+                <a:off x="7965441" y="4002746"/>
+                <a:ext cx="2066591" cy="610936"/>
+              </a:xfrm>
+              <a:prstGeom prst="rect">
+                <a:avLst/>
+              </a:prstGeom>
+              <a:noFill/>
+            </p:spPr>
+            <p:txBody>
+              <a:bodyPr wrap="none" rtlCol="0">
+                <a:spAutoFit/>
+              </a:bodyPr>
+              <a:lstStyle/>
+              <a:p>
+                <a14:m>
+                  <m:oMathPara xmlns:m="http://schemas.openxmlformats.org/officeDocument/2006/math">
+                    <m:oMathParaPr>
+                      <m:jc m:val="centerGroup"/>
+                    </m:oMathParaPr>
+                    <m:oMath xmlns:m="http://schemas.openxmlformats.org/officeDocument/2006/math">
+                      <m:r>
+                        <m:rPr>
+                          <m:nor/>
+                        </m:rPr>
+                        <a:rPr lang="en-US" dirty="0" smtClean="0"/>
+                        <m:t>Scaling</m:t>
+                      </m:r>
+                      <m:r>
+                        <m:rPr>
+                          <m:nor/>
+                        </m:rPr>
+                        <a:rPr lang="en-US" dirty="0" smtClean="0"/>
+                        <m:t> </m:t>
+                      </m:r>
+                      <m:r>
+                        <m:rPr>
+                          <m:nor/>
+                        </m:rPr>
+                        <a:rPr lang="en-US" dirty="0" smtClean="0"/>
+                        <m:t>factor</m:t>
+                      </m:r>
+                      <m:r>
+                        <a:rPr lang="en-GB" b="0" i="1" smtClean="0">
+                          <a:latin typeface="Cambria Math" panose="02040503050406030204" pitchFamily="18" charset="0"/>
+                        </a:rPr>
+                        <m:t>=</m:t>
+                      </m:r>
+                      <m:f>
+                        <m:fPr>
+                          <m:ctrlPr>
+                            <a:rPr lang="en-GB" b="0" i="1" smtClean="0">
+                              <a:latin typeface="Cambria Math" panose="02040503050406030204" pitchFamily="18" charset="0"/>
+                            </a:rPr>
+                          </m:ctrlPr>
+                        </m:fPr>
+                        <m:num>
+                          <m:r>
+                            <a:rPr lang="en-US" b="0" i="1" smtClean="0">
+                              <a:latin typeface="Cambria Math" panose="02040503050406030204" pitchFamily="18" charset="0"/>
+                            </a:rPr>
+                            <m:t>𝐴</m:t>
+                          </m:r>
+                          <m:r>
+                            <a:rPr lang="en-US" b="0" i="1" smtClean="0">
+                              <a:latin typeface="Cambria Math" panose="02040503050406030204" pitchFamily="18" charset="0"/>
+                            </a:rPr>
+                            <m:t>1</m:t>
+                          </m:r>
+                        </m:num>
+                        <m:den>
+                          <m:r>
+                            <a:rPr lang="en-US" b="0" i="1" smtClean="0">
+                              <a:latin typeface="Cambria Math" panose="02040503050406030204" pitchFamily="18" charset="0"/>
+                            </a:rPr>
+                            <m:t>𝐴</m:t>
+                          </m:r>
+                          <m:r>
+                            <a:rPr lang="en-US" b="0" i="1" smtClean="0">
+                              <a:latin typeface="Cambria Math" panose="02040503050406030204" pitchFamily="18" charset="0"/>
+                            </a:rPr>
+                            <m:t>2</m:t>
+                          </m:r>
+                        </m:den>
+                      </m:f>
+                    </m:oMath>
+                  </m:oMathPara>
+                </a14:m>
+                <a:endParaRPr lang="en-US" dirty="0"/>
+              </a:p>
+            </p:txBody>
+          </p:sp>
+        </mc:Choice>
+        <mc:Fallback>
+          <p:sp>
+            <p:nvSpPr>
+              <p:cNvPr id="35" name="TextBox 34">
+                <a:extLst>
+                  <a:ext uri="{FF2B5EF4-FFF2-40B4-BE49-F238E27FC236}">
+                    <a16:creationId xmlns:a16="http://schemas.microsoft.com/office/drawing/2014/main" id="{335CA84D-80BE-054F-9DF4-A402871A8F70}"/>
+                  </a:ext>
+                </a:extLst>
+              </p:cNvPr>
+              <p:cNvSpPr txBox="1">
+                <a:spLocks noRot="1" noChangeAspect="1" noMove="1" noResize="1" noEditPoints="1" noAdjustHandles="1" noChangeArrowheads="1" noChangeShapeType="1" noTextEdit="1"/>
+              </p:cNvSpPr>
+              <p:nvPr/>
+            </p:nvSpPr>
+            <p:spPr>
+              <a:xfrm>
+                <a:off x="7965441" y="4002746"/>
+                <a:ext cx="2066591" cy="610936"/>
+              </a:xfrm>
+              <a:prstGeom prst="rect">
+                <a:avLst/>
+              </a:prstGeom>
+              <a:blipFill>
+                <a:blip r:embed="rId3"/>
+                <a:stretch>
+                  <a:fillRect b="-4082"/>
+                </a:stretch>
+              </a:blipFill>
+            </p:spPr>
+            <p:txBody>
+              <a:bodyPr/>
+              <a:lstStyle/>
+              <a:p>
+                <a:r>
+                  <a:rPr lang="en-VN">
+                    <a:noFill/>
+                  </a:rPr>
+                  <a:t> </a:t>
+                </a:r>
+              </a:p>
+            </p:txBody>
+          </p:sp>
+        </mc:Fallback>
+      </mc:AlternateContent>
+      <p:sp>
+        <p:nvSpPr>
+          <p:cNvPr id="37" name="TextBox 36">
+            <a:extLst>
+              <a:ext uri="{FF2B5EF4-FFF2-40B4-BE49-F238E27FC236}">
+                <a16:creationId xmlns:a16="http://schemas.microsoft.com/office/drawing/2014/main" id="{5861C22F-90CC-CC4E-A2DA-ACE566B8C61A}"/>
+              </a:ext>
+            </a:extLst>
+          </p:cNvPr>
+          <p:cNvSpPr txBox="1"/>
+          <p:nvPr/>
+        </p:nvSpPr>
+        <p:spPr>
+          <a:xfrm>
+            <a:off x="1013655" y="2799765"/>
+            <a:ext cx="487642" cy="369332"/>
+          </a:xfrm>
+          <a:prstGeom prst="rect">
+            <a:avLst/>
+          </a:prstGeom>
+          <a:noFill/>
+        </p:spPr>
+        <p:txBody>
+          <a:bodyPr wrap="square" rtlCol="0">
+            <a:spAutoFit/>
+          </a:bodyPr>
+          <a:lstStyle/>
+          <a:p>
+            <a:r>
+              <a:rPr lang="en-GB" dirty="0"/>
+              <a:t>B2</a:t>
+            </a:r>
+            <a:endParaRPr lang="de-DE" dirty="0"/>
+          </a:p>
+        </p:txBody>
+      </p:sp>
+      <p:sp>
+        <p:nvSpPr>
+          <p:cNvPr id="39" name="TextBox 38">
+            <a:extLst>
+              <a:ext uri="{FF2B5EF4-FFF2-40B4-BE49-F238E27FC236}">
+                <a16:creationId xmlns:a16="http://schemas.microsoft.com/office/drawing/2014/main" id="{6F24D8C6-30F0-6D4B-A303-7BF04C963E42}"/>
+              </a:ext>
+            </a:extLst>
+          </p:cNvPr>
+          <p:cNvSpPr txBox="1"/>
+          <p:nvPr/>
+        </p:nvSpPr>
+        <p:spPr>
+          <a:xfrm>
+            <a:off x="2951480" y="288843"/>
+            <a:ext cx="487642" cy="369332"/>
+          </a:xfrm>
+          <a:prstGeom prst="rect">
+            <a:avLst/>
+          </a:prstGeom>
+          <a:noFill/>
+        </p:spPr>
+        <p:txBody>
+          <a:bodyPr wrap="square" rtlCol="0">
+            <a:spAutoFit/>
+          </a:bodyPr>
+          <a:lstStyle/>
+          <a:p>
+            <a:r>
+              <a:rPr lang="en-GB" dirty="0"/>
+              <a:t>A2</a:t>
+            </a:r>
+            <a:endParaRPr lang="de-DE" dirty="0"/>
+          </a:p>
+        </p:txBody>
+      </p:sp>
+      <mc:AlternateContent xmlns:mc="http://schemas.openxmlformats.org/markup-compatibility/2006">
+        <mc:Choice xmlns:a14="http://schemas.microsoft.com/office/drawing/2010/main" Requires="a14">
+          <p:sp>
+            <p:nvSpPr>
+              <p:cNvPr id="40" name="TextBox 39">
+                <a:extLst>
+                  <a:ext uri="{FF2B5EF4-FFF2-40B4-BE49-F238E27FC236}">
+                    <a16:creationId xmlns:a16="http://schemas.microsoft.com/office/drawing/2014/main" id="{53169839-3D46-394C-8D2E-87722A38D427}"/>
+                  </a:ext>
+                </a:extLst>
+              </p:cNvPr>
+              <p:cNvSpPr txBox="1"/>
+              <p:nvPr/>
+            </p:nvSpPr>
+            <p:spPr>
+              <a:xfrm>
+                <a:off x="8347194" y="3385209"/>
+                <a:ext cx="1827744" cy="369332"/>
+              </a:xfrm>
+              <a:prstGeom prst="rect">
+                <a:avLst/>
+              </a:prstGeom>
+              <a:noFill/>
+            </p:spPr>
+            <p:txBody>
+              <a:bodyPr wrap="none" rtlCol="0">
+                <a:spAutoFit/>
+              </a:bodyPr>
+              <a:lstStyle/>
+              <a:p>
+                <a:pPr/>
+                <a:r>
+                  <a:rPr lang="en-US" b="0" dirty="0"/>
+                  <a:t>A</a:t>
+                </a:r>
+                <a14:m>
+                  <m:oMath xmlns:m="http://schemas.openxmlformats.org/officeDocument/2006/math">
+                    <m:r>
+                      <a:rPr lang="en-US" b="0" i="1" smtClean="0">
+                        <a:latin typeface="Cambria Math" panose="02040503050406030204" pitchFamily="18" charset="0"/>
+                      </a:rPr>
+                      <m:t>2=</m:t>
+                    </m:r>
+                    <m:r>
+                      <a:rPr lang="en-US" b="0" i="1" smtClean="0">
+                        <a:latin typeface="Cambria Math" panose="02040503050406030204" pitchFamily="18" charset="0"/>
+                      </a:rPr>
+                      <m:t>𝐴</m:t>
+                    </m:r>
+                    <m:r>
+                      <a:rPr lang="en-US" b="0" i="1" smtClean="0">
+                        <a:latin typeface="Cambria Math" panose="02040503050406030204" pitchFamily="18" charset="0"/>
+                      </a:rPr>
+                      <m:t>21+</m:t>
+                    </m:r>
+                    <m:r>
+                      <a:rPr lang="en-US" b="0" i="1" smtClean="0">
+                        <a:latin typeface="Cambria Math" panose="02040503050406030204" pitchFamily="18" charset="0"/>
+                      </a:rPr>
+                      <m:t>𝐴</m:t>
+                    </m:r>
+                    <m:r>
+                      <a:rPr lang="en-US" b="0" i="1" smtClean="0">
+                        <a:latin typeface="Cambria Math" panose="02040503050406030204" pitchFamily="18" charset="0"/>
+                      </a:rPr>
+                      <m:t>22</m:t>
+                    </m:r>
+                  </m:oMath>
+                </a14:m>
+                <a:endParaRPr lang="en-US" dirty="0"/>
+              </a:p>
+            </p:txBody>
+          </p:sp>
+        </mc:Choice>
+        <mc:Fallback>
+          <p:sp>
+            <p:nvSpPr>
+              <p:cNvPr id="40" name="TextBox 39">
+                <a:extLst>
+                  <a:ext uri="{FF2B5EF4-FFF2-40B4-BE49-F238E27FC236}">
+                    <a16:creationId xmlns:a16="http://schemas.microsoft.com/office/drawing/2014/main" id="{53169839-3D46-394C-8D2E-87722A38D427}"/>
+                  </a:ext>
+                </a:extLst>
+              </p:cNvPr>
+              <p:cNvSpPr txBox="1">
+                <a:spLocks noRot="1" noChangeAspect="1" noMove="1" noResize="1" noEditPoints="1" noAdjustHandles="1" noChangeArrowheads="1" noChangeShapeType="1" noTextEdit="1"/>
+              </p:cNvSpPr>
+              <p:nvPr/>
+            </p:nvSpPr>
+            <p:spPr>
+              <a:xfrm>
+                <a:off x="8347194" y="3385209"/>
+                <a:ext cx="1827744" cy="369332"/>
+              </a:xfrm>
+              <a:prstGeom prst="rect">
+                <a:avLst/>
+              </a:prstGeom>
+              <a:blipFill>
+                <a:blip r:embed="rId4"/>
+                <a:stretch>
+                  <a:fillRect l="-2759" t="-6667" b="-26667"/>
+                </a:stretch>
+              </a:blipFill>
+            </p:spPr>
+            <p:txBody>
+              <a:bodyPr/>
+              <a:lstStyle/>
+              <a:p>
+                <a:r>
+                  <a:rPr lang="en-VN">
+                    <a:noFill/>
+                  </a:rPr>
+                  <a:t> </a:t>
+                </a:r>
+              </a:p>
+            </p:txBody>
+          </p:sp>
+        </mc:Fallback>
+      </mc:AlternateContent>
+      <p:cxnSp>
+        <p:nvCxnSpPr>
+          <p:cNvPr id="21" name="Straight Connector 20">
+            <a:extLst>
+              <a:ext uri="{FF2B5EF4-FFF2-40B4-BE49-F238E27FC236}">
+                <a16:creationId xmlns:a16="http://schemas.microsoft.com/office/drawing/2014/main" id="{DF5A79D3-D7A2-B449-A627-39896872B835}"/>
+              </a:ext>
+            </a:extLst>
+          </p:cNvPr>
+          <p:cNvCxnSpPr>
+            <a:cxnSpLocks/>
+          </p:cNvCxnSpPr>
+          <p:nvPr/>
+        </p:nvCxnSpPr>
+        <p:spPr>
+          <a:xfrm flipH="1">
+            <a:off x="1385299" y="1842888"/>
+            <a:ext cx="3716681" cy="0"/>
+          </a:xfrm>
+          <a:prstGeom prst="line">
+            <a:avLst/>
+          </a:prstGeom>
+          <a:ln w="28575">
+            <a:solidFill>
+              <a:schemeClr val="tx1"/>
+            </a:solidFill>
+            <a:prstDash val="dash"/>
+          </a:ln>
+        </p:spPr>
+        <p:style>
+          <a:lnRef idx="1">
+            <a:schemeClr val="accent1"/>
+          </a:lnRef>
+          <a:fillRef idx="0">
+            <a:schemeClr val="accent1"/>
+          </a:fillRef>
+          <a:effectRef idx="0">
+            <a:schemeClr val="accent1"/>
+          </a:effectRef>
+          <a:fontRef idx="minor">
+            <a:schemeClr val="tx1"/>
+          </a:fontRef>
+        </p:style>
+      </p:cxnSp>
+      <p:sp>
+        <p:nvSpPr>
+          <p:cNvPr id="28" name="TextBox 27">
+            <a:extLst>
+              <a:ext uri="{FF2B5EF4-FFF2-40B4-BE49-F238E27FC236}">
+                <a16:creationId xmlns:a16="http://schemas.microsoft.com/office/drawing/2014/main" id="{3D61B517-DC29-D74F-B2DF-BEE363166007}"/>
+              </a:ext>
+            </a:extLst>
+          </p:cNvPr>
+          <p:cNvSpPr txBox="1"/>
+          <p:nvPr/>
+        </p:nvSpPr>
+        <p:spPr>
+          <a:xfrm>
+            <a:off x="2951480" y="1773196"/>
+            <a:ext cx="342900" cy="369332"/>
+          </a:xfrm>
+          <a:prstGeom prst="rect">
+            <a:avLst/>
+          </a:prstGeom>
+          <a:noFill/>
+        </p:spPr>
+        <p:txBody>
+          <a:bodyPr wrap="square" rtlCol="0">
+            <a:spAutoFit/>
+          </a:bodyPr>
+          <a:lstStyle/>
+          <a:p>
+            <a:r>
+              <a:rPr lang="el-GR" dirty="0"/>
+              <a:t>α</a:t>
+            </a:r>
+            <a:endParaRPr lang="de-DE" dirty="0"/>
+          </a:p>
+        </p:txBody>
+      </p:sp>
+      <p:sp>
+        <p:nvSpPr>
+          <p:cNvPr id="29" name="TextBox 28">
+            <a:extLst>
+              <a:ext uri="{FF2B5EF4-FFF2-40B4-BE49-F238E27FC236}">
+                <a16:creationId xmlns:a16="http://schemas.microsoft.com/office/drawing/2014/main" id="{9FF3400B-CC08-B34E-9084-EF376C75CA95}"/>
+              </a:ext>
+            </a:extLst>
+          </p:cNvPr>
+          <p:cNvSpPr txBox="1"/>
+          <p:nvPr/>
+        </p:nvSpPr>
+        <p:spPr>
+          <a:xfrm>
+            <a:off x="1329847" y="2347804"/>
+            <a:ext cx="342900" cy="369332"/>
+          </a:xfrm>
+          <a:prstGeom prst="rect">
+            <a:avLst/>
+          </a:prstGeom>
+          <a:noFill/>
+        </p:spPr>
+        <p:txBody>
+          <a:bodyPr wrap="square" rtlCol="0">
+            <a:spAutoFit/>
+          </a:bodyPr>
+          <a:lstStyle/>
+          <a:p>
+            <a:r>
+              <a:rPr lang="el-GR" dirty="0"/>
+              <a:t>α</a:t>
+            </a:r>
+            <a:endParaRPr lang="de-DE" dirty="0"/>
+          </a:p>
+        </p:txBody>
+      </p:sp>
+      <p:sp>
+        <p:nvSpPr>
+          <p:cNvPr id="33" name="TextBox 32">
+            <a:extLst>
+              <a:ext uri="{FF2B5EF4-FFF2-40B4-BE49-F238E27FC236}">
+                <a16:creationId xmlns:a16="http://schemas.microsoft.com/office/drawing/2014/main" id="{0269E9DB-F704-584B-B4B5-66CAC3DDC04A}"/>
+              </a:ext>
+            </a:extLst>
+          </p:cNvPr>
+          <p:cNvSpPr txBox="1"/>
+          <p:nvPr/>
+        </p:nvSpPr>
+        <p:spPr>
+          <a:xfrm>
+            <a:off x="2911018" y="1436246"/>
+            <a:ext cx="802248" cy="369332"/>
+          </a:xfrm>
+          <a:prstGeom prst="rect">
+            <a:avLst/>
+          </a:prstGeom>
+          <a:noFill/>
+        </p:spPr>
+        <p:txBody>
+          <a:bodyPr wrap="square" rtlCol="0">
+            <a:spAutoFit/>
+          </a:bodyPr>
+          <a:lstStyle/>
+          <a:p>
+            <a:r>
+              <a:rPr lang="en-GB" dirty="0"/>
+              <a:t>A22</a:t>
+            </a:r>
+            <a:endParaRPr lang="de-DE" dirty="0"/>
+          </a:p>
+        </p:txBody>
+      </p:sp>
+      <p:sp>
+        <p:nvSpPr>
+          <p:cNvPr id="34" name="TextBox 33">
+            <a:extLst>
+              <a:ext uri="{FF2B5EF4-FFF2-40B4-BE49-F238E27FC236}">
+                <a16:creationId xmlns:a16="http://schemas.microsoft.com/office/drawing/2014/main" id="{B66A6864-FC69-5F47-9A96-509C7CF94FA0}"/>
+              </a:ext>
+            </a:extLst>
+          </p:cNvPr>
+          <p:cNvSpPr txBox="1"/>
+          <p:nvPr/>
+        </p:nvSpPr>
+        <p:spPr>
+          <a:xfrm>
+            <a:off x="1208736" y="1398935"/>
+            <a:ext cx="802248" cy="369332"/>
+          </a:xfrm>
+          <a:prstGeom prst="rect">
+            <a:avLst/>
+          </a:prstGeom>
+          <a:noFill/>
+        </p:spPr>
+        <p:txBody>
+          <a:bodyPr wrap="square" rtlCol="0">
+            <a:spAutoFit/>
+          </a:bodyPr>
+          <a:lstStyle/>
+          <a:p>
+            <a:r>
+              <a:rPr lang="en-GB" dirty="0"/>
+              <a:t>A21</a:t>
+            </a:r>
+            <a:endParaRPr lang="de-DE" dirty="0"/>
+          </a:p>
+        </p:txBody>
+      </p:sp>
+      <p:cxnSp>
+        <p:nvCxnSpPr>
+          <p:cNvPr id="41" name="Straight Connector 40">
+            <a:extLst>
+              <a:ext uri="{FF2B5EF4-FFF2-40B4-BE49-F238E27FC236}">
+                <a16:creationId xmlns:a16="http://schemas.microsoft.com/office/drawing/2014/main" id="{DDC2C3B7-80AA-9543-9E97-2D50FF4137B2}"/>
+              </a:ext>
+            </a:extLst>
+          </p:cNvPr>
+          <p:cNvCxnSpPr>
+            <a:cxnSpLocks/>
+          </p:cNvCxnSpPr>
+          <p:nvPr/>
+        </p:nvCxnSpPr>
+        <p:spPr>
+          <a:xfrm>
+            <a:off x="1700149" y="1017143"/>
+            <a:ext cx="0" cy="813687"/>
+          </a:xfrm>
+          <a:prstGeom prst="line">
+            <a:avLst/>
+          </a:prstGeom>
+          <a:ln w="28575">
+            <a:solidFill>
+              <a:schemeClr val="tx1"/>
+            </a:solidFill>
+            <a:prstDash val="dash"/>
+          </a:ln>
+        </p:spPr>
+        <p:style>
+          <a:lnRef idx="1">
+            <a:schemeClr val="accent1"/>
+          </a:lnRef>
+          <a:fillRef idx="0">
+            <a:schemeClr val="accent1"/>
+          </a:fillRef>
+          <a:effectRef idx="0">
+            <a:schemeClr val="accent1"/>
+          </a:effectRef>
+          <a:fontRef idx="minor">
+            <a:schemeClr val="tx1"/>
+          </a:fontRef>
+        </p:style>
+      </p:cxnSp>
+      <mc:AlternateContent xmlns:mc="http://schemas.openxmlformats.org/markup-compatibility/2006">
+        <mc:Choice xmlns:a14="http://schemas.microsoft.com/office/drawing/2010/main" Requires="a14">
+          <p:sp>
+            <p:nvSpPr>
+              <p:cNvPr id="42" name="TextBox 41">
+                <a:extLst>
+                  <a:ext uri="{FF2B5EF4-FFF2-40B4-BE49-F238E27FC236}">
+                    <a16:creationId xmlns:a16="http://schemas.microsoft.com/office/drawing/2014/main" id="{2318431B-13D8-4F4B-AF76-437BFD32DF04}"/>
+                  </a:ext>
+                </a:extLst>
+              </p:cNvPr>
+              <p:cNvSpPr txBox="1"/>
+              <p:nvPr/>
+            </p:nvSpPr>
+            <p:spPr>
+              <a:xfrm>
+                <a:off x="6395973" y="1846570"/>
+                <a:ext cx="1569468" cy="610936"/>
+              </a:xfrm>
+              <a:prstGeom prst="rect">
+                <a:avLst/>
+              </a:prstGeom>
+              <a:noFill/>
+            </p:spPr>
+            <p:txBody>
+              <a:bodyPr wrap="none" rtlCol="0">
+                <a:spAutoFit/>
+              </a:bodyPr>
+              <a:lstStyle/>
+              <a:p>
+                <a:pPr/>
+                <a14:m>
+                  <m:oMathPara xmlns:m="http://schemas.openxmlformats.org/officeDocument/2006/math">
+                    <m:oMathParaPr>
+                      <m:jc m:val="centerGroup"/>
+                    </m:oMathParaPr>
+                    <m:oMath xmlns:m="http://schemas.openxmlformats.org/officeDocument/2006/math">
+                      <m:func>
+                        <m:funcPr>
+                          <m:ctrlPr>
+                            <a:rPr lang="en-GB" b="0" i="1" smtClean="0">
+                              <a:latin typeface="Cambria Math" panose="02040503050406030204" pitchFamily="18" charset="0"/>
+                            </a:rPr>
+                          </m:ctrlPr>
+                        </m:funcPr>
+                        <m:fName>
+                          <m:r>
+                            <m:rPr>
+                              <m:sty m:val="p"/>
+                            </m:rPr>
+                            <a:rPr lang="en-US" b="0" smtClean="0">
+                              <a:latin typeface="Cambria Math" panose="02040503050406030204" pitchFamily="18" charset="0"/>
+                            </a:rPr>
+                            <m:t>sin</m:t>
+                          </m:r>
+                        </m:fName>
+                        <m:e>
+                          <m:d>
+                            <m:dPr>
+                              <m:ctrlPr>
+                                <a:rPr lang="en-GB" b="0" i="1" smtClean="0">
+                                  <a:latin typeface="Cambria Math" panose="02040503050406030204" pitchFamily="18" charset="0"/>
+                                </a:rPr>
+                              </m:ctrlPr>
+                            </m:dPr>
+                            <m:e>
+                              <m:r>
+                                <a:rPr lang="en-GB" b="0" i="1" smtClean="0">
+                                  <a:latin typeface="Cambria Math" panose="02040503050406030204" pitchFamily="18" charset="0"/>
+                                  <a:ea typeface="Cambria Math" panose="02040503050406030204" pitchFamily="18" charset="0"/>
+                                </a:rPr>
+                                <m:t>𝛼</m:t>
+                              </m:r>
+                            </m:e>
+                          </m:d>
+                        </m:e>
+                      </m:func>
+                      <m:r>
+                        <a:rPr lang="en-GB" b="0" i="1" smtClean="0">
+                          <a:latin typeface="Cambria Math" panose="02040503050406030204" pitchFamily="18" charset="0"/>
+                          <a:ea typeface="Cambria Math" panose="02040503050406030204" pitchFamily="18" charset="0"/>
+                        </a:rPr>
+                        <m:t>=</m:t>
+                      </m:r>
+                      <m:f>
+                        <m:fPr>
+                          <m:ctrlPr>
+                            <a:rPr lang="en-GB" b="0" i="1" smtClean="0">
+                              <a:latin typeface="Cambria Math" panose="02040503050406030204" pitchFamily="18" charset="0"/>
+                              <a:ea typeface="Cambria Math" panose="02040503050406030204" pitchFamily="18" charset="0"/>
+                            </a:rPr>
+                          </m:ctrlPr>
+                        </m:fPr>
+                        <m:num>
+                          <m:r>
+                            <a:rPr lang="en-US" b="0" i="1" smtClean="0">
+                              <a:latin typeface="Cambria Math" panose="02040503050406030204" pitchFamily="18" charset="0"/>
+                              <a:ea typeface="Cambria Math" panose="02040503050406030204" pitchFamily="18" charset="0"/>
+                            </a:rPr>
+                            <m:t>𝐴</m:t>
+                          </m:r>
+                          <m:r>
+                            <a:rPr lang="en-US" b="0" i="1" smtClean="0">
+                              <a:latin typeface="Cambria Math" panose="02040503050406030204" pitchFamily="18" charset="0"/>
+                              <a:ea typeface="Cambria Math" panose="02040503050406030204" pitchFamily="18" charset="0"/>
+                            </a:rPr>
+                            <m:t>21</m:t>
+                          </m:r>
+                        </m:num>
+                        <m:den>
+                          <m:r>
+                            <a:rPr lang="en-US" b="0" i="1" smtClean="0">
+                              <a:latin typeface="Cambria Math" panose="02040503050406030204" pitchFamily="18" charset="0"/>
+                              <a:ea typeface="Cambria Math" panose="02040503050406030204" pitchFamily="18" charset="0"/>
+                            </a:rPr>
+                            <m:t>𝐵</m:t>
+                          </m:r>
+                          <m:r>
+                            <a:rPr lang="en-US" b="0" i="1" smtClean="0">
+                              <a:latin typeface="Cambria Math" panose="02040503050406030204" pitchFamily="18" charset="0"/>
+                              <a:ea typeface="Cambria Math" panose="02040503050406030204" pitchFamily="18" charset="0"/>
+                            </a:rPr>
+                            <m:t>1</m:t>
+                          </m:r>
+                        </m:den>
+                      </m:f>
+                    </m:oMath>
+                  </m:oMathPara>
+                </a14:m>
+                <a:endParaRPr lang="en-US" dirty="0"/>
+              </a:p>
+            </p:txBody>
+          </p:sp>
+        </mc:Choice>
+        <mc:Fallback>
+          <p:sp>
+            <p:nvSpPr>
+              <p:cNvPr id="42" name="TextBox 41">
+                <a:extLst>
+                  <a:ext uri="{FF2B5EF4-FFF2-40B4-BE49-F238E27FC236}">
+                    <a16:creationId xmlns:a16="http://schemas.microsoft.com/office/drawing/2014/main" id="{2318431B-13D8-4F4B-AF76-437BFD32DF04}"/>
+                  </a:ext>
+                </a:extLst>
+              </p:cNvPr>
+              <p:cNvSpPr txBox="1">
+                <a:spLocks noRot="1" noChangeAspect="1" noMove="1" noResize="1" noEditPoints="1" noAdjustHandles="1" noChangeArrowheads="1" noChangeShapeType="1" noTextEdit="1"/>
+              </p:cNvSpPr>
+              <p:nvPr/>
+            </p:nvSpPr>
+            <p:spPr>
+              <a:xfrm>
+                <a:off x="6395973" y="1846570"/>
+                <a:ext cx="1569468" cy="610936"/>
+              </a:xfrm>
+              <a:prstGeom prst="rect">
+                <a:avLst/>
+              </a:prstGeom>
+              <a:blipFill>
+                <a:blip r:embed="rId5"/>
+                <a:stretch>
+                  <a:fillRect b="-4082"/>
+                </a:stretch>
+              </a:blipFill>
+            </p:spPr>
+            <p:txBody>
+              <a:bodyPr/>
+              <a:lstStyle/>
+              <a:p>
+                <a:r>
+                  <a:rPr lang="en-VN">
+                    <a:noFill/>
+                  </a:rPr>
+                  <a:t> </a:t>
+                </a:r>
+              </a:p>
+            </p:txBody>
+          </p:sp>
+        </mc:Fallback>
+      </mc:AlternateContent>
+      <mc:AlternateContent xmlns:mc="http://schemas.openxmlformats.org/markup-compatibility/2006">
+        <mc:Choice xmlns:a14="http://schemas.microsoft.com/office/drawing/2010/main" Requires="a14">
+          <p:sp>
+            <p:nvSpPr>
+              <p:cNvPr id="43" name="TextBox 42">
+                <a:extLst>
+                  <a:ext uri="{FF2B5EF4-FFF2-40B4-BE49-F238E27FC236}">
+                    <a16:creationId xmlns:a16="http://schemas.microsoft.com/office/drawing/2014/main" id="{80D9A202-AA81-2B46-8742-6E79623BD7E6}"/>
+                  </a:ext>
+                </a:extLst>
+              </p:cNvPr>
+              <p:cNvSpPr txBox="1"/>
+              <p:nvPr/>
+            </p:nvSpPr>
+            <p:spPr>
+              <a:xfrm>
+                <a:off x="8233385" y="1967372"/>
+                <a:ext cx="2014269" cy="369332"/>
+              </a:xfrm>
+              <a:prstGeom prst="rect">
+                <a:avLst/>
+              </a:prstGeom>
+              <a:noFill/>
+            </p:spPr>
+            <p:txBody>
+              <a:bodyPr wrap="none" rtlCol="0">
+                <a:spAutoFit/>
+              </a:bodyPr>
+              <a:lstStyle/>
+              <a:p>
+                <a:pPr/>
+                <a14:m>
+                  <m:oMathPara xmlns:m="http://schemas.openxmlformats.org/officeDocument/2006/math">
+                    <m:oMathParaPr>
+                      <m:jc m:val="centerGroup"/>
+                    </m:oMathParaPr>
+                    <m:oMath xmlns:m="http://schemas.openxmlformats.org/officeDocument/2006/math">
+                      <m:r>
+                        <a:rPr lang="en-US" b="0" i="1" smtClean="0">
+                          <a:latin typeface="Cambria Math" panose="02040503050406030204" pitchFamily="18" charset="0"/>
+                        </a:rPr>
+                        <m:t>𝐴</m:t>
+                      </m:r>
+                      <m:r>
+                        <a:rPr lang="en-US" b="0" i="1" smtClean="0">
+                          <a:latin typeface="Cambria Math" panose="02040503050406030204" pitchFamily="18" charset="0"/>
+                        </a:rPr>
+                        <m:t>21=</m:t>
+                      </m:r>
+                      <m:r>
+                        <a:rPr lang="en-US" b="0" i="1" smtClean="0">
+                          <a:latin typeface="Cambria Math" panose="02040503050406030204" pitchFamily="18" charset="0"/>
+                        </a:rPr>
+                        <m:t>𝐵</m:t>
+                      </m:r>
+                      <m:r>
+                        <a:rPr lang="en-US" b="0" i="1" smtClean="0">
+                          <a:latin typeface="Cambria Math" panose="02040503050406030204" pitchFamily="18" charset="0"/>
+                        </a:rPr>
+                        <m:t>1 </m:t>
+                      </m:r>
+                      <m:r>
+                        <m:rPr>
+                          <m:sty m:val="p"/>
+                        </m:rPr>
+                        <a:rPr lang="en-US" b="0" smtClean="0">
+                          <a:latin typeface="Cambria Math" panose="02040503050406030204" pitchFamily="18" charset="0"/>
+                        </a:rPr>
+                        <m:t>asin</m:t>
+                      </m:r>
+                      <m:r>
+                        <a:rPr lang="en-US" b="0" i="1" smtClean="0">
+                          <a:latin typeface="Cambria Math" panose="02040503050406030204" pitchFamily="18" charset="0"/>
+                        </a:rPr>
+                        <m:t>⁡(</m:t>
+                      </m:r>
+                      <m:r>
+                        <a:rPr lang="en-GB" i="1" smtClean="0">
+                          <a:latin typeface="Cambria Math" panose="02040503050406030204" pitchFamily="18" charset="0"/>
+                          <a:ea typeface="Cambria Math" panose="02040503050406030204" pitchFamily="18" charset="0"/>
+                        </a:rPr>
+                        <m:t>𝛼</m:t>
+                      </m:r>
+                      <m:r>
+                        <a:rPr lang="en-US" b="0" i="1" smtClean="0">
+                          <a:latin typeface="Cambria Math" panose="02040503050406030204" pitchFamily="18" charset="0"/>
+                          <a:ea typeface="Cambria Math" panose="02040503050406030204" pitchFamily="18" charset="0"/>
+                        </a:rPr>
+                        <m:t>)</m:t>
+                      </m:r>
+                    </m:oMath>
+                  </m:oMathPara>
+                </a14:m>
+                <a:endParaRPr lang="en-US" dirty="0"/>
+              </a:p>
+            </p:txBody>
+          </p:sp>
+        </mc:Choice>
+        <mc:Fallback>
+          <p:sp>
+            <p:nvSpPr>
+              <p:cNvPr id="43" name="TextBox 42">
+                <a:extLst>
+                  <a:ext uri="{FF2B5EF4-FFF2-40B4-BE49-F238E27FC236}">
+                    <a16:creationId xmlns:a16="http://schemas.microsoft.com/office/drawing/2014/main" id="{80D9A202-AA81-2B46-8742-6E79623BD7E6}"/>
+                  </a:ext>
+                </a:extLst>
+              </p:cNvPr>
+              <p:cNvSpPr txBox="1">
+                <a:spLocks noRot="1" noChangeAspect="1" noMove="1" noResize="1" noEditPoints="1" noAdjustHandles="1" noChangeArrowheads="1" noChangeShapeType="1" noTextEdit="1"/>
+              </p:cNvSpPr>
+              <p:nvPr/>
+            </p:nvSpPr>
+            <p:spPr>
+              <a:xfrm>
+                <a:off x="8233385" y="1967372"/>
+                <a:ext cx="2014269" cy="369332"/>
+              </a:xfrm>
+              <a:prstGeom prst="rect">
+                <a:avLst/>
+              </a:prstGeom>
+              <a:blipFill>
+                <a:blip r:embed="rId6"/>
+                <a:stretch>
+                  <a:fillRect b="-17241"/>
+                </a:stretch>
+              </a:blipFill>
+            </p:spPr>
+            <p:txBody>
+              <a:bodyPr/>
+              <a:lstStyle/>
+              <a:p>
+                <a:r>
+                  <a:rPr lang="en-VN">
+                    <a:noFill/>
+                  </a:rPr>
+                  <a:t> </a:t>
+                </a:r>
+              </a:p>
+            </p:txBody>
+          </p:sp>
+        </mc:Fallback>
+      </mc:AlternateContent>
+      <mc:AlternateContent xmlns:mc="http://schemas.openxmlformats.org/markup-compatibility/2006">
+        <mc:Choice xmlns:a14="http://schemas.microsoft.com/office/drawing/2010/main" Requires="a14">
+          <p:sp>
+            <p:nvSpPr>
+              <p:cNvPr id="44" name="TextBox 43">
+                <a:extLst>
+                  <a:ext uri="{FF2B5EF4-FFF2-40B4-BE49-F238E27FC236}">
+                    <a16:creationId xmlns:a16="http://schemas.microsoft.com/office/drawing/2014/main" id="{401EF6B5-D795-CF46-947D-6E985971289D}"/>
+                  </a:ext>
+                </a:extLst>
+              </p:cNvPr>
+              <p:cNvSpPr txBox="1"/>
+              <p:nvPr/>
+            </p:nvSpPr>
+            <p:spPr>
+              <a:xfrm>
+                <a:off x="8224693" y="2734128"/>
+                <a:ext cx="2072747" cy="369332"/>
+              </a:xfrm>
+              <a:prstGeom prst="rect">
+                <a:avLst/>
+              </a:prstGeom>
+              <a:noFill/>
+            </p:spPr>
+            <p:txBody>
+              <a:bodyPr wrap="none" rtlCol="0">
+                <a:spAutoFit/>
+              </a:bodyPr>
+              <a:lstStyle/>
+              <a:p>
+                <a:pPr/>
+                <a14:m>
+                  <m:oMathPara xmlns:m="http://schemas.openxmlformats.org/officeDocument/2006/math">
+                    <m:oMathParaPr>
+                      <m:jc m:val="centerGroup"/>
+                    </m:oMathParaPr>
+                    <m:oMath xmlns:m="http://schemas.openxmlformats.org/officeDocument/2006/math">
+                      <m:r>
+                        <a:rPr lang="en-US" i="1" smtClean="0">
+                          <a:latin typeface="Cambria Math" panose="02040503050406030204" pitchFamily="18" charset="0"/>
+                        </a:rPr>
+                        <m:t>𝐴</m:t>
+                      </m:r>
+                      <m:r>
+                        <a:rPr lang="en-US" i="1" smtClean="0">
+                          <a:latin typeface="Cambria Math" panose="02040503050406030204" pitchFamily="18" charset="0"/>
+                        </a:rPr>
+                        <m:t>22=</m:t>
+                      </m:r>
+                      <m:r>
+                        <a:rPr lang="en-US" i="1" smtClean="0">
+                          <a:latin typeface="Cambria Math" panose="02040503050406030204" pitchFamily="18" charset="0"/>
+                        </a:rPr>
+                        <m:t>𝐴</m:t>
+                      </m:r>
+                      <m:r>
+                        <a:rPr lang="en-US" i="1" smtClean="0">
+                          <a:latin typeface="Cambria Math" panose="02040503050406030204" pitchFamily="18" charset="0"/>
+                        </a:rPr>
+                        <m:t>1 </m:t>
+                      </m:r>
+                      <m:r>
+                        <a:rPr lang="en-US" i="1" smtClean="0">
+                          <a:latin typeface="Cambria Math" panose="02040503050406030204" pitchFamily="18" charset="0"/>
+                        </a:rPr>
+                        <m:t>𝑎𝑐𝑜𝑠</m:t>
+                      </m:r>
+                      <m:d>
+                        <m:dPr>
+                          <m:ctrlPr>
+                            <a:rPr lang="en-US" i="1">
+                              <a:latin typeface="Cambria Math" panose="02040503050406030204" pitchFamily="18" charset="0"/>
+                            </a:rPr>
+                          </m:ctrlPr>
+                        </m:dPr>
+                        <m:e>
+                          <m:r>
+                            <a:rPr lang="en-GB" i="1" smtClean="0">
+                              <a:latin typeface="Cambria Math" panose="02040503050406030204" pitchFamily="18" charset="0"/>
+                              <a:ea typeface="Cambria Math" panose="02040503050406030204" pitchFamily="18" charset="0"/>
+                            </a:rPr>
+                            <m:t>𝛼</m:t>
+                          </m:r>
+                        </m:e>
+                      </m:d>
+                    </m:oMath>
+                  </m:oMathPara>
+                </a14:m>
+                <a:endParaRPr lang="en-US" dirty="0"/>
+              </a:p>
+            </p:txBody>
+          </p:sp>
+        </mc:Choice>
+        <mc:Fallback>
+          <p:sp>
+            <p:nvSpPr>
+              <p:cNvPr id="44" name="TextBox 43">
+                <a:extLst>
+                  <a:ext uri="{FF2B5EF4-FFF2-40B4-BE49-F238E27FC236}">
+                    <a16:creationId xmlns:a16="http://schemas.microsoft.com/office/drawing/2014/main" id="{401EF6B5-D795-CF46-947D-6E985971289D}"/>
+                  </a:ext>
+                </a:extLst>
+              </p:cNvPr>
+              <p:cNvSpPr txBox="1">
+                <a:spLocks noRot="1" noChangeAspect="1" noMove="1" noResize="1" noEditPoints="1" noAdjustHandles="1" noChangeArrowheads="1" noChangeShapeType="1" noTextEdit="1"/>
+              </p:cNvSpPr>
+              <p:nvPr/>
+            </p:nvSpPr>
+            <p:spPr>
+              <a:xfrm>
+                <a:off x="8224693" y="2734128"/>
+                <a:ext cx="2072747" cy="369332"/>
+              </a:xfrm>
+              <a:prstGeom prst="rect">
+                <a:avLst/>
+              </a:prstGeom>
+              <a:blipFill>
+                <a:blip r:embed="rId7"/>
+                <a:stretch>
+                  <a:fillRect b="-16667"/>
+                </a:stretch>
+              </a:blipFill>
+            </p:spPr>
+            <p:txBody>
+              <a:bodyPr/>
+              <a:lstStyle/>
+              <a:p>
+                <a:r>
+                  <a:rPr lang="en-VN">
+                    <a:noFill/>
+                  </a:rPr>
+                  <a:t> </a:t>
+                </a:r>
+              </a:p>
+            </p:txBody>
+          </p:sp>
+        </mc:Fallback>
+      </mc:AlternateContent>
+      <p:sp>
+        <p:nvSpPr>
+          <p:cNvPr id="45" name="TextBox 44">
+            <a:extLst>
+              <a:ext uri="{FF2B5EF4-FFF2-40B4-BE49-F238E27FC236}">
+                <a16:creationId xmlns:a16="http://schemas.microsoft.com/office/drawing/2014/main" id="{A0FC1D64-3697-5643-A248-0C5188B6C171}"/>
+              </a:ext>
+            </a:extLst>
+          </p:cNvPr>
+          <p:cNvSpPr txBox="1"/>
+          <p:nvPr/>
+        </p:nvSpPr>
+        <p:spPr>
+          <a:xfrm>
+            <a:off x="6678658" y="494058"/>
+            <a:ext cx="2640459" cy="369332"/>
+          </a:xfrm>
+          <a:prstGeom prst="rect">
+            <a:avLst/>
+          </a:prstGeom>
+          <a:noFill/>
+        </p:spPr>
+        <p:txBody>
+          <a:bodyPr wrap="square" rtlCol="0">
+            <a:spAutoFit/>
+          </a:bodyPr>
+          <a:lstStyle/>
+          <a:p>
+            <a:r>
+              <a:rPr lang="en-VN" i="1" dirty="0"/>
+              <a:t>Would stick out at sides</a:t>
+            </a:r>
+          </a:p>
+        </p:txBody>
+      </p:sp>
+    </p:spTree>
+    <p:extLst>
+      <p:ext uri="{BB962C8B-B14F-4D97-AF65-F5344CB8AC3E}">
+        <p14:creationId xmlns:p14="http://schemas.microsoft.com/office/powerpoint/2010/main" val="4280906406"/>
       </p:ext>
     </p:extLst>
   </p:cSld>

</xml_diff>

<commit_message>
rotation scaling works for wide frames
</commit_message>
<xml_diff>
--- a/rectangleRotation.pptx
+++ b/rectangleRotation.pptx
@@ -4,11 +4,15 @@
   <p:sldMasterIdLst>
     <p:sldMasterId id="2147483648" r:id="rId1"/>
   </p:sldMasterIdLst>
+  <p:notesMasterIdLst>
+    <p:notesMasterId r:id="rId7"/>
+  </p:notesMasterIdLst>
   <p:sldIdLst>
-    <p:sldId id="260" r:id="rId2"/>
-    <p:sldId id="261" r:id="rId3"/>
-    <p:sldId id="262" r:id="rId4"/>
-    <p:sldId id="257" r:id="rId5"/>
+    <p:sldId id="263" r:id="rId2"/>
+    <p:sldId id="260" r:id="rId3"/>
+    <p:sldId id="261" r:id="rId4"/>
+    <p:sldId id="262" r:id="rId5"/>
+    <p:sldId id="257" r:id="rId6"/>
   </p:sldIdLst>
   <p:sldSz cx="12192000" cy="6858000"/>
   <p:notesSz cx="6858000" cy="9144000"/>
@@ -115,6 +119,440 @@
 </p:presentation>
 </file>
 
+<file path=ppt/notesMasters/notesMaster1.xml><?xml version="1.0" encoding="utf-8"?>
+<p:notesMaster xmlns:a="http://schemas.openxmlformats.org/drawingml/2006/main" xmlns:r="http://schemas.openxmlformats.org/officeDocument/2006/relationships" xmlns:p="http://schemas.openxmlformats.org/presentationml/2006/main">
+  <p:cSld>
+    <p:bg>
+      <p:bgRef idx="1001">
+        <a:schemeClr val="bg1"/>
+      </p:bgRef>
+    </p:bg>
+    <p:spTree>
+      <p:nvGrpSpPr>
+        <p:cNvPr id="1" name=""/>
+        <p:cNvGrpSpPr/>
+        <p:nvPr/>
+      </p:nvGrpSpPr>
+      <p:grpSpPr>
+        <a:xfrm>
+          <a:off x="0" y="0"/>
+          <a:ext cx="0" cy="0"/>
+          <a:chOff x="0" y="0"/>
+          <a:chExt cx="0" cy="0"/>
+        </a:xfrm>
+      </p:grpSpPr>
+      <p:sp>
+        <p:nvSpPr>
+          <p:cNvPr id="2" name="Header Placeholder 1"/>
+          <p:cNvSpPr>
+            <a:spLocks noGrp="1"/>
+          </p:cNvSpPr>
+          <p:nvPr>
+            <p:ph type="hdr" sz="quarter"/>
+          </p:nvPr>
+        </p:nvSpPr>
+        <p:spPr>
+          <a:xfrm>
+            <a:off x="0" y="0"/>
+            <a:ext cx="2971800" cy="458788"/>
+          </a:xfrm>
+          <a:prstGeom prst="rect">
+            <a:avLst/>
+          </a:prstGeom>
+        </p:spPr>
+        <p:txBody>
+          <a:bodyPr vert="horz" lIns="91440" tIns="45720" rIns="91440" bIns="45720" rtlCol="0"/>
+          <a:lstStyle>
+            <a:lvl1pPr algn="l">
+              <a:defRPr sz="1200"/>
+            </a:lvl1pPr>
+          </a:lstStyle>
+          <a:p>
+            <a:endParaRPr lang="en-VN"/>
+          </a:p>
+        </p:txBody>
+      </p:sp>
+      <p:sp>
+        <p:nvSpPr>
+          <p:cNvPr id="3" name="Date Placeholder 2"/>
+          <p:cNvSpPr>
+            <a:spLocks noGrp="1"/>
+          </p:cNvSpPr>
+          <p:nvPr>
+            <p:ph type="dt" idx="1"/>
+          </p:nvPr>
+        </p:nvSpPr>
+        <p:spPr>
+          <a:xfrm>
+            <a:off x="3884613" y="0"/>
+            <a:ext cx="2971800" cy="458788"/>
+          </a:xfrm>
+          <a:prstGeom prst="rect">
+            <a:avLst/>
+          </a:prstGeom>
+        </p:spPr>
+        <p:txBody>
+          <a:bodyPr vert="horz" lIns="91440" tIns="45720" rIns="91440" bIns="45720" rtlCol="0"/>
+          <a:lstStyle>
+            <a:lvl1pPr algn="r">
+              <a:defRPr sz="1200"/>
+            </a:lvl1pPr>
+          </a:lstStyle>
+          <a:p>
+            <a:fld id="{6A4D1218-4F65-E243-ACC5-E5DA4BDFBC41}" type="datetimeFigureOut">
+              <a:rPr lang="en-VN" smtClean="0"/>
+              <a:t>14/09/2021</a:t>
+            </a:fld>
+            <a:endParaRPr lang="en-VN"/>
+          </a:p>
+        </p:txBody>
+      </p:sp>
+      <p:sp>
+        <p:nvSpPr>
+          <p:cNvPr id="4" name="Slide Image Placeholder 3"/>
+          <p:cNvSpPr>
+            <a:spLocks noGrp="1" noRot="1" noChangeAspect="1"/>
+          </p:cNvSpPr>
+          <p:nvPr>
+            <p:ph type="sldImg" idx="2"/>
+          </p:nvPr>
+        </p:nvSpPr>
+        <p:spPr>
+          <a:xfrm>
+            <a:off x="685800" y="1143000"/>
+            <a:ext cx="5486400" cy="3086100"/>
+          </a:xfrm>
+          <a:prstGeom prst="rect">
+            <a:avLst/>
+          </a:prstGeom>
+          <a:noFill/>
+          <a:ln w="12700">
+            <a:solidFill>
+              <a:prstClr val="black"/>
+            </a:solidFill>
+          </a:ln>
+        </p:spPr>
+        <p:txBody>
+          <a:bodyPr vert="horz" lIns="91440" tIns="45720" rIns="91440" bIns="45720" rtlCol="0" anchor="ctr"/>
+          <a:lstStyle/>
+          <a:p>
+            <a:endParaRPr lang="en-VN"/>
+          </a:p>
+        </p:txBody>
+      </p:sp>
+      <p:sp>
+        <p:nvSpPr>
+          <p:cNvPr id="5" name="Notes Placeholder 4"/>
+          <p:cNvSpPr>
+            <a:spLocks noGrp="1"/>
+          </p:cNvSpPr>
+          <p:nvPr>
+            <p:ph type="body" sz="quarter" idx="3"/>
+          </p:nvPr>
+        </p:nvSpPr>
+        <p:spPr>
+          <a:xfrm>
+            <a:off x="685800" y="4400550"/>
+            <a:ext cx="5486400" cy="3600450"/>
+          </a:xfrm>
+          <a:prstGeom prst="rect">
+            <a:avLst/>
+          </a:prstGeom>
+        </p:spPr>
+        <p:txBody>
+          <a:bodyPr vert="horz" lIns="91440" tIns="45720" rIns="91440" bIns="45720" rtlCol="0"/>
+          <a:lstStyle/>
+          <a:p>
+            <a:pPr lvl="0"/>
+            <a:r>
+              <a:rPr lang="en-US"/>
+              <a:t>Click to edit Master text styles</a:t>
+            </a:r>
+          </a:p>
+          <a:p>
+            <a:pPr lvl="1"/>
+            <a:r>
+              <a:rPr lang="en-US"/>
+              <a:t>Second level</a:t>
+            </a:r>
+          </a:p>
+          <a:p>
+            <a:pPr lvl="2"/>
+            <a:r>
+              <a:rPr lang="en-US"/>
+              <a:t>Third level</a:t>
+            </a:r>
+          </a:p>
+          <a:p>
+            <a:pPr lvl="3"/>
+            <a:r>
+              <a:rPr lang="en-US"/>
+              <a:t>Fourth level</a:t>
+            </a:r>
+          </a:p>
+          <a:p>
+            <a:pPr lvl="4"/>
+            <a:r>
+              <a:rPr lang="en-US"/>
+              <a:t>Fifth level</a:t>
+            </a:r>
+            <a:endParaRPr lang="en-VN"/>
+          </a:p>
+        </p:txBody>
+      </p:sp>
+      <p:sp>
+        <p:nvSpPr>
+          <p:cNvPr id="6" name="Footer Placeholder 5"/>
+          <p:cNvSpPr>
+            <a:spLocks noGrp="1"/>
+          </p:cNvSpPr>
+          <p:nvPr>
+            <p:ph type="ftr" sz="quarter" idx="4"/>
+          </p:nvPr>
+        </p:nvSpPr>
+        <p:spPr>
+          <a:xfrm>
+            <a:off x="0" y="8685213"/>
+            <a:ext cx="2971800" cy="458787"/>
+          </a:xfrm>
+          <a:prstGeom prst="rect">
+            <a:avLst/>
+          </a:prstGeom>
+        </p:spPr>
+        <p:txBody>
+          <a:bodyPr vert="horz" lIns="91440" tIns="45720" rIns="91440" bIns="45720" rtlCol="0" anchor="b"/>
+          <a:lstStyle>
+            <a:lvl1pPr algn="l">
+              <a:defRPr sz="1200"/>
+            </a:lvl1pPr>
+          </a:lstStyle>
+          <a:p>
+            <a:endParaRPr lang="en-VN"/>
+          </a:p>
+        </p:txBody>
+      </p:sp>
+      <p:sp>
+        <p:nvSpPr>
+          <p:cNvPr id="7" name="Slide Number Placeholder 6"/>
+          <p:cNvSpPr>
+            <a:spLocks noGrp="1"/>
+          </p:cNvSpPr>
+          <p:nvPr>
+            <p:ph type="sldNum" sz="quarter" idx="5"/>
+          </p:nvPr>
+        </p:nvSpPr>
+        <p:spPr>
+          <a:xfrm>
+            <a:off x="3884613" y="8685213"/>
+            <a:ext cx="2971800" cy="458787"/>
+          </a:xfrm>
+          <a:prstGeom prst="rect">
+            <a:avLst/>
+          </a:prstGeom>
+        </p:spPr>
+        <p:txBody>
+          <a:bodyPr vert="horz" lIns="91440" tIns="45720" rIns="91440" bIns="45720" rtlCol="0" anchor="b"/>
+          <a:lstStyle>
+            <a:lvl1pPr algn="r">
+              <a:defRPr sz="1200"/>
+            </a:lvl1pPr>
+          </a:lstStyle>
+          <a:p>
+            <a:fld id="{15EAC33F-75A4-FC48-9D8B-54A04066C486}" type="slidenum">
+              <a:rPr lang="en-VN" smtClean="0"/>
+              <a:t>‹#›</a:t>
+            </a:fld>
+            <a:endParaRPr lang="en-VN"/>
+          </a:p>
+        </p:txBody>
+      </p:sp>
+    </p:spTree>
+    <p:extLst>
+      <p:ext uri="{BB962C8B-B14F-4D97-AF65-F5344CB8AC3E}">
+        <p14:creationId xmlns:p14="http://schemas.microsoft.com/office/powerpoint/2010/main" val="2071794653"/>
+      </p:ext>
+    </p:extLst>
+  </p:cSld>
+  <p:clrMap bg1="lt1" tx1="dk1" bg2="lt2" tx2="dk2" accent1="accent1" accent2="accent2" accent3="accent3" accent4="accent4" accent5="accent5" accent6="accent6" hlink="hlink" folHlink="folHlink"/>
+  <p:notesStyle>
+    <a:lvl1pPr marL="0" algn="l" defTabSz="914400" rtl="0" eaLnBrk="1" latinLnBrk="0" hangingPunct="1">
+      <a:defRPr sz="1200" kern="1200">
+        <a:solidFill>
+          <a:schemeClr val="tx1"/>
+        </a:solidFill>
+        <a:latin typeface="+mn-lt"/>
+        <a:ea typeface="+mn-ea"/>
+        <a:cs typeface="+mn-cs"/>
+      </a:defRPr>
+    </a:lvl1pPr>
+    <a:lvl2pPr marL="457200" algn="l" defTabSz="914400" rtl="0" eaLnBrk="1" latinLnBrk="0" hangingPunct="1">
+      <a:defRPr sz="1200" kern="1200">
+        <a:solidFill>
+          <a:schemeClr val="tx1"/>
+        </a:solidFill>
+        <a:latin typeface="+mn-lt"/>
+        <a:ea typeface="+mn-ea"/>
+        <a:cs typeface="+mn-cs"/>
+      </a:defRPr>
+    </a:lvl2pPr>
+    <a:lvl3pPr marL="914400" algn="l" defTabSz="914400" rtl="0" eaLnBrk="1" latinLnBrk="0" hangingPunct="1">
+      <a:defRPr sz="1200" kern="1200">
+        <a:solidFill>
+          <a:schemeClr val="tx1"/>
+        </a:solidFill>
+        <a:latin typeface="+mn-lt"/>
+        <a:ea typeface="+mn-ea"/>
+        <a:cs typeface="+mn-cs"/>
+      </a:defRPr>
+    </a:lvl3pPr>
+    <a:lvl4pPr marL="1371600" algn="l" defTabSz="914400" rtl="0" eaLnBrk="1" latinLnBrk="0" hangingPunct="1">
+      <a:defRPr sz="1200" kern="1200">
+        <a:solidFill>
+          <a:schemeClr val="tx1"/>
+        </a:solidFill>
+        <a:latin typeface="+mn-lt"/>
+        <a:ea typeface="+mn-ea"/>
+        <a:cs typeface="+mn-cs"/>
+      </a:defRPr>
+    </a:lvl4pPr>
+    <a:lvl5pPr marL="1828800" algn="l" defTabSz="914400" rtl="0" eaLnBrk="1" latinLnBrk="0" hangingPunct="1">
+      <a:defRPr sz="1200" kern="1200">
+        <a:solidFill>
+          <a:schemeClr val="tx1"/>
+        </a:solidFill>
+        <a:latin typeface="+mn-lt"/>
+        <a:ea typeface="+mn-ea"/>
+        <a:cs typeface="+mn-cs"/>
+      </a:defRPr>
+    </a:lvl5pPr>
+    <a:lvl6pPr marL="2286000" algn="l" defTabSz="914400" rtl="0" eaLnBrk="1" latinLnBrk="0" hangingPunct="1">
+      <a:defRPr sz="1200" kern="1200">
+        <a:solidFill>
+          <a:schemeClr val="tx1"/>
+        </a:solidFill>
+        <a:latin typeface="+mn-lt"/>
+        <a:ea typeface="+mn-ea"/>
+        <a:cs typeface="+mn-cs"/>
+      </a:defRPr>
+    </a:lvl6pPr>
+    <a:lvl7pPr marL="2743200" algn="l" defTabSz="914400" rtl="0" eaLnBrk="1" latinLnBrk="0" hangingPunct="1">
+      <a:defRPr sz="1200" kern="1200">
+        <a:solidFill>
+          <a:schemeClr val="tx1"/>
+        </a:solidFill>
+        <a:latin typeface="+mn-lt"/>
+        <a:ea typeface="+mn-ea"/>
+        <a:cs typeface="+mn-cs"/>
+      </a:defRPr>
+    </a:lvl7pPr>
+    <a:lvl8pPr marL="3200400" algn="l" defTabSz="914400" rtl="0" eaLnBrk="1" latinLnBrk="0" hangingPunct="1">
+      <a:defRPr sz="1200" kern="1200">
+        <a:solidFill>
+          <a:schemeClr val="tx1"/>
+        </a:solidFill>
+        <a:latin typeface="+mn-lt"/>
+        <a:ea typeface="+mn-ea"/>
+        <a:cs typeface="+mn-cs"/>
+      </a:defRPr>
+    </a:lvl8pPr>
+    <a:lvl9pPr marL="3657600" algn="l" defTabSz="914400" rtl="0" eaLnBrk="1" latinLnBrk="0" hangingPunct="1">
+      <a:defRPr sz="1200" kern="1200">
+        <a:solidFill>
+          <a:schemeClr val="tx1"/>
+        </a:solidFill>
+        <a:latin typeface="+mn-lt"/>
+        <a:ea typeface="+mn-ea"/>
+        <a:cs typeface="+mn-cs"/>
+      </a:defRPr>
+    </a:lvl9pPr>
+  </p:notesStyle>
+</p:notesMaster>
+</file>
+
+<file path=ppt/notesSlides/notesSlide1.xml><?xml version="1.0" encoding="utf-8"?>
+<p:notes xmlns:a="http://schemas.openxmlformats.org/drawingml/2006/main" xmlns:r="http://schemas.openxmlformats.org/officeDocument/2006/relationships" xmlns:p="http://schemas.openxmlformats.org/presentationml/2006/main">
+  <p:cSld>
+    <p:spTree>
+      <p:nvGrpSpPr>
+        <p:cNvPr id="1" name=""/>
+        <p:cNvGrpSpPr/>
+        <p:nvPr/>
+      </p:nvGrpSpPr>
+      <p:grpSpPr>
+        <a:xfrm>
+          <a:off x="0" y="0"/>
+          <a:ext cx="0" cy="0"/>
+          <a:chOff x="0" y="0"/>
+          <a:chExt cx="0" cy="0"/>
+        </a:xfrm>
+      </p:grpSpPr>
+      <p:sp>
+        <p:nvSpPr>
+          <p:cNvPr id="2" name="Slide Image Placeholder 1"/>
+          <p:cNvSpPr>
+            <a:spLocks noGrp="1" noRot="1" noChangeAspect="1"/>
+          </p:cNvSpPr>
+          <p:nvPr>
+            <p:ph type="sldImg"/>
+          </p:nvPr>
+        </p:nvSpPr>
+        <p:spPr/>
+      </p:sp>
+      <p:sp>
+        <p:nvSpPr>
+          <p:cNvPr id="3" name="Notes Placeholder 2"/>
+          <p:cNvSpPr>
+            <a:spLocks noGrp="1"/>
+          </p:cNvSpPr>
+          <p:nvPr>
+            <p:ph type="body" idx="1"/>
+          </p:nvPr>
+        </p:nvSpPr>
+        <p:spPr/>
+        <p:txBody>
+          <a:bodyPr/>
+          <a:lstStyle/>
+          <a:p>
+            <a:endParaRPr lang="en-VN" dirty="0"/>
+          </a:p>
+        </p:txBody>
+      </p:sp>
+      <p:sp>
+        <p:nvSpPr>
+          <p:cNvPr id="4" name="Slide Number Placeholder 3"/>
+          <p:cNvSpPr>
+            <a:spLocks noGrp="1"/>
+          </p:cNvSpPr>
+          <p:nvPr>
+            <p:ph type="sldNum" sz="quarter" idx="5"/>
+          </p:nvPr>
+        </p:nvSpPr>
+        <p:spPr/>
+        <p:txBody>
+          <a:bodyPr/>
+          <a:lstStyle/>
+          <a:p>
+            <a:fld id="{15EAC33F-75A4-FC48-9D8B-54A04066C486}" type="slidenum">
+              <a:rPr lang="en-VN" smtClean="0"/>
+              <a:t>1</a:t>
+            </a:fld>
+            <a:endParaRPr lang="en-VN"/>
+          </a:p>
+        </p:txBody>
+      </p:sp>
+    </p:spTree>
+    <p:extLst>
+      <p:ext uri="{BB962C8B-B14F-4D97-AF65-F5344CB8AC3E}">
+        <p14:creationId xmlns:p14="http://schemas.microsoft.com/office/powerpoint/2010/main" val="745452370"/>
+      </p:ext>
+    </p:extLst>
+  </p:cSld>
+  <p:clrMapOvr>
+    <a:masterClrMapping/>
+  </p:clrMapOvr>
+</p:notes>
+</file>
+
 <file path=ppt/slideLayouts/slideLayout1.xml><?xml version="1.0" encoding="utf-8"?>
 <p:sldLayout xmlns:a="http://schemas.openxmlformats.org/drawingml/2006/main" xmlns:r="http://schemas.openxmlformats.org/officeDocument/2006/relationships" xmlns:p="http://schemas.openxmlformats.org/presentationml/2006/main" type="title" preserve="1">
   <p:cSld name="Title Slide">
@@ -264,7 +702,7 @@
           <a:p>
             <a:fld id="{673EB663-990D-DF42-B5A5-28CD4A2034AE}" type="datetimeFigureOut">
               <a:rPr lang="de-DE" smtClean="0"/>
-              <a:t>08.09.21</a:t>
+              <a:t>14.09.21</a:t>
             </a:fld>
             <a:endParaRPr lang="de-DE"/>
           </a:p>
@@ -464,7 +902,7 @@
           <a:p>
             <a:fld id="{673EB663-990D-DF42-B5A5-28CD4A2034AE}" type="datetimeFigureOut">
               <a:rPr lang="de-DE" smtClean="0"/>
-              <a:t>08.09.21</a:t>
+              <a:t>14.09.21</a:t>
             </a:fld>
             <a:endParaRPr lang="de-DE"/>
           </a:p>
@@ -674,7 +1112,7 @@
           <a:p>
             <a:fld id="{673EB663-990D-DF42-B5A5-28CD4A2034AE}" type="datetimeFigureOut">
               <a:rPr lang="de-DE" smtClean="0"/>
-              <a:t>08.09.21</a:t>
+              <a:t>14.09.21</a:t>
             </a:fld>
             <a:endParaRPr lang="de-DE"/>
           </a:p>
@@ -874,7 +1312,7 @@
           <a:p>
             <a:fld id="{673EB663-990D-DF42-B5A5-28CD4A2034AE}" type="datetimeFigureOut">
               <a:rPr lang="de-DE" smtClean="0"/>
-              <a:t>08.09.21</a:t>
+              <a:t>14.09.21</a:t>
             </a:fld>
             <a:endParaRPr lang="de-DE"/>
           </a:p>
@@ -1150,7 +1588,7 @@
           <a:p>
             <a:fld id="{673EB663-990D-DF42-B5A5-28CD4A2034AE}" type="datetimeFigureOut">
               <a:rPr lang="de-DE" smtClean="0"/>
-              <a:t>08.09.21</a:t>
+              <a:t>14.09.21</a:t>
             </a:fld>
             <a:endParaRPr lang="de-DE"/>
           </a:p>
@@ -1418,7 +1856,7 @@
           <a:p>
             <a:fld id="{673EB663-990D-DF42-B5A5-28CD4A2034AE}" type="datetimeFigureOut">
               <a:rPr lang="de-DE" smtClean="0"/>
-              <a:t>08.09.21</a:t>
+              <a:t>14.09.21</a:t>
             </a:fld>
             <a:endParaRPr lang="de-DE"/>
           </a:p>
@@ -1833,7 +2271,7 @@
           <a:p>
             <a:fld id="{673EB663-990D-DF42-B5A5-28CD4A2034AE}" type="datetimeFigureOut">
               <a:rPr lang="de-DE" smtClean="0"/>
-              <a:t>08.09.21</a:t>
+              <a:t>14.09.21</a:t>
             </a:fld>
             <a:endParaRPr lang="de-DE"/>
           </a:p>
@@ -1975,7 +2413,7 @@
           <a:p>
             <a:fld id="{673EB663-990D-DF42-B5A5-28CD4A2034AE}" type="datetimeFigureOut">
               <a:rPr lang="de-DE" smtClean="0"/>
-              <a:t>08.09.21</a:t>
+              <a:t>14.09.21</a:t>
             </a:fld>
             <a:endParaRPr lang="de-DE"/>
           </a:p>
@@ -2088,7 +2526,7 @@
           <a:p>
             <a:fld id="{673EB663-990D-DF42-B5A5-28CD4A2034AE}" type="datetimeFigureOut">
               <a:rPr lang="de-DE" smtClean="0"/>
-              <a:t>08.09.21</a:t>
+              <a:t>14.09.21</a:t>
             </a:fld>
             <a:endParaRPr lang="de-DE"/>
           </a:p>
@@ -2401,7 +2839,7 @@
           <a:p>
             <a:fld id="{673EB663-990D-DF42-B5A5-28CD4A2034AE}" type="datetimeFigureOut">
               <a:rPr lang="de-DE" smtClean="0"/>
-              <a:t>08.09.21</a:t>
+              <a:t>14.09.21</a:t>
             </a:fld>
             <a:endParaRPr lang="de-DE"/>
           </a:p>
@@ -2690,7 +3128,7 @@
           <a:p>
             <a:fld id="{673EB663-990D-DF42-B5A5-28CD4A2034AE}" type="datetimeFigureOut">
               <a:rPr lang="de-DE" smtClean="0"/>
-              <a:t>08.09.21</a:t>
+              <a:t>14.09.21</a:t>
             </a:fld>
             <a:endParaRPr lang="de-DE"/>
           </a:p>
@@ -2933,7 +3371,7 @@
           <a:p>
             <a:fld id="{673EB663-990D-DF42-B5A5-28CD4A2034AE}" type="datetimeFigureOut">
               <a:rPr lang="de-DE" smtClean="0"/>
-              <a:t>08.09.21</a:t>
+              <a:t>14.09.21</a:t>
             </a:fld>
             <a:endParaRPr lang="de-DE"/>
           </a:p>
@@ -3350,6 +3788,1116 @@
           <a:chExt cx="0" cy="0"/>
         </a:xfrm>
       </p:grpSpPr>
+      <p:grpSp>
+        <p:nvGrpSpPr>
+          <p:cNvPr id="4" name="Group 3">
+            <a:extLst>
+              <a:ext uri="{FF2B5EF4-FFF2-40B4-BE49-F238E27FC236}">
+                <a16:creationId xmlns:a16="http://schemas.microsoft.com/office/drawing/2014/main" id="{657B73CD-328C-F745-BE67-097ADB0FB90D}"/>
+              </a:ext>
+            </a:extLst>
+          </p:cNvPr>
+          <p:cNvGrpSpPr/>
+          <p:nvPr/>
+        </p:nvGrpSpPr>
+        <p:grpSpPr>
+          <a:xfrm>
+            <a:off x="1419336" y="1299402"/>
+            <a:ext cx="4331906" cy="2600952"/>
+            <a:chOff x="894080" y="910434"/>
+            <a:chExt cx="5415280" cy="3488846"/>
+          </a:xfrm>
+        </p:grpSpPr>
+        <p:sp>
+          <p:nvSpPr>
+            <p:cNvPr id="3" name="Rounded Rectangle 2">
+              <a:extLst>
+                <a:ext uri="{FF2B5EF4-FFF2-40B4-BE49-F238E27FC236}">
+                  <a16:creationId xmlns:a16="http://schemas.microsoft.com/office/drawing/2014/main" id="{5AEAE937-50F9-2F40-B139-A19A4B3AD058}"/>
+                </a:ext>
+              </a:extLst>
+            </p:cNvPr>
+            <p:cNvSpPr/>
+            <p:nvPr/>
+          </p:nvSpPr>
+          <p:spPr>
+            <a:xfrm>
+              <a:off x="894080" y="910434"/>
+              <a:ext cx="5415280" cy="3488846"/>
+            </a:xfrm>
+            <a:prstGeom prst="roundRect">
+              <a:avLst/>
+            </a:prstGeom>
+          </p:spPr>
+          <p:style>
+            <a:lnRef idx="2">
+              <a:schemeClr val="accent1">
+                <a:shade val="50000"/>
+              </a:schemeClr>
+            </a:lnRef>
+            <a:fillRef idx="1">
+              <a:schemeClr val="accent1"/>
+            </a:fillRef>
+            <a:effectRef idx="0">
+              <a:schemeClr val="accent1"/>
+            </a:effectRef>
+            <a:fontRef idx="minor">
+              <a:schemeClr val="lt1"/>
+            </a:fontRef>
+          </p:style>
+          <p:txBody>
+            <a:bodyPr rtlCol="0" anchor="ctr"/>
+            <a:lstStyle/>
+            <a:p>
+              <a:pPr algn="ctr"/>
+              <a:endParaRPr lang="en-VN"/>
+            </a:p>
+          </p:txBody>
+        </p:sp>
+        <p:sp>
+          <p:nvSpPr>
+            <p:cNvPr id="56" name="Rounded Rectangle 55">
+              <a:extLst>
+                <a:ext uri="{FF2B5EF4-FFF2-40B4-BE49-F238E27FC236}">
+                  <a16:creationId xmlns:a16="http://schemas.microsoft.com/office/drawing/2014/main" id="{CB5A21C3-0D48-DF45-A7FE-A3D9B5AF6D22}"/>
+                </a:ext>
+              </a:extLst>
+            </p:cNvPr>
+            <p:cNvSpPr/>
+            <p:nvPr/>
+          </p:nvSpPr>
+          <p:spPr>
+            <a:xfrm>
+              <a:off x="1135103" y="1218211"/>
+              <a:ext cx="4879819" cy="2970293"/>
+            </a:xfrm>
+            <a:prstGeom prst="roundRect">
+              <a:avLst>
+                <a:gd name="adj" fmla="val 11878"/>
+              </a:avLst>
+            </a:prstGeom>
+            <a:solidFill>
+              <a:schemeClr val="bg1"/>
+            </a:solidFill>
+          </p:spPr>
+          <p:style>
+            <a:lnRef idx="2">
+              <a:schemeClr val="accent1">
+                <a:shade val="50000"/>
+              </a:schemeClr>
+            </a:lnRef>
+            <a:fillRef idx="1">
+              <a:schemeClr val="accent1"/>
+            </a:fillRef>
+            <a:effectRef idx="0">
+              <a:schemeClr val="accent1"/>
+            </a:effectRef>
+            <a:fontRef idx="minor">
+              <a:schemeClr val="lt1"/>
+            </a:fontRef>
+          </p:style>
+          <p:txBody>
+            <a:bodyPr rtlCol="0" anchor="ctr"/>
+            <a:lstStyle/>
+            <a:p>
+              <a:pPr algn="ctr"/>
+              <a:endParaRPr lang="en-VN"/>
+            </a:p>
+          </p:txBody>
+        </p:sp>
+      </p:grpSp>
+      <p:sp>
+        <p:nvSpPr>
+          <p:cNvPr id="45" name="Rectangle 44">
+            <a:extLst>
+              <a:ext uri="{FF2B5EF4-FFF2-40B4-BE49-F238E27FC236}">
+                <a16:creationId xmlns:a16="http://schemas.microsoft.com/office/drawing/2014/main" id="{CB045013-1921-9542-B442-4319408B0E3A}"/>
+              </a:ext>
+            </a:extLst>
+          </p:cNvPr>
+          <p:cNvSpPr>
+            <a:spLocks noChangeAspect="1"/>
+          </p:cNvSpPr>
+          <p:nvPr/>
+        </p:nvSpPr>
+        <p:spPr>
+          <a:xfrm>
+            <a:off x="1419336" y="1300482"/>
+            <a:ext cx="4352456" cy="2600958"/>
+          </a:xfrm>
+          <a:prstGeom prst="rect">
+            <a:avLst/>
+          </a:prstGeom>
+          <a:solidFill>
+            <a:srgbClr val="FFC000">
+              <a:alpha val="37255"/>
+            </a:srgbClr>
+          </a:solidFill>
+          <a:ln>
+            <a:solidFill>
+              <a:srgbClr val="FF0000"/>
+            </a:solidFill>
+          </a:ln>
+        </p:spPr>
+        <p:style>
+          <a:lnRef idx="2">
+            <a:schemeClr val="accent1">
+              <a:shade val="50000"/>
+            </a:schemeClr>
+          </a:lnRef>
+          <a:fillRef idx="1">
+            <a:schemeClr val="accent1"/>
+          </a:fillRef>
+          <a:effectRef idx="0">
+            <a:schemeClr val="accent1"/>
+          </a:effectRef>
+          <a:fontRef idx="minor">
+            <a:schemeClr val="lt1"/>
+          </a:fontRef>
+        </p:style>
+        <p:txBody>
+          <a:bodyPr rtlCol="0" anchor="ctr"/>
+          <a:lstStyle/>
+          <a:p>
+            <a:pPr algn="ctr"/>
+            <a:endParaRPr lang="de-DE" dirty="0"/>
+          </a:p>
+        </p:txBody>
+      </p:sp>
+      <p:sp>
+        <p:nvSpPr>
+          <p:cNvPr id="10" name="Rectangle 9">
+            <a:extLst>
+              <a:ext uri="{FF2B5EF4-FFF2-40B4-BE49-F238E27FC236}">
+                <a16:creationId xmlns:a16="http://schemas.microsoft.com/office/drawing/2014/main" id="{49D2695A-2AFF-914A-AE0F-F66E950C7CD2}"/>
+              </a:ext>
+            </a:extLst>
+          </p:cNvPr>
+          <p:cNvSpPr>
+            <a:spLocks noChangeAspect="1"/>
+          </p:cNvSpPr>
+          <p:nvPr/>
+        </p:nvSpPr>
+        <p:spPr>
+          <a:xfrm>
+            <a:off x="1934122" y="1779572"/>
+            <a:ext cx="3302339" cy="1693576"/>
+          </a:xfrm>
+          <a:prstGeom prst="rect">
+            <a:avLst/>
+          </a:prstGeom>
+          <a:solidFill>
+            <a:srgbClr val="FFC000">
+              <a:alpha val="37255"/>
+            </a:srgbClr>
+          </a:solidFill>
+          <a:ln>
+            <a:solidFill>
+              <a:srgbClr val="FF0000"/>
+            </a:solidFill>
+          </a:ln>
+        </p:spPr>
+        <p:style>
+          <a:lnRef idx="2">
+            <a:schemeClr val="accent1">
+              <a:shade val="50000"/>
+            </a:schemeClr>
+          </a:lnRef>
+          <a:fillRef idx="1">
+            <a:schemeClr val="accent1"/>
+          </a:fillRef>
+          <a:effectRef idx="0">
+            <a:schemeClr val="accent1"/>
+          </a:effectRef>
+          <a:fontRef idx="minor">
+            <a:schemeClr val="lt1"/>
+          </a:fontRef>
+        </p:style>
+        <p:txBody>
+          <a:bodyPr rtlCol="0" anchor="ctr"/>
+          <a:lstStyle/>
+          <a:p>
+            <a:pPr algn="ctr"/>
+            <a:endParaRPr lang="de-DE" dirty="0"/>
+          </a:p>
+        </p:txBody>
+      </p:sp>
+      <p:sp>
+        <p:nvSpPr>
+          <p:cNvPr id="35" name="TextBox 34">
+            <a:extLst>
+              <a:ext uri="{FF2B5EF4-FFF2-40B4-BE49-F238E27FC236}">
+                <a16:creationId xmlns:a16="http://schemas.microsoft.com/office/drawing/2014/main" id="{5D5CD228-28F4-D842-9618-167376B9EDDB}"/>
+              </a:ext>
+            </a:extLst>
+          </p:cNvPr>
+          <p:cNvSpPr txBox="1"/>
+          <p:nvPr/>
+        </p:nvSpPr>
+        <p:spPr>
+          <a:xfrm>
+            <a:off x="3173890" y="1779572"/>
+            <a:ext cx="802248" cy="307777"/>
+          </a:xfrm>
+          <a:prstGeom prst="rect">
+            <a:avLst/>
+          </a:prstGeom>
+          <a:noFill/>
+        </p:spPr>
+        <p:txBody>
+          <a:bodyPr wrap="square" rtlCol="0">
+            <a:spAutoFit/>
+          </a:bodyPr>
+          <a:lstStyle/>
+          <a:p>
+            <a:pPr algn="ctr"/>
+            <a:r>
+              <a:rPr lang="en-GB" sz="1400" dirty="0" err="1">
+                <a:latin typeface="Consolas" panose="020B0609020204030204" pitchFamily="49" charset="0"/>
+                <a:cs typeface="Consolas" panose="020B0609020204030204" pitchFamily="49" charset="0"/>
+              </a:rPr>
+              <a:t>tw</a:t>
+            </a:r>
+            <a:endParaRPr lang="de-DE" sz="1400" dirty="0">
+              <a:latin typeface="Consolas" panose="020B0609020204030204" pitchFamily="49" charset="0"/>
+              <a:cs typeface="Consolas" panose="020B0609020204030204" pitchFamily="49" charset="0"/>
+            </a:endParaRPr>
+          </a:p>
+        </p:txBody>
+      </p:sp>
+      <p:sp>
+        <p:nvSpPr>
+          <p:cNvPr id="41" name="TextBox 40">
+            <a:extLst>
+              <a:ext uri="{FF2B5EF4-FFF2-40B4-BE49-F238E27FC236}">
+                <a16:creationId xmlns:a16="http://schemas.microsoft.com/office/drawing/2014/main" id="{DB421DC8-8068-7F43-B9B1-AFBAEAB65036}"/>
+              </a:ext>
+            </a:extLst>
+          </p:cNvPr>
+          <p:cNvSpPr txBox="1"/>
+          <p:nvPr/>
+        </p:nvSpPr>
+        <p:spPr>
+          <a:xfrm>
+            <a:off x="4434213" y="2449596"/>
+            <a:ext cx="802248" cy="307777"/>
+          </a:xfrm>
+          <a:prstGeom prst="rect">
+            <a:avLst/>
+          </a:prstGeom>
+          <a:noFill/>
+        </p:spPr>
+        <p:txBody>
+          <a:bodyPr wrap="square" rtlCol="0">
+            <a:spAutoFit/>
+          </a:bodyPr>
+          <a:lstStyle/>
+          <a:p>
+            <a:pPr algn="r"/>
+            <a:r>
+              <a:rPr lang="en-GB" sz="1400" dirty="0" err="1">
+                <a:latin typeface="Consolas" panose="020B0609020204030204" pitchFamily="49" charset="0"/>
+                <a:cs typeface="Consolas" panose="020B0609020204030204" pitchFamily="49" charset="0"/>
+              </a:rPr>
+              <a:t>th</a:t>
+            </a:r>
+            <a:endParaRPr lang="de-DE" sz="1400" dirty="0">
+              <a:latin typeface="Consolas" panose="020B0609020204030204" pitchFamily="49" charset="0"/>
+              <a:cs typeface="Consolas" panose="020B0609020204030204" pitchFamily="49" charset="0"/>
+            </a:endParaRPr>
+          </a:p>
+        </p:txBody>
+      </p:sp>
+      <p:sp>
+        <p:nvSpPr>
+          <p:cNvPr id="50" name="TextBox 49">
+            <a:extLst>
+              <a:ext uri="{FF2B5EF4-FFF2-40B4-BE49-F238E27FC236}">
+                <a16:creationId xmlns:a16="http://schemas.microsoft.com/office/drawing/2014/main" id="{DF57B4C7-4C8B-E941-8477-1753C71EFC80}"/>
+              </a:ext>
+            </a:extLst>
+          </p:cNvPr>
+          <p:cNvSpPr txBox="1"/>
+          <p:nvPr/>
+        </p:nvSpPr>
+        <p:spPr>
+          <a:xfrm>
+            <a:off x="6574044" y="780849"/>
+            <a:ext cx="3769357" cy="307777"/>
+          </a:xfrm>
+          <a:prstGeom prst="rect">
+            <a:avLst/>
+          </a:prstGeom>
+          <a:noFill/>
+        </p:spPr>
+        <p:txBody>
+          <a:bodyPr wrap="square" rtlCol="0">
+            <a:spAutoFit/>
+          </a:bodyPr>
+          <a:lstStyle/>
+          <a:p>
+            <a:r>
+              <a:rPr lang="en-GB" sz="1400" dirty="0" err="1">
+                <a:latin typeface="Consolas" panose="020B0609020204030204" pitchFamily="49" charset="0"/>
+                <a:cs typeface="Consolas" panose="020B0609020204030204" pitchFamily="49" charset="0"/>
+              </a:rPr>
+              <a:t>twm</a:t>
+            </a:r>
+            <a:r>
+              <a:rPr lang="en-GB" sz="1400" dirty="0">
+                <a:latin typeface="Consolas" panose="020B0609020204030204" pitchFamily="49" charset="0"/>
+                <a:cs typeface="Consolas" panose="020B0609020204030204" pitchFamily="49" charset="0"/>
+              </a:rPr>
+              <a:t> = </a:t>
+            </a:r>
+            <a:r>
+              <a:rPr lang="en-GB" sz="1400" dirty="0" err="1">
+                <a:latin typeface="Consolas" panose="020B0609020204030204" pitchFamily="49" charset="0"/>
+                <a:cs typeface="Consolas" panose="020B0609020204030204" pitchFamily="49" charset="0"/>
+              </a:rPr>
+              <a:t>tw</a:t>
+            </a:r>
+            <a:r>
+              <a:rPr lang="en-GB" sz="1400" dirty="0">
+                <a:latin typeface="Consolas" panose="020B0609020204030204" pitchFamily="49" charset="0"/>
+                <a:cs typeface="Consolas" panose="020B0609020204030204" pitchFamily="49" charset="0"/>
+              </a:rPr>
+              <a:t> + 2*m</a:t>
+            </a:r>
+            <a:endParaRPr lang="de-DE" sz="1400" dirty="0">
+              <a:latin typeface="Consolas" panose="020B0609020204030204" pitchFamily="49" charset="0"/>
+              <a:cs typeface="Consolas" panose="020B0609020204030204" pitchFamily="49" charset="0"/>
+            </a:endParaRPr>
+          </a:p>
+        </p:txBody>
+      </p:sp>
+      <p:sp>
+        <p:nvSpPr>
+          <p:cNvPr id="51" name="TextBox 50">
+            <a:extLst>
+              <a:ext uri="{FF2B5EF4-FFF2-40B4-BE49-F238E27FC236}">
+                <a16:creationId xmlns:a16="http://schemas.microsoft.com/office/drawing/2014/main" id="{1D8DC1B2-5C07-8141-A6E3-C3C5435523B3}"/>
+              </a:ext>
+            </a:extLst>
+          </p:cNvPr>
+          <p:cNvSpPr txBox="1"/>
+          <p:nvPr/>
+        </p:nvSpPr>
+        <p:spPr>
+          <a:xfrm>
+            <a:off x="3162800" y="1007544"/>
+            <a:ext cx="802248" cy="307777"/>
+          </a:xfrm>
+          <a:prstGeom prst="rect">
+            <a:avLst/>
+          </a:prstGeom>
+          <a:noFill/>
+        </p:spPr>
+        <p:txBody>
+          <a:bodyPr wrap="square" rtlCol="0">
+            <a:spAutoFit/>
+          </a:bodyPr>
+          <a:lstStyle/>
+          <a:p>
+            <a:pPr algn="ctr"/>
+            <a:r>
+              <a:rPr lang="en-GB" sz="1400" dirty="0" err="1">
+                <a:latin typeface="Consolas" panose="020B0609020204030204" pitchFamily="49" charset="0"/>
+                <a:cs typeface="Consolas" panose="020B0609020204030204" pitchFamily="49" charset="0"/>
+              </a:rPr>
+              <a:t>twm</a:t>
+            </a:r>
+            <a:endParaRPr lang="de-DE" sz="1400" dirty="0">
+              <a:latin typeface="Consolas" panose="020B0609020204030204" pitchFamily="49" charset="0"/>
+              <a:cs typeface="Consolas" panose="020B0609020204030204" pitchFamily="49" charset="0"/>
+            </a:endParaRPr>
+          </a:p>
+        </p:txBody>
+      </p:sp>
+      <p:sp>
+        <p:nvSpPr>
+          <p:cNvPr id="52" name="TextBox 51">
+            <a:extLst>
+              <a:ext uri="{FF2B5EF4-FFF2-40B4-BE49-F238E27FC236}">
+                <a16:creationId xmlns:a16="http://schemas.microsoft.com/office/drawing/2014/main" id="{2BE7776A-37EC-D94E-86CF-D2F48F7D1014}"/>
+              </a:ext>
+            </a:extLst>
+          </p:cNvPr>
+          <p:cNvSpPr txBox="1"/>
+          <p:nvPr/>
+        </p:nvSpPr>
+        <p:spPr>
+          <a:xfrm>
+            <a:off x="5771795" y="2449596"/>
+            <a:ext cx="802248" cy="307777"/>
+          </a:xfrm>
+          <a:prstGeom prst="rect">
+            <a:avLst/>
+          </a:prstGeom>
+          <a:noFill/>
+        </p:spPr>
+        <p:txBody>
+          <a:bodyPr wrap="square" rtlCol="0">
+            <a:spAutoFit/>
+          </a:bodyPr>
+          <a:lstStyle/>
+          <a:p>
+            <a:r>
+              <a:rPr lang="en-GB" sz="1400" dirty="0" err="1">
+                <a:latin typeface="Consolas" panose="020B0609020204030204" pitchFamily="49" charset="0"/>
+                <a:cs typeface="Consolas" panose="020B0609020204030204" pitchFamily="49" charset="0"/>
+              </a:rPr>
+              <a:t>thm</a:t>
+            </a:r>
+            <a:endParaRPr lang="de-DE" sz="1400" dirty="0">
+              <a:latin typeface="Consolas" panose="020B0609020204030204" pitchFamily="49" charset="0"/>
+              <a:cs typeface="Consolas" panose="020B0609020204030204" pitchFamily="49" charset="0"/>
+            </a:endParaRPr>
+          </a:p>
+        </p:txBody>
+      </p:sp>
+      <p:sp>
+        <p:nvSpPr>
+          <p:cNvPr id="53" name="TextBox 52">
+            <a:extLst>
+              <a:ext uri="{FF2B5EF4-FFF2-40B4-BE49-F238E27FC236}">
+                <a16:creationId xmlns:a16="http://schemas.microsoft.com/office/drawing/2014/main" id="{C9D554C4-0F7F-E146-9497-BC2069E993C3}"/>
+              </a:ext>
+            </a:extLst>
+          </p:cNvPr>
+          <p:cNvSpPr txBox="1"/>
+          <p:nvPr/>
+        </p:nvSpPr>
+        <p:spPr>
+          <a:xfrm>
+            <a:off x="6574043" y="1145513"/>
+            <a:ext cx="5850144" cy="307777"/>
+          </a:xfrm>
+          <a:prstGeom prst="rect">
+            <a:avLst/>
+          </a:prstGeom>
+          <a:noFill/>
+        </p:spPr>
+        <p:txBody>
+          <a:bodyPr wrap="square" rtlCol="0">
+            <a:spAutoFit/>
+          </a:bodyPr>
+          <a:lstStyle/>
+          <a:p>
+            <a:r>
+              <a:rPr lang="en-GB" sz="1400" dirty="0" err="1">
+                <a:latin typeface="Consolas" panose="020B0609020204030204" pitchFamily="49" charset="0"/>
+                <a:cs typeface="Consolas" panose="020B0609020204030204" pitchFamily="49" charset="0"/>
+              </a:rPr>
+              <a:t>thm</a:t>
+            </a:r>
+            <a:r>
+              <a:rPr lang="en-GB" sz="1400" dirty="0">
+                <a:latin typeface="Consolas" panose="020B0609020204030204" pitchFamily="49" charset="0"/>
+                <a:cs typeface="Consolas" panose="020B0609020204030204" pitchFamily="49" charset="0"/>
+              </a:rPr>
+              <a:t> = </a:t>
+            </a:r>
+            <a:r>
+              <a:rPr lang="en-GB" sz="1400" dirty="0" err="1">
+                <a:latin typeface="Consolas" panose="020B0609020204030204" pitchFamily="49" charset="0"/>
+                <a:cs typeface="Consolas" panose="020B0609020204030204" pitchFamily="49" charset="0"/>
+              </a:rPr>
+              <a:t>th</a:t>
+            </a:r>
+            <a:r>
+              <a:rPr lang="en-GB" sz="1400" dirty="0">
+                <a:latin typeface="Consolas" panose="020B0609020204030204" pitchFamily="49" charset="0"/>
+                <a:cs typeface="Consolas" panose="020B0609020204030204" pitchFamily="49" charset="0"/>
+              </a:rPr>
+              <a:t> + 2*m</a:t>
+            </a:r>
+            <a:endParaRPr lang="de-DE" sz="1400" dirty="0">
+              <a:latin typeface="Consolas" panose="020B0609020204030204" pitchFamily="49" charset="0"/>
+              <a:cs typeface="Consolas" panose="020B0609020204030204" pitchFamily="49" charset="0"/>
+            </a:endParaRPr>
+          </a:p>
+        </p:txBody>
+      </p:sp>
+      <p:sp>
+        <p:nvSpPr>
+          <p:cNvPr id="55" name="TextBox 54">
+            <a:extLst>
+              <a:ext uri="{FF2B5EF4-FFF2-40B4-BE49-F238E27FC236}">
+                <a16:creationId xmlns:a16="http://schemas.microsoft.com/office/drawing/2014/main" id="{4211456F-DF3F-3E42-B941-58B4EBB9F516}"/>
+              </a:ext>
+            </a:extLst>
+          </p:cNvPr>
+          <p:cNvSpPr txBox="1"/>
+          <p:nvPr/>
+        </p:nvSpPr>
+        <p:spPr>
+          <a:xfrm>
+            <a:off x="6578261" y="444628"/>
+            <a:ext cx="3769357" cy="307777"/>
+          </a:xfrm>
+          <a:prstGeom prst="rect">
+            <a:avLst/>
+          </a:prstGeom>
+          <a:noFill/>
+        </p:spPr>
+        <p:txBody>
+          <a:bodyPr wrap="square" rtlCol="0">
+            <a:spAutoFit/>
+          </a:bodyPr>
+          <a:lstStyle/>
+          <a:p>
+            <a:r>
+              <a:rPr lang="en-GB" sz="1400" dirty="0">
+                <a:latin typeface="Consolas" panose="020B0609020204030204" pitchFamily="49" charset="0"/>
+                <a:cs typeface="Consolas" panose="020B0609020204030204" pitchFamily="49" charset="0"/>
+              </a:rPr>
+              <a:t>m = </a:t>
+            </a:r>
+            <a:r>
+              <a:rPr lang="en-GB" sz="1400" dirty="0" err="1">
+                <a:latin typeface="Consolas" panose="020B0609020204030204" pitchFamily="49" charset="0"/>
+                <a:cs typeface="Consolas" panose="020B0609020204030204" pitchFamily="49" charset="0"/>
+              </a:rPr>
+              <a:t>th</a:t>
+            </a:r>
+            <a:r>
+              <a:rPr lang="en-GB" sz="1400" dirty="0">
+                <a:latin typeface="Consolas" panose="020B0609020204030204" pitchFamily="49" charset="0"/>
+                <a:cs typeface="Consolas" panose="020B0609020204030204" pitchFamily="49" charset="0"/>
+              </a:rPr>
+              <a:t>*</a:t>
+            </a:r>
+            <a:r>
+              <a:rPr lang="en-GB" sz="1400" dirty="0" err="1">
+                <a:latin typeface="Consolas" panose="020B0609020204030204" pitchFamily="49" charset="0"/>
+                <a:cs typeface="Consolas" panose="020B0609020204030204" pitchFamily="49" charset="0"/>
+              </a:rPr>
+              <a:t>marginFactor</a:t>
+            </a:r>
+            <a:endParaRPr lang="de-DE" sz="1400" dirty="0">
+              <a:latin typeface="Consolas" panose="020B0609020204030204" pitchFamily="49" charset="0"/>
+              <a:cs typeface="Consolas" panose="020B0609020204030204" pitchFamily="49" charset="0"/>
+            </a:endParaRPr>
+          </a:p>
+        </p:txBody>
+      </p:sp>
+      <p:grpSp>
+        <p:nvGrpSpPr>
+          <p:cNvPr id="5" name="Group 4">
+            <a:extLst>
+              <a:ext uri="{FF2B5EF4-FFF2-40B4-BE49-F238E27FC236}">
+                <a16:creationId xmlns:a16="http://schemas.microsoft.com/office/drawing/2014/main" id="{70AC8961-68BF-4E4B-BA28-5130D8EE4846}"/>
+              </a:ext>
+            </a:extLst>
+          </p:cNvPr>
+          <p:cNvGrpSpPr/>
+          <p:nvPr/>
+        </p:nvGrpSpPr>
+        <p:grpSpPr>
+          <a:xfrm>
+            <a:off x="1148080" y="375920"/>
+            <a:ext cx="4947920" cy="4439920"/>
+            <a:chOff x="1385298" y="1842888"/>
+            <a:chExt cx="3728890" cy="2344100"/>
+          </a:xfrm>
+        </p:grpSpPr>
+        <p:cxnSp>
+          <p:nvCxnSpPr>
+            <p:cNvPr id="57" name="Straight Connector 56">
+              <a:extLst>
+                <a:ext uri="{FF2B5EF4-FFF2-40B4-BE49-F238E27FC236}">
+                  <a16:creationId xmlns:a16="http://schemas.microsoft.com/office/drawing/2014/main" id="{EFC1A53F-E297-EA42-AA6A-0D5B449D646B}"/>
+                </a:ext>
+              </a:extLst>
+            </p:cNvPr>
+            <p:cNvCxnSpPr>
+              <a:cxnSpLocks/>
+            </p:cNvCxnSpPr>
+            <p:nvPr/>
+          </p:nvCxnSpPr>
+          <p:spPr>
+            <a:xfrm flipH="1">
+              <a:off x="1385299" y="1842888"/>
+              <a:ext cx="3716681" cy="0"/>
+            </a:xfrm>
+            <a:prstGeom prst="line">
+              <a:avLst/>
+            </a:prstGeom>
+            <a:ln w="28575">
+              <a:solidFill>
+                <a:schemeClr val="tx1"/>
+              </a:solidFill>
+              <a:prstDash val="dash"/>
+            </a:ln>
+          </p:spPr>
+          <p:style>
+            <a:lnRef idx="1">
+              <a:schemeClr val="accent1"/>
+            </a:lnRef>
+            <a:fillRef idx="0">
+              <a:schemeClr val="accent1"/>
+            </a:fillRef>
+            <a:effectRef idx="0">
+              <a:schemeClr val="accent1"/>
+            </a:effectRef>
+            <a:fontRef idx="minor">
+              <a:schemeClr val="tx1"/>
+            </a:fontRef>
+          </p:style>
+        </p:cxnSp>
+        <p:cxnSp>
+          <p:nvCxnSpPr>
+            <p:cNvPr id="58" name="Straight Connector 57">
+              <a:extLst>
+                <a:ext uri="{FF2B5EF4-FFF2-40B4-BE49-F238E27FC236}">
+                  <a16:creationId xmlns:a16="http://schemas.microsoft.com/office/drawing/2014/main" id="{C15B36F8-13B0-8740-BB61-683DCF06090F}"/>
+                </a:ext>
+              </a:extLst>
+            </p:cNvPr>
+            <p:cNvCxnSpPr>
+              <a:cxnSpLocks/>
+            </p:cNvCxnSpPr>
+            <p:nvPr/>
+          </p:nvCxnSpPr>
+          <p:spPr>
+            <a:xfrm flipH="1">
+              <a:off x="1385298" y="4186988"/>
+              <a:ext cx="3716681" cy="0"/>
+            </a:xfrm>
+            <a:prstGeom prst="line">
+              <a:avLst/>
+            </a:prstGeom>
+            <a:ln w="28575">
+              <a:solidFill>
+                <a:schemeClr val="tx1"/>
+              </a:solidFill>
+              <a:prstDash val="dash"/>
+            </a:ln>
+          </p:spPr>
+          <p:style>
+            <a:lnRef idx="1">
+              <a:schemeClr val="accent1"/>
+            </a:lnRef>
+            <a:fillRef idx="0">
+              <a:schemeClr val="accent1"/>
+            </a:fillRef>
+            <a:effectRef idx="0">
+              <a:schemeClr val="accent1"/>
+            </a:effectRef>
+            <a:fontRef idx="minor">
+              <a:schemeClr val="tx1"/>
+            </a:fontRef>
+          </p:style>
+        </p:cxnSp>
+        <p:cxnSp>
+          <p:nvCxnSpPr>
+            <p:cNvPr id="59" name="Straight Connector 58">
+              <a:extLst>
+                <a:ext uri="{FF2B5EF4-FFF2-40B4-BE49-F238E27FC236}">
+                  <a16:creationId xmlns:a16="http://schemas.microsoft.com/office/drawing/2014/main" id="{95595F66-6787-FB46-87C7-7097FF44D3FC}"/>
+                </a:ext>
+              </a:extLst>
+            </p:cNvPr>
+            <p:cNvCxnSpPr>
+              <a:cxnSpLocks/>
+            </p:cNvCxnSpPr>
+            <p:nvPr/>
+          </p:nvCxnSpPr>
+          <p:spPr>
+            <a:xfrm flipV="1">
+              <a:off x="1399259" y="1853904"/>
+              <a:ext cx="0" cy="2330983"/>
+            </a:xfrm>
+            <a:prstGeom prst="line">
+              <a:avLst/>
+            </a:prstGeom>
+            <a:ln w="28575">
+              <a:solidFill>
+                <a:schemeClr val="tx1"/>
+              </a:solidFill>
+              <a:prstDash val="dash"/>
+            </a:ln>
+          </p:spPr>
+          <p:style>
+            <a:lnRef idx="1">
+              <a:schemeClr val="accent1"/>
+            </a:lnRef>
+            <a:fillRef idx="0">
+              <a:schemeClr val="accent1"/>
+            </a:fillRef>
+            <a:effectRef idx="0">
+              <a:schemeClr val="accent1"/>
+            </a:effectRef>
+            <a:fontRef idx="minor">
+              <a:schemeClr val="tx1"/>
+            </a:fontRef>
+          </p:style>
+        </p:cxnSp>
+        <p:cxnSp>
+          <p:nvCxnSpPr>
+            <p:cNvPr id="60" name="Straight Connector 59">
+              <a:extLst>
+                <a:ext uri="{FF2B5EF4-FFF2-40B4-BE49-F238E27FC236}">
+                  <a16:creationId xmlns:a16="http://schemas.microsoft.com/office/drawing/2014/main" id="{2BC2707E-7689-324D-8B27-A9C95262127A}"/>
+                </a:ext>
+              </a:extLst>
+            </p:cNvPr>
+            <p:cNvCxnSpPr>
+              <a:cxnSpLocks/>
+            </p:cNvCxnSpPr>
+            <p:nvPr/>
+          </p:nvCxnSpPr>
+          <p:spPr>
+            <a:xfrm flipV="1">
+              <a:off x="5114188" y="1853904"/>
+              <a:ext cx="0" cy="2330983"/>
+            </a:xfrm>
+            <a:prstGeom prst="line">
+              <a:avLst/>
+            </a:prstGeom>
+            <a:ln w="28575">
+              <a:solidFill>
+                <a:schemeClr val="tx1"/>
+              </a:solidFill>
+              <a:prstDash val="dash"/>
+            </a:ln>
+          </p:spPr>
+          <p:style>
+            <a:lnRef idx="1">
+              <a:schemeClr val="accent1"/>
+            </a:lnRef>
+            <a:fillRef idx="0">
+              <a:schemeClr val="accent1"/>
+            </a:fillRef>
+            <a:effectRef idx="0">
+              <a:schemeClr val="accent1"/>
+            </a:effectRef>
+            <a:fontRef idx="minor">
+              <a:schemeClr val="tx1"/>
+            </a:fontRef>
+          </p:style>
+        </p:cxnSp>
+      </p:grpSp>
+      <p:sp>
+        <p:nvSpPr>
+          <p:cNvPr id="61" name="TextBox 60">
+            <a:extLst>
+              <a:ext uri="{FF2B5EF4-FFF2-40B4-BE49-F238E27FC236}">
+                <a16:creationId xmlns:a16="http://schemas.microsoft.com/office/drawing/2014/main" id="{08AE32B9-7278-9648-9D48-427CBC8C7C2D}"/>
+              </a:ext>
+            </a:extLst>
+          </p:cNvPr>
+          <p:cNvSpPr txBox="1"/>
+          <p:nvPr/>
+        </p:nvSpPr>
+        <p:spPr>
+          <a:xfrm>
+            <a:off x="1303520" y="67057"/>
+            <a:ext cx="802248" cy="307777"/>
+          </a:xfrm>
+          <a:prstGeom prst="rect">
+            <a:avLst/>
+          </a:prstGeom>
+          <a:noFill/>
+        </p:spPr>
+        <p:txBody>
+          <a:bodyPr wrap="square" rtlCol="0">
+            <a:spAutoFit/>
+          </a:bodyPr>
+          <a:lstStyle/>
+          <a:p>
+            <a:pPr algn="ctr"/>
+            <a:r>
+              <a:rPr lang="en-GB" sz="1400" dirty="0" err="1">
+                <a:latin typeface="Consolas" panose="020B0609020204030204" pitchFamily="49" charset="0"/>
+                <a:cs typeface="Consolas" panose="020B0609020204030204" pitchFamily="49" charset="0"/>
+              </a:rPr>
+              <a:t>fw</a:t>
+            </a:r>
+            <a:endParaRPr lang="de-DE" sz="1400" dirty="0">
+              <a:latin typeface="Consolas" panose="020B0609020204030204" pitchFamily="49" charset="0"/>
+              <a:cs typeface="Consolas" panose="020B0609020204030204" pitchFamily="49" charset="0"/>
+            </a:endParaRPr>
+          </a:p>
+        </p:txBody>
+      </p:sp>
+      <p:sp>
+        <p:nvSpPr>
+          <p:cNvPr id="62" name="TextBox 61">
+            <a:extLst>
+              <a:ext uri="{FF2B5EF4-FFF2-40B4-BE49-F238E27FC236}">
+                <a16:creationId xmlns:a16="http://schemas.microsoft.com/office/drawing/2014/main" id="{63888F76-FFE7-0943-BA8C-8B9FF93CC069}"/>
+              </a:ext>
+            </a:extLst>
+          </p:cNvPr>
+          <p:cNvSpPr txBox="1"/>
+          <p:nvPr/>
+        </p:nvSpPr>
+        <p:spPr>
+          <a:xfrm>
+            <a:off x="688563" y="699767"/>
+            <a:ext cx="464060" cy="307777"/>
+          </a:xfrm>
+          <a:prstGeom prst="rect">
+            <a:avLst/>
+          </a:prstGeom>
+          <a:noFill/>
+        </p:spPr>
+        <p:txBody>
+          <a:bodyPr wrap="square" rtlCol="0">
+            <a:spAutoFit/>
+          </a:bodyPr>
+          <a:lstStyle/>
+          <a:p>
+            <a:pPr algn="r"/>
+            <a:r>
+              <a:rPr lang="en-GB" sz="1400" dirty="0" err="1">
+                <a:latin typeface="Consolas" panose="020B0609020204030204" pitchFamily="49" charset="0"/>
+                <a:cs typeface="Consolas" panose="020B0609020204030204" pitchFamily="49" charset="0"/>
+              </a:rPr>
+              <a:t>fh</a:t>
+            </a:r>
+            <a:endParaRPr lang="de-DE" sz="1400" dirty="0">
+              <a:latin typeface="Consolas" panose="020B0609020204030204" pitchFamily="49" charset="0"/>
+              <a:cs typeface="Consolas" panose="020B0609020204030204" pitchFamily="49" charset="0"/>
+            </a:endParaRPr>
+          </a:p>
+        </p:txBody>
+      </p:sp>
+      <p:sp>
+        <p:nvSpPr>
+          <p:cNvPr id="63" name="TextBox 62">
+            <a:extLst>
+              <a:ext uri="{FF2B5EF4-FFF2-40B4-BE49-F238E27FC236}">
+                <a16:creationId xmlns:a16="http://schemas.microsoft.com/office/drawing/2014/main" id="{97F4B6E6-B632-954B-8E78-A145AE44614B}"/>
+              </a:ext>
+            </a:extLst>
+          </p:cNvPr>
+          <p:cNvSpPr txBox="1"/>
+          <p:nvPr/>
+        </p:nvSpPr>
+        <p:spPr>
+          <a:xfrm>
+            <a:off x="1065980" y="5135706"/>
+            <a:ext cx="3769357" cy="307777"/>
+          </a:xfrm>
+          <a:prstGeom prst="rect">
+            <a:avLst/>
+          </a:prstGeom>
+          <a:noFill/>
+        </p:spPr>
+        <p:txBody>
+          <a:bodyPr wrap="square" rtlCol="0">
+            <a:spAutoFit/>
+          </a:bodyPr>
+          <a:lstStyle/>
+          <a:p>
+            <a:r>
+              <a:rPr lang="en-GB" sz="1400" dirty="0" err="1">
+                <a:latin typeface="Consolas" panose="020B0609020204030204" pitchFamily="49" charset="0"/>
+                <a:cs typeface="Consolas" panose="020B0609020204030204" pitchFamily="49" charset="0"/>
+              </a:rPr>
+              <a:t>sw</a:t>
+            </a:r>
+            <a:r>
+              <a:rPr lang="en-GB" sz="1400" dirty="0">
+                <a:latin typeface="Consolas" panose="020B0609020204030204" pitchFamily="49" charset="0"/>
+                <a:cs typeface="Consolas" panose="020B0609020204030204" pitchFamily="49" charset="0"/>
+              </a:rPr>
+              <a:t> = </a:t>
+            </a:r>
+            <a:r>
+              <a:rPr lang="en-GB" sz="1400" dirty="0" err="1">
+                <a:latin typeface="Consolas" panose="020B0609020204030204" pitchFamily="49" charset="0"/>
+                <a:cs typeface="Consolas" panose="020B0609020204030204" pitchFamily="49" charset="0"/>
+              </a:rPr>
+              <a:t>fw</a:t>
+            </a:r>
+            <a:r>
+              <a:rPr lang="en-GB" sz="1400" dirty="0">
+                <a:latin typeface="Consolas" panose="020B0609020204030204" pitchFamily="49" charset="0"/>
+                <a:cs typeface="Consolas" panose="020B0609020204030204" pitchFamily="49" charset="0"/>
+              </a:rPr>
+              <a:t> / </a:t>
+            </a:r>
+            <a:r>
+              <a:rPr lang="en-GB" sz="1400" dirty="0" err="1">
+                <a:latin typeface="Consolas" panose="020B0609020204030204" pitchFamily="49" charset="0"/>
+                <a:cs typeface="Consolas" panose="020B0609020204030204" pitchFamily="49" charset="0"/>
+              </a:rPr>
+              <a:t>twm</a:t>
+            </a:r>
+            <a:endParaRPr lang="de-DE" sz="1400" dirty="0">
+              <a:latin typeface="Consolas" panose="020B0609020204030204" pitchFamily="49" charset="0"/>
+              <a:cs typeface="Consolas" panose="020B0609020204030204" pitchFamily="49" charset="0"/>
+            </a:endParaRPr>
+          </a:p>
+        </p:txBody>
+      </p:sp>
+      <p:sp>
+        <p:nvSpPr>
+          <p:cNvPr id="64" name="TextBox 63">
+            <a:extLst>
+              <a:ext uri="{FF2B5EF4-FFF2-40B4-BE49-F238E27FC236}">
+                <a16:creationId xmlns:a16="http://schemas.microsoft.com/office/drawing/2014/main" id="{1CA3360E-509D-1446-9DF0-4E2D429B5228}"/>
+              </a:ext>
+            </a:extLst>
+          </p:cNvPr>
+          <p:cNvSpPr txBox="1"/>
+          <p:nvPr/>
+        </p:nvSpPr>
+        <p:spPr>
+          <a:xfrm>
+            <a:off x="1065980" y="5506716"/>
+            <a:ext cx="3769357" cy="307777"/>
+          </a:xfrm>
+          <a:prstGeom prst="rect">
+            <a:avLst/>
+          </a:prstGeom>
+          <a:noFill/>
+        </p:spPr>
+        <p:txBody>
+          <a:bodyPr wrap="square" rtlCol="0">
+            <a:spAutoFit/>
+          </a:bodyPr>
+          <a:lstStyle/>
+          <a:p>
+            <a:r>
+              <a:rPr lang="en-GB" sz="1400" dirty="0" err="1">
+                <a:latin typeface="Consolas" panose="020B0609020204030204" pitchFamily="49" charset="0"/>
+                <a:cs typeface="Consolas" panose="020B0609020204030204" pitchFamily="49" charset="0"/>
+              </a:rPr>
+              <a:t>sh</a:t>
+            </a:r>
+            <a:r>
+              <a:rPr lang="en-GB" sz="1400" dirty="0">
+                <a:latin typeface="Consolas" panose="020B0609020204030204" pitchFamily="49" charset="0"/>
+                <a:cs typeface="Consolas" panose="020B0609020204030204" pitchFamily="49" charset="0"/>
+              </a:rPr>
+              <a:t> = </a:t>
+            </a:r>
+            <a:r>
+              <a:rPr lang="en-GB" sz="1400" dirty="0" err="1">
+                <a:latin typeface="Consolas" panose="020B0609020204030204" pitchFamily="49" charset="0"/>
+                <a:cs typeface="Consolas" panose="020B0609020204030204" pitchFamily="49" charset="0"/>
+              </a:rPr>
+              <a:t>fh</a:t>
+            </a:r>
+            <a:r>
+              <a:rPr lang="en-GB" sz="1400" dirty="0">
+                <a:latin typeface="Consolas" panose="020B0609020204030204" pitchFamily="49" charset="0"/>
+                <a:cs typeface="Consolas" panose="020B0609020204030204" pitchFamily="49" charset="0"/>
+              </a:rPr>
+              <a:t> / </a:t>
+            </a:r>
+            <a:r>
+              <a:rPr lang="en-GB" sz="1400" dirty="0" err="1">
+                <a:latin typeface="Consolas" panose="020B0609020204030204" pitchFamily="49" charset="0"/>
+                <a:cs typeface="Consolas" panose="020B0609020204030204" pitchFamily="49" charset="0"/>
+              </a:rPr>
+              <a:t>thm</a:t>
+            </a:r>
+            <a:endParaRPr lang="de-DE" sz="1400" dirty="0">
+              <a:latin typeface="Consolas" panose="020B0609020204030204" pitchFamily="49" charset="0"/>
+              <a:cs typeface="Consolas" panose="020B0609020204030204" pitchFamily="49" charset="0"/>
+            </a:endParaRPr>
+          </a:p>
+        </p:txBody>
+      </p:sp>
+      <p:sp>
+        <p:nvSpPr>
+          <p:cNvPr id="66" name="TextBox 65">
+            <a:extLst>
+              <a:ext uri="{FF2B5EF4-FFF2-40B4-BE49-F238E27FC236}">
+                <a16:creationId xmlns:a16="http://schemas.microsoft.com/office/drawing/2014/main" id="{2431676F-31E9-2948-8B46-4E6AAA8C4116}"/>
+              </a:ext>
+            </a:extLst>
+          </p:cNvPr>
+          <p:cNvSpPr txBox="1"/>
+          <p:nvPr/>
+        </p:nvSpPr>
+        <p:spPr>
+          <a:xfrm>
+            <a:off x="6574044" y="1656683"/>
+            <a:ext cx="3769357" cy="307777"/>
+          </a:xfrm>
+          <a:prstGeom prst="rect">
+            <a:avLst/>
+          </a:prstGeom>
+          <a:noFill/>
+        </p:spPr>
+        <p:txBody>
+          <a:bodyPr wrap="square" rtlCol="0">
+            <a:spAutoFit/>
+          </a:bodyPr>
+          <a:lstStyle/>
+          <a:p>
+            <a:r>
+              <a:rPr lang="en-GB" sz="1400" dirty="0">
+                <a:latin typeface="Consolas" panose="020B0609020204030204" pitchFamily="49" charset="0"/>
+                <a:cs typeface="Consolas" panose="020B0609020204030204" pitchFamily="49" charset="0"/>
+              </a:rPr>
+              <a:t>b = </a:t>
+            </a:r>
+            <a:r>
+              <a:rPr lang="en-GB" sz="1400" dirty="0" err="1">
+                <a:latin typeface="Consolas" panose="020B0609020204030204" pitchFamily="49" charset="0"/>
+                <a:cs typeface="Consolas" panose="020B0609020204030204" pitchFamily="49" charset="0"/>
+              </a:rPr>
+              <a:t>th</a:t>
+            </a:r>
+            <a:r>
+              <a:rPr lang="en-GB" sz="1400" dirty="0">
+                <a:latin typeface="Consolas" panose="020B0609020204030204" pitchFamily="49" charset="0"/>
+                <a:cs typeface="Consolas" panose="020B0609020204030204" pitchFamily="49" charset="0"/>
+              </a:rPr>
+              <a:t>*</a:t>
+            </a:r>
+            <a:r>
+              <a:rPr lang="en-GB" sz="1400" dirty="0" err="1">
+                <a:latin typeface="Consolas" panose="020B0609020204030204" pitchFamily="49" charset="0"/>
+                <a:cs typeface="Consolas" panose="020B0609020204030204" pitchFamily="49" charset="0"/>
+              </a:rPr>
+              <a:t>borderWidthFactor</a:t>
+            </a:r>
+            <a:endParaRPr lang="de-DE" sz="1400" dirty="0">
+              <a:latin typeface="Consolas" panose="020B0609020204030204" pitchFamily="49" charset="0"/>
+              <a:cs typeface="Consolas" panose="020B0609020204030204" pitchFamily="49" charset="0"/>
+            </a:endParaRPr>
+          </a:p>
+        </p:txBody>
+      </p:sp>
+    </p:spTree>
+    <p:extLst>
+      <p:ext uri="{BB962C8B-B14F-4D97-AF65-F5344CB8AC3E}">
+        <p14:creationId xmlns:p14="http://schemas.microsoft.com/office/powerpoint/2010/main" val="59046868"/>
+      </p:ext>
+    </p:extLst>
+  </p:cSld>
+  <p:clrMapOvr>
+    <a:masterClrMapping/>
+  </p:clrMapOvr>
+</p:sld>
+</file>
+
+<file path=ppt/slides/slide2.xml><?xml version="1.0" encoding="utf-8"?>
+<p:sld xmlns:a="http://schemas.openxmlformats.org/drawingml/2006/main" xmlns:r="http://schemas.openxmlformats.org/officeDocument/2006/relationships" xmlns:p="http://schemas.openxmlformats.org/presentationml/2006/main">
+  <p:cSld>
+    <p:spTree>
+      <p:nvGrpSpPr>
+        <p:cNvPr id="1" name=""/>
+        <p:cNvGrpSpPr/>
+        <p:nvPr/>
+      </p:nvGrpSpPr>
+      <p:grpSpPr>
+        <a:xfrm>
+          <a:off x="0" y="0"/>
+          <a:ext cx="0" cy="0"/>
+          <a:chOff x="0" y="0"/>
+          <a:chExt cx="0" cy="0"/>
+        </a:xfrm>
+      </p:grpSpPr>
       <p:sp>
         <p:nvSpPr>
           <p:cNvPr id="4" name="Rectangle 3">
@@ -3608,8 +5156,8 @@
           </a:p>
         </p:txBody>
       </p:sp>
-      <mc:AlternateContent xmlns:mc="http://schemas.openxmlformats.org/markup-compatibility/2006">
-        <mc:Choice xmlns:a14="http://schemas.microsoft.com/office/drawing/2010/main" Requires="a14">
+      <mc:AlternateContent xmlns:mc="http://schemas.openxmlformats.org/markup-compatibility/2006" xmlns:a14="http://schemas.microsoft.com/office/drawing/2010/main">
+        <mc:Choice Requires="a14">
           <p:sp>
             <p:nvSpPr>
               <p:cNvPr id="32" name="TextBox 31">
@@ -3882,7 +5430,7 @@
             </p:txBody>
           </p:sp>
         </mc:Choice>
-        <mc:Fallback>
+        <mc:Fallback xmlns="">
           <p:sp>
             <p:nvSpPr>
               <p:cNvPr id="32" name="TextBox 31">
@@ -3927,8 +5475,8 @@
           </p:sp>
         </mc:Fallback>
       </mc:AlternateContent>
-      <mc:AlternateContent xmlns:mc="http://schemas.openxmlformats.org/markup-compatibility/2006">
-        <mc:Choice xmlns:a14="http://schemas.microsoft.com/office/drawing/2010/main" Requires="a14">
+      <mc:AlternateContent xmlns:mc="http://schemas.openxmlformats.org/markup-compatibility/2006" xmlns:a14="http://schemas.microsoft.com/office/drawing/2010/main">
+        <mc:Choice Requires="a14">
           <p:sp>
             <p:nvSpPr>
               <p:cNvPr id="35" name="TextBox 34">
@@ -3957,6 +5505,7 @@
               </a:bodyPr>
               <a:lstStyle/>
               <a:p>
+                <a:pPr/>
                 <a14:m>
                   <m:oMathPara xmlns:m="http://schemas.openxmlformats.org/officeDocument/2006/math">
                     <m:oMathParaPr>
@@ -4192,13 +5741,12 @@
                 <a:endParaRPr lang="en-US" dirty="0"/>
               </a:p>
               <a:p>
-                <a:pPr/>
                 <a:endParaRPr lang="en-US" dirty="0"/>
               </a:p>
             </p:txBody>
           </p:sp>
         </mc:Choice>
-        <mc:Fallback>
+        <mc:Fallback xmlns="">
           <p:sp>
             <p:nvSpPr>
               <p:cNvPr id="35" name="TextBox 34">
@@ -4458,8 +6006,8 @@
           </a:p>
         </p:txBody>
       </p:sp>
-      <mc:AlternateContent xmlns:mc="http://schemas.openxmlformats.org/markup-compatibility/2006">
-        <mc:Choice xmlns:a14="http://schemas.microsoft.com/office/drawing/2010/main" Requires="a14">
+      <mc:AlternateContent xmlns:mc="http://schemas.openxmlformats.org/markup-compatibility/2006" xmlns:a14="http://schemas.microsoft.com/office/drawing/2010/main">
+        <mc:Choice Requires="a14">
           <p:sp>
             <p:nvSpPr>
               <p:cNvPr id="18" name="TextBox 17">
@@ -4488,7 +6036,6 @@
               </a:bodyPr>
               <a:lstStyle/>
               <a:p>
-                <a:pPr/>
                 <a:r>
                   <a:rPr lang="en-US" b="0" dirty="0"/>
                   <a:t>tan</a:t>
@@ -4563,7 +6110,7 @@
             </p:txBody>
           </p:sp>
         </mc:Choice>
-        <mc:Fallback>
+        <mc:Fallback xmlns="">
           <p:sp>
             <p:nvSpPr>
               <p:cNvPr id="18" name="TextBox 17">
@@ -4742,7 +6289,7 @@
 </p:sld>
 </file>
 
-<file path=ppt/slides/slide2.xml><?xml version="1.0" encoding="utf-8"?>
+<file path=ppt/slides/slide3.xml><?xml version="1.0" encoding="utf-8"?>
 <p:sld xmlns:a="http://schemas.openxmlformats.org/drawingml/2006/main" xmlns:r="http://schemas.openxmlformats.org/officeDocument/2006/relationships" xmlns:p="http://schemas.openxmlformats.org/presentationml/2006/main">
   <p:cSld>
     <p:spTree>
@@ -4945,8 +6492,8 @@
           </a:p>
         </p:txBody>
       </p:sp>
-      <mc:AlternateContent xmlns:mc="http://schemas.openxmlformats.org/markup-compatibility/2006">
-        <mc:Choice xmlns:a14="http://schemas.microsoft.com/office/drawing/2010/main" Requires="a14">
+      <mc:AlternateContent xmlns:mc="http://schemas.openxmlformats.org/markup-compatibility/2006" xmlns:a14="http://schemas.microsoft.com/office/drawing/2010/main">
+        <mc:Choice Requires="a14">
           <p:sp>
             <p:nvSpPr>
               <p:cNvPr id="32" name="TextBox 31">
@@ -5079,7 +6626,7 @@
             </p:txBody>
           </p:sp>
         </mc:Choice>
-        <mc:Fallback>
+        <mc:Fallback xmlns="">
           <p:sp>
             <p:nvSpPr>
               <p:cNvPr id="32" name="TextBox 31">
@@ -5124,8 +6671,8 @@
           </p:sp>
         </mc:Fallback>
       </mc:AlternateContent>
-      <mc:AlternateContent xmlns:mc="http://schemas.openxmlformats.org/markup-compatibility/2006">
-        <mc:Choice xmlns:a14="http://schemas.microsoft.com/office/drawing/2010/main" Requires="a14">
+      <mc:AlternateContent xmlns:mc="http://schemas.openxmlformats.org/markup-compatibility/2006" xmlns:a14="http://schemas.microsoft.com/office/drawing/2010/main">
+        <mc:Choice Requires="a14">
           <p:sp>
             <p:nvSpPr>
               <p:cNvPr id="35" name="TextBox 34">
@@ -5154,6 +6701,7 @@
               </a:bodyPr>
               <a:lstStyle/>
               <a:p>
+                <a:pPr/>
                 <a14:m>
                   <m:oMathPara xmlns:m="http://schemas.openxmlformats.org/officeDocument/2006/math">
                     <m:oMathParaPr>
@@ -5232,7 +6780,7 @@
             </p:txBody>
           </p:sp>
         </mc:Choice>
-        <mc:Fallback>
+        <mc:Fallback xmlns="">
           <p:sp>
             <p:nvSpPr>
               <p:cNvPr id="35" name="TextBox 34">
@@ -5349,8 +6897,8 @@
           </a:p>
         </p:txBody>
       </p:sp>
-      <mc:AlternateContent xmlns:mc="http://schemas.openxmlformats.org/markup-compatibility/2006">
-        <mc:Choice xmlns:a14="http://schemas.microsoft.com/office/drawing/2010/main" Requires="a14">
+      <mc:AlternateContent xmlns:mc="http://schemas.openxmlformats.org/markup-compatibility/2006" xmlns:a14="http://schemas.microsoft.com/office/drawing/2010/main">
+        <mc:Choice Requires="a14">
           <p:sp>
             <p:nvSpPr>
               <p:cNvPr id="40" name="TextBox 39">
@@ -5379,7 +6927,6 @@
               </a:bodyPr>
               <a:lstStyle/>
               <a:p>
-                <a:pPr/>
                 <a:r>
                   <a:rPr lang="en-US" b="0" dirty="0"/>
                   <a:t>A</a:t>
@@ -5423,7 +6970,7 @@
             </p:txBody>
           </p:sp>
         </mc:Choice>
-        <mc:Fallback>
+        <mc:Fallback xmlns="">
           <p:sp>
             <p:nvSpPr>
               <p:cNvPr id="40" name="TextBox 39">
@@ -5700,8 +7247,8 @@
           </a:fontRef>
         </p:style>
       </p:cxnSp>
-      <mc:AlternateContent xmlns:mc="http://schemas.openxmlformats.org/markup-compatibility/2006">
-        <mc:Choice xmlns:a14="http://schemas.microsoft.com/office/drawing/2010/main" Requires="a14">
+      <mc:AlternateContent xmlns:mc="http://schemas.openxmlformats.org/markup-compatibility/2006" xmlns:a14="http://schemas.microsoft.com/office/drawing/2010/main">
+        <mc:Choice Requires="a14">
           <p:sp>
             <p:nvSpPr>
               <p:cNvPr id="42" name="TextBox 41">
@@ -5834,7 +7381,7 @@
             </p:txBody>
           </p:sp>
         </mc:Choice>
-        <mc:Fallback>
+        <mc:Fallback xmlns="">
           <p:sp>
             <p:nvSpPr>
               <p:cNvPr id="42" name="TextBox 41">
@@ -5879,8 +7426,8 @@
           </p:sp>
         </mc:Fallback>
       </mc:AlternateContent>
-      <mc:AlternateContent xmlns:mc="http://schemas.openxmlformats.org/markup-compatibility/2006">
-        <mc:Choice xmlns:a14="http://schemas.microsoft.com/office/drawing/2010/main" Requires="a14">
+      <mc:AlternateContent xmlns:mc="http://schemas.openxmlformats.org/markup-compatibility/2006" xmlns:a14="http://schemas.microsoft.com/office/drawing/2010/main">
+        <mc:Choice Requires="a14">
           <p:sp>
             <p:nvSpPr>
               <p:cNvPr id="43" name="TextBox 42">
@@ -5977,7 +7524,7 @@
             </p:txBody>
           </p:sp>
         </mc:Choice>
-        <mc:Fallback>
+        <mc:Fallback xmlns="">
           <p:sp>
             <p:nvSpPr>
               <p:cNvPr id="43" name="TextBox 42">
@@ -6022,8 +7569,8 @@
           </p:sp>
         </mc:Fallback>
       </mc:AlternateContent>
-      <mc:AlternateContent xmlns:mc="http://schemas.openxmlformats.org/markup-compatibility/2006">
-        <mc:Choice xmlns:a14="http://schemas.microsoft.com/office/drawing/2010/main" Requires="a14">
+      <mc:AlternateContent xmlns:mc="http://schemas.openxmlformats.org/markup-compatibility/2006" xmlns:a14="http://schemas.microsoft.com/office/drawing/2010/main">
+        <mc:Choice Requires="a14">
           <p:sp>
             <p:nvSpPr>
               <p:cNvPr id="44" name="TextBox 43">
@@ -6115,7 +7662,7 @@
             </p:txBody>
           </p:sp>
         </mc:Choice>
-        <mc:Fallback>
+        <mc:Fallback xmlns="">
           <p:sp>
             <p:nvSpPr>
               <p:cNvPr id="44" name="TextBox 43">
@@ -6252,7 +7799,7 @@
 </p:sld>
 </file>
 
-<file path=ppt/slides/slide3.xml><?xml version="1.0" encoding="utf-8"?>
+<file path=ppt/slides/slide4.xml><?xml version="1.0" encoding="utf-8"?>
 <p:sld xmlns:a="http://schemas.openxmlformats.org/drawingml/2006/main" xmlns:r="http://schemas.openxmlformats.org/officeDocument/2006/relationships" xmlns:p="http://schemas.openxmlformats.org/presentationml/2006/main">
   <p:cSld>
     <p:spTree>
@@ -6399,8 +7946,8 @@
           </a:p>
         </p:txBody>
       </p:sp>
-      <mc:AlternateContent xmlns:mc="http://schemas.openxmlformats.org/markup-compatibility/2006">
-        <mc:Choice xmlns:a14="http://schemas.microsoft.com/office/drawing/2010/main" Requires="a14">
+      <mc:AlternateContent xmlns:mc="http://schemas.openxmlformats.org/markup-compatibility/2006" xmlns:a14="http://schemas.microsoft.com/office/drawing/2010/main">
+        <mc:Choice Requires="a14">
           <p:sp>
             <p:nvSpPr>
               <p:cNvPr id="32" name="TextBox 31">
@@ -6533,7 +8080,7 @@
             </p:txBody>
           </p:sp>
         </mc:Choice>
-        <mc:Fallback>
+        <mc:Fallback xmlns="">
           <p:sp>
             <p:nvSpPr>
               <p:cNvPr id="32" name="TextBox 31">
@@ -6650,8 +8197,8 @@
           </a:p>
         </p:txBody>
       </p:sp>
-      <mc:AlternateContent xmlns:mc="http://schemas.openxmlformats.org/markup-compatibility/2006">
-        <mc:Choice xmlns:a14="http://schemas.microsoft.com/office/drawing/2010/main" Requires="a14">
+      <mc:AlternateContent xmlns:mc="http://schemas.openxmlformats.org/markup-compatibility/2006" xmlns:a14="http://schemas.microsoft.com/office/drawing/2010/main">
+        <mc:Choice Requires="a14">
           <p:sp>
             <p:nvSpPr>
               <p:cNvPr id="40" name="TextBox 39">
@@ -6680,7 +8227,6 @@
               </a:bodyPr>
               <a:lstStyle/>
               <a:p>
-                <a:pPr/>
                 <a:r>
                   <a:rPr lang="en-US" b="0" dirty="0"/>
                   <a:t>A</a:t>
@@ -6724,7 +8270,7 @@
             </p:txBody>
           </p:sp>
         </mc:Choice>
-        <mc:Fallback>
+        <mc:Fallback xmlns="">
           <p:sp>
             <p:nvSpPr>
               <p:cNvPr id="40" name="TextBox 39">
@@ -6957,8 +8503,8 @@
           </a:p>
         </p:txBody>
       </p:sp>
-      <mc:AlternateContent xmlns:mc="http://schemas.openxmlformats.org/markup-compatibility/2006">
-        <mc:Choice xmlns:a14="http://schemas.microsoft.com/office/drawing/2010/main" Requires="a14">
+      <mc:AlternateContent xmlns:mc="http://schemas.openxmlformats.org/markup-compatibility/2006" xmlns:a14="http://schemas.microsoft.com/office/drawing/2010/main">
+        <mc:Choice Requires="a14">
           <p:sp>
             <p:nvSpPr>
               <p:cNvPr id="42" name="TextBox 41">
@@ -7091,7 +8637,7 @@
             </p:txBody>
           </p:sp>
         </mc:Choice>
-        <mc:Fallback>
+        <mc:Fallback xmlns="">
           <p:sp>
             <p:nvSpPr>
               <p:cNvPr id="42" name="TextBox 41">
@@ -7136,8 +8682,8 @@
           </p:sp>
         </mc:Fallback>
       </mc:AlternateContent>
-      <mc:AlternateContent xmlns:mc="http://schemas.openxmlformats.org/markup-compatibility/2006">
-        <mc:Choice xmlns:a14="http://schemas.microsoft.com/office/drawing/2010/main" Requires="a14">
+      <mc:AlternateContent xmlns:mc="http://schemas.openxmlformats.org/markup-compatibility/2006" xmlns:a14="http://schemas.microsoft.com/office/drawing/2010/main">
+        <mc:Choice Requires="a14">
           <p:sp>
             <p:nvSpPr>
               <p:cNvPr id="43" name="TextBox 42">
@@ -7234,7 +8780,7 @@
             </p:txBody>
           </p:sp>
         </mc:Choice>
-        <mc:Fallback>
+        <mc:Fallback xmlns="">
           <p:sp>
             <p:nvSpPr>
               <p:cNvPr id="43" name="TextBox 42">
@@ -7279,8 +8825,8 @@
           </p:sp>
         </mc:Fallback>
       </mc:AlternateContent>
-      <mc:AlternateContent xmlns:mc="http://schemas.openxmlformats.org/markup-compatibility/2006">
-        <mc:Choice xmlns:a14="http://schemas.microsoft.com/office/drawing/2010/main" Requires="a14">
+      <mc:AlternateContent xmlns:mc="http://schemas.openxmlformats.org/markup-compatibility/2006" xmlns:a14="http://schemas.microsoft.com/office/drawing/2010/main">
+        <mc:Choice Requires="a14">
           <p:sp>
             <p:nvSpPr>
               <p:cNvPr id="44" name="TextBox 43">
@@ -7372,7 +8918,7 @@
             </p:txBody>
           </p:sp>
         </mc:Choice>
-        <mc:Fallback>
+        <mc:Fallback xmlns="">
           <p:sp>
             <p:nvSpPr>
               <p:cNvPr id="44" name="TextBox 43">
@@ -7621,8 +9167,8 @@
           </a:p>
         </p:txBody>
       </p:sp>
-      <mc:AlternateContent xmlns:mc="http://schemas.openxmlformats.org/markup-compatibility/2006">
-        <mc:Choice xmlns:a14="http://schemas.microsoft.com/office/drawing/2010/main" Requires="a14">
+      <mc:AlternateContent xmlns:mc="http://schemas.openxmlformats.org/markup-compatibility/2006" xmlns:a14="http://schemas.microsoft.com/office/drawing/2010/main">
+        <mc:Choice Requires="a14">
           <p:sp>
             <p:nvSpPr>
               <p:cNvPr id="36" name="TextBox 35">
@@ -7755,7 +9301,7 @@
             </p:txBody>
           </p:sp>
         </mc:Choice>
-        <mc:Fallback>
+        <mc:Fallback xmlns="">
           <p:sp>
             <p:nvSpPr>
               <p:cNvPr id="36" name="TextBox 35">
@@ -7800,8 +9346,8 @@
           </p:sp>
         </mc:Fallback>
       </mc:AlternateContent>
-      <mc:AlternateContent xmlns:mc="http://schemas.openxmlformats.org/markup-compatibility/2006">
-        <mc:Choice xmlns:a14="http://schemas.microsoft.com/office/drawing/2010/main" Requires="a14">
+      <mc:AlternateContent xmlns:mc="http://schemas.openxmlformats.org/markup-compatibility/2006" xmlns:a14="http://schemas.microsoft.com/office/drawing/2010/main">
+        <mc:Choice Requires="a14">
           <p:sp>
             <p:nvSpPr>
               <p:cNvPr id="38" name="TextBox 37">
@@ -7830,7 +9376,6 @@
               </a:bodyPr>
               <a:lstStyle/>
               <a:p>
-                <a:pPr/>
                 <a:r>
                   <a:rPr lang="en-US" dirty="0"/>
                   <a:t>B</a:t>
@@ -7874,7 +9419,7 @@
             </p:txBody>
           </p:sp>
         </mc:Choice>
-        <mc:Fallback>
+        <mc:Fallback xmlns="">
           <p:sp>
             <p:nvSpPr>
               <p:cNvPr id="38" name="TextBox 37">
@@ -7919,8 +9464,8 @@
           </p:sp>
         </mc:Fallback>
       </mc:AlternateContent>
-      <mc:AlternateContent xmlns:mc="http://schemas.openxmlformats.org/markup-compatibility/2006">
-        <mc:Choice xmlns:a14="http://schemas.microsoft.com/office/drawing/2010/main" Requires="a14">
+      <mc:AlternateContent xmlns:mc="http://schemas.openxmlformats.org/markup-compatibility/2006" xmlns:a14="http://schemas.microsoft.com/office/drawing/2010/main">
+        <mc:Choice Requires="a14">
           <p:sp>
             <p:nvSpPr>
               <p:cNvPr id="47" name="TextBox 46">
@@ -8053,7 +9598,7 @@
             </p:txBody>
           </p:sp>
         </mc:Choice>
-        <mc:Fallback>
+        <mc:Fallback xmlns="">
           <p:sp>
             <p:nvSpPr>
               <p:cNvPr id="47" name="TextBox 46">
@@ -8098,8 +9643,8 @@
           </p:sp>
         </mc:Fallback>
       </mc:AlternateContent>
-      <mc:AlternateContent xmlns:mc="http://schemas.openxmlformats.org/markup-compatibility/2006">
-        <mc:Choice xmlns:a14="http://schemas.microsoft.com/office/drawing/2010/main" Requires="a14">
+      <mc:AlternateContent xmlns:mc="http://schemas.openxmlformats.org/markup-compatibility/2006" xmlns:a14="http://schemas.microsoft.com/office/drawing/2010/main">
+        <mc:Choice Requires="a14">
           <p:sp>
             <p:nvSpPr>
               <p:cNvPr id="48" name="TextBox 47">
@@ -8128,7 +9673,6 @@
               </a:bodyPr>
               <a:lstStyle/>
               <a:p>
-                <a:pPr/>
                 <a:r>
                   <a:rPr lang="en-US" b="0" dirty="0"/>
                   <a:t>B</a:t>
@@ -8189,7 +9733,7 @@
             </p:txBody>
           </p:sp>
         </mc:Choice>
-        <mc:Fallback>
+        <mc:Fallback xmlns="">
           <p:sp>
             <p:nvSpPr>
               <p:cNvPr id="48" name="TextBox 47">
@@ -8234,8 +9778,8 @@
           </p:sp>
         </mc:Fallback>
       </mc:AlternateContent>
-      <mc:AlternateContent xmlns:mc="http://schemas.openxmlformats.org/markup-compatibility/2006">
-        <mc:Choice xmlns:a14="http://schemas.microsoft.com/office/drawing/2010/main" Requires="a14">
+      <mc:AlternateContent xmlns:mc="http://schemas.openxmlformats.org/markup-compatibility/2006" xmlns:a14="http://schemas.microsoft.com/office/drawing/2010/main">
+        <mc:Choice Requires="a14">
           <p:sp>
             <p:nvSpPr>
               <p:cNvPr id="49" name="TextBox 48">
@@ -8264,7 +9808,6 @@
               </a:bodyPr>
               <a:lstStyle/>
               <a:p>
-                <a:pPr/>
                 <a:r>
                   <a:rPr lang="en-US" dirty="0"/>
                   <a:t>B</a:t>
@@ -8326,7 +9869,7 @@
             </p:txBody>
           </p:sp>
         </mc:Choice>
-        <mc:Fallback>
+        <mc:Fallback xmlns="">
           <p:sp>
             <p:nvSpPr>
               <p:cNvPr id="49" name="TextBox 48">
@@ -8384,7 +9927,7 @@
 </p:sld>
 </file>
 
-<file path=ppt/slides/slide4.xml><?xml version="1.0" encoding="utf-8"?>
+<file path=ppt/slides/slide5.xml><?xml version="1.0" encoding="utf-8"?>
 <p:sld xmlns:a="http://schemas.openxmlformats.org/drawingml/2006/main" xmlns:r="http://schemas.openxmlformats.org/officeDocument/2006/relationships" xmlns:p="http://schemas.openxmlformats.org/presentationml/2006/main">
   <p:cSld>
     <p:spTree>
@@ -10031,4 +11574,299 @@
     </a:ext>
   </a:extLst>
 </a:theme>
+</file>
+
+<file path=ppt/theme/theme2.xml><?xml version="1.0" encoding="utf-8"?>
+<a:theme xmlns:a="http://schemas.openxmlformats.org/drawingml/2006/main" name="Office Theme">
+  <a:themeElements>
+    <a:clrScheme name="Office">
+      <a:dk1>
+        <a:sysClr val="windowText" lastClr="000000"/>
+      </a:dk1>
+      <a:lt1>
+        <a:sysClr val="window" lastClr="FFFFFF"/>
+      </a:lt1>
+      <a:dk2>
+        <a:srgbClr val="44546A"/>
+      </a:dk2>
+      <a:lt2>
+        <a:srgbClr val="E7E6E6"/>
+      </a:lt2>
+      <a:accent1>
+        <a:srgbClr val="4472C4"/>
+      </a:accent1>
+      <a:accent2>
+        <a:srgbClr val="ED7D31"/>
+      </a:accent2>
+      <a:accent3>
+        <a:srgbClr val="A5A5A5"/>
+      </a:accent3>
+      <a:accent4>
+        <a:srgbClr val="FFC000"/>
+      </a:accent4>
+      <a:accent5>
+        <a:srgbClr val="5B9BD5"/>
+      </a:accent5>
+      <a:accent6>
+        <a:srgbClr val="70AD47"/>
+      </a:accent6>
+      <a:hlink>
+        <a:srgbClr val="0563C1"/>
+      </a:hlink>
+      <a:folHlink>
+        <a:srgbClr val="954F72"/>
+      </a:folHlink>
+    </a:clrScheme>
+    <a:fontScheme name="Office">
+      <a:majorFont>
+        <a:latin typeface="Calibri Light" panose="020F0302020204030204"/>
+        <a:ea typeface=""/>
+        <a:cs typeface=""/>
+        <a:font script="Jpan" typeface="游ゴシック Light"/>
+        <a:font script="Hang" typeface="맑은 고딕"/>
+        <a:font script="Hans" typeface="等线 Light"/>
+        <a:font script="Hant" typeface="新細明體"/>
+        <a:font script="Arab" typeface="Times New Roman"/>
+        <a:font script="Hebr" typeface="Times New Roman"/>
+        <a:font script="Thai" typeface="Angsana New"/>
+        <a:font script="Ethi" typeface="Nyala"/>
+        <a:font script="Beng" typeface="Vrinda"/>
+        <a:font script="Gujr" typeface="Shruti"/>
+        <a:font script="Khmr" typeface="MoolBoran"/>
+        <a:font script="Knda" typeface="Tunga"/>
+        <a:font script="Guru" typeface="Raavi"/>
+        <a:font script="Cans" typeface="Euphemia"/>
+        <a:font script="Cher" typeface="Plantagenet Cherokee"/>
+        <a:font script="Yiii" typeface="Microsoft Yi Baiti"/>
+        <a:font script="Tibt" typeface="Microsoft Himalaya"/>
+        <a:font script="Thaa" typeface="MV Boli"/>
+        <a:font script="Deva" typeface="Mangal"/>
+        <a:font script="Telu" typeface="Gautami"/>
+        <a:font script="Taml" typeface="Latha"/>
+        <a:font script="Syrc" typeface="Estrangelo Edessa"/>
+        <a:font script="Orya" typeface="Kalinga"/>
+        <a:font script="Mlym" typeface="Kartika"/>
+        <a:font script="Laoo" typeface="DokChampa"/>
+        <a:font script="Sinh" typeface="Iskoola Pota"/>
+        <a:font script="Mong" typeface="Mongolian Baiti"/>
+        <a:font script="Viet" typeface="Times New Roman"/>
+        <a:font script="Uigh" typeface="Microsoft Uighur"/>
+        <a:font script="Geor" typeface="Sylfaen"/>
+        <a:font script="Armn" typeface="Arial"/>
+        <a:font script="Bugi" typeface="Leelawadee UI"/>
+        <a:font script="Bopo" typeface="Microsoft JhengHei"/>
+        <a:font script="Java" typeface="Javanese Text"/>
+        <a:font script="Lisu" typeface="Segoe UI"/>
+        <a:font script="Mymr" typeface="Myanmar Text"/>
+        <a:font script="Nkoo" typeface="Ebrima"/>
+        <a:font script="Olck" typeface="Nirmala UI"/>
+        <a:font script="Osma" typeface="Ebrima"/>
+        <a:font script="Phag" typeface="Phagspa"/>
+        <a:font script="Syrn" typeface="Estrangelo Edessa"/>
+        <a:font script="Syrj" typeface="Estrangelo Edessa"/>
+        <a:font script="Syre" typeface="Estrangelo Edessa"/>
+        <a:font script="Sora" typeface="Nirmala UI"/>
+        <a:font script="Tale" typeface="Microsoft Tai Le"/>
+        <a:font script="Talu" typeface="Microsoft New Tai Lue"/>
+        <a:font script="Tfng" typeface="Ebrima"/>
+      </a:majorFont>
+      <a:minorFont>
+        <a:latin typeface="Calibri" panose="020F0502020204030204"/>
+        <a:ea typeface=""/>
+        <a:cs typeface=""/>
+        <a:font script="Jpan" typeface="游ゴシック"/>
+        <a:font script="Hang" typeface="맑은 고딕"/>
+        <a:font script="Hans" typeface="等线"/>
+        <a:font script="Hant" typeface="新細明體"/>
+        <a:font script="Arab" typeface="Arial"/>
+        <a:font script="Hebr" typeface="Arial"/>
+        <a:font script="Thai" typeface="Cordia New"/>
+        <a:font script="Ethi" typeface="Nyala"/>
+        <a:font script="Beng" typeface="Vrinda"/>
+        <a:font script="Gujr" typeface="Shruti"/>
+        <a:font script="Khmr" typeface="DaunPenh"/>
+        <a:font script="Knda" typeface="Tunga"/>
+        <a:font script="Guru" typeface="Raavi"/>
+        <a:font script="Cans" typeface="Euphemia"/>
+        <a:font script="Cher" typeface="Plantagenet Cherokee"/>
+        <a:font script="Yiii" typeface="Microsoft Yi Baiti"/>
+        <a:font script="Tibt" typeface="Microsoft Himalaya"/>
+        <a:font script="Thaa" typeface="MV Boli"/>
+        <a:font script="Deva" typeface="Mangal"/>
+        <a:font script="Telu" typeface="Gautami"/>
+        <a:font script="Taml" typeface="Latha"/>
+        <a:font script="Syrc" typeface="Estrangelo Edessa"/>
+        <a:font script="Orya" typeface="Kalinga"/>
+        <a:font script="Mlym" typeface="Kartika"/>
+        <a:font script="Laoo" typeface="DokChampa"/>
+        <a:font script="Sinh" typeface="Iskoola Pota"/>
+        <a:font script="Mong" typeface="Mongolian Baiti"/>
+        <a:font script="Viet" typeface="Arial"/>
+        <a:font script="Uigh" typeface="Microsoft Uighur"/>
+        <a:font script="Geor" typeface="Sylfaen"/>
+        <a:font script="Armn" typeface="Arial"/>
+        <a:font script="Bugi" typeface="Leelawadee UI"/>
+        <a:font script="Bopo" typeface="Microsoft JhengHei"/>
+        <a:font script="Java" typeface="Javanese Text"/>
+        <a:font script="Lisu" typeface="Segoe UI"/>
+        <a:font script="Mymr" typeface="Myanmar Text"/>
+        <a:font script="Nkoo" typeface="Ebrima"/>
+        <a:font script="Olck" typeface="Nirmala UI"/>
+        <a:font script="Osma" typeface="Ebrima"/>
+        <a:font script="Phag" typeface="Phagspa"/>
+        <a:font script="Syrn" typeface="Estrangelo Edessa"/>
+        <a:font script="Syrj" typeface="Estrangelo Edessa"/>
+        <a:font script="Syre" typeface="Estrangelo Edessa"/>
+        <a:font script="Sora" typeface="Nirmala UI"/>
+        <a:font script="Tale" typeface="Microsoft Tai Le"/>
+        <a:font script="Talu" typeface="Microsoft New Tai Lue"/>
+        <a:font script="Tfng" typeface="Ebrima"/>
+      </a:minorFont>
+    </a:fontScheme>
+    <a:fmtScheme name="Office">
+      <a:fillStyleLst>
+        <a:solidFill>
+          <a:schemeClr val="phClr"/>
+        </a:solidFill>
+        <a:gradFill rotWithShape="1">
+          <a:gsLst>
+            <a:gs pos="0">
+              <a:schemeClr val="phClr">
+                <a:lumMod val="110000"/>
+                <a:satMod val="105000"/>
+                <a:tint val="67000"/>
+              </a:schemeClr>
+            </a:gs>
+            <a:gs pos="50000">
+              <a:schemeClr val="phClr">
+                <a:lumMod val="105000"/>
+                <a:satMod val="103000"/>
+                <a:tint val="73000"/>
+              </a:schemeClr>
+            </a:gs>
+            <a:gs pos="100000">
+              <a:schemeClr val="phClr">
+                <a:lumMod val="105000"/>
+                <a:satMod val="109000"/>
+                <a:tint val="81000"/>
+              </a:schemeClr>
+            </a:gs>
+          </a:gsLst>
+          <a:lin ang="5400000" scaled="0"/>
+        </a:gradFill>
+        <a:gradFill rotWithShape="1">
+          <a:gsLst>
+            <a:gs pos="0">
+              <a:schemeClr val="phClr">
+                <a:satMod val="103000"/>
+                <a:lumMod val="102000"/>
+                <a:tint val="94000"/>
+              </a:schemeClr>
+            </a:gs>
+            <a:gs pos="50000">
+              <a:schemeClr val="phClr">
+                <a:satMod val="110000"/>
+                <a:lumMod val="100000"/>
+                <a:shade val="100000"/>
+              </a:schemeClr>
+            </a:gs>
+            <a:gs pos="100000">
+              <a:schemeClr val="phClr">
+                <a:lumMod val="99000"/>
+                <a:satMod val="120000"/>
+                <a:shade val="78000"/>
+              </a:schemeClr>
+            </a:gs>
+          </a:gsLst>
+          <a:lin ang="5400000" scaled="0"/>
+        </a:gradFill>
+      </a:fillStyleLst>
+      <a:lnStyleLst>
+        <a:ln w="6350" cap="flat" cmpd="sng" algn="ctr">
+          <a:solidFill>
+            <a:schemeClr val="phClr"/>
+          </a:solidFill>
+          <a:prstDash val="solid"/>
+          <a:miter lim="800000"/>
+        </a:ln>
+        <a:ln w="12700" cap="flat" cmpd="sng" algn="ctr">
+          <a:solidFill>
+            <a:schemeClr val="phClr"/>
+          </a:solidFill>
+          <a:prstDash val="solid"/>
+          <a:miter lim="800000"/>
+        </a:ln>
+        <a:ln w="19050" cap="flat" cmpd="sng" algn="ctr">
+          <a:solidFill>
+            <a:schemeClr val="phClr"/>
+          </a:solidFill>
+          <a:prstDash val="solid"/>
+          <a:miter lim="800000"/>
+        </a:ln>
+      </a:lnStyleLst>
+      <a:effectStyleLst>
+        <a:effectStyle>
+          <a:effectLst/>
+        </a:effectStyle>
+        <a:effectStyle>
+          <a:effectLst/>
+        </a:effectStyle>
+        <a:effectStyle>
+          <a:effectLst>
+            <a:outerShdw blurRad="57150" dist="19050" dir="5400000" algn="ctr" rotWithShape="0">
+              <a:srgbClr val="000000">
+                <a:alpha val="63000"/>
+              </a:srgbClr>
+            </a:outerShdw>
+          </a:effectLst>
+        </a:effectStyle>
+      </a:effectStyleLst>
+      <a:bgFillStyleLst>
+        <a:solidFill>
+          <a:schemeClr val="phClr"/>
+        </a:solidFill>
+        <a:solidFill>
+          <a:schemeClr val="phClr">
+            <a:tint val="95000"/>
+            <a:satMod val="170000"/>
+          </a:schemeClr>
+        </a:solidFill>
+        <a:gradFill rotWithShape="1">
+          <a:gsLst>
+            <a:gs pos="0">
+              <a:schemeClr val="phClr">
+                <a:tint val="93000"/>
+                <a:satMod val="150000"/>
+                <a:shade val="98000"/>
+                <a:lumMod val="102000"/>
+              </a:schemeClr>
+            </a:gs>
+            <a:gs pos="50000">
+              <a:schemeClr val="phClr">
+                <a:tint val="98000"/>
+                <a:satMod val="130000"/>
+                <a:shade val="90000"/>
+                <a:lumMod val="103000"/>
+              </a:schemeClr>
+            </a:gs>
+            <a:gs pos="100000">
+              <a:schemeClr val="phClr">
+                <a:shade val="63000"/>
+                <a:satMod val="120000"/>
+              </a:schemeClr>
+            </a:gs>
+          </a:gsLst>
+          <a:lin ang="5400000" scaled="0"/>
+        </a:gradFill>
+      </a:bgFillStyleLst>
+    </a:fmtScheme>
+  </a:themeElements>
+  <a:objectDefaults/>
+  <a:extraClrSchemeLst/>
+  <a:extLst>
+    <a:ext uri="{05A4C25C-085E-4340-85A3-A5531E510DB2}">
+      <thm15:themeFamily xmlns:thm15="http://schemas.microsoft.com/office/thememl/2012/main" name="Office Theme" id="{62F939B6-93AF-4DB8-9C6B-D6C7DFDC589F}" vid="{4A3C46E8-61CC-4603-A589-7422A47A8E4A}"/>
+    </a:ext>
+  </a:extLst>
+</a:theme>
 </file>
</xml_diff>

<commit_message>
rotation scaling works almost
</commit_message>
<xml_diff>
--- a/rectangleRotation.pptx
+++ b/rectangleRotation.pptx
@@ -5,14 +5,15 @@
     <p:sldMasterId id="2147483648" r:id="rId1"/>
   </p:sldMasterIdLst>
   <p:notesMasterIdLst>
-    <p:notesMasterId r:id="rId7"/>
+    <p:notesMasterId r:id="rId8"/>
   </p:notesMasterIdLst>
   <p:sldIdLst>
     <p:sldId id="263" r:id="rId2"/>
     <p:sldId id="260" r:id="rId3"/>
-    <p:sldId id="261" r:id="rId4"/>
-    <p:sldId id="262" r:id="rId5"/>
-    <p:sldId id="257" r:id="rId6"/>
+    <p:sldId id="264" r:id="rId4"/>
+    <p:sldId id="261" r:id="rId5"/>
+    <p:sldId id="262" r:id="rId6"/>
+    <p:sldId id="257" r:id="rId7"/>
   </p:sldIdLst>
   <p:sldSz cx="12192000" cy="6858000"/>
   <p:notesSz cx="6858000" cy="9144000"/>
@@ -4882,6 +4883,2238 @@
 </file>
 
 <file path=ppt/slides/slide2.xml><?xml version="1.0" encoding="utf-8"?>
+<p:sld xmlns:a="http://schemas.openxmlformats.org/drawingml/2006/main" xmlns:r="http://schemas.openxmlformats.org/officeDocument/2006/relationships" xmlns:p="http://schemas.openxmlformats.org/presentationml/2006/main">
+  <p:cSld>
+    <p:spTree>
+      <p:nvGrpSpPr>
+        <p:cNvPr id="1" name=""/>
+        <p:cNvGrpSpPr/>
+        <p:nvPr/>
+      </p:nvGrpSpPr>
+      <p:grpSpPr>
+        <a:xfrm>
+          <a:off x="0" y="0"/>
+          <a:ext cx="0" cy="0"/>
+          <a:chOff x="0" y="0"/>
+          <a:chExt cx="0" cy="0"/>
+        </a:xfrm>
+      </p:grpSpPr>
+      <p:sp>
+        <p:nvSpPr>
+          <p:cNvPr id="4" name="Rectangle 3">
+            <a:extLst>
+              <a:ext uri="{FF2B5EF4-FFF2-40B4-BE49-F238E27FC236}">
+                <a16:creationId xmlns:a16="http://schemas.microsoft.com/office/drawing/2014/main" id="{C02BF6B6-025E-8D45-9150-0309B5F42CCB}"/>
+              </a:ext>
+            </a:extLst>
+          </p:cNvPr>
+          <p:cNvSpPr/>
+          <p:nvPr/>
+        </p:nvSpPr>
+        <p:spPr>
+          <a:xfrm>
+            <a:off x="400699" y="1027415"/>
+            <a:ext cx="10705672" cy="4294598"/>
+          </a:xfrm>
+          <a:prstGeom prst="rect">
+            <a:avLst/>
+          </a:prstGeom>
+          <a:solidFill>
+            <a:srgbClr val="4472C4">
+              <a:alpha val="37255"/>
+            </a:srgbClr>
+          </a:solidFill>
+          <a:ln>
+            <a:solidFill>
+              <a:schemeClr val="tx1"/>
+            </a:solidFill>
+          </a:ln>
+        </p:spPr>
+        <p:style>
+          <a:lnRef idx="2">
+            <a:schemeClr val="accent1">
+              <a:shade val="50000"/>
+            </a:schemeClr>
+          </a:lnRef>
+          <a:fillRef idx="1">
+            <a:schemeClr val="accent1"/>
+          </a:fillRef>
+          <a:effectRef idx="0">
+            <a:schemeClr val="accent1"/>
+          </a:effectRef>
+          <a:fontRef idx="minor">
+            <a:schemeClr val="lt1"/>
+          </a:fontRef>
+        </p:style>
+        <p:txBody>
+          <a:bodyPr rtlCol="0" anchor="ctr"/>
+          <a:lstStyle/>
+          <a:p>
+            <a:pPr algn="ctr"/>
+            <a:endParaRPr lang="de-DE" dirty="0"/>
+          </a:p>
+        </p:txBody>
+      </p:sp>
+      <p:sp>
+        <p:nvSpPr>
+          <p:cNvPr id="10" name="Rectangle 9">
+            <a:extLst>
+              <a:ext uri="{FF2B5EF4-FFF2-40B4-BE49-F238E27FC236}">
+                <a16:creationId xmlns:a16="http://schemas.microsoft.com/office/drawing/2014/main" id="{49D2695A-2AFF-914A-AE0F-F66E950C7CD2}"/>
+              </a:ext>
+            </a:extLst>
+          </p:cNvPr>
+          <p:cNvSpPr>
+            <a:spLocks noChangeAspect="1"/>
+          </p:cNvSpPr>
+          <p:nvPr/>
+        </p:nvSpPr>
+        <p:spPr>
+          <a:xfrm rot="575565">
+            <a:off x="2094003" y="1631966"/>
+            <a:ext cx="7351158" cy="3092110"/>
+          </a:xfrm>
+          <a:prstGeom prst="rect">
+            <a:avLst/>
+          </a:prstGeom>
+          <a:solidFill>
+            <a:srgbClr val="FFC000">
+              <a:alpha val="37255"/>
+            </a:srgbClr>
+          </a:solidFill>
+          <a:ln>
+            <a:solidFill>
+              <a:srgbClr val="FF0000"/>
+            </a:solidFill>
+          </a:ln>
+        </p:spPr>
+        <p:style>
+          <a:lnRef idx="2">
+            <a:schemeClr val="accent1">
+              <a:shade val="50000"/>
+            </a:schemeClr>
+          </a:lnRef>
+          <a:fillRef idx="1">
+            <a:schemeClr val="accent1"/>
+          </a:fillRef>
+          <a:effectRef idx="0">
+            <a:schemeClr val="accent1"/>
+          </a:effectRef>
+          <a:fontRef idx="minor">
+            <a:schemeClr val="lt1"/>
+          </a:fontRef>
+        </p:style>
+        <p:txBody>
+          <a:bodyPr rtlCol="0" anchor="ctr"/>
+          <a:lstStyle/>
+          <a:p>
+            <a:pPr algn="ctr"/>
+            <a:endParaRPr lang="de-DE" dirty="0"/>
+          </a:p>
+        </p:txBody>
+      </p:sp>
+      <p:sp>
+        <p:nvSpPr>
+          <p:cNvPr id="16" name="TextBox 15">
+            <a:extLst>
+              <a:ext uri="{FF2B5EF4-FFF2-40B4-BE49-F238E27FC236}">
+                <a16:creationId xmlns:a16="http://schemas.microsoft.com/office/drawing/2014/main" id="{A810F6C6-DEF5-1C43-8A3D-6430AEF7775A}"/>
+              </a:ext>
+            </a:extLst>
+          </p:cNvPr>
+          <p:cNvSpPr txBox="1"/>
+          <p:nvPr/>
+        </p:nvSpPr>
+        <p:spPr>
+          <a:xfrm>
+            <a:off x="3291676" y="920393"/>
+            <a:ext cx="342900" cy="369332"/>
+          </a:xfrm>
+          <a:prstGeom prst="rect">
+            <a:avLst/>
+          </a:prstGeom>
+          <a:noFill/>
+        </p:spPr>
+        <p:txBody>
+          <a:bodyPr wrap="square" rtlCol="0">
+            <a:spAutoFit/>
+          </a:bodyPr>
+          <a:lstStyle/>
+          <a:p>
+            <a:r>
+              <a:rPr lang="el-GR" dirty="0">
+                <a:latin typeface="Consolas" panose="020B0609020204030204" pitchFamily="49" charset="0"/>
+                <a:cs typeface="Consolas" panose="020B0609020204030204" pitchFamily="49" charset="0"/>
+              </a:rPr>
+              <a:t>α</a:t>
+            </a:r>
+            <a:endParaRPr lang="de-DE" dirty="0">
+              <a:latin typeface="Consolas" panose="020B0609020204030204" pitchFamily="49" charset="0"/>
+              <a:cs typeface="Consolas" panose="020B0609020204030204" pitchFamily="49" charset="0"/>
+            </a:endParaRPr>
+          </a:p>
+        </p:txBody>
+      </p:sp>
+      <p:sp>
+        <p:nvSpPr>
+          <p:cNvPr id="20" name="TextBox 19">
+            <a:extLst>
+              <a:ext uri="{FF2B5EF4-FFF2-40B4-BE49-F238E27FC236}">
+                <a16:creationId xmlns:a16="http://schemas.microsoft.com/office/drawing/2014/main" id="{E542551C-F921-9445-B141-B871D5041870}"/>
+              </a:ext>
+            </a:extLst>
+          </p:cNvPr>
+          <p:cNvSpPr txBox="1"/>
+          <p:nvPr/>
+        </p:nvSpPr>
+        <p:spPr>
+          <a:xfrm>
+            <a:off x="3065648" y="1156916"/>
+            <a:ext cx="342900" cy="369332"/>
+          </a:xfrm>
+          <a:prstGeom prst="rect">
+            <a:avLst/>
+          </a:prstGeom>
+          <a:noFill/>
+        </p:spPr>
+        <p:txBody>
+          <a:bodyPr wrap="square" rtlCol="0">
+            <a:spAutoFit/>
+          </a:bodyPr>
+          <a:lstStyle/>
+          <a:p>
+            <a:r>
+              <a:rPr lang="el-GR" dirty="0">
+                <a:latin typeface="Consolas" panose="020B0609020204030204" pitchFamily="49" charset="0"/>
+                <a:cs typeface="Consolas" panose="020B0609020204030204" pitchFamily="49" charset="0"/>
+              </a:rPr>
+              <a:t>β</a:t>
+            </a:r>
+            <a:endParaRPr lang="de-DE" dirty="0">
+              <a:latin typeface="Consolas" panose="020B0609020204030204" pitchFamily="49" charset="0"/>
+              <a:cs typeface="Consolas" panose="020B0609020204030204" pitchFamily="49" charset="0"/>
+            </a:endParaRPr>
+          </a:p>
+        </p:txBody>
+      </p:sp>
+      <p:sp>
+        <p:nvSpPr>
+          <p:cNvPr id="30" name="TextBox 29">
+            <a:extLst>
+              <a:ext uri="{FF2B5EF4-FFF2-40B4-BE49-F238E27FC236}">
+                <a16:creationId xmlns:a16="http://schemas.microsoft.com/office/drawing/2014/main" id="{098F1191-0EF2-3943-946C-6B5A0AEF03FB}"/>
+              </a:ext>
+            </a:extLst>
+          </p:cNvPr>
+          <p:cNvSpPr txBox="1"/>
+          <p:nvPr/>
+        </p:nvSpPr>
+        <p:spPr>
+          <a:xfrm rot="549789">
+            <a:off x="5260381" y="4696133"/>
+            <a:ext cx="693377" cy="369332"/>
+          </a:xfrm>
+          <a:prstGeom prst="rect">
+            <a:avLst/>
+          </a:prstGeom>
+          <a:noFill/>
+        </p:spPr>
+        <p:txBody>
+          <a:bodyPr wrap="square" rtlCol="0">
+            <a:spAutoFit/>
+          </a:bodyPr>
+          <a:lstStyle/>
+          <a:p>
+            <a:r>
+              <a:rPr lang="en-GB" dirty="0" err="1">
+                <a:latin typeface="Consolas" panose="020B0609020204030204" pitchFamily="49" charset="0"/>
+                <a:cs typeface="Consolas" panose="020B0609020204030204" pitchFamily="49" charset="0"/>
+              </a:rPr>
+              <a:t>twm</a:t>
+            </a:r>
+            <a:endParaRPr lang="de-DE" dirty="0">
+              <a:latin typeface="Consolas" panose="020B0609020204030204" pitchFamily="49" charset="0"/>
+              <a:cs typeface="Consolas" panose="020B0609020204030204" pitchFamily="49" charset="0"/>
+            </a:endParaRPr>
+          </a:p>
+        </p:txBody>
+      </p:sp>
+      <p:sp>
+        <p:nvSpPr>
+          <p:cNvPr id="31" name="TextBox 30">
+            <a:extLst>
+              <a:ext uri="{FF2B5EF4-FFF2-40B4-BE49-F238E27FC236}">
+                <a16:creationId xmlns:a16="http://schemas.microsoft.com/office/drawing/2014/main" id="{859B51C3-173D-2941-9465-93397D93D7CD}"/>
+              </a:ext>
+            </a:extLst>
+          </p:cNvPr>
+          <p:cNvSpPr txBox="1"/>
+          <p:nvPr/>
+        </p:nvSpPr>
+        <p:spPr>
+          <a:xfrm rot="583683">
+            <a:off x="9349197" y="3648871"/>
+            <a:ext cx="928684" cy="369332"/>
+          </a:xfrm>
+          <a:prstGeom prst="rect">
+            <a:avLst/>
+          </a:prstGeom>
+          <a:noFill/>
+        </p:spPr>
+        <p:txBody>
+          <a:bodyPr wrap="square" rtlCol="0">
+            <a:spAutoFit/>
+          </a:bodyPr>
+          <a:lstStyle/>
+          <a:p>
+            <a:r>
+              <a:rPr lang="en-GB" dirty="0" err="1"/>
+              <a:t>thm</a:t>
+            </a:r>
+            <a:endParaRPr lang="de-DE" dirty="0"/>
+          </a:p>
+        </p:txBody>
+      </p:sp>
+      <mc:AlternateContent xmlns:mc="http://schemas.openxmlformats.org/markup-compatibility/2006">
+        <mc:Choice xmlns:a14="http://schemas.microsoft.com/office/drawing/2010/main" Requires="a14">
+          <p:sp>
+            <p:nvSpPr>
+              <p:cNvPr id="32" name="TextBox 31">
+                <a:extLst>
+                  <a:ext uri="{FF2B5EF4-FFF2-40B4-BE49-F238E27FC236}">
+                    <a16:creationId xmlns:a16="http://schemas.microsoft.com/office/drawing/2014/main" id="{C0827B7B-6600-B847-B256-E1E080E6764C}"/>
+                  </a:ext>
+                </a:extLst>
+              </p:cNvPr>
+              <p:cNvSpPr txBox="1"/>
+              <p:nvPr/>
+            </p:nvSpPr>
+            <p:spPr>
+              <a:xfrm>
+                <a:off x="6568877" y="248430"/>
+                <a:ext cx="4397293" cy="618246"/>
+              </a:xfrm>
+              <a:prstGeom prst="rect">
+                <a:avLst/>
+              </a:prstGeom>
+              <a:noFill/>
+            </p:spPr>
+            <p:txBody>
+              <a:bodyPr wrap="none" rtlCol="0">
+                <a:spAutoFit/>
+              </a:bodyPr>
+              <a:lstStyle/>
+              <a:p>
+                <a:pPr/>
+                <a14:m>
+                  <m:oMathPara xmlns:m="http://schemas.openxmlformats.org/officeDocument/2006/math">
+                    <m:oMathParaPr>
+                      <m:jc m:val="centerGroup"/>
+                    </m:oMathParaPr>
+                    <m:oMath xmlns:m="http://schemas.openxmlformats.org/officeDocument/2006/math">
+                      <m:func>
+                        <m:funcPr>
+                          <m:ctrlPr>
+                            <a:rPr lang="en-GB" b="0" i="1" smtClean="0">
+                              <a:latin typeface="Cambria Math" panose="02040503050406030204" pitchFamily="18" charset="0"/>
+                            </a:rPr>
+                          </m:ctrlPr>
+                        </m:funcPr>
+                        <m:fName>
+                          <m:r>
+                            <m:rPr>
+                              <m:sty m:val="p"/>
+                            </m:rPr>
+                            <a:rPr lang="en-GB" b="0" i="0" smtClean="0">
+                              <a:latin typeface="Cambria Math" panose="02040503050406030204" pitchFamily="18" charset="0"/>
+                            </a:rPr>
+                            <m:t>sin</m:t>
+                          </m:r>
+                        </m:fName>
+                        <m:e>
+                          <m:d>
+                            <m:dPr>
+                              <m:ctrlPr>
+                                <a:rPr lang="en-GB" b="0" i="1" smtClean="0">
+                                  <a:latin typeface="Cambria Math" panose="02040503050406030204" pitchFamily="18" charset="0"/>
+                                </a:rPr>
+                              </m:ctrlPr>
+                            </m:dPr>
+                            <m:e>
+                              <m:r>
+                                <a:rPr lang="en-GB" b="0" i="1" smtClean="0">
+                                  <a:latin typeface="Cambria Math" panose="02040503050406030204" pitchFamily="18" charset="0"/>
+                                  <a:ea typeface="Cambria Math" panose="02040503050406030204" pitchFamily="18" charset="0"/>
+                                </a:rPr>
+                                <m:t>𝛼</m:t>
+                              </m:r>
+                              <m:r>
+                                <a:rPr lang="en-GB" b="0" i="1" smtClean="0">
+                                  <a:latin typeface="Cambria Math" panose="02040503050406030204" pitchFamily="18" charset="0"/>
+                                  <a:ea typeface="Cambria Math" panose="02040503050406030204" pitchFamily="18" charset="0"/>
+                                </a:rPr>
+                                <m:t>+</m:t>
+                              </m:r>
+                              <m:r>
+                                <m:rPr>
+                                  <m:nor/>
+                                </m:rPr>
+                                <a:rPr lang="el-GR" dirty="0">
+                                  <a:latin typeface="Consolas" panose="020B0609020204030204" pitchFamily="49" charset="0"/>
+                                  <a:cs typeface="Consolas" panose="020B0609020204030204" pitchFamily="49" charset="0"/>
+                                </a:rPr>
+                                <m:t>β</m:t>
+                              </m:r>
+                            </m:e>
+                          </m:d>
+                        </m:e>
+                      </m:func>
+                      <m:r>
+                        <a:rPr lang="en-GB" b="0" i="1" smtClean="0">
+                          <a:latin typeface="Cambria Math" panose="02040503050406030204" pitchFamily="18" charset="0"/>
+                          <a:ea typeface="Cambria Math" panose="02040503050406030204" pitchFamily="18" charset="0"/>
+                        </a:rPr>
+                        <m:t>= </m:t>
+                      </m:r>
+                      <m:f>
+                        <m:fPr>
+                          <m:ctrlPr>
+                            <a:rPr lang="en-GB" b="0" i="1" smtClean="0">
+                              <a:latin typeface="Cambria Math" panose="02040503050406030204" pitchFamily="18" charset="0"/>
+                              <a:ea typeface="Cambria Math" panose="02040503050406030204" pitchFamily="18" charset="0"/>
+                            </a:rPr>
+                          </m:ctrlPr>
+                        </m:fPr>
+                        <m:num>
+                          <m:r>
+                            <a:rPr lang="en-US" b="0" i="1" smtClean="0">
+                              <a:latin typeface="Cambria Math" panose="02040503050406030204" pitchFamily="18" charset="0"/>
+                              <a:ea typeface="Cambria Math" panose="02040503050406030204" pitchFamily="18" charset="0"/>
+                            </a:rPr>
+                            <m:t>𝑡h</m:t>
+                          </m:r>
+                          <m:r>
+                            <a:rPr lang="en-US" b="0" i="1" smtClean="0">
+                              <a:latin typeface="Cambria Math" panose="02040503050406030204" pitchFamily="18" charset="0"/>
+                              <a:ea typeface="Cambria Math" panose="02040503050406030204" pitchFamily="18" charset="0"/>
+                            </a:rPr>
+                            <m:t>𝑟</m:t>
+                          </m:r>
+                        </m:num>
+                        <m:den>
+                          <m:r>
+                            <a:rPr lang="en-GB" b="0" i="1" smtClean="0">
+                              <a:latin typeface="Cambria Math" panose="02040503050406030204" pitchFamily="18" charset="0"/>
+                              <a:ea typeface="Cambria Math" panose="02040503050406030204" pitchFamily="18" charset="0"/>
+                            </a:rPr>
+                            <m:t>𝑑</m:t>
+                          </m:r>
+                        </m:den>
+                      </m:f>
+                      <m:r>
+                        <a:rPr lang="en-GB" b="0" i="1" smtClean="0">
+                          <a:latin typeface="Cambria Math" panose="02040503050406030204" pitchFamily="18" charset="0"/>
+                          <a:ea typeface="Cambria Math" panose="02040503050406030204" pitchFamily="18" charset="0"/>
+                        </a:rPr>
+                        <m:t>   </m:t>
+                      </m:r>
+                      <m:r>
+                        <a:rPr lang="en-US" b="0" i="1" smtClean="0">
+                          <a:latin typeface="Cambria Math" panose="02040503050406030204" pitchFamily="18" charset="0"/>
+                          <a:ea typeface="Cambria Math" panose="02040503050406030204" pitchFamily="18" charset="0"/>
+                        </a:rPr>
+                        <m:t>𝑤𝑖𝑡h</m:t>
+                      </m:r>
+                      <m:r>
+                        <a:rPr lang="en-US" b="0" i="1" smtClean="0">
+                          <a:latin typeface="Cambria Math" panose="02040503050406030204" pitchFamily="18" charset="0"/>
+                          <a:ea typeface="Cambria Math" panose="02040503050406030204" pitchFamily="18" charset="0"/>
+                        </a:rPr>
+                        <m:t> </m:t>
+                      </m:r>
+                      <m:r>
+                        <a:rPr lang="en-US" b="0" i="1" smtClean="0">
+                          <a:latin typeface="Cambria Math" panose="02040503050406030204" pitchFamily="18" charset="0"/>
+                          <a:ea typeface="Cambria Math" panose="02040503050406030204" pitchFamily="18" charset="0"/>
+                        </a:rPr>
+                        <m:t>𝑑</m:t>
+                      </m:r>
+                      <m:r>
+                        <a:rPr lang="en-US" b="0" i="1" smtClean="0">
+                          <a:latin typeface="Cambria Math" panose="02040503050406030204" pitchFamily="18" charset="0"/>
+                          <a:ea typeface="Cambria Math" panose="02040503050406030204" pitchFamily="18" charset="0"/>
+                        </a:rPr>
+                        <m:t>=</m:t>
+                      </m:r>
+                      <m:rad>
+                        <m:radPr>
+                          <m:degHide m:val="on"/>
+                          <m:ctrlPr>
+                            <a:rPr lang="en-US" b="0" i="1" smtClean="0">
+                              <a:latin typeface="Cambria Math" panose="02040503050406030204" pitchFamily="18" charset="0"/>
+                              <a:ea typeface="Cambria Math" panose="02040503050406030204" pitchFamily="18" charset="0"/>
+                            </a:rPr>
+                          </m:ctrlPr>
+                        </m:radPr>
+                        <m:deg/>
+                        <m:e>
+                          <m:sSup>
+                            <m:sSupPr>
+                              <m:ctrlPr>
+                                <a:rPr lang="en-US" b="0" i="1" smtClean="0">
+                                  <a:latin typeface="Cambria Math" panose="02040503050406030204" pitchFamily="18" charset="0"/>
+                                  <a:ea typeface="Cambria Math" panose="02040503050406030204" pitchFamily="18" charset="0"/>
+                                </a:rPr>
+                              </m:ctrlPr>
+                            </m:sSupPr>
+                            <m:e>
+                              <m:sSup>
+                                <m:sSupPr>
+                                  <m:ctrlPr>
+                                    <a:rPr lang="en-US" b="0" i="1" smtClean="0">
+                                      <a:latin typeface="Cambria Math" panose="02040503050406030204" pitchFamily="18" charset="0"/>
+                                      <a:ea typeface="Cambria Math" panose="02040503050406030204" pitchFamily="18" charset="0"/>
+                                    </a:rPr>
+                                  </m:ctrlPr>
+                                </m:sSupPr>
+                                <m:e>
+                                  <m:r>
+                                    <a:rPr lang="en-US" b="0" i="1" smtClean="0">
+                                      <a:latin typeface="Cambria Math" panose="02040503050406030204" pitchFamily="18" charset="0"/>
+                                      <a:ea typeface="Cambria Math" panose="02040503050406030204" pitchFamily="18" charset="0"/>
+                                    </a:rPr>
+                                    <m:t>𝐴</m:t>
+                                  </m:r>
+                                  <m:r>
+                                    <a:rPr lang="en-US" b="0" i="1" smtClean="0">
+                                      <a:latin typeface="Cambria Math" panose="02040503050406030204" pitchFamily="18" charset="0"/>
+                                      <a:ea typeface="Cambria Math" panose="02040503050406030204" pitchFamily="18" charset="0"/>
+                                    </a:rPr>
+                                    <m:t>1</m:t>
+                                  </m:r>
+                                </m:e>
+                                <m:sup>
+                                  <m:r>
+                                    <a:rPr lang="en-US" b="0" i="1" smtClean="0">
+                                      <a:latin typeface="Cambria Math" panose="02040503050406030204" pitchFamily="18" charset="0"/>
+                                      <a:ea typeface="Cambria Math" panose="02040503050406030204" pitchFamily="18" charset="0"/>
+                                    </a:rPr>
+                                    <m:t>2</m:t>
+                                  </m:r>
+                                </m:sup>
+                              </m:sSup>
+                              <m:r>
+                                <a:rPr lang="en-US" b="0" i="1" smtClean="0">
+                                  <a:latin typeface="Cambria Math" panose="02040503050406030204" pitchFamily="18" charset="0"/>
+                                  <a:ea typeface="Cambria Math" panose="02040503050406030204" pitchFamily="18" charset="0"/>
+                                </a:rPr>
+                                <m:t>+</m:t>
+                              </m:r>
+                              <m:r>
+                                <a:rPr lang="en-US" b="0" i="1" smtClean="0">
+                                  <a:latin typeface="Cambria Math" panose="02040503050406030204" pitchFamily="18" charset="0"/>
+                                  <a:ea typeface="Cambria Math" panose="02040503050406030204" pitchFamily="18" charset="0"/>
+                                </a:rPr>
+                                <m:t>𝐵</m:t>
+                              </m:r>
+                              <m:r>
+                                <a:rPr lang="en-US" b="0" i="1" smtClean="0">
+                                  <a:latin typeface="Cambria Math" panose="02040503050406030204" pitchFamily="18" charset="0"/>
+                                  <a:ea typeface="Cambria Math" panose="02040503050406030204" pitchFamily="18" charset="0"/>
+                                </a:rPr>
+                                <m:t>1</m:t>
+                              </m:r>
+                            </m:e>
+                            <m:sup>
+                              <m:r>
+                                <a:rPr lang="en-US" b="0" i="1" smtClean="0">
+                                  <a:latin typeface="Cambria Math" panose="02040503050406030204" pitchFamily="18" charset="0"/>
+                                  <a:ea typeface="Cambria Math" panose="02040503050406030204" pitchFamily="18" charset="0"/>
+                                </a:rPr>
+                                <m:t>2</m:t>
+                              </m:r>
+                            </m:sup>
+                          </m:sSup>
+                        </m:e>
+                      </m:rad>
+                    </m:oMath>
+                  </m:oMathPara>
+                </a14:m>
+                <a:endParaRPr lang="en-US" dirty="0">
+                  <a:latin typeface="Consolas" panose="020B0609020204030204" pitchFamily="49" charset="0"/>
+                  <a:cs typeface="Consolas" panose="020B0609020204030204" pitchFamily="49" charset="0"/>
+                </a:endParaRPr>
+              </a:p>
+            </p:txBody>
+          </p:sp>
+        </mc:Choice>
+        <mc:Fallback>
+          <p:sp>
+            <p:nvSpPr>
+              <p:cNvPr id="32" name="TextBox 31">
+                <a:extLst>
+                  <a:ext uri="{FF2B5EF4-FFF2-40B4-BE49-F238E27FC236}">
+                    <a16:creationId xmlns:a16="http://schemas.microsoft.com/office/drawing/2014/main" id="{C0827B7B-6600-B847-B256-E1E080E6764C}"/>
+                  </a:ext>
+                </a:extLst>
+              </p:cNvPr>
+              <p:cNvSpPr txBox="1">
+                <a:spLocks noRot="1" noChangeAspect="1" noMove="1" noResize="1" noEditPoints="1" noAdjustHandles="1" noChangeArrowheads="1" noChangeShapeType="1" noTextEdit="1"/>
+              </p:cNvSpPr>
+              <p:nvPr/>
+            </p:nvSpPr>
+            <p:spPr>
+              <a:xfrm>
+                <a:off x="6568877" y="248430"/>
+                <a:ext cx="4397293" cy="618246"/>
+              </a:xfrm>
+              <a:prstGeom prst="rect">
+                <a:avLst/>
+              </a:prstGeom>
+              <a:blipFill>
+                <a:blip r:embed="rId2"/>
+                <a:stretch>
+                  <a:fillRect b="-6000"/>
+                </a:stretch>
+              </a:blipFill>
+            </p:spPr>
+            <p:txBody>
+              <a:bodyPr/>
+              <a:lstStyle/>
+              <a:p>
+                <a:r>
+                  <a:rPr lang="en-VN">
+                    <a:noFill/>
+                  </a:rPr>
+                  <a:t> </a:t>
+                </a:r>
+              </a:p>
+            </p:txBody>
+          </p:sp>
+        </mc:Fallback>
+      </mc:AlternateContent>
+      <mc:AlternateContent xmlns:mc="http://schemas.openxmlformats.org/markup-compatibility/2006">
+        <mc:Choice xmlns:a14="http://schemas.microsoft.com/office/drawing/2010/main" Requires="a14">
+          <p:sp>
+            <p:nvSpPr>
+              <p:cNvPr id="35" name="TextBox 34">
+                <a:extLst>
+                  <a:ext uri="{FF2B5EF4-FFF2-40B4-BE49-F238E27FC236}">
+                    <a16:creationId xmlns:a16="http://schemas.microsoft.com/office/drawing/2014/main" id="{335CA84D-80BE-054F-9DF4-A402871A8F70}"/>
+                  </a:ext>
+                </a:extLst>
+              </p:cNvPr>
+              <p:cNvSpPr txBox="1"/>
+              <p:nvPr/>
+            </p:nvSpPr>
+            <p:spPr>
+              <a:xfrm>
+                <a:off x="6278882" y="5341868"/>
+                <a:ext cx="5913118" cy="1427057"/>
+              </a:xfrm>
+              <a:prstGeom prst="rect">
+                <a:avLst/>
+              </a:prstGeom>
+              <a:noFill/>
+            </p:spPr>
+            <p:txBody>
+              <a:bodyPr wrap="square" rtlCol="0">
+                <a:spAutoFit/>
+              </a:bodyPr>
+              <a:lstStyle/>
+              <a:p>
+                <a:pPr algn="ctr"/>
+                <a14:m>
+                  <m:oMathPara xmlns:m="http://schemas.openxmlformats.org/officeDocument/2006/math">
+                    <m:oMathParaPr>
+                      <m:jc m:val="centerGroup"/>
+                    </m:oMathParaPr>
+                    <m:oMath xmlns:m="http://schemas.openxmlformats.org/officeDocument/2006/math">
+                      <m:r>
+                        <m:rPr>
+                          <m:nor/>
+                        </m:rPr>
+                        <a:rPr lang="el-GR" dirty="0" smtClean="0">
+                          <a:latin typeface="Consolas" panose="020B0609020204030204" pitchFamily="49" charset="0"/>
+                          <a:cs typeface="Consolas" panose="020B0609020204030204" pitchFamily="49" charset="0"/>
+                        </a:rPr>
+                        <m:t>β</m:t>
+                      </m:r>
+                      <m:r>
+                        <a:rPr lang="en-US" b="0" i="1" dirty="0" smtClean="0">
+                          <a:latin typeface="Cambria Math" panose="02040503050406030204" pitchFamily="18" charset="0"/>
+                          <a:cs typeface="Consolas" panose="020B0609020204030204" pitchFamily="49" charset="0"/>
+                        </a:rPr>
+                        <m:t>=</m:t>
+                      </m:r>
+                      <m:sSup>
+                        <m:sSupPr>
+                          <m:ctrlPr>
+                            <a:rPr lang="en-US" b="0" i="1" dirty="0" smtClean="0">
+                              <a:latin typeface="Cambria Math" panose="02040503050406030204" pitchFamily="18" charset="0"/>
+                              <a:cs typeface="Consolas" panose="020B0609020204030204" pitchFamily="49" charset="0"/>
+                            </a:rPr>
+                          </m:ctrlPr>
+                        </m:sSupPr>
+                        <m:e>
+                          <m:r>
+                            <a:rPr lang="en-US" b="0" i="1" dirty="0" smtClean="0">
+                              <a:latin typeface="Cambria Math" panose="02040503050406030204" pitchFamily="18" charset="0"/>
+                              <a:cs typeface="Consolas" panose="020B0609020204030204" pitchFamily="49" charset="0"/>
+                            </a:rPr>
+                            <m:t>𝑡𝑎𝑛</m:t>
+                          </m:r>
+                        </m:e>
+                        <m:sup>
+                          <m:r>
+                            <a:rPr lang="en-US" b="0" i="1" dirty="0" smtClean="0">
+                              <a:latin typeface="Cambria Math" panose="02040503050406030204" pitchFamily="18" charset="0"/>
+                              <a:cs typeface="Consolas" panose="020B0609020204030204" pitchFamily="49" charset="0"/>
+                            </a:rPr>
+                            <m:t>−1</m:t>
+                          </m:r>
+                        </m:sup>
+                      </m:sSup>
+                      <m:d>
+                        <m:dPr>
+                          <m:ctrlPr>
+                            <a:rPr lang="en-US" b="0" i="1" dirty="0" smtClean="0">
+                              <a:latin typeface="Cambria Math" panose="02040503050406030204" pitchFamily="18" charset="0"/>
+                              <a:cs typeface="Consolas" panose="020B0609020204030204" pitchFamily="49" charset="0"/>
+                            </a:rPr>
+                          </m:ctrlPr>
+                        </m:dPr>
+                        <m:e>
+                          <m:f>
+                            <m:fPr>
+                              <m:ctrlPr>
+                                <a:rPr lang="en-US" b="0" i="1" dirty="0" smtClean="0">
+                                  <a:latin typeface="Cambria Math" panose="02040503050406030204" pitchFamily="18" charset="0"/>
+                                  <a:cs typeface="Consolas" panose="020B0609020204030204" pitchFamily="49" charset="0"/>
+                                </a:rPr>
+                              </m:ctrlPr>
+                            </m:fPr>
+                            <m:num>
+                              <m:r>
+                                <a:rPr lang="en-US" b="0" i="1" dirty="0" smtClean="0">
+                                  <a:latin typeface="Cambria Math" panose="02040503050406030204" pitchFamily="18" charset="0"/>
+                                  <a:cs typeface="Consolas" panose="020B0609020204030204" pitchFamily="49" charset="0"/>
+                                </a:rPr>
+                                <m:t>𝑡h𝑚</m:t>
+                              </m:r>
+                            </m:num>
+                            <m:den>
+                              <m:r>
+                                <a:rPr lang="en-US" b="0" i="1" dirty="0" smtClean="0">
+                                  <a:latin typeface="Cambria Math" panose="02040503050406030204" pitchFamily="18" charset="0"/>
+                                  <a:cs typeface="Consolas" panose="020B0609020204030204" pitchFamily="49" charset="0"/>
+                                </a:rPr>
+                                <m:t>𝑡𝑤𝑚</m:t>
+                              </m:r>
+                            </m:den>
+                          </m:f>
+                        </m:e>
+                      </m:d>
+                      <m:r>
+                        <a:rPr lang="en-US" b="0" i="1" dirty="0" smtClean="0">
+                          <a:latin typeface="Cambria Math" panose="02040503050406030204" pitchFamily="18" charset="0"/>
+                          <a:cs typeface="Consolas" panose="020B0609020204030204" pitchFamily="49" charset="0"/>
+                        </a:rPr>
+                        <m:t>,  </m:t>
+                      </m:r>
+                      <m:r>
+                        <a:rPr lang="en-US" b="0" i="1" smtClean="0">
+                          <a:latin typeface="Cambria Math" panose="02040503050406030204" pitchFamily="18" charset="0"/>
+                        </a:rPr>
+                        <m:t>𝑡h𝑟</m:t>
+                      </m:r>
+                      <m:r>
+                        <a:rPr lang="en-US" i="1">
+                          <a:latin typeface="Cambria Math" panose="02040503050406030204" pitchFamily="18" charset="0"/>
+                        </a:rPr>
+                        <m:t>=</m:t>
+                      </m:r>
+                      <m:r>
+                        <a:rPr lang="en-US" i="1">
+                          <a:latin typeface="Cambria Math" panose="02040503050406030204" pitchFamily="18" charset="0"/>
+                        </a:rPr>
+                        <m:t>𝑠𝑖𝑛</m:t>
+                      </m:r>
+                      <m:d>
+                        <m:dPr>
+                          <m:ctrlPr>
+                            <a:rPr lang="en-US" i="1">
+                              <a:latin typeface="Cambria Math" panose="02040503050406030204" pitchFamily="18" charset="0"/>
+                            </a:rPr>
+                          </m:ctrlPr>
+                        </m:dPr>
+                        <m:e>
+                          <m:r>
+                            <a:rPr lang="en-GB" i="1">
+                              <a:latin typeface="Cambria Math" panose="02040503050406030204" pitchFamily="18" charset="0"/>
+                              <a:ea typeface="Cambria Math" panose="02040503050406030204" pitchFamily="18" charset="0"/>
+                            </a:rPr>
+                            <m:t>𝛼</m:t>
+                          </m:r>
+                          <m:r>
+                            <a:rPr lang="en-US" i="1">
+                              <a:latin typeface="Cambria Math" panose="02040503050406030204" pitchFamily="18" charset="0"/>
+                              <a:ea typeface="Cambria Math" panose="02040503050406030204" pitchFamily="18" charset="0"/>
+                            </a:rPr>
+                            <m:t>+</m:t>
+                          </m:r>
+                          <m:r>
+                            <m:rPr>
+                              <m:nor/>
+                            </m:rPr>
+                            <a:rPr lang="el-GR" dirty="0">
+                              <a:latin typeface="Consolas" panose="020B0609020204030204" pitchFamily="49" charset="0"/>
+                              <a:cs typeface="Consolas" panose="020B0609020204030204" pitchFamily="49" charset="0"/>
+                            </a:rPr>
+                            <m:t>β</m:t>
+                          </m:r>
+                        </m:e>
+                      </m:d>
+                      <m:rad>
+                        <m:radPr>
+                          <m:degHide m:val="on"/>
+                          <m:ctrlPr>
+                            <a:rPr lang="en-US" i="1">
+                              <a:latin typeface="Cambria Math" panose="02040503050406030204" pitchFamily="18" charset="0"/>
+                              <a:ea typeface="Cambria Math" panose="02040503050406030204" pitchFamily="18" charset="0"/>
+                            </a:rPr>
+                          </m:ctrlPr>
+                        </m:radPr>
+                        <m:deg/>
+                        <m:e>
+                          <m:sSup>
+                            <m:sSupPr>
+                              <m:ctrlPr>
+                                <a:rPr lang="en-US" i="1">
+                                  <a:latin typeface="Cambria Math" panose="02040503050406030204" pitchFamily="18" charset="0"/>
+                                  <a:ea typeface="Cambria Math" panose="02040503050406030204" pitchFamily="18" charset="0"/>
+                                </a:rPr>
+                              </m:ctrlPr>
+                            </m:sSupPr>
+                            <m:e>
+                              <m:sSup>
+                                <m:sSupPr>
+                                  <m:ctrlPr>
+                                    <a:rPr lang="en-US" i="1">
+                                      <a:latin typeface="Cambria Math" panose="02040503050406030204" pitchFamily="18" charset="0"/>
+                                      <a:ea typeface="Cambria Math" panose="02040503050406030204" pitchFamily="18" charset="0"/>
+                                    </a:rPr>
+                                  </m:ctrlPr>
+                                </m:sSupPr>
+                                <m:e>
+                                  <m:r>
+                                    <a:rPr lang="en-US" b="0" i="1" smtClean="0">
+                                      <a:latin typeface="Cambria Math" panose="02040503050406030204" pitchFamily="18" charset="0"/>
+                                      <a:ea typeface="Cambria Math" panose="02040503050406030204" pitchFamily="18" charset="0"/>
+                                    </a:rPr>
+                                    <m:t>𝑡𝑤𝑚</m:t>
+                                  </m:r>
+                                </m:e>
+                                <m:sup>
+                                  <m:r>
+                                    <a:rPr lang="en-US" i="1">
+                                      <a:latin typeface="Cambria Math" panose="02040503050406030204" pitchFamily="18" charset="0"/>
+                                      <a:ea typeface="Cambria Math" panose="02040503050406030204" pitchFamily="18" charset="0"/>
+                                    </a:rPr>
+                                    <m:t>2</m:t>
+                                  </m:r>
+                                </m:sup>
+                              </m:sSup>
+                              <m:r>
+                                <a:rPr lang="en-US" i="1">
+                                  <a:latin typeface="Cambria Math" panose="02040503050406030204" pitchFamily="18" charset="0"/>
+                                  <a:ea typeface="Cambria Math" panose="02040503050406030204" pitchFamily="18" charset="0"/>
+                                </a:rPr>
+                                <m:t>+</m:t>
+                              </m:r>
+                              <m:r>
+                                <a:rPr lang="en-US" b="0" i="1" smtClean="0">
+                                  <a:latin typeface="Cambria Math" panose="02040503050406030204" pitchFamily="18" charset="0"/>
+                                  <a:ea typeface="Cambria Math" panose="02040503050406030204" pitchFamily="18" charset="0"/>
+                                </a:rPr>
+                                <m:t>𝑡h𝑚</m:t>
+                              </m:r>
+                            </m:e>
+                            <m:sup>
+                              <m:r>
+                                <a:rPr lang="en-US" i="1">
+                                  <a:latin typeface="Cambria Math" panose="02040503050406030204" pitchFamily="18" charset="0"/>
+                                  <a:ea typeface="Cambria Math" panose="02040503050406030204" pitchFamily="18" charset="0"/>
+                                </a:rPr>
+                                <m:t>2</m:t>
+                              </m:r>
+                            </m:sup>
+                          </m:sSup>
+                        </m:e>
+                      </m:rad>
+                      <m:r>
+                        <m:rPr>
+                          <m:nor/>
+                        </m:rPr>
+                        <a:rPr lang="en-US" b="0" i="0" smtClean="0">
+                          <a:latin typeface="Cambria Math" panose="02040503050406030204" pitchFamily="18" charset="0"/>
+                          <a:ea typeface="Cambria Math" panose="02040503050406030204" pitchFamily="18" charset="0"/>
+                        </a:rPr>
+                        <m:t>  </m:t>
+                      </m:r>
+                    </m:oMath>
+                    <m:oMath xmlns:m="http://schemas.openxmlformats.org/officeDocument/2006/math">
+                      <m:r>
+                        <m:rPr>
+                          <m:nor/>
+                        </m:rPr>
+                        <a:rPr lang="en-US" dirty="0">
+                          <a:latin typeface="Cambria Math" panose="02040503050406030204" pitchFamily="18" charset="0"/>
+                          <a:cs typeface="Consolas" panose="020B0609020204030204" pitchFamily="49" charset="0"/>
+                        </a:rPr>
+                        <m:t>RotationFactor</m:t>
+                      </m:r>
+                      <m:r>
+                        <m:rPr>
+                          <m:nor/>
+                        </m:rPr>
+                        <a:rPr lang="en-US" b="0" i="0" dirty="0" smtClean="0">
+                          <a:latin typeface="Cambria Math" panose="02040503050406030204" pitchFamily="18" charset="0"/>
+                          <a:cs typeface="Consolas" panose="020B0609020204030204" pitchFamily="49" charset="0"/>
+                        </a:rPr>
+                        <m:t>Vertical</m:t>
+                      </m:r>
+                      <m:r>
+                        <m:rPr>
+                          <m:nor/>
+                        </m:rPr>
+                        <a:rPr lang="en-US" b="0" i="0" dirty="0" smtClean="0">
+                          <a:latin typeface="Consolas" panose="020B0609020204030204" pitchFamily="49" charset="0"/>
+                          <a:cs typeface="Consolas" panose="020B0609020204030204" pitchFamily="49" charset="0"/>
+                        </a:rPr>
+                        <m:t> = </m:t>
+                      </m:r>
+                      <m:r>
+                        <m:rPr>
+                          <m:nor/>
+                        </m:rPr>
+                        <a:rPr lang="en-US" b="0" i="0" dirty="0" smtClean="0">
+                          <a:latin typeface="Consolas" panose="020B0609020204030204" pitchFamily="49" charset="0"/>
+                          <a:cs typeface="Consolas" panose="020B0609020204030204" pitchFamily="49" charset="0"/>
+                        </a:rPr>
+                        <m:t>srv</m:t>
+                      </m:r>
+                      <m:r>
+                        <a:rPr lang="en-GB" i="1">
+                          <a:latin typeface="Cambria Math" panose="02040503050406030204" pitchFamily="18" charset="0"/>
+                        </a:rPr>
+                        <m:t>=</m:t>
+                      </m:r>
+                      <m:f>
+                        <m:fPr>
+                          <m:ctrlPr>
+                            <a:rPr lang="en-GB" i="1">
+                              <a:latin typeface="Cambria Math" panose="02040503050406030204" pitchFamily="18" charset="0"/>
+                            </a:rPr>
+                          </m:ctrlPr>
+                        </m:fPr>
+                        <m:num>
+                          <m:r>
+                            <a:rPr lang="en-US" i="1">
+                              <a:latin typeface="Cambria Math" panose="02040503050406030204" pitchFamily="18" charset="0"/>
+                            </a:rPr>
+                            <m:t>𝑡h𝑚</m:t>
+                          </m:r>
+                        </m:num>
+                        <m:den>
+                          <m:r>
+                            <a:rPr lang="en-US" i="1">
+                              <a:latin typeface="Cambria Math" panose="02040503050406030204" pitchFamily="18" charset="0"/>
+                            </a:rPr>
+                            <m:t>𝑡h𝑟</m:t>
+                          </m:r>
+                        </m:den>
+                      </m:f>
+                    </m:oMath>
+                  </m:oMathPara>
+                </a14:m>
+                <a:endParaRPr lang="en-US" dirty="0">
+                  <a:latin typeface="Consolas" panose="020B0609020204030204" pitchFamily="49" charset="0"/>
+                  <a:cs typeface="Consolas" panose="020B0609020204030204" pitchFamily="49" charset="0"/>
+                </a:endParaRPr>
+              </a:p>
+              <a:p>
+                <a:pPr algn="ctr"/>
+                <a:endParaRPr lang="en-US" dirty="0">
+                  <a:latin typeface="Consolas" panose="020B0609020204030204" pitchFamily="49" charset="0"/>
+                  <a:cs typeface="Consolas" panose="020B0609020204030204" pitchFamily="49" charset="0"/>
+                </a:endParaRPr>
+              </a:p>
+            </p:txBody>
+          </p:sp>
+        </mc:Choice>
+        <mc:Fallback>
+          <p:sp>
+            <p:nvSpPr>
+              <p:cNvPr id="35" name="TextBox 34">
+                <a:extLst>
+                  <a:ext uri="{FF2B5EF4-FFF2-40B4-BE49-F238E27FC236}">
+                    <a16:creationId xmlns:a16="http://schemas.microsoft.com/office/drawing/2014/main" id="{335CA84D-80BE-054F-9DF4-A402871A8F70}"/>
+                  </a:ext>
+                </a:extLst>
+              </p:cNvPr>
+              <p:cNvSpPr txBox="1">
+                <a:spLocks noRot="1" noChangeAspect="1" noMove="1" noResize="1" noEditPoints="1" noAdjustHandles="1" noChangeArrowheads="1" noChangeShapeType="1" noTextEdit="1"/>
+              </p:cNvSpPr>
+              <p:nvPr/>
+            </p:nvSpPr>
+            <p:spPr>
+              <a:xfrm>
+                <a:off x="6278882" y="5341868"/>
+                <a:ext cx="5913118" cy="1427057"/>
+              </a:xfrm>
+              <a:prstGeom prst="rect">
+                <a:avLst/>
+              </a:prstGeom>
+              <a:blipFill>
+                <a:blip r:embed="rId3"/>
+                <a:stretch>
+                  <a:fillRect/>
+                </a:stretch>
+              </a:blipFill>
+            </p:spPr>
+            <p:txBody>
+              <a:bodyPr/>
+              <a:lstStyle/>
+              <a:p>
+                <a:r>
+                  <a:rPr lang="en-VN">
+                    <a:noFill/>
+                  </a:rPr>
+                  <a:t> </a:t>
+                </a:r>
+              </a:p>
+            </p:txBody>
+          </p:sp>
+        </mc:Fallback>
+      </mc:AlternateContent>
+      <p:cxnSp>
+        <p:nvCxnSpPr>
+          <p:cNvPr id="38" name="Straight Connector 37">
+            <a:extLst>
+              <a:ext uri="{FF2B5EF4-FFF2-40B4-BE49-F238E27FC236}">
+                <a16:creationId xmlns:a16="http://schemas.microsoft.com/office/drawing/2014/main" id="{35C14695-3F9D-7E45-B75B-1728B794F7F4}"/>
+              </a:ext>
+            </a:extLst>
+          </p:cNvPr>
+          <p:cNvCxnSpPr/>
+          <p:nvPr/>
+        </p:nvCxnSpPr>
+        <p:spPr>
+          <a:xfrm flipV="1">
+            <a:off x="9133309" y="1041071"/>
+            <a:ext cx="0" cy="4273900"/>
+          </a:xfrm>
+          <a:prstGeom prst="line">
+            <a:avLst/>
+          </a:prstGeom>
+          <a:ln w="28575">
+            <a:solidFill>
+              <a:schemeClr val="tx1"/>
+            </a:solidFill>
+            <a:prstDash val="dash"/>
+          </a:ln>
+        </p:spPr>
+        <p:style>
+          <a:lnRef idx="1">
+            <a:schemeClr val="accent1"/>
+          </a:lnRef>
+          <a:fillRef idx="0">
+            <a:schemeClr val="accent1"/>
+          </a:fillRef>
+          <a:effectRef idx="0">
+            <a:schemeClr val="accent1"/>
+          </a:effectRef>
+          <a:fontRef idx="minor">
+            <a:schemeClr val="tx1"/>
+          </a:fontRef>
+        </p:style>
+      </p:cxnSp>
+      <p:cxnSp>
+        <p:nvCxnSpPr>
+          <p:cNvPr id="25" name="Straight Connector 24">
+            <a:extLst>
+              <a:ext uri="{FF2B5EF4-FFF2-40B4-BE49-F238E27FC236}">
+                <a16:creationId xmlns:a16="http://schemas.microsoft.com/office/drawing/2014/main" id="{15FB0CE4-7621-064C-BCD0-CE3F9F5994AA}"/>
+              </a:ext>
+            </a:extLst>
+          </p:cNvPr>
+          <p:cNvCxnSpPr>
+            <a:cxnSpLocks/>
+          </p:cNvCxnSpPr>
+          <p:nvPr/>
+        </p:nvCxnSpPr>
+        <p:spPr>
+          <a:xfrm rot="575565">
+            <a:off x="2071745" y="1609708"/>
+            <a:ext cx="7351158" cy="3092110"/>
+          </a:xfrm>
+          <a:prstGeom prst="line">
+            <a:avLst/>
+          </a:prstGeom>
+          <a:ln>
+            <a:solidFill>
+              <a:srgbClr val="FF0000"/>
+            </a:solidFill>
+          </a:ln>
+        </p:spPr>
+        <p:style>
+          <a:lnRef idx="1">
+            <a:schemeClr val="accent1"/>
+          </a:lnRef>
+          <a:fillRef idx="0">
+            <a:schemeClr val="accent1"/>
+          </a:fillRef>
+          <a:effectRef idx="0">
+            <a:schemeClr val="accent1"/>
+          </a:effectRef>
+          <a:fontRef idx="minor">
+            <a:schemeClr val="tx1"/>
+          </a:fontRef>
+        </p:style>
+      </p:cxnSp>
+      <p:sp>
+        <p:nvSpPr>
+          <p:cNvPr id="27" name="Rounded Rectangular Callout 26">
+            <a:extLst>
+              <a:ext uri="{FF2B5EF4-FFF2-40B4-BE49-F238E27FC236}">
+                <a16:creationId xmlns:a16="http://schemas.microsoft.com/office/drawing/2014/main" id="{2B0E5EFA-324B-084B-88F9-1DAEB1A1D872}"/>
+              </a:ext>
+            </a:extLst>
+          </p:cNvPr>
+          <p:cNvSpPr/>
+          <p:nvPr/>
+        </p:nvSpPr>
+        <p:spPr>
+          <a:xfrm>
+            <a:off x="6721754" y="2921271"/>
+            <a:ext cx="556181" cy="376978"/>
+          </a:xfrm>
+          <a:prstGeom prst="wedgeRoundRectCallout">
+            <a:avLst>
+              <a:gd name="adj1" fmla="val -158706"/>
+              <a:gd name="adj2" fmla="val 62529"/>
+              <a:gd name="adj3" fmla="val 16667"/>
+            </a:avLst>
+          </a:prstGeom>
+          <a:noFill/>
+        </p:spPr>
+        <p:style>
+          <a:lnRef idx="2">
+            <a:schemeClr val="accent1">
+              <a:shade val="50000"/>
+            </a:schemeClr>
+          </a:lnRef>
+          <a:fillRef idx="1">
+            <a:schemeClr val="accent1"/>
+          </a:fillRef>
+          <a:effectRef idx="0">
+            <a:schemeClr val="accent1"/>
+          </a:effectRef>
+          <a:fontRef idx="minor">
+            <a:schemeClr val="lt1"/>
+          </a:fontRef>
+        </p:style>
+        <p:txBody>
+          <a:bodyPr rtlCol="0" anchor="ctr"/>
+          <a:lstStyle/>
+          <a:p>
+            <a:pPr algn="ctr"/>
+            <a:r>
+              <a:rPr lang="de-DE" dirty="0">
+                <a:solidFill>
+                  <a:sysClr val="windowText" lastClr="000000"/>
+                </a:solidFill>
+              </a:rPr>
+              <a:t>d</a:t>
+            </a:r>
+          </a:p>
+        </p:txBody>
+      </p:sp>
+      <p:sp>
+        <p:nvSpPr>
+          <p:cNvPr id="37" name="TextBox 36">
+            <a:extLst>
+              <a:ext uri="{FF2B5EF4-FFF2-40B4-BE49-F238E27FC236}">
+                <a16:creationId xmlns:a16="http://schemas.microsoft.com/office/drawing/2014/main" id="{5861C22F-90CC-CC4E-A2DA-ACE566B8C61A}"/>
+              </a:ext>
+            </a:extLst>
+          </p:cNvPr>
+          <p:cNvSpPr txBox="1"/>
+          <p:nvPr/>
+        </p:nvSpPr>
+        <p:spPr>
+          <a:xfrm>
+            <a:off x="9133309" y="1380621"/>
+            <a:ext cx="873597" cy="369332"/>
+          </a:xfrm>
+          <a:prstGeom prst="rect">
+            <a:avLst/>
+          </a:prstGeom>
+          <a:noFill/>
+        </p:spPr>
+        <p:txBody>
+          <a:bodyPr wrap="square" rtlCol="0">
+            <a:spAutoFit/>
+          </a:bodyPr>
+          <a:lstStyle/>
+          <a:p>
+            <a:r>
+              <a:rPr lang="en-GB" dirty="0" err="1">
+                <a:latin typeface="Consolas" panose="020B0609020204030204" pitchFamily="49" charset="0"/>
+                <a:cs typeface="Consolas" panose="020B0609020204030204" pitchFamily="49" charset="0"/>
+              </a:rPr>
+              <a:t>thr</a:t>
+            </a:r>
+            <a:endParaRPr lang="de-DE" dirty="0">
+              <a:latin typeface="Consolas" panose="020B0609020204030204" pitchFamily="49" charset="0"/>
+              <a:cs typeface="Consolas" panose="020B0609020204030204" pitchFamily="49" charset="0"/>
+            </a:endParaRPr>
+          </a:p>
+        </p:txBody>
+      </p:sp>
+      <mc:AlternateContent xmlns:mc="http://schemas.openxmlformats.org/markup-compatibility/2006">
+        <mc:Choice xmlns:a14="http://schemas.microsoft.com/office/drawing/2010/main" Requires="a14">
+          <p:sp>
+            <p:nvSpPr>
+              <p:cNvPr id="18" name="TextBox 17">
+                <a:extLst>
+                  <a:ext uri="{FF2B5EF4-FFF2-40B4-BE49-F238E27FC236}">
+                    <a16:creationId xmlns:a16="http://schemas.microsoft.com/office/drawing/2014/main" id="{689176F6-71B6-9A48-B045-CAA132129BF2}"/>
+                  </a:ext>
+                </a:extLst>
+              </p:cNvPr>
+              <p:cNvSpPr txBox="1"/>
+              <p:nvPr/>
+            </p:nvSpPr>
+            <p:spPr>
+              <a:xfrm>
+                <a:off x="4616813" y="321905"/>
+                <a:ext cx="1479187" cy="491288"/>
+              </a:xfrm>
+              <a:prstGeom prst="rect">
+                <a:avLst/>
+              </a:prstGeom>
+              <a:noFill/>
+            </p:spPr>
+            <p:txBody>
+              <a:bodyPr wrap="none" rtlCol="0">
+                <a:spAutoFit/>
+              </a:bodyPr>
+              <a:lstStyle/>
+              <a:p>
+                <a:r>
+                  <a:rPr lang="en-US" b="0" dirty="0"/>
+                  <a:t>tan</a:t>
+                </a:r>
+                <a14:m>
+                  <m:oMath xmlns:m="http://schemas.openxmlformats.org/officeDocument/2006/math">
+                    <m:d>
+                      <m:dPr>
+                        <m:ctrlPr>
+                          <a:rPr lang="en-US" b="0" i="1" smtClean="0">
+                            <a:latin typeface="Cambria Math" panose="02040503050406030204" pitchFamily="18" charset="0"/>
+                          </a:rPr>
+                        </m:ctrlPr>
+                      </m:dPr>
+                      <m:e>
+                        <m:r>
+                          <m:rPr>
+                            <m:nor/>
+                          </m:rPr>
+                          <a:rPr lang="el-GR" dirty="0"/>
+                          <m:t>β</m:t>
+                        </m:r>
+                      </m:e>
+                    </m:d>
+                    <m:r>
+                      <a:rPr lang="en-US" b="0" i="1" dirty="0" smtClean="0">
+                        <a:latin typeface="Cambria Math" panose="02040503050406030204" pitchFamily="18" charset="0"/>
+                      </a:rPr>
+                      <m:t>=</m:t>
+                    </m:r>
+                    <m:f>
+                      <m:fPr>
+                        <m:ctrlPr>
+                          <a:rPr lang="en-US" b="0" i="1" dirty="0" smtClean="0">
+                            <a:latin typeface="Cambria Math" panose="02040503050406030204" pitchFamily="18" charset="0"/>
+                          </a:rPr>
+                        </m:ctrlPr>
+                      </m:fPr>
+                      <m:num>
+                        <m:r>
+                          <a:rPr lang="en-US" b="0" i="1" dirty="0" smtClean="0">
+                            <a:latin typeface="Cambria Math" panose="02040503050406030204" pitchFamily="18" charset="0"/>
+                          </a:rPr>
+                          <m:t>𝑡h𝑚</m:t>
+                        </m:r>
+                      </m:num>
+                      <m:den>
+                        <m:r>
+                          <a:rPr lang="en-US" b="0" i="1" dirty="0" smtClean="0">
+                            <a:latin typeface="Cambria Math" panose="02040503050406030204" pitchFamily="18" charset="0"/>
+                          </a:rPr>
+                          <m:t>𝑡𝑤𝑚</m:t>
+                        </m:r>
+                      </m:den>
+                    </m:f>
+                  </m:oMath>
+                </a14:m>
+                <a:endParaRPr lang="en-US" dirty="0"/>
+              </a:p>
+            </p:txBody>
+          </p:sp>
+        </mc:Choice>
+        <mc:Fallback>
+          <p:sp>
+            <p:nvSpPr>
+              <p:cNvPr id="18" name="TextBox 17">
+                <a:extLst>
+                  <a:ext uri="{FF2B5EF4-FFF2-40B4-BE49-F238E27FC236}">
+                    <a16:creationId xmlns:a16="http://schemas.microsoft.com/office/drawing/2014/main" id="{689176F6-71B6-9A48-B045-CAA132129BF2}"/>
+                  </a:ext>
+                </a:extLst>
+              </p:cNvPr>
+              <p:cNvSpPr txBox="1">
+                <a:spLocks noRot="1" noChangeAspect="1" noMove="1" noResize="1" noEditPoints="1" noAdjustHandles="1" noChangeArrowheads="1" noChangeShapeType="1" noTextEdit="1"/>
+              </p:cNvSpPr>
+              <p:nvPr/>
+            </p:nvSpPr>
+            <p:spPr>
+              <a:xfrm>
+                <a:off x="4616813" y="321905"/>
+                <a:ext cx="1479187" cy="491288"/>
+              </a:xfrm>
+              <a:prstGeom prst="rect">
+                <a:avLst/>
+              </a:prstGeom>
+              <a:blipFill>
+                <a:blip r:embed="rId4"/>
+                <a:stretch>
+                  <a:fillRect l="-3390" b="-10256"/>
+                </a:stretch>
+              </a:blipFill>
+            </p:spPr>
+            <p:txBody>
+              <a:bodyPr/>
+              <a:lstStyle/>
+              <a:p>
+                <a:r>
+                  <a:rPr lang="en-VN">
+                    <a:noFill/>
+                  </a:rPr>
+                  <a:t> </a:t>
+                </a:r>
+              </a:p>
+            </p:txBody>
+          </p:sp>
+        </mc:Fallback>
+      </mc:AlternateContent>
+      <p:cxnSp>
+        <p:nvCxnSpPr>
+          <p:cNvPr id="26" name="Straight Connector 25">
+            <a:extLst>
+              <a:ext uri="{FF2B5EF4-FFF2-40B4-BE49-F238E27FC236}">
+                <a16:creationId xmlns:a16="http://schemas.microsoft.com/office/drawing/2014/main" id="{49F6CC71-AA06-9041-AAC3-1310B36066E5}"/>
+              </a:ext>
+            </a:extLst>
+          </p:cNvPr>
+          <p:cNvCxnSpPr>
+            <a:cxnSpLocks/>
+          </p:cNvCxnSpPr>
+          <p:nvPr/>
+        </p:nvCxnSpPr>
+        <p:spPr>
+          <a:xfrm flipH="1">
+            <a:off x="1865499" y="2299917"/>
+            <a:ext cx="7774779" cy="11129"/>
+          </a:xfrm>
+          <a:prstGeom prst="line">
+            <a:avLst/>
+          </a:prstGeom>
+          <a:ln w="28575">
+            <a:solidFill>
+              <a:schemeClr val="tx1"/>
+            </a:solidFill>
+            <a:prstDash val="dash"/>
+          </a:ln>
+        </p:spPr>
+        <p:style>
+          <a:lnRef idx="1">
+            <a:schemeClr val="accent1"/>
+          </a:lnRef>
+          <a:fillRef idx="0">
+            <a:schemeClr val="accent1"/>
+          </a:fillRef>
+          <a:effectRef idx="0">
+            <a:schemeClr val="accent1"/>
+          </a:effectRef>
+          <a:fontRef idx="minor">
+            <a:schemeClr val="tx1"/>
+          </a:fontRef>
+        </p:style>
+      </p:cxnSp>
+      <mc:AlternateContent xmlns:mc="http://schemas.openxmlformats.org/markup-compatibility/2006">
+        <mc:Choice xmlns:a14="http://schemas.microsoft.com/office/drawing/2010/main" Requires="a14">
+          <p:sp>
+            <p:nvSpPr>
+              <p:cNvPr id="19" name="TextBox 18">
+                <a:extLst>
+                  <a:ext uri="{FF2B5EF4-FFF2-40B4-BE49-F238E27FC236}">
+                    <a16:creationId xmlns:a16="http://schemas.microsoft.com/office/drawing/2014/main" id="{F25CAF17-870D-DB4D-8A67-C8D37F6D10ED}"/>
+                  </a:ext>
+                </a:extLst>
+              </p:cNvPr>
+              <p:cNvSpPr txBox="1"/>
+              <p:nvPr/>
+            </p:nvSpPr>
+            <p:spPr>
+              <a:xfrm>
+                <a:off x="182882" y="5320416"/>
+                <a:ext cx="5913118" cy="1151277"/>
+              </a:xfrm>
+              <a:prstGeom prst="rect">
+                <a:avLst/>
+              </a:prstGeom>
+              <a:noFill/>
+            </p:spPr>
+            <p:txBody>
+              <a:bodyPr wrap="square" rtlCol="0">
+                <a:spAutoFit/>
+              </a:bodyPr>
+              <a:lstStyle/>
+              <a:p>
+                <a:pPr algn="ctr"/>
+                <a14:m>
+                  <m:oMathPara xmlns:m="http://schemas.openxmlformats.org/officeDocument/2006/math">
+                    <m:oMathParaPr>
+                      <m:jc m:val="centerGroup"/>
+                    </m:oMathParaPr>
+                    <m:oMath xmlns:m="http://schemas.openxmlformats.org/officeDocument/2006/math">
+                      <m:r>
+                        <a:rPr lang="en-US" b="0" i="1" dirty="0" smtClean="0">
+                          <a:latin typeface="Cambria Math" panose="02040503050406030204" pitchFamily="18" charset="0"/>
+                          <a:cs typeface="Consolas" panose="020B0609020204030204" pitchFamily="49" charset="0"/>
+                        </a:rPr>
+                        <m:t>𝑡𝑟𝑤</m:t>
+                      </m:r>
+                      <m:r>
+                        <a:rPr lang="en-US" b="0" i="1" dirty="0" smtClean="0">
+                          <a:latin typeface="Cambria Math" panose="02040503050406030204" pitchFamily="18" charset="0"/>
+                          <a:cs typeface="Consolas" panose="020B0609020204030204" pitchFamily="49" charset="0"/>
+                        </a:rPr>
+                        <m:t>1=</m:t>
+                      </m:r>
+                      <m:func>
+                        <m:funcPr>
+                          <m:ctrlPr>
+                            <a:rPr lang="en-US" i="1" dirty="0">
+                              <a:latin typeface="Cambria Math" panose="02040503050406030204" pitchFamily="18" charset="0"/>
+                              <a:cs typeface="Consolas" panose="020B0609020204030204" pitchFamily="49" charset="0"/>
+                            </a:rPr>
+                          </m:ctrlPr>
+                        </m:funcPr>
+                        <m:fName>
+                          <m:r>
+                            <m:rPr>
+                              <m:sty m:val="p"/>
+                            </m:rPr>
+                            <a:rPr lang="en-US" dirty="0">
+                              <a:latin typeface="Cambria Math" panose="02040503050406030204" pitchFamily="18" charset="0"/>
+                              <a:cs typeface="Consolas" panose="020B0609020204030204" pitchFamily="49" charset="0"/>
+                            </a:rPr>
+                            <m:t>sin</m:t>
+                          </m:r>
+                        </m:fName>
+                        <m:e>
+                          <m:d>
+                            <m:dPr>
+                              <m:ctrlPr>
+                                <a:rPr lang="en-US" i="1" dirty="0">
+                                  <a:latin typeface="Cambria Math" panose="02040503050406030204" pitchFamily="18" charset="0"/>
+                                  <a:cs typeface="Consolas" panose="020B0609020204030204" pitchFamily="49" charset="0"/>
+                                </a:rPr>
+                              </m:ctrlPr>
+                            </m:dPr>
+                            <m:e>
+                              <m:r>
+                                <a:rPr lang="en-GB" i="1">
+                                  <a:latin typeface="Cambria Math" panose="02040503050406030204" pitchFamily="18" charset="0"/>
+                                  <a:ea typeface="Cambria Math" panose="02040503050406030204" pitchFamily="18" charset="0"/>
+                                </a:rPr>
+                                <m:t>𝛼</m:t>
+                              </m:r>
+                            </m:e>
+                          </m:d>
+                        </m:e>
+                      </m:func>
+                      <m:r>
+                        <a:rPr lang="en-US" i="1" dirty="0">
+                          <a:latin typeface="Cambria Math" panose="02040503050406030204" pitchFamily="18" charset="0"/>
+                          <a:ea typeface="Cambria Math" panose="02040503050406030204" pitchFamily="18" charset="0"/>
+                        </a:rPr>
+                        <m:t>𝑡h𝑚</m:t>
+                      </m:r>
+                      <m:r>
+                        <a:rPr lang="en-US" b="0" i="1" dirty="0" smtClean="0">
+                          <a:latin typeface="Cambria Math" panose="02040503050406030204" pitchFamily="18" charset="0"/>
+                          <a:ea typeface="Cambria Math" panose="02040503050406030204" pitchFamily="18" charset="0"/>
+                        </a:rPr>
+                        <m:t>,  </m:t>
+                      </m:r>
+                      <m:r>
+                        <a:rPr lang="en-US" b="0" i="1" dirty="0" smtClean="0">
+                          <a:latin typeface="Cambria Math" panose="02040503050406030204" pitchFamily="18" charset="0"/>
+                          <a:ea typeface="Cambria Math" panose="02040503050406030204" pitchFamily="18" charset="0"/>
+                        </a:rPr>
+                        <m:t>𝑡𝑟𝑤</m:t>
+                      </m:r>
+                      <m:r>
+                        <a:rPr lang="en-US" b="0" i="1" dirty="0" smtClean="0">
+                          <a:latin typeface="Cambria Math" panose="02040503050406030204" pitchFamily="18" charset="0"/>
+                          <a:ea typeface="Cambria Math" panose="02040503050406030204" pitchFamily="18" charset="0"/>
+                        </a:rPr>
+                        <m:t>2=</m:t>
+                      </m:r>
+                      <m:func>
+                        <m:funcPr>
+                          <m:ctrlPr>
+                            <a:rPr lang="en-US" i="1" dirty="0">
+                              <a:latin typeface="Cambria Math" panose="02040503050406030204" pitchFamily="18" charset="0"/>
+                              <a:cs typeface="Consolas" panose="020B0609020204030204" pitchFamily="49" charset="0"/>
+                            </a:rPr>
+                          </m:ctrlPr>
+                        </m:funcPr>
+                        <m:fName>
+                          <m:r>
+                            <m:rPr>
+                              <m:sty m:val="p"/>
+                            </m:rPr>
+                            <a:rPr lang="en-US" dirty="0">
+                              <a:latin typeface="Cambria Math" panose="02040503050406030204" pitchFamily="18" charset="0"/>
+                              <a:cs typeface="Consolas" panose="020B0609020204030204" pitchFamily="49" charset="0"/>
+                            </a:rPr>
+                            <m:t>cos</m:t>
+                          </m:r>
+                        </m:fName>
+                        <m:e>
+                          <m:d>
+                            <m:dPr>
+                              <m:ctrlPr>
+                                <a:rPr lang="en-US" i="1" dirty="0">
+                                  <a:latin typeface="Cambria Math" panose="02040503050406030204" pitchFamily="18" charset="0"/>
+                                  <a:cs typeface="Consolas" panose="020B0609020204030204" pitchFamily="49" charset="0"/>
+                                </a:rPr>
+                              </m:ctrlPr>
+                            </m:dPr>
+                            <m:e>
+                              <m:r>
+                                <a:rPr lang="en-GB" i="1">
+                                  <a:latin typeface="Cambria Math" panose="02040503050406030204" pitchFamily="18" charset="0"/>
+                                  <a:ea typeface="Cambria Math" panose="02040503050406030204" pitchFamily="18" charset="0"/>
+                                </a:rPr>
+                                <m:t>𝛼</m:t>
+                              </m:r>
+                            </m:e>
+                          </m:d>
+                          <m:r>
+                            <a:rPr lang="en-US" i="1">
+                              <a:latin typeface="Cambria Math" panose="02040503050406030204" pitchFamily="18" charset="0"/>
+                              <a:ea typeface="Cambria Math" panose="02040503050406030204" pitchFamily="18" charset="0"/>
+                            </a:rPr>
+                            <m:t> </m:t>
+                          </m:r>
+                        </m:e>
+                      </m:func>
+                      <m:r>
+                        <a:rPr lang="en-US" b="0" i="1" smtClean="0">
+                          <a:latin typeface="Cambria Math" panose="02040503050406030204" pitchFamily="18" charset="0"/>
+                          <a:ea typeface="Cambria Math" panose="02040503050406030204" pitchFamily="18" charset="0"/>
+                        </a:rPr>
+                        <m:t>𝑑</m:t>
+                      </m:r>
+                    </m:oMath>
+                    <m:oMath xmlns:m="http://schemas.openxmlformats.org/officeDocument/2006/math">
+                      <m:r>
+                        <m:rPr>
+                          <m:nor/>
+                        </m:rPr>
+                        <a:rPr lang="en-US" b="0" i="0" dirty="0" smtClean="0">
+                          <a:latin typeface="Cambria Math" panose="02040503050406030204" pitchFamily="18" charset="0"/>
+                          <a:cs typeface="Consolas" panose="020B0609020204030204" pitchFamily="49" charset="0"/>
+                        </a:rPr>
+                        <m:t>RotationFactorHorizontal</m:t>
+                      </m:r>
+                      <m:r>
+                        <m:rPr>
+                          <m:nor/>
+                        </m:rPr>
+                        <a:rPr lang="en-US" b="0" i="0" dirty="0" smtClean="0">
+                          <a:latin typeface="Consolas" panose="020B0609020204030204" pitchFamily="49" charset="0"/>
+                          <a:cs typeface="Consolas" panose="020B0609020204030204" pitchFamily="49" charset="0"/>
+                        </a:rPr>
+                        <m:t> = </m:t>
+                      </m:r>
+                      <m:r>
+                        <m:rPr>
+                          <m:nor/>
+                        </m:rPr>
+                        <a:rPr lang="en-US" b="0" i="0" dirty="0" smtClean="0">
+                          <a:latin typeface="Consolas" panose="020B0609020204030204" pitchFamily="49" charset="0"/>
+                          <a:cs typeface="Consolas" panose="020B0609020204030204" pitchFamily="49" charset="0"/>
+                        </a:rPr>
+                        <m:t>srh</m:t>
+                      </m:r>
+                      <m:r>
+                        <a:rPr lang="en-GB" i="1">
+                          <a:latin typeface="Cambria Math" panose="02040503050406030204" pitchFamily="18" charset="0"/>
+                        </a:rPr>
+                        <m:t>=</m:t>
+                      </m:r>
+                      <m:f>
+                        <m:fPr>
+                          <m:ctrlPr>
+                            <a:rPr lang="en-GB" i="1">
+                              <a:latin typeface="Cambria Math" panose="02040503050406030204" pitchFamily="18" charset="0"/>
+                            </a:rPr>
+                          </m:ctrlPr>
+                        </m:fPr>
+                        <m:num>
+                          <m:r>
+                            <a:rPr lang="en-US" i="1">
+                              <a:latin typeface="Cambria Math" panose="02040503050406030204" pitchFamily="18" charset="0"/>
+                            </a:rPr>
+                            <m:t>𝑡</m:t>
+                          </m:r>
+                          <m:r>
+                            <a:rPr lang="en-US" b="0" i="1" smtClean="0">
+                              <a:latin typeface="Cambria Math" panose="02040503050406030204" pitchFamily="18" charset="0"/>
+                            </a:rPr>
+                            <m:t>𝑤</m:t>
+                          </m:r>
+                          <m:r>
+                            <a:rPr lang="en-US" i="1">
+                              <a:latin typeface="Cambria Math" panose="02040503050406030204" pitchFamily="18" charset="0"/>
+                            </a:rPr>
+                            <m:t>𝑚</m:t>
+                          </m:r>
+                        </m:num>
+                        <m:den>
+                          <m:r>
+                            <a:rPr lang="en-US" i="1">
+                              <a:latin typeface="Cambria Math" panose="02040503050406030204" pitchFamily="18" charset="0"/>
+                            </a:rPr>
+                            <m:t>𝑡</m:t>
+                          </m:r>
+                          <m:r>
+                            <a:rPr lang="en-US" b="0" i="1" smtClean="0">
+                              <a:latin typeface="Cambria Math" panose="02040503050406030204" pitchFamily="18" charset="0"/>
+                            </a:rPr>
+                            <m:t>𝑤</m:t>
+                          </m:r>
+                          <m:r>
+                            <a:rPr lang="en-US" i="1">
+                              <a:latin typeface="Cambria Math" panose="02040503050406030204" pitchFamily="18" charset="0"/>
+                            </a:rPr>
+                            <m:t>𝑟</m:t>
+                          </m:r>
+                        </m:den>
+                      </m:f>
+                      <m:r>
+                        <a:rPr lang="en-US" b="0" i="1" smtClean="0">
+                          <a:latin typeface="Cambria Math" panose="02040503050406030204" pitchFamily="18" charset="0"/>
+                        </a:rPr>
+                        <m:t>=</m:t>
+                      </m:r>
+                      <m:f>
+                        <m:fPr>
+                          <m:ctrlPr>
+                            <a:rPr lang="en-US" b="0" i="1" smtClean="0">
+                              <a:latin typeface="Cambria Math" panose="02040503050406030204" pitchFamily="18" charset="0"/>
+                            </a:rPr>
+                          </m:ctrlPr>
+                        </m:fPr>
+                        <m:num>
+                          <m:r>
+                            <a:rPr lang="en-US" b="0" i="1" smtClean="0">
+                              <a:latin typeface="Cambria Math" panose="02040503050406030204" pitchFamily="18" charset="0"/>
+                            </a:rPr>
+                            <m:t>𝑡𝑤𝑚</m:t>
+                          </m:r>
+                        </m:num>
+                        <m:den>
+                          <m:r>
+                            <a:rPr lang="en-US" b="0" i="1" smtClean="0">
+                              <a:latin typeface="Cambria Math" panose="02040503050406030204" pitchFamily="18" charset="0"/>
+                            </a:rPr>
+                            <m:t>𝑡𝑤𝑟</m:t>
+                          </m:r>
+                          <m:r>
+                            <a:rPr lang="en-US" b="0" i="1" smtClean="0">
+                              <a:latin typeface="Cambria Math" panose="02040503050406030204" pitchFamily="18" charset="0"/>
+                            </a:rPr>
+                            <m:t>1+</m:t>
+                          </m:r>
+                          <m:r>
+                            <a:rPr lang="en-US" b="0" i="1" smtClean="0">
+                              <a:latin typeface="Cambria Math" panose="02040503050406030204" pitchFamily="18" charset="0"/>
+                            </a:rPr>
+                            <m:t>𝑡𝑤𝑟</m:t>
+                          </m:r>
+                          <m:r>
+                            <a:rPr lang="en-US" b="0" i="1" smtClean="0">
+                              <a:latin typeface="Cambria Math" panose="02040503050406030204" pitchFamily="18" charset="0"/>
+                            </a:rPr>
+                            <m:t>2</m:t>
+                          </m:r>
+                        </m:den>
+                      </m:f>
+                    </m:oMath>
+                  </m:oMathPara>
+                </a14:m>
+                <a:endParaRPr lang="en-US" dirty="0">
+                  <a:latin typeface="Consolas" panose="020B0609020204030204" pitchFamily="49" charset="0"/>
+                  <a:cs typeface="Consolas" panose="020B0609020204030204" pitchFamily="49" charset="0"/>
+                </a:endParaRPr>
+              </a:p>
+              <a:p>
+                <a:pPr algn="ctr"/>
+                <a:endParaRPr lang="en-US" dirty="0">
+                  <a:latin typeface="Consolas" panose="020B0609020204030204" pitchFamily="49" charset="0"/>
+                  <a:cs typeface="Consolas" panose="020B0609020204030204" pitchFamily="49" charset="0"/>
+                </a:endParaRPr>
+              </a:p>
+            </p:txBody>
+          </p:sp>
+        </mc:Choice>
+        <mc:Fallback>
+          <p:sp>
+            <p:nvSpPr>
+              <p:cNvPr id="19" name="TextBox 18">
+                <a:extLst>
+                  <a:ext uri="{FF2B5EF4-FFF2-40B4-BE49-F238E27FC236}">
+                    <a16:creationId xmlns:a16="http://schemas.microsoft.com/office/drawing/2014/main" id="{F25CAF17-870D-DB4D-8A67-C8D37F6D10ED}"/>
+                  </a:ext>
+                </a:extLst>
+              </p:cNvPr>
+              <p:cNvSpPr txBox="1">
+                <a:spLocks noRot="1" noChangeAspect="1" noMove="1" noResize="1" noEditPoints="1" noAdjustHandles="1" noChangeArrowheads="1" noChangeShapeType="1" noTextEdit="1"/>
+              </p:cNvSpPr>
+              <p:nvPr/>
+            </p:nvSpPr>
+            <p:spPr>
+              <a:xfrm>
+                <a:off x="182882" y="5320416"/>
+                <a:ext cx="5913118" cy="1151277"/>
+              </a:xfrm>
+              <a:prstGeom prst="rect">
+                <a:avLst/>
+              </a:prstGeom>
+              <a:blipFill>
+                <a:blip r:embed="rId5"/>
+                <a:stretch>
+                  <a:fillRect/>
+                </a:stretch>
+              </a:blipFill>
+            </p:spPr>
+            <p:txBody>
+              <a:bodyPr/>
+              <a:lstStyle/>
+              <a:p>
+                <a:r>
+                  <a:rPr lang="en-VN">
+                    <a:noFill/>
+                  </a:rPr>
+                  <a:t> </a:t>
+                </a:r>
+              </a:p>
+            </p:txBody>
+          </p:sp>
+        </mc:Fallback>
+      </mc:AlternateContent>
+      <p:cxnSp>
+        <p:nvCxnSpPr>
+          <p:cNvPr id="22" name="Straight Connector 21">
+            <a:extLst>
+              <a:ext uri="{FF2B5EF4-FFF2-40B4-BE49-F238E27FC236}">
+                <a16:creationId xmlns:a16="http://schemas.microsoft.com/office/drawing/2014/main" id="{6C448393-3263-5D4E-9CBA-8E95494E6E42}"/>
+              </a:ext>
+            </a:extLst>
+          </p:cNvPr>
+          <p:cNvCxnSpPr>
+            <a:cxnSpLocks/>
+          </p:cNvCxnSpPr>
+          <p:nvPr/>
+        </p:nvCxnSpPr>
+        <p:spPr>
+          <a:xfrm>
+            <a:off x="1887757" y="2311046"/>
+            <a:ext cx="0" cy="1782963"/>
+          </a:xfrm>
+          <a:prstGeom prst="line">
+            <a:avLst/>
+          </a:prstGeom>
+          <a:ln w="12700">
+            <a:solidFill>
+              <a:schemeClr val="tx1"/>
+            </a:solidFill>
+            <a:prstDash val="solid"/>
+          </a:ln>
+        </p:spPr>
+        <p:style>
+          <a:lnRef idx="1">
+            <a:schemeClr val="accent1"/>
+          </a:lnRef>
+          <a:fillRef idx="0">
+            <a:schemeClr val="accent1"/>
+          </a:fillRef>
+          <a:effectRef idx="0">
+            <a:schemeClr val="accent1"/>
+          </a:effectRef>
+          <a:fontRef idx="minor">
+            <a:schemeClr val="tx1"/>
+          </a:fontRef>
+        </p:style>
+      </p:cxnSp>
+      <p:sp>
+        <p:nvSpPr>
+          <p:cNvPr id="28" name="TextBox 27">
+            <a:extLst>
+              <a:ext uri="{FF2B5EF4-FFF2-40B4-BE49-F238E27FC236}">
+                <a16:creationId xmlns:a16="http://schemas.microsoft.com/office/drawing/2014/main" id="{33F85B08-8650-3847-AD86-850D2E9CD34C}"/>
+              </a:ext>
+            </a:extLst>
+          </p:cNvPr>
+          <p:cNvSpPr txBox="1"/>
+          <p:nvPr/>
+        </p:nvSpPr>
+        <p:spPr>
+          <a:xfrm>
+            <a:off x="2418079" y="1955177"/>
+            <a:ext cx="873597" cy="369332"/>
+          </a:xfrm>
+          <a:prstGeom prst="rect">
+            <a:avLst/>
+          </a:prstGeom>
+          <a:noFill/>
+        </p:spPr>
+        <p:txBody>
+          <a:bodyPr wrap="square" rtlCol="0">
+            <a:spAutoFit/>
+          </a:bodyPr>
+          <a:lstStyle/>
+          <a:p>
+            <a:r>
+              <a:rPr lang="en-GB" dirty="0">
+                <a:latin typeface="Consolas" panose="020B0609020204030204" pitchFamily="49" charset="0"/>
+                <a:cs typeface="Consolas" panose="020B0609020204030204" pitchFamily="49" charset="0"/>
+              </a:rPr>
+              <a:t>twr2</a:t>
+            </a:r>
+            <a:endParaRPr lang="de-DE" dirty="0">
+              <a:latin typeface="Consolas" panose="020B0609020204030204" pitchFamily="49" charset="0"/>
+              <a:cs typeface="Consolas" panose="020B0609020204030204" pitchFamily="49" charset="0"/>
+            </a:endParaRPr>
+          </a:p>
+        </p:txBody>
+      </p:sp>
+      <p:cxnSp>
+        <p:nvCxnSpPr>
+          <p:cNvPr id="29" name="Straight Connector 28">
+            <a:extLst>
+              <a:ext uri="{FF2B5EF4-FFF2-40B4-BE49-F238E27FC236}">
+                <a16:creationId xmlns:a16="http://schemas.microsoft.com/office/drawing/2014/main" id="{EA4160BF-8487-794D-A9C2-1616C8F78271}"/>
+              </a:ext>
+            </a:extLst>
+          </p:cNvPr>
+          <p:cNvCxnSpPr>
+            <a:cxnSpLocks/>
+          </p:cNvCxnSpPr>
+          <p:nvPr/>
+        </p:nvCxnSpPr>
+        <p:spPr>
+          <a:xfrm>
+            <a:off x="2405917" y="1041071"/>
+            <a:ext cx="0" cy="1269975"/>
+          </a:xfrm>
+          <a:prstGeom prst="line">
+            <a:avLst/>
+          </a:prstGeom>
+          <a:ln w="12700">
+            <a:solidFill>
+              <a:schemeClr val="tx1"/>
+            </a:solidFill>
+            <a:prstDash val="solid"/>
+          </a:ln>
+        </p:spPr>
+        <p:style>
+          <a:lnRef idx="1">
+            <a:schemeClr val="accent1"/>
+          </a:lnRef>
+          <a:fillRef idx="0">
+            <a:schemeClr val="accent1"/>
+          </a:fillRef>
+          <a:effectRef idx="0">
+            <a:schemeClr val="accent1"/>
+          </a:effectRef>
+          <a:fontRef idx="minor">
+            <a:schemeClr val="tx1"/>
+          </a:fontRef>
+        </p:style>
+      </p:cxnSp>
+      <p:sp>
+        <p:nvSpPr>
+          <p:cNvPr id="33" name="TextBox 32">
+            <a:extLst>
+              <a:ext uri="{FF2B5EF4-FFF2-40B4-BE49-F238E27FC236}">
+                <a16:creationId xmlns:a16="http://schemas.microsoft.com/office/drawing/2014/main" id="{DC9AC1CB-A498-E140-8CEB-EE0E3F5EB18F}"/>
+              </a:ext>
+            </a:extLst>
+          </p:cNvPr>
+          <p:cNvSpPr txBox="1"/>
+          <p:nvPr/>
+        </p:nvSpPr>
+        <p:spPr>
+          <a:xfrm>
+            <a:off x="1591423" y="1962219"/>
+            <a:ext cx="873597" cy="369332"/>
+          </a:xfrm>
+          <a:prstGeom prst="rect">
+            <a:avLst/>
+          </a:prstGeom>
+          <a:noFill/>
+        </p:spPr>
+        <p:txBody>
+          <a:bodyPr wrap="square" rtlCol="0">
+            <a:spAutoFit/>
+          </a:bodyPr>
+          <a:lstStyle/>
+          <a:p>
+            <a:pPr algn="r"/>
+            <a:r>
+              <a:rPr lang="en-GB" dirty="0">
+                <a:latin typeface="Consolas" panose="020B0609020204030204" pitchFamily="49" charset="0"/>
+                <a:cs typeface="Consolas" panose="020B0609020204030204" pitchFamily="49" charset="0"/>
+              </a:rPr>
+              <a:t>twr1</a:t>
+            </a:r>
+            <a:endParaRPr lang="de-DE" dirty="0">
+              <a:latin typeface="Consolas" panose="020B0609020204030204" pitchFamily="49" charset="0"/>
+              <a:cs typeface="Consolas" panose="020B0609020204030204" pitchFamily="49" charset="0"/>
+            </a:endParaRPr>
+          </a:p>
+        </p:txBody>
+      </p:sp>
+      <mc:AlternateContent xmlns:mc="http://schemas.openxmlformats.org/markup-compatibility/2006">
+        <mc:Choice xmlns:a14="http://schemas.microsoft.com/office/drawing/2010/main" Requires="a14">
+          <p:sp>
+            <p:nvSpPr>
+              <p:cNvPr id="36" name="TextBox 35">
+                <a:extLst>
+                  <a:ext uri="{FF2B5EF4-FFF2-40B4-BE49-F238E27FC236}">
+                    <a16:creationId xmlns:a16="http://schemas.microsoft.com/office/drawing/2014/main" id="{F9425338-BCC8-5249-9C2F-C38A97EB325E}"/>
+                  </a:ext>
+                </a:extLst>
+              </p:cNvPr>
+              <p:cNvSpPr txBox="1"/>
+              <p:nvPr/>
+            </p:nvSpPr>
+            <p:spPr>
+              <a:xfrm>
+                <a:off x="851829" y="261145"/>
+                <a:ext cx="1486112" cy="484941"/>
+              </a:xfrm>
+              <a:prstGeom prst="rect">
+                <a:avLst/>
+              </a:prstGeom>
+              <a:noFill/>
+            </p:spPr>
+            <p:txBody>
+              <a:bodyPr wrap="none" rtlCol="0">
+                <a:spAutoFit/>
+              </a:bodyPr>
+              <a:lstStyle/>
+              <a:p>
+                <a:r>
+                  <a:rPr lang="en-US" dirty="0"/>
+                  <a:t>sin</a:t>
+                </a:r>
+                <a14:m>
+                  <m:oMath xmlns:m="http://schemas.openxmlformats.org/officeDocument/2006/math">
+                    <m:d>
+                      <m:dPr>
+                        <m:ctrlPr>
+                          <a:rPr lang="en-US" b="0" i="1" smtClean="0">
+                            <a:latin typeface="Cambria Math" panose="02040503050406030204" pitchFamily="18" charset="0"/>
+                          </a:rPr>
+                        </m:ctrlPr>
+                      </m:dPr>
+                      <m:e>
+                        <m:r>
+                          <a:rPr lang="en-GB" i="1">
+                            <a:latin typeface="Cambria Math" panose="02040503050406030204" pitchFamily="18" charset="0"/>
+                            <a:ea typeface="Cambria Math" panose="02040503050406030204" pitchFamily="18" charset="0"/>
+                          </a:rPr>
+                          <m:t>𝛼</m:t>
+                        </m:r>
+                      </m:e>
+                    </m:d>
+                    <m:r>
+                      <a:rPr lang="en-US" b="0" i="1" dirty="0" smtClean="0">
+                        <a:latin typeface="Cambria Math" panose="02040503050406030204" pitchFamily="18" charset="0"/>
+                      </a:rPr>
+                      <m:t>=</m:t>
+                    </m:r>
+                    <m:f>
+                      <m:fPr>
+                        <m:ctrlPr>
+                          <a:rPr lang="en-US" b="0" i="1" dirty="0" smtClean="0">
+                            <a:latin typeface="Cambria Math" panose="02040503050406030204" pitchFamily="18" charset="0"/>
+                          </a:rPr>
+                        </m:ctrlPr>
+                      </m:fPr>
+                      <m:num>
+                        <m:r>
+                          <a:rPr lang="en-US" b="0" i="1" dirty="0" smtClean="0">
+                            <a:latin typeface="Cambria Math" panose="02040503050406030204" pitchFamily="18" charset="0"/>
+                          </a:rPr>
+                          <m:t>𝑡𝑟𝑤</m:t>
+                        </m:r>
+                        <m:r>
+                          <a:rPr lang="en-US" b="0" i="1" dirty="0" smtClean="0">
+                            <a:latin typeface="Cambria Math" panose="02040503050406030204" pitchFamily="18" charset="0"/>
+                          </a:rPr>
+                          <m:t>1</m:t>
+                        </m:r>
+                      </m:num>
+                      <m:den>
+                        <m:r>
+                          <a:rPr lang="en-US" b="0" i="1" dirty="0" smtClean="0">
+                            <a:latin typeface="Cambria Math" panose="02040503050406030204" pitchFamily="18" charset="0"/>
+                          </a:rPr>
+                          <m:t>𝑡h𝑚</m:t>
+                        </m:r>
+                      </m:den>
+                    </m:f>
+                  </m:oMath>
+                </a14:m>
+                <a:endParaRPr lang="en-US" dirty="0"/>
+              </a:p>
+            </p:txBody>
+          </p:sp>
+        </mc:Choice>
+        <mc:Fallback>
+          <p:sp>
+            <p:nvSpPr>
+              <p:cNvPr id="36" name="TextBox 35">
+                <a:extLst>
+                  <a:ext uri="{FF2B5EF4-FFF2-40B4-BE49-F238E27FC236}">
+                    <a16:creationId xmlns:a16="http://schemas.microsoft.com/office/drawing/2014/main" id="{F9425338-BCC8-5249-9C2F-C38A97EB325E}"/>
+                  </a:ext>
+                </a:extLst>
+              </p:cNvPr>
+              <p:cNvSpPr txBox="1">
+                <a:spLocks noRot="1" noChangeAspect="1" noMove="1" noResize="1" noEditPoints="1" noAdjustHandles="1" noChangeArrowheads="1" noChangeShapeType="1" noTextEdit="1"/>
+              </p:cNvSpPr>
+              <p:nvPr/>
+            </p:nvSpPr>
+            <p:spPr>
+              <a:xfrm>
+                <a:off x="851829" y="261145"/>
+                <a:ext cx="1486112" cy="484941"/>
+              </a:xfrm>
+              <a:prstGeom prst="rect">
+                <a:avLst/>
+              </a:prstGeom>
+              <a:blipFill>
+                <a:blip r:embed="rId6"/>
+                <a:stretch>
+                  <a:fillRect l="-4237" b="-7692"/>
+                </a:stretch>
+              </a:blipFill>
+            </p:spPr>
+            <p:txBody>
+              <a:bodyPr/>
+              <a:lstStyle/>
+              <a:p>
+                <a:r>
+                  <a:rPr lang="en-VN">
+                    <a:noFill/>
+                  </a:rPr>
+                  <a:t> </a:t>
+                </a:r>
+              </a:p>
+            </p:txBody>
+          </p:sp>
+        </mc:Fallback>
+      </mc:AlternateContent>
+      <mc:AlternateContent xmlns:mc="http://schemas.openxmlformats.org/markup-compatibility/2006">
+        <mc:Choice xmlns:a14="http://schemas.microsoft.com/office/drawing/2010/main" Requires="a14">
+          <p:sp>
+            <p:nvSpPr>
+              <p:cNvPr id="40" name="TextBox 39">
+                <a:extLst>
+                  <a:ext uri="{FF2B5EF4-FFF2-40B4-BE49-F238E27FC236}">
+                    <a16:creationId xmlns:a16="http://schemas.microsoft.com/office/drawing/2014/main" id="{B5E48116-F543-7045-ABB6-C851F19385F8}"/>
+                  </a:ext>
+                </a:extLst>
+              </p:cNvPr>
+              <p:cNvSpPr txBox="1"/>
+              <p:nvPr/>
+            </p:nvSpPr>
+            <p:spPr>
+              <a:xfrm>
+                <a:off x="2465020" y="231940"/>
+                <a:ext cx="1529073" cy="485518"/>
+              </a:xfrm>
+              <a:prstGeom prst="rect">
+                <a:avLst/>
+              </a:prstGeom>
+              <a:noFill/>
+            </p:spPr>
+            <p:txBody>
+              <a:bodyPr wrap="none" rtlCol="0">
+                <a:spAutoFit/>
+              </a:bodyPr>
+              <a:lstStyle/>
+              <a:p>
+                <a:r>
+                  <a:rPr lang="en-US" dirty="0"/>
+                  <a:t>cos</a:t>
+                </a:r>
+                <a14:m>
+                  <m:oMath xmlns:m="http://schemas.openxmlformats.org/officeDocument/2006/math">
+                    <m:d>
+                      <m:dPr>
+                        <m:ctrlPr>
+                          <a:rPr lang="en-US" b="0" i="1" smtClean="0">
+                            <a:latin typeface="Cambria Math" panose="02040503050406030204" pitchFamily="18" charset="0"/>
+                          </a:rPr>
+                        </m:ctrlPr>
+                      </m:dPr>
+                      <m:e>
+                        <m:r>
+                          <a:rPr lang="en-GB" i="1">
+                            <a:latin typeface="Cambria Math" panose="02040503050406030204" pitchFamily="18" charset="0"/>
+                            <a:ea typeface="Cambria Math" panose="02040503050406030204" pitchFamily="18" charset="0"/>
+                          </a:rPr>
+                          <m:t>𝛼</m:t>
+                        </m:r>
+                      </m:e>
+                    </m:d>
+                    <m:r>
+                      <a:rPr lang="en-US" b="0" i="1" dirty="0" smtClean="0">
+                        <a:latin typeface="Cambria Math" panose="02040503050406030204" pitchFamily="18" charset="0"/>
+                      </a:rPr>
+                      <m:t>=</m:t>
+                    </m:r>
+                    <m:f>
+                      <m:fPr>
+                        <m:ctrlPr>
+                          <a:rPr lang="en-US" b="0" i="1" dirty="0" smtClean="0">
+                            <a:latin typeface="Cambria Math" panose="02040503050406030204" pitchFamily="18" charset="0"/>
+                          </a:rPr>
+                        </m:ctrlPr>
+                      </m:fPr>
+                      <m:num>
+                        <m:r>
+                          <a:rPr lang="en-US" b="0" i="1" dirty="0" smtClean="0">
+                            <a:latin typeface="Cambria Math" panose="02040503050406030204" pitchFamily="18" charset="0"/>
+                          </a:rPr>
+                          <m:t>𝑡𝑟𝑤</m:t>
+                        </m:r>
+                        <m:r>
+                          <a:rPr lang="en-US" b="0" i="1" dirty="0" smtClean="0">
+                            <a:latin typeface="Cambria Math" panose="02040503050406030204" pitchFamily="18" charset="0"/>
+                          </a:rPr>
+                          <m:t>2</m:t>
+                        </m:r>
+                      </m:num>
+                      <m:den>
+                        <m:r>
+                          <a:rPr lang="en-US" b="0" i="1" dirty="0" smtClean="0">
+                            <a:latin typeface="Cambria Math" panose="02040503050406030204" pitchFamily="18" charset="0"/>
+                          </a:rPr>
+                          <m:t>𝑑</m:t>
+                        </m:r>
+                      </m:den>
+                    </m:f>
+                  </m:oMath>
+                </a14:m>
+                <a:endParaRPr lang="en-US" dirty="0"/>
+              </a:p>
+            </p:txBody>
+          </p:sp>
+        </mc:Choice>
+        <mc:Fallback>
+          <p:sp>
+            <p:nvSpPr>
+              <p:cNvPr id="40" name="TextBox 39">
+                <a:extLst>
+                  <a:ext uri="{FF2B5EF4-FFF2-40B4-BE49-F238E27FC236}">
+                    <a16:creationId xmlns:a16="http://schemas.microsoft.com/office/drawing/2014/main" id="{B5E48116-F543-7045-ABB6-C851F19385F8}"/>
+                  </a:ext>
+                </a:extLst>
+              </p:cNvPr>
+              <p:cNvSpPr txBox="1">
+                <a:spLocks noRot="1" noChangeAspect="1" noMove="1" noResize="1" noEditPoints="1" noAdjustHandles="1" noChangeArrowheads="1" noChangeShapeType="1" noTextEdit="1"/>
+              </p:cNvSpPr>
+              <p:nvPr/>
+            </p:nvSpPr>
+            <p:spPr>
+              <a:xfrm>
+                <a:off x="2465020" y="231940"/>
+                <a:ext cx="1529073" cy="485518"/>
+              </a:xfrm>
+              <a:prstGeom prst="rect">
+                <a:avLst/>
+              </a:prstGeom>
+              <a:blipFill>
+                <a:blip r:embed="rId7"/>
+                <a:stretch>
+                  <a:fillRect l="-2459" b="-7692"/>
+                </a:stretch>
+              </a:blipFill>
+            </p:spPr>
+            <p:txBody>
+              <a:bodyPr/>
+              <a:lstStyle/>
+              <a:p>
+                <a:r>
+                  <a:rPr lang="en-VN">
+                    <a:noFill/>
+                  </a:rPr>
+                  <a:t> </a:t>
+                </a:r>
+              </a:p>
+            </p:txBody>
+          </p:sp>
+        </mc:Fallback>
+      </mc:AlternateContent>
+    </p:spTree>
+    <p:extLst>
+      <p:ext uri="{BB962C8B-B14F-4D97-AF65-F5344CB8AC3E}">
+        <p14:creationId xmlns:p14="http://schemas.microsoft.com/office/powerpoint/2010/main" val="354758786"/>
+      </p:ext>
+    </p:extLst>
+  </p:cSld>
+  <p:clrMapOvr>
+    <a:masterClrMapping/>
+  </p:clrMapOvr>
+</p:sld>
+</file>
+
+<file path=ppt/slides/slide3.xml><?xml version="1.0" encoding="utf-8"?>
 <p:sld xmlns:a="http://schemas.openxmlformats.org/drawingml/2006/main" xmlns:r="http://schemas.openxmlformats.org/officeDocument/2006/relationships" xmlns:p="http://schemas.openxmlformats.org/presentationml/2006/main">
   <p:cSld>
     <p:spTree>
@@ -6279,7 +8512,7 @@
     </p:spTree>
     <p:extLst>
       <p:ext uri="{BB962C8B-B14F-4D97-AF65-F5344CB8AC3E}">
-        <p14:creationId xmlns:p14="http://schemas.microsoft.com/office/powerpoint/2010/main" val="354758786"/>
+        <p14:creationId xmlns:p14="http://schemas.microsoft.com/office/powerpoint/2010/main" val="3013368907"/>
       </p:ext>
     </p:extLst>
   </p:cSld>
@@ -6289,7 +8522,7 @@
 </p:sld>
 </file>
 
-<file path=ppt/slides/slide3.xml><?xml version="1.0" encoding="utf-8"?>
+<file path=ppt/slides/slide4.xml><?xml version="1.0" encoding="utf-8"?>
 <p:sld xmlns:a="http://schemas.openxmlformats.org/drawingml/2006/main" xmlns:r="http://schemas.openxmlformats.org/officeDocument/2006/relationships" xmlns:p="http://schemas.openxmlformats.org/presentationml/2006/main">
   <p:cSld>
     <p:spTree>
@@ -7799,7 +10032,7 @@
 </p:sld>
 </file>
 
-<file path=ppt/slides/slide4.xml><?xml version="1.0" encoding="utf-8"?>
+<file path=ppt/slides/slide5.xml><?xml version="1.0" encoding="utf-8"?>
 <p:sld xmlns:a="http://schemas.openxmlformats.org/drawingml/2006/main" xmlns:r="http://schemas.openxmlformats.org/officeDocument/2006/relationships" xmlns:p="http://schemas.openxmlformats.org/presentationml/2006/main">
   <p:cSld>
     <p:spTree>
@@ -9927,7 +12160,7 @@
 </p:sld>
 </file>
 
-<file path=ppt/slides/slide5.xml><?xml version="1.0" encoding="utf-8"?>
+<file path=ppt/slides/slide6.xml><?xml version="1.0" encoding="utf-8"?>
 <p:sld xmlns:a="http://schemas.openxmlformats.org/drawingml/2006/main" xmlns:r="http://schemas.openxmlformats.org/officeDocument/2006/relationships" xmlns:p="http://schemas.openxmlformats.org/presentationml/2006/main">
   <p:cSld>
     <p:spTree>

</xml_diff>

<commit_message>
renaming variables in calc
</commit_message>
<xml_diff>
--- a/rectangleRotation.pptx
+++ b/rectangleRotation.pptx
@@ -5,15 +5,16 @@
     <p:sldMasterId id="2147483648" r:id="rId1"/>
   </p:sldMasterIdLst>
   <p:notesMasterIdLst>
-    <p:notesMasterId r:id="rId8"/>
+    <p:notesMasterId r:id="rId9"/>
   </p:notesMasterIdLst>
   <p:sldIdLst>
     <p:sldId id="263" r:id="rId2"/>
     <p:sldId id="260" r:id="rId3"/>
-    <p:sldId id="264" r:id="rId4"/>
-    <p:sldId id="261" r:id="rId5"/>
-    <p:sldId id="262" r:id="rId6"/>
-    <p:sldId id="257" r:id="rId7"/>
+    <p:sldId id="265" r:id="rId4"/>
+    <p:sldId id="264" r:id="rId5"/>
+    <p:sldId id="261" r:id="rId6"/>
+    <p:sldId id="262" r:id="rId7"/>
+    <p:sldId id="257" r:id="rId8"/>
   </p:sldIdLst>
   <p:sldSz cx="12192000" cy="6858000"/>
   <p:notesSz cx="6858000" cy="9144000"/>
@@ -545,6 +546,90 @@
     <p:extLst>
       <p:ext uri="{BB962C8B-B14F-4D97-AF65-F5344CB8AC3E}">
         <p14:creationId xmlns:p14="http://schemas.microsoft.com/office/powerpoint/2010/main" val="745452370"/>
+      </p:ext>
+    </p:extLst>
+  </p:cSld>
+  <p:clrMapOvr>
+    <a:masterClrMapping/>
+  </p:clrMapOvr>
+</p:notes>
+</file>
+
+<file path=ppt/notesSlides/notesSlide2.xml><?xml version="1.0" encoding="utf-8"?>
+<p:notes xmlns:a="http://schemas.openxmlformats.org/drawingml/2006/main" xmlns:r="http://schemas.openxmlformats.org/officeDocument/2006/relationships" xmlns:p="http://schemas.openxmlformats.org/presentationml/2006/main">
+  <p:cSld>
+    <p:spTree>
+      <p:nvGrpSpPr>
+        <p:cNvPr id="1" name=""/>
+        <p:cNvGrpSpPr/>
+        <p:nvPr/>
+      </p:nvGrpSpPr>
+      <p:grpSpPr>
+        <a:xfrm>
+          <a:off x="0" y="0"/>
+          <a:ext cx="0" cy="0"/>
+          <a:chOff x="0" y="0"/>
+          <a:chExt cx="0" cy="0"/>
+        </a:xfrm>
+      </p:grpSpPr>
+      <p:sp>
+        <p:nvSpPr>
+          <p:cNvPr id="2" name="Slide Image Placeholder 1"/>
+          <p:cNvSpPr>
+            <a:spLocks noGrp="1" noRot="1" noChangeAspect="1"/>
+          </p:cNvSpPr>
+          <p:nvPr>
+            <p:ph type="sldImg"/>
+          </p:nvPr>
+        </p:nvSpPr>
+        <p:spPr/>
+      </p:sp>
+      <p:sp>
+        <p:nvSpPr>
+          <p:cNvPr id="3" name="Notes Placeholder 2"/>
+          <p:cNvSpPr>
+            <a:spLocks noGrp="1"/>
+          </p:cNvSpPr>
+          <p:nvPr>
+            <p:ph type="body" idx="1"/>
+          </p:nvPr>
+        </p:nvSpPr>
+        <p:spPr/>
+        <p:txBody>
+          <a:bodyPr/>
+          <a:lstStyle/>
+          <a:p>
+            <a:endParaRPr lang="en-VN" dirty="0"/>
+          </a:p>
+        </p:txBody>
+      </p:sp>
+      <p:sp>
+        <p:nvSpPr>
+          <p:cNvPr id="4" name="Slide Number Placeholder 3"/>
+          <p:cNvSpPr>
+            <a:spLocks noGrp="1"/>
+          </p:cNvSpPr>
+          <p:nvPr>
+            <p:ph type="sldNum" sz="quarter" idx="5"/>
+          </p:nvPr>
+        </p:nvSpPr>
+        <p:spPr/>
+        <p:txBody>
+          <a:bodyPr/>
+          <a:lstStyle/>
+          <a:p>
+            <a:fld id="{15EAC33F-75A4-FC48-9D8B-54A04066C486}" type="slidenum">
+              <a:rPr lang="en-VN" smtClean="0"/>
+              <a:t>3</a:t>
+            </a:fld>
+            <a:endParaRPr lang="en-VN"/>
+          </a:p>
+        </p:txBody>
+      </p:sp>
+    </p:spTree>
+    <p:extLst>
+      <p:ext uri="{BB962C8B-B14F-4D97-AF65-F5344CB8AC3E}">
+        <p14:creationId xmlns:p14="http://schemas.microsoft.com/office/powerpoint/2010/main" val="3107785096"/>
       </p:ext>
     </p:extLst>
   </p:cSld>
@@ -3791,10 +3876,10 @@
       </p:grpSpPr>
       <p:grpSp>
         <p:nvGrpSpPr>
-          <p:cNvPr id="4" name="Group 3">
-            <a:extLst>
-              <a:ext uri="{FF2B5EF4-FFF2-40B4-BE49-F238E27FC236}">
-                <a16:creationId xmlns:a16="http://schemas.microsoft.com/office/drawing/2014/main" id="{657B73CD-328C-F745-BE67-097ADB0FB90D}"/>
+          <p:cNvPr id="2" name="Group 1">
+            <a:extLst>
+              <a:ext uri="{FF2B5EF4-FFF2-40B4-BE49-F238E27FC236}">
+                <a16:creationId xmlns:a16="http://schemas.microsoft.com/office/drawing/2014/main" id="{E9AC571A-EDF3-BA42-9943-1012CDA818CC}"/>
               </a:ext>
             </a:extLst>
           </p:cNvPr>
@@ -3803,32 +3888,162 @@
         </p:nvGrpSpPr>
         <p:grpSpPr>
           <a:xfrm>
-            <a:off x="1419336" y="1299402"/>
-            <a:ext cx="4331906" cy="2600952"/>
-            <a:chOff x="894080" y="910434"/>
-            <a:chExt cx="5415280" cy="3488846"/>
+            <a:off x="984700" y="1522296"/>
+            <a:ext cx="4352456" cy="2602038"/>
+            <a:chOff x="984700" y="1522296"/>
+            <a:chExt cx="4352456" cy="2602038"/>
           </a:xfrm>
         </p:grpSpPr>
-        <p:sp>
-          <p:nvSpPr>
-            <p:cNvPr id="3" name="Rounded Rectangle 2">
+        <p:grpSp>
+          <p:nvGrpSpPr>
+            <p:cNvPr id="4" name="Group 3">
               <a:extLst>
                 <a:ext uri="{FF2B5EF4-FFF2-40B4-BE49-F238E27FC236}">
-                  <a16:creationId xmlns:a16="http://schemas.microsoft.com/office/drawing/2014/main" id="{5AEAE937-50F9-2F40-B139-A19A4B3AD058}"/>
+                  <a16:creationId xmlns:a16="http://schemas.microsoft.com/office/drawing/2014/main" id="{657B73CD-328C-F745-BE67-097ADB0FB90D}"/>
                 </a:ext>
               </a:extLst>
             </p:cNvPr>
-            <p:cNvSpPr/>
+            <p:cNvGrpSpPr/>
+            <p:nvPr/>
+          </p:nvGrpSpPr>
+          <p:grpSpPr>
+            <a:xfrm>
+              <a:off x="984700" y="1522296"/>
+              <a:ext cx="4331906" cy="2600952"/>
+              <a:chOff x="894080" y="910434"/>
+              <a:chExt cx="5415280" cy="3488846"/>
+            </a:xfrm>
+          </p:grpSpPr>
+          <p:sp>
+            <p:nvSpPr>
+              <p:cNvPr id="3" name="Rounded Rectangle 2">
+                <a:extLst>
+                  <a:ext uri="{FF2B5EF4-FFF2-40B4-BE49-F238E27FC236}">
+                    <a16:creationId xmlns:a16="http://schemas.microsoft.com/office/drawing/2014/main" id="{5AEAE937-50F9-2F40-B139-A19A4B3AD058}"/>
+                  </a:ext>
+                </a:extLst>
+              </p:cNvPr>
+              <p:cNvSpPr/>
+              <p:nvPr/>
+            </p:nvSpPr>
+            <p:spPr>
+              <a:xfrm>
+                <a:off x="894080" y="910434"/>
+                <a:ext cx="5415280" cy="3488846"/>
+              </a:xfrm>
+              <a:prstGeom prst="roundRect">
+                <a:avLst/>
+              </a:prstGeom>
+            </p:spPr>
+            <p:style>
+              <a:lnRef idx="2">
+                <a:schemeClr val="accent1">
+                  <a:shade val="50000"/>
+                </a:schemeClr>
+              </a:lnRef>
+              <a:fillRef idx="1">
+                <a:schemeClr val="accent1"/>
+              </a:fillRef>
+              <a:effectRef idx="0">
+                <a:schemeClr val="accent1"/>
+              </a:effectRef>
+              <a:fontRef idx="minor">
+                <a:schemeClr val="lt1"/>
+              </a:fontRef>
+            </p:style>
+            <p:txBody>
+              <a:bodyPr rtlCol="0" anchor="ctr"/>
+              <a:lstStyle/>
+              <a:p>
+                <a:pPr algn="ctr"/>
+                <a:endParaRPr lang="en-VN"/>
+              </a:p>
+            </p:txBody>
+          </p:sp>
+          <p:sp>
+            <p:nvSpPr>
+              <p:cNvPr id="56" name="Rounded Rectangle 55">
+                <a:extLst>
+                  <a:ext uri="{FF2B5EF4-FFF2-40B4-BE49-F238E27FC236}">
+                    <a16:creationId xmlns:a16="http://schemas.microsoft.com/office/drawing/2014/main" id="{CB5A21C3-0D48-DF45-A7FE-A3D9B5AF6D22}"/>
+                  </a:ext>
+                </a:extLst>
+              </p:cNvPr>
+              <p:cNvSpPr/>
+              <p:nvPr/>
+            </p:nvSpPr>
+            <p:spPr>
+              <a:xfrm>
+                <a:off x="1135103" y="1218211"/>
+                <a:ext cx="4879819" cy="2970293"/>
+              </a:xfrm>
+              <a:prstGeom prst="roundRect">
+                <a:avLst>
+                  <a:gd name="adj" fmla="val 11878"/>
+                </a:avLst>
+              </a:prstGeom>
+              <a:solidFill>
+                <a:schemeClr val="bg1"/>
+              </a:solidFill>
+            </p:spPr>
+            <p:style>
+              <a:lnRef idx="2">
+                <a:schemeClr val="accent1">
+                  <a:shade val="50000"/>
+                </a:schemeClr>
+              </a:lnRef>
+              <a:fillRef idx="1">
+                <a:schemeClr val="accent1"/>
+              </a:fillRef>
+              <a:effectRef idx="0">
+                <a:schemeClr val="accent1"/>
+              </a:effectRef>
+              <a:fontRef idx="minor">
+                <a:schemeClr val="lt1"/>
+              </a:fontRef>
+            </p:style>
+            <p:txBody>
+              <a:bodyPr rtlCol="0" anchor="ctr"/>
+              <a:lstStyle/>
+              <a:p>
+                <a:pPr algn="ctr"/>
+                <a:endParaRPr lang="en-VN"/>
+              </a:p>
+            </p:txBody>
+          </p:sp>
+        </p:grpSp>
+        <p:sp>
+          <p:nvSpPr>
+            <p:cNvPr id="45" name="Rectangle 44">
+              <a:extLst>
+                <a:ext uri="{FF2B5EF4-FFF2-40B4-BE49-F238E27FC236}">
+                  <a16:creationId xmlns:a16="http://schemas.microsoft.com/office/drawing/2014/main" id="{CB045013-1921-9542-B442-4319408B0E3A}"/>
+                </a:ext>
+              </a:extLst>
+            </p:cNvPr>
+            <p:cNvSpPr>
+              <a:spLocks noChangeAspect="1"/>
+            </p:cNvSpPr>
             <p:nvPr/>
           </p:nvSpPr>
           <p:spPr>
             <a:xfrm>
-              <a:off x="894080" y="910434"/>
-              <a:ext cx="5415280" cy="3488846"/>
+              <a:off x="984700" y="1523376"/>
+              <a:ext cx="4352456" cy="2600958"/>
             </a:xfrm>
-            <a:prstGeom prst="roundRect">
+            <a:prstGeom prst="rect">
               <a:avLst/>
             </a:prstGeom>
+            <a:solidFill>
+              <a:srgbClr val="FFC000">
+                <a:alpha val="37255"/>
+              </a:srgbClr>
+            </a:solidFill>
+            <a:ln>
+              <a:solidFill>
+                <a:srgbClr val="FF0000"/>
+              </a:solidFill>
+            </a:ln>
           </p:spPr>
           <p:style>
             <a:lnRef idx="2">
@@ -3851,35 +4066,42 @@
             <a:lstStyle/>
             <a:p>
               <a:pPr algn="ctr"/>
-              <a:endParaRPr lang="en-VN"/>
+              <a:endParaRPr lang="de-DE" dirty="0"/>
             </a:p>
           </p:txBody>
         </p:sp>
         <p:sp>
           <p:nvSpPr>
-            <p:cNvPr id="56" name="Rounded Rectangle 55">
+            <p:cNvPr id="10" name="Rectangle 9">
               <a:extLst>
                 <a:ext uri="{FF2B5EF4-FFF2-40B4-BE49-F238E27FC236}">
-                  <a16:creationId xmlns:a16="http://schemas.microsoft.com/office/drawing/2014/main" id="{CB5A21C3-0D48-DF45-A7FE-A3D9B5AF6D22}"/>
+                  <a16:creationId xmlns:a16="http://schemas.microsoft.com/office/drawing/2014/main" id="{49D2695A-2AFF-914A-AE0F-F66E950C7CD2}"/>
                 </a:ext>
               </a:extLst>
             </p:cNvPr>
-            <p:cNvSpPr/>
+            <p:cNvSpPr>
+              <a:spLocks noChangeAspect="1"/>
+            </p:cNvSpPr>
             <p:nvPr/>
           </p:nvSpPr>
           <p:spPr>
             <a:xfrm>
-              <a:off x="1135103" y="1218211"/>
-              <a:ext cx="4879819" cy="2970293"/>
+              <a:off x="1499486" y="2002466"/>
+              <a:ext cx="3302339" cy="1693576"/>
             </a:xfrm>
-            <a:prstGeom prst="roundRect">
-              <a:avLst>
-                <a:gd name="adj" fmla="val 11878"/>
-              </a:avLst>
+            <a:prstGeom prst="rect">
+              <a:avLst/>
             </a:prstGeom>
             <a:solidFill>
-              <a:schemeClr val="bg1"/>
+              <a:srgbClr val="FFC000">
+                <a:alpha val="37255"/>
+              </a:srgbClr>
             </a:solidFill>
+            <a:ln>
+              <a:solidFill>
+                <a:srgbClr val="FF0000"/>
+              </a:solidFill>
+            </a:ln>
           </p:spPr>
           <p:style>
             <a:lnRef idx="2">
@@ -3902,129 +4124,13 @@
             <a:lstStyle/>
             <a:p>
               <a:pPr algn="ctr"/>
-              <a:endParaRPr lang="en-VN"/>
+              <a:endParaRPr lang="de-DE" dirty="0"/>
             </a:p>
           </p:txBody>
         </p:sp>
       </p:grpSp>
       <p:sp>
         <p:nvSpPr>
-          <p:cNvPr id="45" name="Rectangle 44">
-            <a:extLst>
-              <a:ext uri="{FF2B5EF4-FFF2-40B4-BE49-F238E27FC236}">
-                <a16:creationId xmlns:a16="http://schemas.microsoft.com/office/drawing/2014/main" id="{CB045013-1921-9542-B442-4319408B0E3A}"/>
-              </a:ext>
-            </a:extLst>
-          </p:cNvPr>
-          <p:cNvSpPr>
-            <a:spLocks noChangeAspect="1"/>
-          </p:cNvSpPr>
-          <p:nvPr/>
-        </p:nvSpPr>
-        <p:spPr>
-          <a:xfrm>
-            <a:off x="1419336" y="1300482"/>
-            <a:ext cx="4352456" cy="2600958"/>
-          </a:xfrm>
-          <a:prstGeom prst="rect">
-            <a:avLst/>
-          </a:prstGeom>
-          <a:solidFill>
-            <a:srgbClr val="FFC000">
-              <a:alpha val="37255"/>
-            </a:srgbClr>
-          </a:solidFill>
-          <a:ln>
-            <a:solidFill>
-              <a:srgbClr val="FF0000"/>
-            </a:solidFill>
-          </a:ln>
-        </p:spPr>
-        <p:style>
-          <a:lnRef idx="2">
-            <a:schemeClr val="accent1">
-              <a:shade val="50000"/>
-            </a:schemeClr>
-          </a:lnRef>
-          <a:fillRef idx="1">
-            <a:schemeClr val="accent1"/>
-          </a:fillRef>
-          <a:effectRef idx="0">
-            <a:schemeClr val="accent1"/>
-          </a:effectRef>
-          <a:fontRef idx="minor">
-            <a:schemeClr val="lt1"/>
-          </a:fontRef>
-        </p:style>
-        <p:txBody>
-          <a:bodyPr rtlCol="0" anchor="ctr"/>
-          <a:lstStyle/>
-          <a:p>
-            <a:pPr algn="ctr"/>
-            <a:endParaRPr lang="de-DE" dirty="0"/>
-          </a:p>
-        </p:txBody>
-      </p:sp>
-      <p:sp>
-        <p:nvSpPr>
-          <p:cNvPr id="10" name="Rectangle 9">
-            <a:extLst>
-              <a:ext uri="{FF2B5EF4-FFF2-40B4-BE49-F238E27FC236}">
-                <a16:creationId xmlns:a16="http://schemas.microsoft.com/office/drawing/2014/main" id="{49D2695A-2AFF-914A-AE0F-F66E950C7CD2}"/>
-              </a:ext>
-            </a:extLst>
-          </p:cNvPr>
-          <p:cNvSpPr>
-            <a:spLocks noChangeAspect="1"/>
-          </p:cNvSpPr>
-          <p:nvPr/>
-        </p:nvSpPr>
-        <p:spPr>
-          <a:xfrm>
-            <a:off x="1934122" y="1779572"/>
-            <a:ext cx="3302339" cy="1693576"/>
-          </a:xfrm>
-          <a:prstGeom prst="rect">
-            <a:avLst/>
-          </a:prstGeom>
-          <a:solidFill>
-            <a:srgbClr val="FFC000">
-              <a:alpha val="37255"/>
-            </a:srgbClr>
-          </a:solidFill>
-          <a:ln>
-            <a:solidFill>
-              <a:srgbClr val="FF0000"/>
-            </a:solidFill>
-          </a:ln>
-        </p:spPr>
-        <p:style>
-          <a:lnRef idx="2">
-            <a:schemeClr val="accent1">
-              <a:shade val="50000"/>
-            </a:schemeClr>
-          </a:lnRef>
-          <a:fillRef idx="1">
-            <a:schemeClr val="accent1"/>
-          </a:fillRef>
-          <a:effectRef idx="0">
-            <a:schemeClr val="accent1"/>
-          </a:effectRef>
-          <a:fontRef idx="minor">
-            <a:schemeClr val="lt1"/>
-          </a:fontRef>
-        </p:style>
-        <p:txBody>
-          <a:bodyPr rtlCol="0" anchor="ctr"/>
-          <a:lstStyle/>
-          <a:p>
-            <a:pPr algn="ctr"/>
-            <a:endParaRPr lang="de-DE" dirty="0"/>
-          </a:p>
-        </p:txBody>
-      </p:sp>
-      <p:sp>
-        <p:nvSpPr>
           <p:cNvPr id="35" name="TextBox 34">
             <a:extLst>
               <a:ext uri="{FF2B5EF4-FFF2-40B4-BE49-F238E27FC236}">
@@ -4037,7 +4143,7 @@
         </p:nvSpPr>
         <p:spPr>
           <a:xfrm>
-            <a:off x="3173890" y="1779572"/>
+            <a:off x="2739254" y="2002466"/>
             <a:ext cx="802248" cy="307777"/>
           </a:xfrm>
           <a:prstGeom prst="rect">
@@ -4080,7 +4186,7 @@
         </p:nvSpPr>
         <p:spPr>
           <a:xfrm>
-            <a:off x="4434213" y="2449596"/>
+            <a:off x="3999577" y="2672490"/>
             <a:ext cx="802248" cy="307777"/>
           </a:xfrm>
           <a:prstGeom prst="rect">
@@ -4123,7 +4229,7 @@
         </p:nvSpPr>
         <p:spPr>
           <a:xfrm>
-            <a:off x="6574044" y="780849"/>
+            <a:off x="6431804" y="2000049"/>
             <a:ext cx="3769357" cy="307777"/>
           </a:xfrm>
           <a:prstGeom prst="rect">
@@ -4186,7 +4292,7 @@
         </p:nvSpPr>
         <p:spPr>
           <a:xfrm>
-            <a:off x="3162800" y="1007544"/>
+            <a:off x="2728164" y="1230438"/>
             <a:ext cx="802248" cy="307777"/>
           </a:xfrm>
           <a:prstGeom prst="rect">
@@ -4229,7 +4335,7 @@
         </p:nvSpPr>
         <p:spPr>
           <a:xfrm>
-            <a:off x="5771795" y="2449596"/>
+            <a:off x="5337159" y="2672490"/>
             <a:ext cx="802248" cy="307777"/>
           </a:xfrm>
           <a:prstGeom prst="rect">
@@ -4271,7 +4377,7 @@
         </p:nvSpPr>
         <p:spPr>
           <a:xfrm>
-            <a:off x="6574043" y="1145513"/>
+            <a:off x="6431803" y="2364713"/>
             <a:ext cx="5850144" cy="307777"/>
           </a:xfrm>
           <a:prstGeom prst="rect">
@@ -4334,7 +4440,7 @@
         </p:nvSpPr>
         <p:spPr>
           <a:xfrm>
-            <a:off x="6578261" y="444628"/>
+            <a:off x="6436021" y="1663828"/>
             <a:ext cx="3769357" cy="307777"/>
           </a:xfrm>
           <a:prstGeom prst="rect">
@@ -4383,209 +4489,12 @@
           </a:p>
         </p:txBody>
       </p:sp>
-      <p:grpSp>
-        <p:nvGrpSpPr>
-          <p:cNvPr id="5" name="Group 4">
-            <a:extLst>
-              <a:ext uri="{FF2B5EF4-FFF2-40B4-BE49-F238E27FC236}">
-                <a16:creationId xmlns:a16="http://schemas.microsoft.com/office/drawing/2014/main" id="{70AC8961-68BF-4E4B-BA28-5130D8EE4846}"/>
-              </a:ext>
-            </a:extLst>
-          </p:cNvPr>
-          <p:cNvGrpSpPr/>
-          <p:nvPr/>
-        </p:nvGrpSpPr>
-        <p:grpSpPr>
-          <a:xfrm>
-            <a:off x="1148080" y="375920"/>
-            <a:ext cx="4947920" cy="4439920"/>
-            <a:chOff x="1385298" y="1842888"/>
-            <a:chExt cx="3728890" cy="2344100"/>
-          </a:xfrm>
-        </p:grpSpPr>
-        <p:cxnSp>
-          <p:nvCxnSpPr>
-            <p:cNvPr id="57" name="Straight Connector 56">
-              <a:extLst>
-                <a:ext uri="{FF2B5EF4-FFF2-40B4-BE49-F238E27FC236}">
-                  <a16:creationId xmlns:a16="http://schemas.microsoft.com/office/drawing/2014/main" id="{EFC1A53F-E297-EA42-AA6A-0D5B449D646B}"/>
-                </a:ext>
-              </a:extLst>
-            </p:cNvPr>
-            <p:cNvCxnSpPr>
-              <a:cxnSpLocks/>
-            </p:cNvCxnSpPr>
-            <p:nvPr/>
-          </p:nvCxnSpPr>
-          <p:spPr>
-            <a:xfrm flipH="1">
-              <a:off x="1385299" y="1842888"/>
-              <a:ext cx="3716681" cy="0"/>
-            </a:xfrm>
-            <a:prstGeom prst="line">
-              <a:avLst/>
-            </a:prstGeom>
-            <a:ln w="28575">
-              <a:solidFill>
-                <a:schemeClr val="tx1"/>
-              </a:solidFill>
-              <a:prstDash val="dash"/>
-            </a:ln>
-          </p:spPr>
-          <p:style>
-            <a:lnRef idx="1">
-              <a:schemeClr val="accent1"/>
-            </a:lnRef>
-            <a:fillRef idx="0">
-              <a:schemeClr val="accent1"/>
-            </a:fillRef>
-            <a:effectRef idx="0">
-              <a:schemeClr val="accent1"/>
-            </a:effectRef>
-            <a:fontRef idx="minor">
-              <a:schemeClr val="tx1"/>
-            </a:fontRef>
-          </p:style>
-        </p:cxnSp>
-        <p:cxnSp>
-          <p:nvCxnSpPr>
-            <p:cNvPr id="58" name="Straight Connector 57">
-              <a:extLst>
-                <a:ext uri="{FF2B5EF4-FFF2-40B4-BE49-F238E27FC236}">
-                  <a16:creationId xmlns:a16="http://schemas.microsoft.com/office/drawing/2014/main" id="{C15B36F8-13B0-8740-BB61-683DCF06090F}"/>
-                </a:ext>
-              </a:extLst>
-            </p:cNvPr>
-            <p:cNvCxnSpPr>
-              <a:cxnSpLocks/>
-            </p:cNvCxnSpPr>
-            <p:nvPr/>
-          </p:nvCxnSpPr>
-          <p:spPr>
-            <a:xfrm flipH="1">
-              <a:off x="1385298" y="4186988"/>
-              <a:ext cx="3716681" cy="0"/>
-            </a:xfrm>
-            <a:prstGeom prst="line">
-              <a:avLst/>
-            </a:prstGeom>
-            <a:ln w="28575">
-              <a:solidFill>
-                <a:schemeClr val="tx1"/>
-              </a:solidFill>
-              <a:prstDash val="dash"/>
-            </a:ln>
-          </p:spPr>
-          <p:style>
-            <a:lnRef idx="1">
-              <a:schemeClr val="accent1"/>
-            </a:lnRef>
-            <a:fillRef idx="0">
-              <a:schemeClr val="accent1"/>
-            </a:fillRef>
-            <a:effectRef idx="0">
-              <a:schemeClr val="accent1"/>
-            </a:effectRef>
-            <a:fontRef idx="minor">
-              <a:schemeClr val="tx1"/>
-            </a:fontRef>
-          </p:style>
-        </p:cxnSp>
-        <p:cxnSp>
-          <p:nvCxnSpPr>
-            <p:cNvPr id="59" name="Straight Connector 58">
-              <a:extLst>
-                <a:ext uri="{FF2B5EF4-FFF2-40B4-BE49-F238E27FC236}">
-                  <a16:creationId xmlns:a16="http://schemas.microsoft.com/office/drawing/2014/main" id="{95595F66-6787-FB46-87C7-7097FF44D3FC}"/>
-                </a:ext>
-              </a:extLst>
-            </p:cNvPr>
-            <p:cNvCxnSpPr>
-              <a:cxnSpLocks/>
-            </p:cNvCxnSpPr>
-            <p:nvPr/>
-          </p:nvCxnSpPr>
-          <p:spPr>
-            <a:xfrm flipV="1">
-              <a:off x="1399259" y="1853904"/>
-              <a:ext cx="0" cy="2330983"/>
-            </a:xfrm>
-            <a:prstGeom prst="line">
-              <a:avLst/>
-            </a:prstGeom>
-            <a:ln w="28575">
-              <a:solidFill>
-                <a:schemeClr val="tx1"/>
-              </a:solidFill>
-              <a:prstDash val="dash"/>
-            </a:ln>
-          </p:spPr>
-          <p:style>
-            <a:lnRef idx="1">
-              <a:schemeClr val="accent1"/>
-            </a:lnRef>
-            <a:fillRef idx="0">
-              <a:schemeClr val="accent1"/>
-            </a:fillRef>
-            <a:effectRef idx="0">
-              <a:schemeClr val="accent1"/>
-            </a:effectRef>
-            <a:fontRef idx="minor">
-              <a:schemeClr val="tx1"/>
-            </a:fontRef>
-          </p:style>
-        </p:cxnSp>
-        <p:cxnSp>
-          <p:nvCxnSpPr>
-            <p:cNvPr id="60" name="Straight Connector 59">
-              <a:extLst>
-                <a:ext uri="{FF2B5EF4-FFF2-40B4-BE49-F238E27FC236}">
-                  <a16:creationId xmlns:a16="http://schemas.microsoft.com/office/drawing/2014/main" id="{2BC2707E-7689-324D-8B27-A9C95262127A}"/>
-                </a:ext>
-              </a:extLst>
-            </p:cNvPr>
-            <p:cNvCxnSpPr>
-              <a:cxnSpLocks/>
-            </p:cNvCxnSpPr>
-            <p:nvPr/>
-          </p:nvCxnSpPr>
-          <p:spPr>
-            <a:xfrm flipV="1">
-              <a:off x="5114188" y="1853904"/>
-              <a:ext cx="0" cy="2330983"/>
-            </a:xfrm>
-            <a:prstGeom prst="line">
-              <a:avLst/>
-            </a:prstGeom>
-            <a:ln w="28575">
-              <a:solidFill>
-                <a:schemeClr val="tx1"/>
-              </a:solidFill>
-              <a:prstDash val="dash"/>
-            </a:ln>
-          </p:spPr>
-          <p:style>
-            <a:lnRef idx="1">
-              <a:schemeClr val="accent1"/>
-            </a:lnRef>
-            <a:fillRef idx="0">
-              <a:schemeClr val="accent1"/>
-            </a:fillRef>
-            <a:effectRef idx="0">
-              <a:schemeClr val="accent1"/>
-            </a:effectRef>
-            <a:fontRef idx="minor">
-              <a:schemeClr val="tx1"/>
-            </a:fontRef>
-          </p:style>
-        </p:cxnSp>
-      </p:grpSp>
       <p:sp>
         <p:nvSpPr>
-          <p:cNvPr id="61" name="TextBox 60">
-            <a:extLst>
-              <a:ext uri="{FF2B5EF4-FFF2-40B4-BE49-F238E27FC236}">
-                <a16:creationId xmlns:a16="http://schemas.microsoft.com/office/drawing/2014/main" id="{08AE32B9-7278-9648-9D48-427CBC8C7C2D}"/>
+          <p:cNvPr id="66" name="TextBox 65">
+            <a:extLst>
+              <a:ext uri="{FF2B5EF4-FFF2-40B4-BE49-F238E27FC236}">
+                <a16:creationId xmlns:a16="http://schemas.microsoft.com/office/drawing/2014/main" id="{2431676F-31E9-2948-8B46-4E6AAA8C4116}"/>
               </a:ext>
             </a:extLst>
           </p:cNvPr>
@@ -4594,233 +4503,7 @@
         </p:nvSpPr>
         <p:spPr>
           <a:xfrm>
-            <a:off x="1303520" y="67057"/>
-            <a:ext cx="802248" cy="307777"/>
-          </a:xfrm>
-          <a:prstGeom prst="rect">
-            <a:avLst/>
-          </a:prstGeom>
-          <a:noFill/>
-        </p:spPr>
-        <p:txBody>
-          <a:bodyPr wrap="square" rtlCol="0">
-            <a:spAutoFit/>
-          </a:bodyPr>
-          <a:lstStyle/>
-          <a:p>
-            <a:pPr algn="ctr"/>
-            <a:r>
-              <a:rPr lang="en-GB" sz="1400" dirty="0" err="1">
-                <a:latin typeface="Consolas" panose="020B0609020204030204" pitchFamily="49" charset="0"/>
-                <a:cs typeface="Consolas" panose="020B0609020204030204" pitchFamily="49" charset="0"/>
-              </a:rPr>
-              <a:t>fw</a:t>
-            </a:r>
-            <a:endParaRPr lang="de-DE" sz="1400" dirty="0">
-              <a:latin typeface="Consolas" panose="020B0609020204030204" pitchFamily="49" charset="0"/>
-              <a:cs typeface="Consolas" panose="020B0609020204030204" pitchFamily="49" charset="0"/>
-            </a:endParaRPr>
-          </a:p>
-        </p:txBody>
-      </p:sp>
-      <p:sp>
-        <p:nvSpPr>
-          <p:cNvPr id="62" name="TextBox 61">
-            <a:extLst>
-              <a:ext uri="{FF2B5EF4-FFF2-40B4-BE49-F238E27FC236}">
-                <a16:creationId xmlns:a16="http://schemas.microsoft.com/office/drawing/2014/main" id="{63888F76-FFE7-0943-BA8C-8B9FF93CC069}"/>
-              </a:ext>
-            </a:extLst>
-          </p:cNvPr>
-          <p:cNvSpPr txBox="1"/>
-          <p:nvPr/>
-        </p:nvSpPr>
-        <p:spPr>
-          <a:xfrm>
-            <a:off x="688563" y="699767"/>
-            <a:ext cx="464060" cy="307777"/>
-          </a:xfrm>
-          <a:prstGeom prst="rect">
-            <a:avLst/>
-          </a:prstGeom>
-          <a:noFill/>
-        </p:spPr>
-        <p:txBody>
-          <a:bodyPr wrap="square" rtlCol="0">
-            <a:spAutoFit/>
-          </a:bodyPr>
-          <a:lstStyle/>
-          <a:p>
-            <a:pPr algn="r"/>
-            <a:r>
-              <a:rPr lang="en-GB" sz="1400" dirty="0" err="1">
-                <a:latin typeface="Consolas" panose="020B0609020204030204" pitchFamily="49" charset="0"/>
-                <a:cs typeface="Consolas" panose="020B0609020204030204" pitchFamily="49" charset="0"/>
-              </a:rPr>
-              <a:t>fh</a:t>
-            </a:r>
-            <a:endParaRPr lang="de-DE" sz="1400" dirty="0">
-              <a:latin typeface="Consolas" panose="020B0609020204030204" pitchFamily="49" charset="0"/>
-              <a:cs typeface="Consolas" panose="020B0609020204030204" pitchFamily="49" charset="0"/>
-            </a:endParaRPr>
-          </a:p>
-        </p:txBody>
-      </p:sp>
-      <p:sp>
-        <p:nvSpPr>
-          <p:cNvPr id="63" name="TextBox 62">
-            <a:extLst>
-              <a:ext uri="{FF2B5EF4-FFF2-40B4-BE49-F238E27FC236}">
-                <a16:creationId xmlns:a16="http://schemas.microsoft.com/office/drawing/2014/main" id="{97F4B6E6-B632-954B-8E78-A145AE44614B}"/>
-              </a:ext>
-            </a:extLst>
-          </p:cNvPr>
-          <p:cNvSpPr txBox="1"/>
-          <p:nvPr/>
-        </p:nvSpPr>
-        <p:spPr>
-          <a:xfrm>
-            <a:off x="1065980" y="5135706"/>
-            <a:ext cx="3769357" cy="307777"/>
-          </a:xfrm>
-          <a:prstGeom prst="rect">
-            <a:avLst/>
-          </a:prstGeom>
-          <a:noFill/>
-        </p:spPr>
-        <p:txBody>
-          <a:bodyPr wrap="square" rtlCol="0">
-            <a:spAutoFit/>
-          </a:bodyPr>
-          <a:lstStyle/>
-          <a:p>
-            <a:r>
-              <a:rPr lang="en-GB" sz="1400" dirty="0" err="1">
-                <a:latin typeface="Consolas" panose="020B0609020204030204" pitchFamily="49" charset="0"/>
-                <a:cs typeface="Consolas" panose="020B0609020204030204" pitchFamily="49" charset="0"/>
-              </a:rPr>
-              <a:t>sw</a:t>
-            </a:r>
-            <a:r>
-              <a:rPr lang="en-GB" sz="1400" dirty="0">
-                <a:latin typeface="Consolas" panose="020B0609020204030204" pitchFamily="49" charset="0"/>
-                <a:cs typeface="Consolas" panose="020B0609020204030204" pitchFamily="49" charset="0"/>
-              </a:rPr>
-              <a:t> = </a:t>
-            </a:r>
-            <a:r>
-              <a:rPr lang="en-GB" sz="1400" dirty="0" err="1">
-                <a:latin typeface="Consolas" panose="020B0609020204030204" pitchFamily="49" charset="0"/>
-                <a:cs typeface="Consolas" panose="020B0609020204030204" pitchFamily="49" charset="0"/>
-              </a:rPr>
-              <a:t>fw</a:t>
-            </a:r>
-            <a:r>
-              <a:rPr lang="en-GB" sz="1400" dirty="0">
-                <a:latin typeface="Consolas" panose="020B0609020204030204" pitchFamily="49" charset="0"/>
-                <a:cs typeface="Consolas" panose="020B0609020204030204" pitchFamily="49" charset="0"/>
-              </a:rPr>
-              <a:t> / </a:t>
-            </a:r>
-            <a:r>
-              <a:rPr lang="en-GB" sz="1400" dirty="0" err="1">
-                <a:latin typeface="Consolas" panose="020B0609020204030204" pitchFamily="49" charset="0"/>
-                <a:cs typeface="Consolas" panose="020B0609020204030204" pitchFamily="49" charset="0"/>
-              </a:rPr>
-              <a:t>twm</a:t>
-            </a:r>
-            <a:endParaRPr lang="de-DE" sz="1400" dirty="0">
-              <a:latin typeface="Consolas" panose="020B0609020204030204" pitchFamily="49" charset="0"/>
-              <a:cs typeface="Consolas" panose="020B0609020204030204" pitchFamily="49" charset="0"/>
-            </a:endParaRPr>
-          </a:p>
-        </p:txBody>
-      </p:sp>
-      <p:sp>
-        <p:nvSpPr>
-          <p:cNvPr id="64" name="TextBox 63">
-            <a:extLst>
-              <a:ext uri="{FF2B5EF4-FFF2-40B4-BE49-F238E27FC236}">
-                <a16:creationId xmlns:a16="http://schemas.microsoft.com/office/drawing/2014/main" id="{1CA3360E-509D-1446-9DF0-4E2D429B5228}"/>
-              </a:ext>
-            </a:extLst>
-          </p:cNvPr>
-          <p:cNvSpPr txBox="1"/>
-          <p:nvPr/>
-        </p:nvSpPr>
-        <p:spPr>
-          <a:xfrm>
-            <a:off x="1065980" y="5506716"/>
-            <a:ext cx="3769357" cy="307777"/>
-          </a:xfrm>
-          <a:prstGeom prst="rect">
-            <a:avLst/>
-          </a:prstGeom>
-          <a:noFill/>
-        </p:spPr>
-        <p:txBody>
-          <a:bodyPr wrap="square" rtlCol="0">
-            <a:spAutoFit/>
-          </a:bodyPr>
-          <a:lstStyle/>
-          <a:p>
-            <a:r>
-              <a:rPr lang="en-GB" sz="1400" dirty="0" err="1">
-                <a:latin typeface="Consolas" panose="020B0609020204030204" pitchFamily="49" charset="0"/>
-                <a:cs typeface="Consolas" panose="020B0609020204030204" pitchFamily="49" charset="0"/>
-              </a:rPr>
-              <a:t>sh</a:t>
-            </a:r>
-            <a:r>
-              <a:rPr lang="en-GB" sz="1400" dirty="0">
-                <a:latin typeface="Consolas" panose="020B0609020204030204" pitchFamily="49" charset="0"/>
-                <a:cs typeface="Consolas" panose="020B0609020204030204" pitchFamily="49" charset="0"/>
-              </a:rPr>
-              <a:t> = </a:t>
-            </a:r>
-            <a:r>
-              <a:rPr lang="en-GB" sz="1400" dirty="0" err="1">
-                <a:latin typeface="Consolas" panose="020B0609020204030204" pitchFamily="49" charset="0"/>
-                <a:cs typeface="Consolas" panose="020B0609020204030204" pitchFamily="49" charset="0"/>
-              </a:rPr>
-              <a:t>fh</a:t>
-            </a:r>
-            <a:r>
-              <a:rPr lang="en-GB" sz="1400" dirty="0">
-                <a:latin typeface="Consolas" panose="020B0609020204030204" pitchFamily="49" charset="0"/>
-                <a:cs typeface="Consolas" panose="020B0609020204030204" pitchFamily="49" charset="0"/>
-              </a:rPr>
-              <a:t> / </a:t>
-            </a:r>
-            <a:r>
-              <a:rPr lang="en-GB" sz="1400" dirty="0" err="1">
-                <a:latin typeface="Consolas" panose="020B0609020204030204" pitchFamily="49" charset="0"/>
-                <a:cs typeface="Consolas" panose="020B0609020204030204" pitchFamily="49" charset="0"/>
-              </a:rPr>
-              <a:t>thm</a:t>
-            </a:r>
-            <a:endParaRPr lang="de-DE" sz="1400" dirty="0">
-              <a:latin typeface="Consolas" panose="020B0609020204030204" pitchFamily="49" charset="0"/>
-              <a:cs typeface="Consolas" panose="020B0609020204030204" pitchFamily="49" charset="0"/>
-            </a:endParaRPr>
-          </a:p>
-        </p:txBody>
-      </p:sp>
-      <p:sp>
-        <p:nvSpPr>
-          <p:cNvPr id="66" name="TextBox 65">
-            <a:extLst>
-              <a:ext uri="{FF2B5EF4-FFF2-40B4-BE49-F238E27FC236}">
-                <a16:creationId xmlns:a16="http://schemas.microsoft.com/office/drawing/2014/main" id="{2431676F-31E9-2948-8B46-4E6AAA8C4116}"/>
-              </a:ext>
-            </a:extLst>
-          </p:cNvPr>
-          <p:cNvSpPr txBox="1"/>
-          <p:nvPr/>
-        </p:nvSpPr>
-        <p:spPr>
-          <a:xfrm>
-            <a:off x="6574044" y="1656683"/>
+            <a:off x="6431804" y="2875883"/>
             <a:ext cx="3769357" cy="307777"/>
           </a:xfrm>
           <a:prstGeom prst="rect">
@@ -4899,6 +4582,261 @@
           <a:chExt cx="0" cy="0"/>
         </a:xfrm>
       </p:grpSpPr>
+      <p:grpSp>
+        <p:nvGrpSpPr>
+          <p:cNvPr id="23" name="Group 22">
+            <a:extLst>
+              <a:ext uri="{FF2B5EF4-FFF2-40B4-BE49-F238E27FC236}">
+                <a16:creationId xmlns:a16="http://schemas.microsoft.com/office/drawing/2014/main" id="{7C4158F8-2BE0-4B4E-8DE5-9B6C61F9F0A0}"/>
+              </a:ext>
+            </a:extLst>
+          </p:cNvPr>
+          <p:cNvGrpSpPr/>
+          <p:nvPr/>
+        </p:nvGrpSpPr>
+        <p:grpSpPr>
+          <a:xfrm rot="568031">
+            <a:off x="2099918" y="1623666"/>
+            <a:ext cx="7337207" cy="3086645"/>
+            <a:chOff x="984700" y="1522296"/>
+            <a:chExt cx="4352456" cy="2602038"/>
+          </a:xfrm>
+        </p:grpSpPr>
+        <p:grpSp>
+          <p:nvGrpSpPr>
+            <p:cNvPr id="24" name="Group 23">
+              <a:extLst>
+                <a:ext uri="{FF2B5EF4-FFF2-40B4-BE49-F238E27FC236}">
+                  <a16:creationId xmlns:a16="http://schemas.microsoft.com/office/drawing/2014/main" id="{4C699F78-8EF3-3F41-B7BF-10ECA9B697A5}"/>
+                </a:ext>
+              </a:extLst>
+            </p:cNvPr>
+            <p:cNvGrpSpPr/>
+            <p:nvPr/>
+          </p:nvGrpSpPr>
+          <p:grpSpPr>
+            <a:xfrm>
+              <a:off x="984700" y="1522296"/>
+              <a:ext cx="4331906" cy="2600952"/>
+              <a:chOff x="894080" y="910434"/>
+              <a:chExt cx="5415280" cy="3488846"/>
+            </a:xfrm>
+          </p:grpSpPr>
+          <p:sp>
+            <p:nvSpPr>
+              <p:cNvPr id="41" name="Rounded Rectangle 40">
+                <a:extLst>
+                  <a:ext uri="{FF2B5EF4-FFF2-40B4-BE49-F238E27FC236}">
+                    <a16:creationId xmlns:a16="http://schemas.microsoft.com/office/drawing/2014/main" id="{9E112E40-A7F3-DF4B-AD92-BA19E7CB9CA0}"/>
+                  </a:ext>
+                </a:extLst>
+              </p:cNvPr>
+              <p:cNvSpPr/>
+              <p:nvPr/>
+            </p:nvSpPr>
+            <p:spPr>
+              <a:xfrm>
+                <a:off x="894080" y="910434"/>
+                <a:ext cx="5415280" cy="3488846"/>
+              </a:xfrm>
+              <a:prstGeom prst="roundRect">
+                <a:avLst/>
+              </a:prstGeom>
+            </p:spPr>
+            <p:style>
+              <a:lnRef idx="2">
+                <a:schemeClr val="accent1">
+                  <a:shade val="50000"/>
+                </a:schemeClr>
+              </a:lnRef>
+              <a:fillRef idx="1">
+                <a:schemeClr val="accent1"/>
+              </a:fillRef>
+              <a:effectRef idx="0">
+                <a:schemeClr val="accent1"/>
+              </a:effectRef>
+              <a:fontRef idx="minor">
+                <a:schemeClr val="lt1"/>
+              </a:fontRef>
+            </p:style>
+            <p:txBody>
+              <a:bodyPr rtlCol="0" anchor="ctr"/>
+              <a:lstStyle/>
+              <a:p>
+                <a:pPr algn="ctr"/>
+                <a:endParaRPr lang="en-VN"/>
+              </a:p>
+            </p:txBody>
+          </p:sp>
+          <p:sp>
+            <p:nvSpPr>
+              <p:cNvPr id="42" name="Rounded Rectangle 41">
+                <a:extLst>
+                  <a:ext uri="{FF2B5EF4-FFF2-40B4-BE49-F238E27FC236}">
+                    <a16:creationId xmlns:a16="http://schemas.microsoft.com/office/drawing/2014/main" id="{78645986-8F72-1A4B-8A96-44C1166F5F70}"/>
+                  </a:ext>
+                </a:extLst>
+              </p:cNvPr>
+              <p:cNvSpPr/>
+              <p:nvPr/>
+            </p:nvSpPr>
+            <p:spPr>
+              <a:xfrm>
+                <a:off x="1135103" y="1218211"/>
+                <a:ext cx="4879819" cy="2970293"/>
+              </a:xfrm>
+              <a:prstGeom prst="roundRect">
+                <a:avLst>
+                  <a:gd name="adj" fmla="val 11878"/>
+                </a:avLst>
+              </a:prstGeom>
+              <a:solidFill>
+                <a:schemeClr val="bg1"/>
+              </a:solidFill>
+            </p:spPr>
+            <p:style>
+              <a:lnRef idx="2">
+                <a:schemeClr val="accent1">
+                  <a:shade val="50000"/>
+                </a:schemeClr>
+              </a:lnRef>
+              <a:fillRef idx="1">
+                <a:schemeClr val="accent1"/>
+              </a:fillRef>
+              <a:effectRef idx="0">
+                <a:schemeClr val="accent1"/>
+              </a:effectRef>
+              <a:fontRef idx="minor">
+                <a:schemeClr val="lt1"/>
+              </a:fontRef>
+            </p:style>
+            <p:txBody>
+              <a:bodyPr rtlCol="0" anchor="ctr"/>
+              <a:lstStyle/>
+              <a:p>
+                <a:pPr algn="ctr"/>
+                <a:endParaRPr lang="en-VN"/>
+              </a:p>
+            </p:txBody>
+          </p:sp>
+        </p:grpSp>
+        <p:sp>
+          <p:nvSpPr>
+            <p:cNvPr id="34" name="Rectangle 33">
+              <a:extLst>
+                <a:ext uri="{FF2B5EF4-FFF2-40B4-BE49-F238E27FC236}">
+                  <a16:creationId xmlns:a16="http://schemas.microsoft.com/office/drawing/2014/main" id="{428C0FB3-622B-7C45-B188-719689AFB576}"/>
+                </a:ext>
+              </a:extLst>
+            </p:cNvPr>
+            <p:cNvSpPr>
+              <a:spLocks noChangeAspect="1"/>
+            </p:cNvSpPr>
+            <p:nvPr/>
+          </p:nvSpPr>
+          <p:spPr>
+            <a:xfrm>
+              <a:off x="984700" y="1523376"/>
+              <a:ext cx="4352456" cy="2600958"/>
+            </a:xfrm>
+            <a:prstGeom prst="rect">
+              <a:avLst/>
+            </a:prstGeom>
+            <a:solidFill>
+              <a:srgbClr val="FFC000">
+                <a:alpha val="37255"/>
+              </a:srgbClr>
+            </a:solidFill>
+            <a:ln>
+              <a:solidFill>
+                <a:srgbClr val="FF0000"/>
+              </a:solidFill>
+            </a:ln>
+          </p:spPr>
+          <p:style>
+            <a:lnRef idx="2">
+              <a:schemeClr val="accent1">
+                <a:shade val="50000"/>
+              </a:schemeClr>
+            </a:lnRef>
+            <a:fillRef idx="1">
+              <a:schemeClr val="accent1"/>
+            </a:fillRef>
+            <a:effectRef idx="0">
+              <a:schemeClr val="accent1"/>
+            </a:effectRef>
+            <a:fontRef idx="minor">
+              <a:schemeClr val="lt1"/>
+            </a:fontRef>
+          </p:style>
+          <p:txBody>
+            <a:bodyPr rtlCol="0" anchor="ctr"/>
+            <a:lstStyle/>
+            <a:p>
+              <a:pPr algn="ctr"/>
+              <a:endParaRPr lang="de-DE" dirty="0"/>
+            </a:p>
+          </p:txBody>
+        </p:sp>
+        <p:sp>
+          <p:nvSpPr>
+            <p:cNvPr id="39" name="Rectangle 38">
+              <a:extLst>
+                <a:ext uri="{FF2B5EF4-FFF2-40B4-BE49-F238E27FC236}">
+                  <a16:creationId xmlns:a16="http://schemas.microsoft.com/office/drawing/2014/main" id="{BE5738BC-25EE-D841-ADAF-D6E71D094BA4}"/>
+                </a:ext>
+              </a:extLst>
+            </p:cNvPr>
+            <p:cNvSpPr>
+              <a:spLocks noChangeAspect="1"/>
+            </p:cNvSpPr>
+            <p:nvPr/>
+          </p:nvSpPr>
+          <p:spPr>
+            <a:xfrm>
+              <a:off x="1499486" y="2002466"/>
+              <a:ext cx="3302339" cy="1693576"/>
+            </a:xfrm>
+            <a:prstGeom prst="rect">
+              <a:avLst/>
+            </a:prstGeom>
+            <a:solidFill>
+              <a:srgbClr val="FFC000">
+                <a:alpha val="37255"/>
+              </a:srgbClr>
+            </a:solidFill>
+            <a:ln>
+              <a:solidFill>
+                <a:srgbClr val="FF0000"/>
+              </a:solidFill>
+            </a:ln>
+          </p:spPr>
+          <p:style>
+            <a:lnRef idx="2">
+              <a:schemeClr val="accent1">
+                <a:shade val="50000"/>
+              </a:schemeClr>
+            </a:lnRef>
+            <a:fillRef idx="1">
+              <a:schemeClr val="accent1"/>
+            </a:fillRef>
+            <a:effectRef idx="0">
+              <a:schemeClr val="accent1"/>
+            </a:effectRef>
+            <a:fontRef idx="minor">
+              <a:schemeClr val="lt1"/>
+            </a:fontRef>
+          </p:style>
+          <p:txBody>
+            <a:bodyPr rtlCol="0" anchor="ctr"/>
+            <a:lstStyle/>
+            <a:p>
+              <a:pPr algn="ctr"/>
+              <a:endParaRPr lang="de-DE" dirty="0"/>
+            </a:p>
+          </p:txBody>
+        </p:sp>
+      </p:grpSp>
       <p:sp>
         <p:nvSpPr>
           <p:cNvPr id="4" name="Rectangle 3">
@@ -4957,64 +4895,6 @@
       </p:sp>
       <p:sp>
         <p:nvSpPr>
-          <p:cNvPr id="10" name="Rectangle 9">
-            <a:extLst>
-              <a:ext uri="{FF2B5EF4-FFF2-40B4-BE49-F238E27FC236}">
-                <a16:creationId xmlns:a16="http://schemas.microsoft.com/office/drawing/2014/main" id="{49D2695A-2AFF-914A-AE0F-F66E950C7CD2}"/>
-              </a:ext>
-            </a:extLst>
-          </p:cNvPr>
-          <p:cNvSpPr>
-            <a:spLocks noChangeAspect="1"/>
-          </p:cNvSpPr>
-          <p:nvPr/>
-        </p:nvSpPr>
-        <p:spPr>
-          <a:xfrm rot="575565">
-            <a:off x="2094003" y="1631966"/>
-            <a:ext cx="7351158" cy="3092110"/>
-          </a:xfrm>
-          <a:prstGeom prst="rect">
-            <a:avLst/>
-          </a:prstGeom>
-          <a:solidFill>
-            <a:srgbClr val="FFC000">
-              <a:alpha val="37255"/>
-            </a:srgbClr>
-          </a:solidFill>
-          <a:ln>
-            <a:solidFill>
-              <a:srgbClr val="FF0000"/>
-            </a:solidFill>
-          </a:ln>
-        </p:spPr>
-        <p:style>
-          <a:lnRef idx="2">
-            <a:schemeClr val="accent1">
-              <a:shade val="50000"/>
-            </a:schemeClr>
-          </a:lnRef>
-          <a:fillRef idx="1">
-            <a:schemeClr val="accent1"/>
-          </a:fillRef>
-          <a:effectRef idx="0">
-            <a:schemeClr val="accent1"/>
-          </a:effectRef>
-          <a:fontRef idx="minor">
-            <a:schemeClr val="lt1"/>
-          </a:fontRef>
-        </p:style>
-        <p:txBody>
-          <a:bodyPr rtlCol="0" anchor="ctr"/>
-          <a:lstStyle/>
-          <a:p>
-            <a:pPr algn="ctr"/>
-            <a:endParaRPr lang="de-DE" dirty="0"/>
-          </a:p>
-        </p:txBody>
-      </p:sp>
-      <p:sp>
-        <p:nvSpPr>
           <p:cNvPr id="16" name="TextBox 15">
             <a:extLst>
               <a:ext uri="{FF2B5EF4-FFF2-40B4-BE49-F238E27FC236}">
@@ -5175,8 +5055,8 @@
           </a:p>
         </p:txBody>
       </p:sp>
-      <mc:AlternateContent xmlns:mc="http://schemas.openxmlformats.org/markup-compatibility/2006">
-        <mc:Choice xmlns:a14="http://schemas.microsoft.com/office/drawing/2010/main" Requires="a14">
+      <mc:AlternateContent xmlns:mc="http://schemas.openxmlformats.org/markup-compatibility/2006" xmlns:a14="http://schemas.microsoft.com/office/drawing/2010/main">
+        <mc:Choice Requires="a14">
           <p:sp>
             <p:nvSpPr>
               <p:cNvPr id="32" name="TextBox 31">
@@ -5291,14 +5171,7 @@
                               <a:latin typeface="Cambria Math" panose="02040503050406030204" pitchFamily="18" charset="0"/>
                               <a:ea typeface="Cambria Math" panose="02040503050406030204" pitchFamily="18" charset="0"/>
                             </a:rPr>
-                            <m:t>𝑡h</m:t>
-                          </m:r>
-                          <m:r>
-                            <a:rPr lang="en-US" b="0" i="1" smtClean="0">
-                              <a:latin typeface="Cambria Math" panose="02040503050406030204" pitchFamily="18" charset="0"/>
-                              <a:ea typeface="Cambria Math" panose="02040503050406030204" pitchFamily="18" charset="0"/>
-                            </a:rPr>
-                            <m:t>𝑟</m:t>
+                            <m:t>𝑡h𝑟</m:t>
                           </m:r>
                         </m:num>
                         <m:den>
@@ -5448,7 +5321,7 @@
             </p:txBody>
           </p:sp>
         </mc:Choice>
-        <mc:Fallback>
+        <mc:Fallback xmlns="">
           <p:sp>
             <p:nvSpPr>
               <p:cNvPr id="32" name="TextBox 31">
@@ -5493,8 +5366,8 @@
           </p:sp>
         </mc:Fallback>
       </mc:AlternateContent>
-      <mc:AlternateContent xmlns:mc="http://schemas.openxmlformats.org/markup-compatibility/2006">
-        <mc:Choice xmlns:a14="http://schemas.microsoft.com/office/drawing/2010/main" Requires="a14">
+      <mc:AlternateContent xmlns:mc="http://schemas.openxmlformats.org/markup-compatibility/2006" xmlns:a14="http://schemas.microsoft.com/office/drawing/2010/main">
+        <mc:Choice Requires="a14">
           <p:sp>
             <p:nvSpPr>
               <p:cNvPr id="35" name="TextBox 34">
@@ -5853,7 +5726,7 @@
             </p:txBody>
           </p:sp>
         </mc:Choice>
-        <mc:Fallback>
+        <mc:Fallback xmlns="">
           <p:sp>
             <p:nvSpPr>
               <p:cNvPr id="35" name="TextBox 34">
@@ -6083,8 +5956,8 @@
           </a:p>
         </p:txBody>
       </p:sp>
-      <mc:AlternateContent xmlns:mc="http://schemas.openxmlformats.org/markup-compatibility/2006">
-        <mc:Choice xmlns:a14="http://schemas.microsoft.com/office/drawing/2010/main" Requires="a14">
+      <mc:AlternateContent xmlns:mc="http://schemas.openxmlformats.org/markup-compatibility/2006" xmlns:a14="http://schemas.microsoft.com/office/drawing/2010/main">
+        <mc:Choice Requires="a14">
           <p:sp>
             <p:nvSpPr>
               <p:cNvPr id="18" name="TextBox 17">
@@ -6175,7 +6048,7 @@
             </p:txBody>
           </p:sp>
         </mc:Choice>
-        <mc:Fallback>
+        <mc:Fallback xmlns="">
           <p:sp>
             <p:nvSpPr>
               <p:cNvPr id="18" name="TextBox 17">
@@ -6264,8 +6137,8 @@
           </a:fontRef>
         </p:style>
       </p:cxnSp>
-      <mc:AlternateContent xmlns:mc="http://schemas.openxmlformats.org/markup-compatibility/2006">
-        <mc:Choice xmlns:a14="http://schemas.microsoft.com/office/drawing/2010/main" Requires="a14">
+      <mc:AlternateContent xmlns:mc="http://schemas.openxmlformats.org/markup-compatibility/2006" xmlns:a14="http://schemas.microsoft.com/office/drawing/2010/main">
+        <mc:Choice Requires="a14">
           <p:sp>
             <p:nvSpPr>
               <p:cNvPr id="19" name="TextBox 18">
@@ -6597,7 +6470,7 @@
             </p:txBody>
           </p:sp>
         </mc:Choice>
-        <mc:Fallback>
+        <mc:Fallback xmlns="">
           <p:sp>
             <p:nvSpPr>
               <p:cNvPr id="19" name="TextBox 18">
@@ -6815,8 +6688,8 @@
           </a:p>
         </p:txBody>
       </p:sp>
-      <mc:AlternateContent xmlns:mc="http://schemas.openxmlformats.org/markup-compatibility/2006">
-        <mc:Choice xmlns:a14="http://schemas.microsoft.com/office/drawing/2010/main" Requires="a14">
+      <mc:AlternateContent xmlns:mc="http://schemas.openxmlformats.org/markup-compatibility/2006" xmlns:a14="http://schemas.microsoft.com/office/drawing/2010/main">
+        <mc:Choice Requires="a14">
           <p:sp>
             <p:nvSpPr>
               <p:cNvPr id="36" name="TextBox 35">
@@ -6913,7 +6786,7 @@
             </p:txBody>
           </p:sp>
         </mc:Choice>
-        <mc:Fallback>
+        <mc:Fallback xmlns="">
           <p:sp>
             <p:nvSpPr>
               <p:cNvPr id="36" name="TextBox 35">
@@ -6958,8 +6831,8 @@
           </p:sp>
         </mc:Fallback>
       </mc:AlternateContent>
-      <mc:AlternateContent xmlns:mc="http://schemas.openxmlformats.org/markup-compatibility/2006">
-        <mc:Choice xmlns:a14="http://schemas.microsoft.com/office/drawing/2010/main" Requires="a14">
+      <mc:AlternateContent xmlns:mc="http://schemas.openxmlformats.org/markup-compatibility/2006" xmlns:a14="http://schemas.microsoft.com/office/drawing/2010/main">
+        <mc:Choice Requires="a14">
           <p:sp>
             <p:nvSpPr>
               <p:cNvPr id="40" name="TextBox 39">
@@ -7056,7 +6929,7 @@
             </p:txBody>
           </p:sp>
         </mc:Choice>
-        <mc:Fallback>
+        <mc:Fallback xmlns="">
           <p:sp>
             <p:nvSpPr>
               <p:cNvPr id="40" name="TextBox 39">
@@ -7115,6 +6988,946 @@
 </file>
 
 <file path=ppt/slides/slide3.xml><?xml version="1.0" encoding="utf-8"?>
+<p:sld xmlns:a="http://schemas.openxmlformats.org/drawingml/2006/main" xmlns:r="http://schemas.openxmlformats.org/officeDocument/2006/relationships" xmlns:p="http://schemas.openxmlformats.org/presentationml/2006/main">
+  <p:cSld>
+    <p:spTree>
+      <p:nvGrpSpPr>
+        <p:cNvPr id="1" name=""/>
+        <p:cNvGrpSpPr/>
+        <p:nvPr/>
+      </p:nvGrpSpPr>
+      <p:grpSpPr>
+        <a:xfrm>
+          <a:off x="0" y="0"/>
+          <a:ext cx="0" cy="0"/>
+          <a:chOff x="0" y="0"/>
+          <a:chExt cx="0" cy="0"/>
+        </a:xfrm>
+      </p:grpSpPr>
+      <p:grpSp>
+        <p:nvGrpSpPr>
+          <p:cNvPr id="5" name="Group 4">
+            <a:extLst>
+              <a:ext uri="{FF2B5EF4-FFF2-40B4-BE49-F238E27FC236}">
+                <a16:creationId xmlns:a16="http://schemas.microsoft.com/office/drawing/2014/main" id="{70AC8961-68BF-4E4B-BA28-5130D8EE4846}"/>
+              </a:ext>
+            </a:extLst>
+          </p:cNvPr>
+          <p:cNvGrpSpPr/>
+          <p:nvPr/>
+        </p:nvGrpSpPr>
+        <p:grpSpPr>
+          <a:xfrm>
+            <a:off x="1148079" y="375920"/>
+            <a:ext cx="6184541" cy="4759786"/>
+            <a:chOff x="1385298" y="1842888"/>
+            <a:chExt cx="3728890" cy="2344100"/>
+          </a:xfrm>
+        </p:grpSpPr>
+        <p:cxnSp>
+          <p:nvCxnSpPr>
+            <p:cNvPr id="57" name="Straight Connector 56">
+              <a:extLst>
+                <a:ext uri="{FF2B5EF4-FFF2-40B4-BE49-F238E27FC236}">
+                  <a16:creationId xmlns:a16="http://schemas.microsoft.com/office/drawing/2014/main" id="{EFC1A53F-E297-EA42-AA6A-0D5B449D646B}"/>
+                </a:ext>
+              </a:extLst>
+            </p:cNvPr>
+            <p:cNvCxnSpPr>
+              <a:cxnSpLocks/>
+            </p:cNvCxnSpPr>
+            <p:nvPr/>
+          </p:nvCxnSpPr>
+          <p:spPr>
+            <a:xfrm flipH="1">
+              <a:off x="1385299" y="1842888"/>
+              <a:ext cx="3716681" cy="0"/>
+            </a:xfrm>
+            <a:prstGeom prst="line">
+              <a:avLst/>
+            </a:prstGeom>
+            <a:ln w="28575">
+              <a:solidFill>
+                <a:schemeClr val="tx1"/>
+              </a:solidFill>
+              <a:prstDash val="dash"/>
+            </a:ln>
+          </p:spPr>
+          <p:style>
+            <a:lnRef idx="1">
+              <a:schemeClr val="accent1"/>
+            </a:lnRef>
+            <a:fillRef idx="0">
+              <a:schemeClr val="accent1"/>
+            </a:fillRef>
+            <a:effectRef idx="0">
+              <a:schemeClr val="accent1"/>
+            </a:effectRef>
+            <a:fontRef idx="minor">
+              <a:schemeClr val="tx1"/>
+            </a:fontRef>
+          </p:style>
+        </p:cxnSp>
+        <p:cxnSp>
+          <p:nvCxnSpPr>
+            <p:cNvPr id="58" name="Straight Connector 57">
+              <a:extLst>
+                <a:ext uri="{FF2B5EF4-FFF2-40B4-BE49-F238E27FC236}">
+                  <a16:creationId xmlns:a16="http://schemas.microsoft.com/office/drawing/2014/main" id="{C15B36F8-13B0-8740-BB61-683DCF06090F}"/>
+                </a:ext>
+              </a:extLst>
+            </p:cNvPr>
+            <p:cNvCxnSpPr>
+              <a:cxnSpLocks/>
+            </p:cNvCxnSpPr>
+            <p:nvPr/>
+          </p:nvCxnSpPr>
+          <p:spPr>
+            <a:xfrm flipH="1">
+              <a:off x="1385298" y="4186988"/>
+              <a:ext cx="3716681" cy="0"/>
+            </a:xfrm>
+            <a:prstGeom prst="line">
+              <a:avLst/>
+            </a:prstGeom>
+            <a:ln w="28575">
+              <a:solidFill>
+                <a:schemeClr val="tx1"/>
+              </a:solidFill>
+              <a:prstDash val="dash"/>
+            </a:ln>
+          </p:spPr>
+          <p:style>
+            <a:lnRef idx="1">
+              <a:schemeClr val="accent1"/>
+            </a:lnRef>
+            <a:fillRef idx="0">
+              <a:schemeClr val="accent1"/>
+            </a:fillRef>
+            <a:effectRef idx="0">
+              <a:schemeClr val="accent1"/>
+            </a:effectRef>
+            <a:fontRef idx="minor">
+              <a:schemeClr val="tx1"/>
+            </a:fontRef>
+          </p:style>
+        </p:cxnSp>
+        <p:cxnSp>
+          <p:nvCxnSpPr>
+            <p:cNvPr id="59" name="Straight Connector 58">
+              <a:extLst>
+                <a:ext uri="{FF2B5EF4-FFF2-40B4-BE49-F238E27FC236}">
+                  <a16:creationId xmlns:a16="http://schemas.microsoft.com/office/drawing/2014/main" id="{95595F66-6787-FB46-87C7-7097FF44D3FC}"/>
+                </a:ext>
+              </a:extLst>
+            </p:cNvPr>
+            <p:cNvCxnSpPr>
+              <a:cxnSpLocks/>
+            </p:cNvCxnSpPr>
+            <p:nvPr/>
+          </p:nvCxnSpPr>
+          <p:spPr>
+            <a:xfrm flipV="1">
+              <a:off x="1399259" y="1853904"/>
+              <a:ext cx="0" cy="2330983"/>
+            </a:xfrm>
+            <a:prstGeom prst="line">
+              <a:avLst/>
+            </a:prstGeom>
+            <a:ln w="28575">
+              <a:solidFill>
+                <a:schemeClr val="tx1"/>
+              </a:solidFill>
+              <a:prstDash val="dash"/>
+            </a:ln>
+          </p:spPr>
+          <p:style>
+            <a:lnRef idx="1">
+              <a:schemeClr val="accent1"/>
+            </a:lnRef>
+            <a:fillRef idx="0">
+              <a:schemeClr val="accent1"/>
+            </a:fillRef>
+            <a:effectRef idx="0">
+              <a:schemeClr val="accent1"/>
+            </a:effectRef>
+            <a:fontRef idx="minor">
+              <a:schemeClr val="tx1"/>
+            </a:fontRef>
+          </p:style>
+        </p:cxnSp>
+        <p:cxnSp>
+          <p:nvCxnSpPr>
+            <p:cNvPr id="60" name="Straight Connector 59">
+              <a:extLst>
+                <a:ext uri="{FF2B5EF4-FFF2-40B4-BE49-F238E27FC236}">
+                  <a16:creationId xmlns:a16="http://schemas.microsoft.com/office/drawing/2014/main" id="{2BC2707E-7689-324D-8B27-A9C95262127A}"/>
+                </a:ext>
+              </a:extLst>
+            </p:cNvPr>
+            <p:cNvCxnSpPr>
+              <a:cxnSpLocks/>
+            </p:cNvCxnSpPr>
+            <p:nvPr/>
+          </p:nvCxnSpPr>
+          <p:spPr>
+            <a:xfrm flipV="1">
+              <a:off x="5114188" y="1853904"/>
+              <a:ext cx="0" cy="2330983"/>
+            </a:xfrm>
+            <a:prstGeom prst="line">
+              <a:avLst/>
+            </a:prstGeom>
+            <a:ln w="28575">
+              <a:solidFill>
+                <a:schemeClr val="tx1"/>
+              </a:solidFill>
+              <a:prstDash val="dash"/>
+            </a:ln>
+          </p:spPr>
+          <p:style>
+            <a:lnRef idx="1">
+              <a:schemeClr val="accent1"/>
+            </a:lnRef>
+            <a:fillRef idx="0">
+              <a:schemeClr val="accent1"/>
+            </a:fillRef>
+            <a:effectRef idx="0">
+              <a:schemeClr val="accent1"/>
+            </a:effectRef>
+            <a:fontRef idx="minor">
+              <a:schemeClr val="tx1"/>
+            </a:fontRef>
+          </p:style>
+        </p:cxnSp>
+      </p:grpSp>
+      <p:sp>
+        <p:nvSpPr>
+          <p:cNvPr id="61" name="TextBox 60">
+            <a:extLst>
+              <a:ext uri="{FF2B5EF4-FFF2-40B4-BE49-F238E27FC236}">
+                <a16:creationId xmlns:a16="http://schemas.microsoft.com/office/drawing/2014/main" id="{08AE32B9-7278-9648-9D48-427CBC8C7C2D}"/>
+              </a:ext>
+            </a:extLst>
+          </p:cNvPr>
+          <p:cNvSpPr txBox="1"/>
+          <p:nvPr/>
+        </p:nvSpPr>
+        <p:spPr>
+          <a:xfrm>
+            <a:off x="1303520" y="67057"/>
+            <a:ext cx="802248" cy="307777"/>
+          </a:xfrm>
+          <a:prstGeom prst="rect">
+            <a:avLst/>
+          </a:prstGeom>
+          <a:noFill/>
+        </p:spPr>
+        <p:txBody>
+          <a:bodyPr wrap="square" rtlCol="0">
+            <a:spAutoFit/>
+          </a:bodyPr>
+          <a:lstStyle/>
+          <a:p>
+            <a:pPr algn="ctr"/>
+            <a:r>
+              <a:rPr lang="en-GB" sz="1400" dirty="0" err="1">
+                <a:latin typeface="Consolas" panose="020B0609020204030204" pitchFamily="49" charset="0"/>
+                <a:cs typeface="Consolas" panose="020B0609020204030204" pitchFamily="49" charset="0"/>
+              </a:rPr>
+              <a:t>fw</a:t>
+            </a:r>
+            <a:endParaRPr lang="de-DE" sz="1400" dirty="0">
+              <a:latin typeface="Consolas" panose="020B0609020204030204" pitchFamily="49" charset="0"/>
+              <a:cs typeface="Consolas" panose="020B0609020204030204" pitchFamily="49" charset="0"/>
+            </a:endParaRPr>
+          </a:p>
+        </p:txBody>
+      </p:sp>
+      <p:sp>
+        <p:nvSpPr>
+          <p:cNvPr id="62" name="TextBox 61">
+            <a:extLst>
+              <a:ext uri="{FF2B5EF4-FFF2-40B4-BE49-F238E27FC236}">
+                <a16:creationId xmlns:a16="http://schemas.microsoft.com/office/drawing/2014/main" id="{63888F76-FFE7-0943-BA8C-8B9FF93CC069}"/>
+              </a:ext>
+            </a:extLst>
+          </p:cNvPr>
+          <p:cNvSpPr txBox="1"/>
+          <p:nvPr/>
+        </p:nvSpPr>
+        <p:spPr>
+          <a:xfrm>
+            <a:off x="688563" y="699767"/>
+            <a:ext cx="464060" cy="307777"/>
+          </a:xfrm>
+          <a:prstGeom prst="rect">
+            <a:avLst/>
+          </a:prstGeom>
+          <a:noFill/>
+        </p:spPr>
+        <p:txBody>
+          <a:bodyPr wrap="square" rtlCol="0">
+            <a:spAutoFit/>
+          </a:bodyPr>
+          <a:lstStyle/>
+          <a:p>
+            <a:pPr algn="r"/>
+            <a:r>
+              <a:rPr lang="en-GB" sz="1400" dirty="0" err="1">
+                <a:latin typeface="Consolas" panose="020B0609020204030204" pitchFamily="49" charset="0"/>
+                <a:cs typeface="Consolas" panose="020B0609020204030204" pitchFamily="49" charset="0"/>
+              </a:rPr>
+              <a:t>fh</a:t>
+            </a:r>
+            <a:endParaRPr lang="de-DE" sz="1400" dirty="0">
+              <a:latin typeface="Consolas" panose="020B0609020204030204" pitchFamily="49" charset="0"/>
+              <a:cs typeface="Consolas" panose="020B0609020204030204" pitchFamily="49" charset="0"/>
+            </a:endParaRPr>
+          </a:p>
+        </p:txBody>
+      </p:sp>
+      <p:sp>
+        <p:nvSpPr>
+          <p:cNvPr id="63" name="TextBox 62">
+            <a:extLst>
+              <a:ext uri="{FF2B5EF4-FFF2-40B4-BE49-F238E27FC236}">
+                <a16:creationId xmlns:a16="http://schemas.microsoft.com/office/drawing/2014/main" id="{97F4B6E6-B632-954B-8E78-A145AE44614B}"/>
+              </a:ext>
+            </a:extLst>
+          </p:cNvPr>
+          <p:cNvSpPr txBox="1"/>
+          <p:nvPr/>
+        </p:nvSpPr>
+        <p:spPr>
+          <a:xfrm>
+            <a:off x="2641511" y="5426493"/>
+            <a:ext cx="3769357" cy="307777"/>
+          </a:xfrm>
+          <a:prstGeom prst="rect">
+            <a:avLst/>
+          </a:prstGeom>
+          <a:noFill/>
+        </p:spPr>
+        <p:txBody>
+          <a:bodyPr wrap="square" rtlCol="0">
+            <a:spAutoFit/>
+          </a:bodyPr>
+          <a:lstStyle/>
+          <a:p>
+            <a:r>
+              <a:rPr lang="en-GB" sz="1400" dirty="0" err="1">
+                <a:latin typeface="Consolas" panose="020B0609020204030204" pitchFamily="49" charset="0"/>
+                <a:cs typeface="Consolas" panose="020B0609020204030204" pitchFamily="49" charset="0"/>
+              </a:rPr>
+              <a:t>sw</a:t>
+            </a:r>
+            <a:r>
+              <a:rPr lang="en-GB" sz="1400" dirty="0">
+                <a:latin typeface="Consolas" panose="020B0609020204030204" pitchFamily="49" charset="0"/>
+                <a:cs typeface="Consolas" panose="020B0609020204030204" pitchFamily="49" charset="0"/>
+              </a:rPr>
+              <a:t> = </a:t>
+            </a:r>
+            <a:r>
+              <a:rPr lang="en-GB" sz="1400" dirty="0" err="1">
+                <a:latin typeface="Consolas" panose="020B0609020204030204" pitchFamily="49" charset="0"/>
+                <a:cs typeface="Consolas" panose="020B0609020204030204" pitchFamily="49" charset="0"/>
+              </a:rPr>
+              <a:t>fw</a:t>
+            </a:r>
+            <a:r>
+              <a:rPr lang="en-GB" sz="1400" dirty="0">
+                <a:latin typeface="Consolas" panose="020B0609020204030204" pitchFamily="49" charset="0"/>
+                <a:cs typeface="Consolas" panose="020B0609020204030204" pitchFamily="49" charset="0"/>
+              </a:rPr>
+              <a:t> / </a:t>
+            </a:r>
+            <a:r>
+              <a:rPr lang="en-GB" sz="1400" dirty="0" err="1">
+                <a:latin typeface="Consolas" panose="020B0609020204030204" pitchFamily="49" charset="0"/>
+                <a:cs typeface="Consolas" panose="020B0609020204030204" pitchFamily="49" charset="0"/>
+              </a:rPr>
+              <a:t>twr</a:t>
+            </a:r>
+            <a:endParaRPr lang="de-DE" sz="1400" dirty="0">
+              <a:latin typeface="Consolas" panose="020B0609020204030204" pitchFamily="49" charset="0"/>
+              <a:cs typeface="Consolas" panose="020B0609020204030204" pitchFamily="49" charset="0"/>
+            </a:endParaRPr>
+          </a:p>
+        </p:txBody>
+      </p:sp>
+      <p:sp>
+        <p:nvSpPr>
+          <p:cNvPr id="64" name="TextBox 63">
+            <a:extLst>
+              <a:ext uri="{FF2B5EF4-FFF2-40B4-BE49-F238E27FC236}">
+                <a16:creationId xmlns:a16="http://schemas.microsoft.com/office/drawing/2014/main" id="{1CA3360E-509D-1446-9DF0-4E2D429B5228}"/>
+              </a:ext>
+            </a:extLst>
+          </p:cNvPr>
+          <p:cNvSpPr txBox="1"/>
+          <p:nvPr/>
+        </p:nvSpPr>
+        <p:spPr>
+          <a:xfrm>
+            <a:off x="2641511" y="5797503"/>
+            <a:ext cx="3769357" cy="307777"/>
+          </a:xfrm>
+          <a:prstGeom prst="rect">
+            <a:avLst/>
+          </a:prstGeom>
+          <a:noFill/>
+        </p:spPr>
+        <p:txBody>
+          <a:bodyPr wrap="square" rtlCol="0">
+            <a:spAutoFit/>
+          </a:bodyPr>
+          <a:lstStyle/>
+          <a:p>
+            <a:r>
+              <a:rPr lang="en-GB" sz="1400" dirty="0" err="1">
+                <a:latin typeface="Consolas" panose="020B0609020204030204" pitchFamily="49" charset="0"/>
+                <a:cs typeface="Consolas" panose="020B0609020204030204" pitchFamily="49" charset="0"/>
+              </a:rPr>
+              <a:t>sh</a:t>
+            </a:r>
+            <a:r>
+              <a:rPr lang="en-GB" sz="1400" dirty="0">
+                <a:latin typeface="Consolas" panose="020B0609020204030204" pitchFamily="49" charset="0"/>
+                <a:cs typeface="Consolas" panose="020B0609020204030204" pitchFamily="49" charset="0"/>
+              </a:rPr>
+              <a:t>= </a:t>
+            </a:r>
+            <a:r>
+              <a:rPr lang="en-GB" sz="1400" dirty="0" err="1">
+                <a:latin typeface="Consolas" panose="020B0609020204030204" pitchFamily="49" charset="0"/>
+                <a:cs typeface="Consolas" panose="020B0609020204030204" pitchFamily="49" charset="0"/>
+              </a:rPr>
+              <a:t>fh</a:t>
+            </a:r>
+            <a:r>
+              <a:rPr lang="en-GB" sz="1400" dirty="0">
+                <a:latin typeface="Consolas" panose="020B0609020204030204" pitchFamily="49" charset="0"/>
+                <a:cs typeface="Consolas" panose="020B0609020204030204" pitchFamily="49" charset="0"/>
+              </a:rPr>
+              <a:t> / </a:t>
+            </a:r>
+            <a:r>
+              <a:rPr lang="en-GB" sz="1400" dirty="0" err="1">
+                <a:latin typeface="Consolas" panose="020B0609020204030204" pitchFamily="49" charset="0"/>
+                <a:cs typeface="Consolas" panose="020B0609020204030204" pitchFamily="49" charset="0"/>
+              </a:rPr>
+              <a:t>thr</a:t>
+            </a:r>
+            <a:endParaRPr lang="de-DE" sz="1400" dirty="0">
+              <a:latin typeface="Consolas" panose="020B0609020204030204" pitchFamily="49" charset="0"/>
+              <a:cs typeface="Consolas" panose="020B0609020204030204" pitchFamily="49" charset="0"/>
+            </a:endParaRPr>
+          </a:p>
+        </p:txBody>
+      </p:sp>
+      <p:grpSp>
+        <p:nvGrpSpPr>
+          <p:cNvPr id="2" name="Group 1">
+            <a:extLst>
+              <a:ext uri="{FF2B5EF4-FFF2-40B4-BE49-F238E27FC236}">
+                <a16:creationId xmlns:a16="http://schemas.microsoft.com/office/drawing/2014/main" id="{C5DD5784-A585-D740-8590-DDA4573729B5}"/>
+              </a:ext>
+            </a:extLst>
+          </p:cNvPr>
+          <p:cNvGrpSpPr/>
+          <p:nvPr/>
+        </p:nvGrpSpPr>
+        <p:grpSpPr>
+          <a:xfrm>
+            <a:off x="1633810" y="1043507"/>
+            <a:ext cx="4777058" cy="3510635"/>
+            <a:chOff x="1232988" y="1027414"/>
+            <a:chExt cx="4777058" cy="3510635"/>
+          </a:xfrm>
+        </p:grpSpPr>
+        <p:sp>
+          <p:nvSpPr>
+            <p:cNvPr id="30" name="Rectangle 29">
+              <a:extLst>
+                <a:ext uri="{FF2B5EF4-FFF2-40B4-BE49-F238E27FC236}">
+                  <a16:creationId xmlns:a16="http://schemas.microsoft.com/office/drawing/2014/main" id="{3E359577-BD65-2E4D-BFBD-5F810F197A29}"/>
+                </a:ext>
+              </a:extLst>
+            </p:cNvPr>
+            <p:cNvSpPr/>
+            <p:nvPr/>
+          </p:nvSpPr>
+          <p:spPr>
+            <a:xfrm>
+              <a:off x="1232988" y="1027414"/>
+              <a:ext cx="4777058" cy="3510635"/>
+            </a:xfrm>
+            <a:prstGeom prst="rect">
+              <a:avLst/>
+            </a:prstGeom>
+            <a:solidFill>
+              <a:srgbClr val="4472C4">
+                <a:alpha val="37255"/>
+              </a:srgbClr>
+            </a:solidFill>
+            <a:ln>
+              <a:solidFill>
+                <a:schemeClr val="tx1"/>
+              </a:solidFill>
+            </a:ln>
+          </p:spPr>
+          <p:style>
+            <a:lnRef idx="2">
+              <a:schemeClr val="accent1">
+                <a:shade val="50000"/>
+              </a:schemeClr>
+            </a:lnRef>
+            <a:fillRef idx="1">
+              <a:schemeClr val="accent1"/>
+            </a:fillRef>
+            <a:effectRef idx="0">
+              <a:schemeClr val="accent1"/>
+            </a:effectRef>
+            <a:fontRef idx="minor">
+              <a:schemeClr val="lt1"/>
+            </a:fontRef>
+          </p:style>
+          <p:txBody>
+            <a:bodyPr rtlCol="0" anchor="ctr"/>
+            <a:lstStyle/>
+            <a:p>
+              <a:pPr algn="ctr"/>
+              <a:endParaRPr lang="de-DE" dirty="0"/>
+            </a:p>
+          </p:txBody>
+        </p:sp>
+        <p:grpSp>
+          <p:nvGrpSpPr>
+            <p:cNvPr id="24" name="Group 23">
+              <a:extLst>
+                <a:ext uri="{FF2B5EF4-FFF2-40B4-BE49-F238E27FC236}">
+                  <a16:creationId xmlns:a16="http://schemas.microsoft.com/office/drawing/2014/main" id="{FEC42AA1-957A-3341-93AE-4BC115610B2F}"/>
+                </a:ext>
+              </a:extLst>
+            </p:cNvPr>
+            <p:cNvGrpSpPr/>
+            <p:nvPr/>
+          </p:nvGrpSpPr>
+          <p:grpSpPr>
+            <a:xfrm rot="1095909">
+              <a:off x="1481827" y="1659772"/>
+              <a:ext cx="4298952" cy="2279006"/>
+              <a:chOff x="984700" y="1522296"/>
+              <a:chExt cx="4352456" cy="2602038"/>
+            </a:xfrm>
+          </p:grpSpPr>
+          <p:grpSp>
+            <p:nvGrpSpPr>
+              <p:cNvPr id="25" name="Group 24">
+                <a:extLst>
+                  <a:ext uri="{FF2B5EF4-FFF2-40B4-BE49-F238E27FC236}">
+                    <a16:creationId xmlns:a16="http://schemas.microsoft.com/office/drawing/2014/main" id="{5BED366F-E0FB-304C-9AD9-D595D674A83B}"/>
+                  </a:ext>
+                </a:extLst>
+              </p:cNvPr>
+              <p:cNvGrpSpPr/>
+              <p:nvPr/>
+            </p:nvGrpSpPr>
+            <p:grpSpPr>
+              <a:xfrm>
+                <a:off x="984700" y="1522296"/>
+                <a:ext cx="4331906" cy="2600952"/>
+                <a:chOff x="894080" y="910434"/>
+                <a:chExt cx="5415280" cy="3488846"/>
+              </a:xfrm>
+            </p:grpSpPr>
+            <p:sp>
+              <p:nvSpPr>
+                <p:cNvPr id="28" name="Rounded Rectangle 27">
+                  <a:extLst>
+                    <a:ext uri="{FF2B5EF4-FFF2-40B4-BE49-F238E27FC236}">
+                      <a16:creationId xmlns:a16="http://schemas.microsoft.com/office/drawing/2014/main" id="{05A82205-CE49-4242-BD1F-CECDC4F225C8}"/>
+                    </a:ext>
+                  </a:extLst>
+                </p:cNvPr>
+                <p:cNvSpPr/>
+                <p:nvPr/>
+              </p:nvSpPr>
+              <p:spPr>
+                <a:xfrm>
+                  <a:off x="894080" y="910434"/>
+                  <a:ext cx="5415280" cy="3488846"/>
+                </a:xfrm>
+                <a:prstGeom prst="roundRect">
+                  <a:avLst/>
+                </a:prstGeom>
+              </p:spPr>
+              <p:style>
+                <a:lnRef idx="2">
+                  <a:schemeClr val="accent1">
+                    <a:shade val="50000"/>
+                  </a:schemeClr>
+                </a:lnRef>
+                <a:fillRef idx="1">
+                  <a:schemeClr val="accent1"/>
+                </a:fillRef>
+                <a:effectRef idx="0">
+                  <a:schemeClr val="accent1"/>
+                </a:effectRef>
+                <a:fontRef idx="minor">
+                  <a:schemeClr val="lt1"/>
+                </a:fontRef>
+              </p:style>
+              <p:txBody>
+                <a:bodyPr rtlCol="0" anchor="ctr"/>
+                <a:lstStyle/>
+                <a:p>
+                  <a:pPr algn="ctr"/>
+                  <a:endParaRPr lang="en-VN"/>
+                </a:p>
+              </p:txBody>
+            </p:sp>
+            <p:sp>
+              <p:nvSpPr>
+                <p:cNvPr id="29" name="Rounded Rectangle 28">
+                  <a:extLst>
+                    <a:ext uri="{FF2B5EF4-FFF2-40B4-BE49-F238E27FC236}">
+                      <a16:creationId xmlns:a16="http://schemas.microsoft.com/office/drawing/2014/main" id="{841E5A47-9E4E-3A40-966B-AA804E13FFBC}"/>
+                    </a:ext>
+                  </a:extLst>
+                </p:cNvPr>
+                <p:cNvSpPr/>
+                <p:nvPr/>
+              </p:nvSpPr>
+              <p:spPr>
+                <a:xfrm>
+                  <a:off x="1135103" y="1218211"/>
+                  <a:ext cx="4879819" cy="2970293"/>
+                </a:xfrm>
+                <a:prstGeom prst="roundRect">
+                  <a:avLst>
+                    <a:gd name="adj" fmla="val 11878"/>
+                  </a:avLst>
+                </a:prstGeom>
+                <a:solidFill>
+                  <a:schemeClr val="bg1"/>
+                </a:solidFill>
+              </p:spPr>
+              <p:style>
+                <a:lnRef idx="2">
+                  <a:schemeClr val="accent1">
+                    <a:shade val="50000"/>
+                  </a:schemeClr>
+                </a:lnRef>
+                <a:fillRef idx="1">
+                  <a:schemeClr val="accent1"/>
+                </a:fillRef>
+                <a:effectRef idx="0">
+                  <a:schemeClr val="accent1"/>
+                </a:effectRef>
+                <a:fontRef idx="minor">
+                  <a:schemeClr val="lt1"/>
+                </a:fontRef>
+              </p:style>
+              <p:txBody>
+                <a:bodyPr rtlCol="0" anchor="ctr"/>
+                <a:lstStyle/>
+                <a:p>
+                  <a:pPr algn="ctr"/>
+                  <a:endParaRPr lang="en-VN"/>
+                </a:p>
+              </p:txBody>
+            </p:sp>
+          </p:grpSp>
+          <p:sp>
+            <p:nvSpPr>
+              <p:cNvPr id="26" name="Rectangle 25">
+                <a:extLst>
+                  <a:ext uri="{FF2B5EF4-FFF2-40B4-BE49-F238E27FC236}">
+                    <a16:creationId xmlns:a16="http://schemas.microsoft.com/office/drawing/2014/main" id="{BD32B3BC-A8DD-6E41-891E-4192DF288946}"/>
+                  </a:ext>
+                </a:extLst>
+              </p:cNvPr>
+              <p:cNvSpPr>
+                <a:spLocks noChangeAspect="1"/>
+              </p:cNvSpPr>
+              <p:nvPr/>
+            </p:nvSpPr>
+            <p:spPr>
+              <a:xfrm>
+                <a:off x="984700" y="1523376"/>
+                <a:ext cx="4352456" cy="2600958"/>
+              </a:xfrm>
+              <a:prstGeom prst="rect">
+                <a:avLst/>
+              </a:prstGeom>
+              <a:solidFill>
+                <a:srgbClr val="FFC000">
+                  <a:alpha val="37255"/>
+                </a:srgbClr>
+              </a:solidFill>
+              <a:ln>
+                <a:solidFill>
+                  <a:srgbClr val="FF0000"/>
+                </a:solidFill>
+              </a:ln>
+            </p:spPr>
+            <p:style>
+              <a:lnRef idx="2">
+                <a:schemeClr val="accent1">
+                  <a:shade val="50000"/>
+                </a:schemeClr>
+              </a:lnRef>
+              <a:fillRef idx="1">
+                <a:schemeClr val="accent1"/>
+              </a:fillRef>
+              <a:effectRef idx="0">
+                <a:schemeClr val="accent1"/>
+              </a:effectRef>
+              <a:fontRef idx="minor">
+                <a:schemeClr val="lt1"/>
+              </a:fontRef>
+            </p:style>
+            <p:txBody>
+              <a:bodyPr rtlCol="0" anchor="ctr"/>
+              <a:lstStyle/>
+              <a:p>
+                <a:pPr algn="ctr"/>
+                <a:endParaRPr lang="de-DE" dirty="0"/>
+              </a:p>
+            </p:txBody>
+          </p:sp>
+          <p:sp>
+            <p:nvSpPr>
+              <p:cNvPr id="27" name="Rectangle 26">
+                <a:extLst>
+                  <a:ext uri="{FF2B5EF4-FFF2-40B4-BE49-F238E27FC236}">
+                    <a16:creationId xmlns:a16="http://schemas.microsoft.com/office/drawing/2014/main" id="{F2E2894C-172A-A745-ABB1-B1BCAD4D5D5F}"/>
+                  </a:ext>
+                </a:extLst>
+              </p:cNvPr>
+              <p:cNvSpPr>
+                <a:spLocks noChangeAspect="1"/>
+              </p:cNvSpPr>
+              <p:nvPr/>
+            </p:nvSpPr>
+            <p:spPr>
+              <a:xfrm>
+                <a:off x="1499486" y="2002466"/>
+                <a:ext cx="3302339" cy="1693576"/>
+              </a:xfrm>
+              <a:prstGeom prst="rect">
+                <a:avLst/>
+              </a:prstGeom>
+              <a:solidFill>
+                <a:srgbClr val="FFC000">
+                  <a:alpha val="37255"/>
+                </a:srgbClr>
+              </a:solidFill>
+              <a:ln>
+                <a:solidFill>
+                  <a:srgbClr val="FF0000"/>
+                </a:solidFill>
+              </a:ln>
+            </p:spPr>
+            <p:style>
+              <a:lnRef idx="2">
+                <a:schemeClr val="accent1">
+                  <a:shade val="50000"/>
+                </a:schemeClr>
+              </a:lnRef>
+              <a:fillRef idx="1">
+                <a:schemeClr val="accent1"/>
+              </a:fillRef>
+              <a:effectRef idx="0">
+                <a:schemeClr val="accent1"/>
+              </a:effectRef>
+              <a:fontRef idx="minor">
+                <a:schemeClr val="lt1"/>
+              </a:fontRef>
+            </p:style>
+            <p:txBody>
+              <a:bodyPr rtlCol="0" anchor="ctr"/>
+              <a:lstStyle/>
+              <a:p>
+                <a:pPr algn="ctr"/>
+                <a:endParaRPr lang="de-DE" dirty="0"/>
+              </a:p>
+            </p:txBody>
+          </p:sp>
+        </p:grpSp>
+      </p:grpSp>
+      <p:sp>
+        <p:nvSpPr>
+          <p:cNvPr id="32" name="TextBox 31">
+            <a:extLst>
+              <a:ext uri="{FF2B5EF4-FFF2-40B4-BE49-F238E27FC236}">
+                <a16:creationId xmlns:a16="http://schemas.microsoft.com/office/drawing/2014/main" id="{CE70E108-4F3D-DD41-81C1-5714342A555A}"/>
+              </a:ext>
+            </a:extLst>
+          </p:cNvPr>
+          <p:cNvSpPr txBox="1"/>
+          <p:nvPr/>
+        </p:nvSpPr>
+        <p:spPr>
+          <a:xfrm>
+            <a:off x="3334236" y="688589"/>
+            <a:ext cx="902477" cy="307777"/>
+          </a:xfrm>
+          <a:prstGeom prst="rect">
+            <a:avLst/>
+          </a:prstGeom>
+          <a:noFill/>
+        </p:spPr>
+        <p:txBody>
+          <a:bodyPr wrap="square" rtlCol="0">
+            <a:spAutoFit/>
+          </a:bodyPr>
+          <a:lstStyle/>
+          <a:p>
+            <a:pPr algn="ctr"/>
+            <a:r>
+              <a:rPr lang="en-GB" sz="1400" dirty="0" err="1">
+                <a:latin typeface="Consolas" panose="020B0609020204030204" pitchFamily="49" charset="0"/>
+                <a:cs typeface="Consolas" panose="020B0609020204030204" pitchFamily="49" charset="0"/>
+              </a:rPr>
+              <a:t>thr</a:t>
+            </a:r>
+            <a:endParaRPr lang="de-DE" sz="1400" dirty="0">
+              <a:latin typeface="Consolas" panose="020B0609020204030204" pitchFamily="49" charset="0"/>
+              <a:cs typeface="Consolas" panose="020B0609020204030204" pitchFamily="49" charset="0"/>
+            </a:endParaRPr>
+          </a:p>
+        </p:txBody>
+      </p:sp>
+      <p:sp>
+        <p:nvSpPr>
+          <p:cNvPr id="33" name="TextBox 32">
+            <a:extLst>
+              <a:ext uri="{FF2B5EF4-FFF2-40B4-BE49-F238E27FC236}">
+                <a16:creationId xmlns:a16="http://schemas.microsoft.com/office/drawing/2014/main" id="{700FCB03-ABA5-5A44-87A4-7390D1B4945D}"/>
+              </a:ext>
+            </a:extLst>
+          </p:cNvPr>
+          <p:cNvSpPr txBox="1"/>
+          <p:nvPr/>
+        </p:nvSpPr>
+        <p:spPr>
+          <a:xfrm>
+            <a:off x="6430144" y="2601925"/>
+            <a:ext cx="902477" cy="307777"/>
+          </a:xfrm>
+          <a:prstGeom prst="rect">
+            <a:avLst/>
+          </a:prstGeom>
+          <a:noFill/>
+        </p:spPr>
+        <p:txBody>
+          <a:bodyPr wrap="square" rtlCol="0">
+            <a:spAutoFit/>
+          </a:bodyPr>
+          <a:lstStyle/>
+          <a:p>
+            <a:r>
+              <a:rPr lang="en-GB" sz="1400" dirty="0" err="1">
+                <a:latin typeface="Consolas" panose="020B0609020204030204" pitchFamily="49" charset="0"/>
+                <a:cs typeface="Consolas" panose="020B0609020204030204" pitchFamily="49" charset="0"/>
+              </a:rPr>
+              <a:t>twr</a:t>
+            </a:r>
+            <a:endParaRPr lang="de-DE" sz="1400" dirty="0">
+              <a:latin typeface="Consolas" panose="020B0609020204030204" pitchFamily="49" charset="0"/>
+              <a:cs typeface="Consolas" panose="020B0609020204030204" pitchFamily="49" charset="0"/>
+            </a:endParaRPr>
+          </a:p>
+        </p:txBody>
+      </p:sp>
+      <p:sp>
+        <p:nvSpPr>
+          <p:cNvPr id="34" name="TextBox 33">
+            <a:extLst>
+              <a:ext uri="{FF2B5EF4-FFF2-40B4-BE49-F238E27FC236}">
+                <a16:creationId xmlns:a16="http://schemas.microsoft.com/office/drawing/2014/main" id="{DC6EFC74-FAD5-4C44-88CD-1122638C4826}"/>
+              </a:ext>
+            </a:extLst>
+          </p:cNvPr>
+          <p:cNvSpPr txBox="1"/>
+          <p:nvPr/>
+        </p:nvSpPr>
+        <p:spPr>
+          <a:xfrm>
+            <a:off x="2641510" y="6174303"/>
+            <a:ext cx="3769357" cy="307777"/>
+          </a:xfrm>
+          <a:prstGeom prst="rect">
+            <a:avLst/>
+          </a:prstGeom>
+          <a:noFill/>
+        </p:spPr>
+        <p:txBody>
+          <a:bodyPr wrap="square" rtlCol="0">
+            <a:spAutoFit/>
+          </a:bodyPr>
+          <a:lstStyle/>
+          <a:p>
+            <a:r>
+              <a:rPr lang="en-GB" sz="1400" dirty="0">
+                <a:latin typeface="Consolas" panose="020B0609020204030204" pitchFamily="49" charset="0"/>
+                <a:cs typeface="Consolas" panose="020B0609020204030204" pitchFamily="49" charset="0"/>
+              </a:rPr>
+              <a:t>scale=min(</a:t>
+            </a:r>
+            <a:r>
+              <a:rPr lang="en-GB" sz="1400" dirty="0" err="1">
+                <a:latin typeface="Consolas" panose="020B0609020204030204" pitchFamily="49" charset="0"/>
+                <a:cs typeface="Consolas" panose="020B0609020204030204" pitchFamily="49" charset="0"/>
+              </a:rPr>
+              <a:t>sw</a:t>
+            </a:r>
+            <a:r>
+              <a:rPr lang="en-GB" sz="1400" dirty="0">
+                <a:latin typeface="Consolas" panose="020B0609020204030204" pitchFamily="49" charset="0"/>
+                <a:cs typeface="Consolas" panose="020B0609020204030204" pitchFamily="49" charset="0"/>
+              </a:rPr>
+              <a:t>, </a:t>
+            </a:r>
+            <a:r>
+              <a:rPr lang="en-GB" sz="1400" dirty="0" err="1">
+                <a:latin typeface="Consolas" panose="020B0609020204030204" pitchFamily="49" charset="0"/>
+                <a:cs typeface="Consolas" panose="020B0609020204030204" pitchFamily="49" charset="0"/>
+              </a:rPr>
+              <a:t>sh</a:t>
+            </a:r>
+            <a:r>
+              <a:rPr lang="en-GB" sz="1400" dirty="0">
+                <a:latin typeface="Consolas" panose="020B0609020204030204" pitchFamily="49" charset="0"/>
+                <a:cs typeface="Consolas" panose="020B0609020204030204" pitchFamily="49" charset="0"/>
+              </a:rPr>
+              <a:t>)</a:t>
+            </a:r>
+            <a:endParaRPr lang="de-DE" sz="1400" dirty="0">
+              <a:latin typeface="Consolas" panose="020B0609020204030204" pitchFamily="49" charset="0"/>
+              <a:cs typeface="Consolas" panose="020B0609020204030204" pitchFamily="49" charset="0"/>
+            </a:endParaRPr>
+          </a:p>
+        </p:txBody>
+      </p:sp>
+    </p:spTree>
+    <p:extLst>
+      <p:ext uri="{BB962C8B-B14F-4D97-AF65-F5344CB8AC3E}">
+        <p14:creationId xmlns:p14="http://schemas.microsoft.com/office/powerpoint/2010/main" val="2985952050"/>
+      </p:ext>
+    </p:extLst>
+  </p:cSld>
+  <p:clrMapOvr>
+    <a:masterClrMapping/>
+  </p:clrMapOvr>
+</p:sld>
+</file>
+
+<file path=ppt/slides/slide4.xml><?xml version="1.0" encoding="utf-8"?>
 <p:sld xmlns:a="http://schemas.openxmlformats.org/drawingml/2006/main" xmlns:r="http://schemas.openxmlformats.org/officeDocument/2006/relationships" xmlns:p="http://schemas.openxmlformats.org/presentationml/2006/main">
   <p:cSld>
     <p:spTree>
@@ -8522,7 +9335,7 @@
 </p:sld>
 </file>
 
-<file path=ppt/slides/slide4.xml><?xml version="1.0" encoding="utf-8"?>
+<file path=ppt/slides/slide5.xml><?xml version="1.0" encoding="utf-8"?>
 <p:sld xmlns:a="http://schemas.openxmlformats.org/drawingml/2006/main" xmlns:r="http://schemas.openxmlformats.org/officeDocument/2006/relationships" xmlns:p="http://schemas.openxmlformats.org/presentationml/2006/main">
   <p:cSld>
     <p:spTree>
@@ -10032,7 +10845,7 @@
 </p:sld>
 </file>
 
-<file path=ppt/slides/slide5.xml><?xml version="1.0" encoding="utf-8"?>
+<file path=ppt/slides/slide6.xml><?xml version="1.0" encoding="utf-8"?>
 <p:sld xmlns:a="http://schemas.openxmlformats.org/drawingml/2006/main" xmlns:r="http://schemas.openxmlformats.org/officeDocument/2006/relationships" xmlns:p="http://schemas.openxmlformats.org/presentationml/2006/main">
   <p:cSld>
     <p:spTree>
@@ -12160,7 +12973,7 @@
 </p:sld>
 </file>
 
-<file path=ppt/slides/slide6.xml><?xml version="1.0" encoding="utf-8"?>
+<file path=ppt/slides/slide7.xml><?xml version="1.0" encoding="utf-8"?>
 <p:sld xmlns:a="http://schemas.openxmlformats.org/drawingml/2006/main" xmlns:r="http://schemas.openxmlformats.org/officeDocument/2006/relationships" xmlns:p="http://schemas.openxmlformats.org/presentationml/2006/main">
   <p:cSld>
     <p:spTree>

</xml_diff>